<commit_message>
1.Expand minDistance to 0.5. 2.modify the pause function. 3.increase the number of trials to 240, 20 trials per condition
</commit_message>
<xml_diff>
--- a/pictures/introduction.pptx
+++ b/pictures/introduction.pptx
@@ -5,20 +5,18 @@
     <p:sldMasterId id="2147483648" r:id="rId1"/>
   </p:sldMasterIdLst>
   <p:notesMasterIdLst>
-    <p:notesMasterId r:id="rId13"/>
+    <p:notesMasterId r:id="rId11"/>
   </p:notesMasterIdLst>
   <p:sldIdLst>
     <p:sldId id="261" r:id="rId2"/>
     <p:sldId id="267" r:id="rId3"/>
     <p:sldId id="268" r:id="rId4"/>
     <p:sldId id="275" r:id="rId5"/>
-    <p:sldId id="274" r:id="rId6"/>
-    <p:sldId id="278" r:id="rId7"/>
-    <p:sldId id="260" r:id="rId8"/>
-    <p:sldId id="277" r:id="rId9"/>
-    <p:sldId id="276" r:id="rId10"/>
-    <p:sldId id="279" r:id="rId11"/>
-    <p:sldId id="259" r:id="rId12"/>
+    <p:sldId id="278" r:id="rId6"/>
+    <p:sldId id="276" r:id="rId7"/>
+    <p:sldId id="277" r:id="rId8"/>
+    <p:sldId id="259" r:id="rId9"/>
+    <p:sldId id="279" r:id="rId10"/>
   </p:sldIdLst>
   <p:sldSz cx="12192000" cy="6858000"/>
   <p:notesSz cx="6858000" cy="9144000"/>
@@ -120,7 +118,7 @@
   <p:extLst>
     <p:ext uri="{521415D9-36F7-43E2-AB2F-B90AF26B5E84}">
       <p14:sectionLst xmlns:p14="http://schemas.microsoft.com/office/powerpoint/2010/main">
-        <p14:section name="player1" id="{C928C6DD-A8B0-4EDF-9A2A-EB8EEBB6A25F}">
+        <p14:section name="introduction" id="{C928C6DD-A8B0-4EDF-9A2A-EB8EEBB6A25F}">
           <p14:sldIdLst>
             <p14:sldId id="261"/>
             <p14:sldId id="267"/>
@@ -130,13 +128,15 @@
         </p14:section>
         <p14:section name="insert pictures" id="{0987D39C-2E96-485A-8C68-510B317FB800}">
           <p14:sldIdLst>
-            <p14:sldId id="274"/>
             <p14:sldId id="278"/>
-            <p14:sldId id="260"/>
+            <p14:sldId id="276"/>
             <p14:sldId id="277"/>
-            <p14:sldId id="276"/>
+            <p14:sldId id="259"/>
+          </p14:sldIdLst>
+        </p14:section>
+        <p14:section name="not used" id="{8EF0A4D0-8265-4F5F-BE1A-CBA81FBCC78C}">
+          <p14:sldIdLst>
             <p14:sldId id="279"/>
-            <p14:sldId id="259"/>
           </p14:sldIdLst>
         </p14:section>
       </p14:sectionLst>
@@ -242,7 +242,7 @@
           <a:p>
             <a:fld id="{C0546B5F-B17E-4A11-A9CD-A10C644EC78D}" type="datetimeFigureOut">
               <a:rPr lang="zh-CN" altLang="en-US" smtClean="0"/>
-              <a:t>2021/7/21</a:t>
+              <a:t>2021/9/15</a:t>
             </a:fld>
             <a:endParaRPr lang="zh-CN" altLang="en-US"/>
           </a:p>
@@ -968,7 +968,7 @@
           <a:p>
             <a:fld id="{22C6D5CB-9E91-4D8B-8A6F-E7E64CE5E759}" type="datetimeFigureOut">
               <a:rPr lang="zh-CN" altLang="en-US" smtClean="0"/>
-              <a:t>2021/7/21</a:t>
+              <a:t>2021/9/15</a:t>
             </a:fld>
             <a:endParaRPr lang="zh-CN" altLang="en-US"/>
           </a:p>
@@ -1166,7 +1166,7 @@
           <a:p>
             <a:fld id="{22C6D5CB-9E91-4D8B-8A6F-E7E64CE5E759}" type="datetimeFigureOut">
               <a:rPr lang="zh-CN" altLang="en-US" smtClean="0"/>
-              <a:t>2021/7/21</a:t>
+              <a:t>2021/9/15</a:t>
             </a:fld>
             <a:endParaRPr lang="zh-CN" altLang="en-US"/>
           </a:p>
@@ -1374,7 +1374,7 @@
           <a:p>
             <a:fld id="{22C6D5CB-9E91-4D8B-8A6F-E7E64CE5E759}" type="datetimeFigureOut">
               <a:rPr lang="zh-CN" altLang="en-US" smtClean="0"/>
-              <a:t>2021/7/21</a:t>
+              <a:t>2021/9/15</a:t>
             </a:fld>
             <a:endParaRPr lang="zh-CN" altLang="en-US"/>
           </a:p>
@@ -1572,7 +1572,7 @@
           <a:p>
             <a:fld id="{22C6D5CB-9E91-4D8B-8A6F-E7E64CE5E759}" type="datetimeFigureOut">
               <a:rPr lang="zh-CN" altLang="en-US" smtClean="0"/>
-              <a:t>2021/7/21</a:t>
+              <a:t>2021/9/15</a:t>
             </a:fld>
             <a:endParaRPr lang="zh-CN" altLang="en-US"/>
           </a:p>
@@ -1847,7 +1847,7 @@
           <a:p>
             <a:fld id="{22C6D5CB-9E91-4D8B-8A6F-E7E64CE5E759}" type="datetimeFigureOut">
               <a:rPr lang="zh-CN" altLang="en-US" smtClean="0"/>
-              <a:t>2021/7/21</a:t>
+              <a:t>2021/9/15</a:t>
             </a:fld>
             <a:endParaRPr lang="zh-CN" altLang="en-US"/>
           </a:p>
@@ -2112,7 +2112,7 @@
           <a:p>
             <a:fld id="{22C6D5CB-9E91-4D8B-8A6F-E7E64CE5E759}" type="datetimeFigureOut">
               <a:rPr lang="zh-CN" altLang="en-US" smtClean="0"/>
-              <a:t>2021/7/21</a:t>
+              <a:t>2021/9/15</a:t>
             </a:fld>
             <a:endParaRPr lang="zh-CN" altLang="en-US"/>
           </a:p>
@@ -2524,7 +2524,7 @@
           <a:p>
             <a:fld id="{22C6D5CB-9E91-4D8B-8A6F-E7E64CE5E759}" type="datetimeFigureOut">
               <a:rPr lang="zh-CN" altLang="en-US" smtClean="0"/>
-              <a:t>2021/7/21</a:t>
+              <a:t>2021/9/15</a:t>
             </a:fld>
             <a:endParaRPr lang="zh-CN" altLang="en-US"/>
           </a:p>
@@ -2665,7 +2665,7 @@
           <a:p>
             <a:fld id="{22C6D5CB-9E91-4D8B-8A6F-E7E64CE5E759}" type="datetimeFigureOut">
               <a:rPr lang="zh-CN" altLang="en-US" smtClean="0"/>
-              <a:t>2021/7/21</a:t>
+              <a:t>2021/9/15</a:t>
             </a:fld>
             <a:endParaRPr lang="zh-CN" altLang="en-US"/>
           </a:p>
@@ -2778,7 +2778,7 @@
           <a:p>
             <a:fld id="{22C6D5CB-9E91-4D8B-8A6F-E7E64CE5E759}" type="datetimeFigureOut">
               <a:rPr lang="zh-CN" altLang="en-US" smtClean="0"/>
-              <a:t>2021/7/21</a:t>
+              <a:t>2021/9/15</a:t>
             </a:fld>
             <a:endParaRPr lang="zh-CN" altLang="en-US"/>
           </a:p>
@@ -3089,7 +3089,7 @@
           <a:p>
             <a:fld id="{22C6D5CB-9E91-4D8B-8A6F-E7E64CE5E759}" type="datetimeFigureOut">
               <a:rPr lang="zh-CN" altLang="en-US" smtClean="0"/>
-              <a:t>2021/7/21</a:t>
+              <a:t>2021/9/15</a:t>
             </a:fld>
             <a:endParaRPr lang="zh-CN" altLang="en-US"/>
           </a:p>
@@ -3377,7 +3377,7 @@
           <a:p>
             <a:fld id="{22C6D5CB-9E91-4D8B-8A6F-E7E64CE5E759}" type="datetimeFigureOut">
               <a:rPr lang="zh-CN" altLang="en-US" smtClean="0"/>
-              <a:t>2021/7/21</a:t>
+              <a:t>2021/9/15</a:t>
             </a:fld>
             <a:endParaRPr lang="zh-CN" altLang="en-US"/>
           </a:p>
@@ -3618,7 +3618,7 @@
           <a:p>
             <a:fld id="{22C6D5CB-9E91-4D8B-8A6F-E7E64CE5E759}" type="datetimeFigureOut">
               <a:rPr lang="zh-CN" altLang="en-US" smtClean="0"/>
-              <a:t>2021/7/21</a:t>
+              <a:t>2021/9/15</a:t>
             </a:fld>
             <a:endParaRPr lang="zh-CN" altLang="en-US"/>
           </a:p>
@@ -5090,221 +5090,6 @@
 </p:sld>
 </file>
 
-<file path=ppt/slides/slide10.xml><?xml version="1.0" encoding="utf-8"?>
-<p:sld xmlns:a="http://schemas.openxmlformats.org/drawingml/2006/main" xmlns:r="http://schemas.openxmlformats.org/officeDocument/2006/relationships" xmlns:p="http://schemas.openxmlformats.org/presentationml/2006/main">
-  <p:cSld>
-    <p:spTree>
-      <p:nvGrpSpPr>
-        <p:cNvPr id="1" name=""/>
-        <p:cNvGrpSpPr/>
-        <p:nvPr/>
-      </p:nvGrpSpPr>
-      <p:grpSpPr>
-        <a:xfrm>
-          <a:off x="0" y="0"/>
-          <a:ext cx="0" cy="0"/>
-          <a:chOff x="0" y="0"/>
-          <a:chExt cx="0" cy="0"/>
-        </a:xfrm>
-      </p:grpSpPr>
-      <p:sp>
-        <p:nvSpPr>
-          <p:cNvPr id="4" name="矩形 3"/>
-          <p:cNvSpPr/>
-          <p:nvPr/>
-        </p:nvSpPr>
-        <p:spPr>
-          <a:xfrm>
-            <a:off x="887506" y="416859"/>
-            <a:ext cx="8767482" cy="6131859"/>
-          </a:xfrm>
-          <a:prstGeom prst="rect">
-            <a:avLst/>
-          </a:prstGeom>
-          <a:solidFill>
-            <a:schemeClr val="bg2">
-              <a:lumMod val="25000"/>
-            </a:schemeClr>
-          </a:solidFill>
-          <a:ln>
-            <a:noFill/>
-          </a:ln>
-        </p:spPr>
-        <p:style>
-          <a:lnRef idx="3">
-            <a:schemeClr val="lt1"/>
-          </a:lnRef>
-          <a:fillRef idx="1">
-            <a:schemeClr val="accent3"/>
-          </a:fillRef>
-          <a:effectRef idx="1">
-            <a:schemeClr val="accent3"/>
-          </a:effectRef>
-          <a:fontRef idx="minor">
-            <a:schemeClr val="lt1"/>
-          </a:fontRef>
-        </p:style>
-        <p:txBody>
-          <a:bodyPr rtlCol="0" anchor="ctr"/>
-          <a:lstStyle/>
-          <a:p>
-            <a:pPr lvl="4">
-              <a:lnSpc>
-                <a:spcPct val="150000"/>
-              </a:lnSpc>
-            </a:pPr>
-            <a:r>
-              <a:rPr lang="zh-CN" altLang="en-US" sz="5400" b="1" dirty="0">
-                <a:latin typeface="黑体" panose="02010609060101010101" pitchFamily="49" charset="-122"/>
-                <a:ea typeface="黑体" panose="02010609060101010101" pitchFamily="49" charset="-122"/>
-              </a:rPr>
-              <a:t>请休息片刻，</a:t>
-            </a:r>
-            <a:endParaRPr lang="en-US" altLang="zh-CN" sz="5400" b="1" dirty="0">
-              <a:latin typeface="黑体" panose="02010609060101010101" pitchFamily="49" charset="-122"/>
-              <a:ea typeface="黑体" panose="02010609060101010101" pitchFamily="49" charset="-122"/>
-            </a:endParaRPr>
-          </a:p>
-          <a:p>
-            <a:pPr lvl="4">
-              <a:lnSpc>
-                <a:spcPct val="150000"/>
-              </a:lnSpc>
-            </a:pPr>
-            <a:r>
-              <a:rPr lang="en-US" altLang="zh-CN" sz="5400" b="1" dirty="0">
-                <a:latin typeface="黑体" panose="02010609060101010101" pitchFamily="49" charset="-122"/>
-                <a:ea typeface="黑体" panose="02010609060101010101" pitchFamily="49" charset="-122"/>
-              </a:rPr>
-              <a:t>30s</a:t>
-            </a:r>
-            <a:r>
-              <a:rPr lang="zh-CN" altLang="en-US" sz="5400" b="1" dirty="0">
-                <a:latin typeface="黑体" panose="02010609060101010101" pitchFamily="49" charset="-122"/>
-                <a:ea typeface="黑体" panose="02010609060101010101" pitchFamily="49" charset="-122"/>
-              </a:rPr>
-              <a:t>后游戏继续。</a:t>
-            </a:r>
-          </a:p>
-        </p:txBody>
-      </p:sp>
-    </p:spTree>
-    <p:extLst>
-      <p:ext uri="{BB962C8B-B14F-4D97-AF65-F5344CB8AC3E}">
-        <p14:creationId xmlns:p14="http://schemas.microsoft.com/office/powerpoint/2010/main" val="3226466048"/>
-      </p:ext>
-    </p:extLst>
-  </p:cSld>
-  <p:clrMapOvr>
-    <a:masterClrMapping/>
-  </p:clrMapOvr>
-</p:sld>
-</file>
-
-<file path=ppt/slides/slide11.xml><?xml version="1.0" encoding="utf-8"?>
-<p:sld xmlns:a="http://schemas.openxmlformats.org/drawingml/2006/main" xmlns:r="http://schemas.openxmlformats.org/officeDocument/2006/relationships" xmlns:p="http://schemas.openxmlformats.org/presentationml/2006/main">
-  <p:cSld>
-    <p:spTree>
-      <p:nvGrpSpPr>
-        <p:cNvPr id="1" name=""/>
-        <p:cNvGrpSpPr/>
-        <p:nvPr/>
-      </p:nvGrpSpPr>
-      <p:grpSpPr>
-        <a:xfrm>
-          <a:off x="0" y="0"/>
-          <a:ext cx="0" cy="0"/>
-          <a:chOff x="0" y="0"/>
-          <a:chExt cx="0" cy="0"/>
-        </a:xfrm>
-      </p:grpSpPr>
-      <p:sp>
-        <p:nvSpPr>
-          <p:cNvPr id="4" name="矩形 3"/>
-          <p:cNvSpPr/>
-          <p:nvPr/>
-        </p:nvSpPr>
-        <p:spPr>
-          <a:xfrm>
-            <a:off x="887506" y="416859"/>
-            <a:ext cx="8767482" cy="6131859"/>
-          </a:xfrm>
-          <a:prstGeom prst="rect">
-            <a:avLst/>
-          </a:prstGeom>
-          <a:solidFill>
-            <a:schemeClr val="bg2">
-              <a:lumMod val="25000"/>
-            </a:schemeClr>
-          </a:solidFill>
-          <a:ln>
-            <a:noFill/>
-          </a:ln>
-        </p:spPr>
-        <p:style>
-          <a:lnRef idx="3">
-            <a:schemeClr val="lt1"/>
-          </a:lnRef>
-          <a:fillRef idx="1">
-            <a:schemeClr val="accent3"/>
-          </a:fillRef>
-          <a:effectRef idx="1">
-            <a:schemeClr val="accent3"/>
-          </a:effectRef>
-          <a:fontRef idx="minor">
-            <a:schemeClr val="lt1"/>
-          </a:fontRef>
-        </p:style>
-        <p:txBody>
-          <a:bodyPr rtlCol="0" anchor="ctr"/>
-          <a:lstStyle/>
-          <a:p>
-            <a:pPr lvl="6">
-              <a:lnSpc>
-                <a:spcPct val="150000"/>
-              </a:lnSpc>
-            </a:pPr>
-            <a:r>
-              <a:rPr lang="zh-CN" altLang="en-US" sz="5400" b="1" dirty="0">
-                <a:latin typeface="黑体" panose="02010609060101010101" pitchFamily="49" charset="-122"/>
-                <a:ea typeface="黑体" panose="02010609060101010101" pitchFamily="49" charset="-122"/>
-              </a:rPr>
-              <a:t>实验结束，</a:t>
-            </a:r>
-            <a:endParaRPr lang="en-US" altLang="zh-CN" sz="5400" b="1" dirty="0">
-              <a:latin typeface="黑体" panose="02010609060101010101" pitchFamily="49" charset="-122"/>
-              <a:ea typeface="黑体" panose="02010609060101010101" pitchFamily="49" charset="-122"/>
-            </a:endParaRPr>
-          </a:p>
-          <a:p>
-            <a:pPr lvl="6">
-              <a:lnSpc>
-                <a:spcPct val="150000"/>
-              </a:lnSpc>
-            </a:pPr>
-            <a:r>
-              <a:rPr lang="zh-CN" altLang="en-US" sz="5400" b="1" dirty="0">
-                <a:latin typeface="黑体" panose="02010609060101010101" pitchFamily="49" charset="-122"/>
-                <a:ea typeface="黑体" panose="02010609060101010101" pitchFamily="49" charset="-122"/>
-              </a:rPr>
-              <a:t>请联系主试。</a:t>
-            </a:r>
-          </a:p>
-        </p:txBody>
-      </p:sp>
-    </p:spTree>
-    <p:extLst>
-      <p:ext uri="{BB962C8B-B14F-4D97-AF65-F5344CB8AC3E}">
-        <p14:creationId xmlns:p14="http://schemas.microsoft.com/office/powerpoint/2010/main" val="856994835"/>
-      </p:ext>
-    </p:extLst>
-  </p:cSld>
-  <p:clrMapOvr>
-    <a:masterClrMapping/>
-  </p:clrMapOvr>
-</p:sld>
-</file>
-
 <file path=ppt/slides/slide2.xml><?xml version="1.0" encoding="utf-8"?>
 <p:sld xmlns:a="http://schemas.openxmlformats.org/drawingml/2006/main" xmlns:r="http://schemas.openxmlformats.org/officeDocument/2006/relationships" xmlns:p="http://schemas.openxmlformats.org/presentationml/2006/main">
   <p:cSld>
@@ -7571,7 +7356,7 @@
 </file>
 
 <file path=ppt/slides/slide4.xml><?xml version="1.0" encoding="utf-8"?>
-<p:sld xmlns:a="http://schemas.openxmlformats.org/drawingml/2006/main" xmlns:r="http://schemas.openxmlformats.org/officeDocument/2006/relationships" xmlns:p="http://schemas.openxmlformats.org/presentationml/2006/main">
+<p:sld xmlns:a="http://schemas.openxmlformats.org/drawingml/2006/main" xmlns:r="http://schemas.openxmlformats.org/officeDocument/2006/relationships" xmlns:p="http://schemas.openxmlformats.org/presentationml/2006/main" show="0">
   <p:cSld>
     <p:spTree>
       <p:nvGrpSpPr>
@@ -7709,12 +7494,592 @@
           <a:chExt cx="0" cy="0"/>
         </a:xfrm>
       </p:grpSpPr>
+      <p:sp>
+        <p:nvSpPr>
+          <p:cNvPr id="4" name="矩形 3"/>
+          <p:cNvSpPr/>
+          <p:nvPr/>
+        </p:nvSpPr>
+        <p:spPr>
+          <a:xfrm>
+            <a:off x="1500336" y="363070"/>
+            <a:ext cx="8767482" cy="6131859"/>
+          </a:xfrm>
+          <a:prstGeom prst="rect">
+            <a:avLst/>
+          </a:prstGeom>
+          <a:solidFill>
+            <a:schemeClr val="bg2">
+              <a:lumMod val="25000"/>
+            </a:schemeClr>
+          </a:solidFill>
+          <a:ln>
+            <a:noFill/>
+          </a:ln>
+        </p:spPr>
+        <p:style>
+          <a:lnRef idx="3">
+            <a:schemeClr val="lt1"/>
+          </a:lnRef>
+          <a:fillRef idx="1">
+            <a:schemeClr val="accent3"/>
+          </a:fillRef>
+          <a:effectRef idx="1">
+            <a:schemeClr val="accent3"/>
+          </a:effectRef>
+          <a:fontRef idx="minor">
+            <a:schemeClr val="lt1"/>
+          </a:fontRef>
+        </p:style>
+        <p:txBody>
+          <a:bodyPr rtlCol="0" anchor="ctr"/>
+          <a:lstStyle/>
+          <a:p>
+            <a:pPr>
+              <a:lnSpc>
+                <a:spcPct val="150000"/>
+              </a:lnSpc>
+              <a:spcBef>
+                <a:spcPts val="200"/>
+              </a:spcBef>
+              <a:spcAft>
+                <a:spcPts val="200"/>
+              </a:spcAft>
+            </a:pPr>
+            <a:endParaRPr lang="zh-CN" altLang="en-US" sz="2000" dirty="0">
+              <a:latin typeface="黑体" panose="02010609060101010101" pitchFamily="49" charset="-122"/>
+              <a:ea typeface="黑体" panose="02010609060101010101" pitchFamily="49" charset="-122"/>
+            </a:endParaRPr>
+          </a:p>
+        </p:txBody>
+      </p:sp>
+      <p:sp>
+        <p:nvSpPr>
+          <p:cNvPr id="3" name="文本框 2"/>
+          <p:cNvSpPr txBox="1"/>
+          <p:nvPr/>
+        </p:nvSpPr>
+        <p:spPr>
+          <a:xfrm>
+            <a:off x="1870130" y="672600"/>
+            <a:ext cx="7879976" cy="5526321"/>
+          </a:xfrm>
+          <a:prstGeom prst="rect">
+            <a:avLst/>
+          </a:prstGeom>
+          <a:noFill/>
+        </p:spPr>
+        <p:txBody>
+          <a:bodyPr wrap="square" rtlCol="0">
+            <a:spAutoFit/>
+          </a:bodyPr>
+          <a:lstStyle/>
+          <a:p>
+            <a:pPr algn="ctr">
+              <a:lnSpc>
+                <a:spcPct val="150000"/>
+              </a:lnSpc>
+              <a:spcBef>
+                <a:spcPts val="200"/>
+              </a:spcBef>
+              <a:spcAft>
+                <a:spcPts val="200"/>
+              </a:spcAft>
+            </a:pPr>
+            <a:r>
+              <a:rPr lang="zh-CN" altLang="en-US" b="1" dirty="0">
+                <a:solidFill>
+                  <a:schemeClr val="bg1">
+                    <a:lumMod val="95000"/>
+                  </a:schemeClr>
+                </a:solidFill>
+                <a:latin typeface="黑体" panose="02010609060101010101" pitchFamily="49" charset="-122"/>
+                <a:ea typeface="黑体" panose="02010609060101010101" pitchFamily="49" charset="-122"/>
+              </a:rPr>
+              <a:t>您好，欢迎参与“狼追羊”游戏！</a:t>
+            </a:r>
+            <a:endParaRPr lang="en-US" altLang="zh-CN" b="1" dirty="0">
+              <a:solidFill>
+                <a:schemeClr val="bg1">
+                  <a:lumMod val="95000"/>
+                </a:schemeClr>
+              </a:solidFill>
+              <a:latin typeface="黑体" panose="02010609060101010101" pitchFamily="49" charset="-122"/>
+              <a:ea typeface="黑体" panose="02010609060101010101" pitchFamily="49" charset="-122"/>
+            </a:endParaRPr>
+          </a:p>
+          <a:p>
+            <a:pPr>
+              <a:lnSpc>
+                <a:spcPct val="150000"/>
+              </a:lnSpc>
+              <a:spcBef>
+                <a:spcPts val="200"/>
+              </a:spcBef>
+              <a:spcAft>
+                <a:spcPts val="200"/>
+              </a:spcAft>
+            </a:pPr>
+            <a:r>
+              <a:rPr lang="zh-CN" altLang="en-US" b="1" dirty="0">
+                <a:solidFill>
+                  <a:schemeClr val="bg1">
+                    <a:lumMod val="95000"/>
+                  </a:schemeClr>
+                </a:solidFill>
+                <a:latin typeface="黑体" panose="02010609060101010101" pitchFamily="49" charset="-122"/>
+                <a:ea typeface="黑体" panose="02010609060101010101" pitchFamily="49" charset="-122"/>
+              </a:rPr>
+              <a:t>游戏即将开始，您可以通过操纵游戏手柄左上角的摇杆来控制狼的移动</a:t>
+            </a:r>
+            <a:endParaRPr lang="en-US" altLang="zh-CN" b="1" dirty="0">
+              <a:solidFill>
+                <a:schemeClr val="bg1">
+                  <a:lumMod val="95000"/>
+                </a:schemeClr>
+              </a:solidFill>
+              <a:latin typeface="黑体" panose="02010609060101010101" pitchFamily="49" charset="-122"/>
+              <a:ea typeface="黑体" panose="02010609060101010101" pitchFamily="49" charset="-122"/>
+            </a:endParaRPr>
+          </a:p>
+          <a:p>
+            <a:pPr>
+              <a:lnSpc>
+                <a:spcPct val="150000"/>
+              </a:lnSpc>
+              <a:spcBef>
+                <a:spcPts val="200"/>
+              </a:spcBef>
+              <a:spcAft>
+                <a:spcPts val="200"/>
+              </a:spcAft>
+            </a:pPr>
+            <a:endParaRPr lang="en-US" altLang="zh-CN" b="1" dirty="0">
+              <a:solidFill>
+                <a:schemeClr val="bg1">
+                  <a:lumMod val="95000"/>
+                </a:schemeClr>
+              </a:solidFill>
+              <a:latin typeface="黑体" panose="02010609060101010101" pitchFamily="49" charset="-122"/>
+              <a:ea typeface="黑体" panose="02010609060101010101" pitchFamily="49" charset="-122"/>
+            </a:endParaRPr>
+          </a:p>
+          <a:p>
+            <a:pPr>
+              <a:lnSpc>
+                <a:spcPct val="150000"/>
+              </a:lnSpc>
+              <a:spcBef>
+                <a:spcPts val="200"/>
+              </a:spcBef>
+              <a:spcAft>
+                <a:spcPts val="200"/>
+              </a:spcAft>
+            </a:pPr>
+            <a:endParaRPr lang="en-US" altLang="zh-CN" b="1" dirty="0">
+              <a:solidFill>
+                <a:schemeClr val="bg1">
+                  <a:lumMod val="95000"/>
+                </a:schemeClr>
+              </a:solidFill>
+              <a:latin typeface="黑体" panose="02010609060101010101" pitchFamily="49" charset="-122"/>
+              <a:ea typeface="黑体" panose="02010609060101010101" pitchFamily="49" charset="-122"/>
+            </a:endParaRPr>
+          </a:p>
+          <a:p>
+            <a:pPr>
+              <a:lnSpc>
+                <a:spcPct val="150000"/>
+              </a:lnSpc>
+              <a:spcBef>
+                <a:spcPts val="200"/>
+              </a:spcBef>
+              <a:spcAft>
+                <a:spcPts val="200"/>
+              </a:spcAft>
+            </a:pPr>
+            <a:endParaRPr lang="en-US" altLang="zh-CN" b="1" dirty="0">
+              <a:solidFill>
+                <a:schemeClr val="bg1">
+                  <a:lumMod val="95000"/>
+                </a:schemeClr>
+              </a:solidFill>
+              <a:latin typeface="黑体" panose="02010609060101010101" pitchFamily="49" charset="-122"/>
+              <a:ea typeface="黑体" panose="02010609060101010101" pitchFamily="49" charset="-122"/>
+            </a:endParaRPr>
+          </a:p>
+          <a:p>
+            <a:pPr>
+              <a:lnSpc>
+                <a:spcPct val="150000"/>
+              </a:lnSpc>
+              <a:spcBef>
+                <a:spcPts val="200"/>
+              </a:spcBef>
+              <a:spcAft>
+                <a:spcPts val="200"/>
+              </a:spcAft>
+            </a:pPr>
+            <a:r>
+              <a:rPr lang="zh-CN" altLang="en-US" b="1" dirty="0">
+                <a:solidFill>
+                  <a:schemeClr val="bg1">
+                    <a:lumMod val="95000"/>
+                  </a:schemeClr>
+                </a:solidFill>
+                <a:latin typeface="黑体" panose="02010609060101010101" pitchFamily="49" charset="-122"/>
+                <a:ea typeface="黑体" panose="02010609060101010101" pitchFamily="49" charset="-122"/>
+              </a:rPr>
+              <a:t>再次提醒：</a:t>
+            </a:r>
+            <a:endParaRPr lang="en-US" altLang="zh-CN" b="1" dirty="0">
+              <a:solidFill>
+                <a:schemeClr val="bg1">
+                  <a:lumMod val="95000"/>
+                </a:schemeClr>
+              </a:solidFill>
+              <a:latin typeface="黑体" panose="02010609060101010101" pitchFamily="49" charset="-122"/>
+              <a:ea typeface="黑体" panose="02010609060101010101" pitchFamily="49" charset="-122"/>
+            </a:endParaRPr>
+          </a:p>
+          <a:p>
+            <a:pPr>
+              <a:lnSpc>
+                <a:spcPct val="150000"/>
+              </a:lnSpc>
+              <a:spcBef>
+                <a:spcPts val="200"/>
+              </a:spcBef>
+              <a:spcAft>
+                <a:spcPts val="200"/>
+              </a:spcAft>
+            </a:pPr>
+            <a:r>
+              <a:rPr lang="en-US" altLang="zh-CN" b="1" dirty="0">
+                <a:solidFill>
+                  <a:schemeClr val="bg1">
+                    <a:lumMod val="95000"/>
+                  </a:schemeClr>
+                </a:solidFill>
+                <a:latin typeface="黑体" panose="02010609060101010101" pitchFamily="49" charset="-122"/>
+                <a:ea typeface="黑体" panose="02010609060101010101" pitchFamily="49" charset="-122"/>
+              </a:rPr>
+              <a:t>1</a:t>
+            </a:r>
+            <a:r>
+              <a:rPr lang="zh-CN" altLang="en-US" b="1" dirty="0">
+                <a:solidFill>
+                  <a:schemeClr val="bg1">
+                    <a:lumMod val="95000"/>
+                  </a:schemeClr>
+                </a:solidFill>
+                <a:latin typeface="黑体" panose="02010609060101010101" pitchFamily="49" charset="-122"/>
+                <a:ea typeface="黑体" panose="02010609060101010101" pitchFamily="49" charset="-122"/>
+              </a:rPr>
+              <a:t>）游戏任务是尽快地在</a:t>
+            </a:r>
+            <a:r>
+              <a:rPr lang="zh-CN" altLang="en-US" b="1" dirty="0">
+                <a:solidFill>
+                  <a:srgbClr val="FF0000"/>
+                </a:solidFill>
+                <a:latin typeface="黑体" panose="02010609060101010101" pitchFamily="49" charset="-122"/>
+                <a:ea typeface="黑体" panose="02010609060101010101" pitchFamily="49" charset="-122"/>
+              </a:rPr>
+              <a:t>规定时间内（</a:t>
+            </a:r>
+            <a:r>
+              <a:rPr lang="en-US" altLang="zh-CN" b="1" dirty="0">
+                <a:solidFill>
+                  <a:srgbClr val="FF0000"/>
+                </a:solidFill>
+                <a:latin typeface="黑体" panose="02010609060101010101" pitchFamily="49" charset="-122"/>
+                <a:ea typeface="黑体" panose="02010609060101010101" pitchFamily="49" charset="-122"/>
+              </a:rPr>
+              <a:t>15s</a:t>
+            </a:r>
+            <a:r>
+              <a:rPr lang="zh-CN" altLang="en-US" b="1" dirty="0">
+                <a:solidFill>
+                  <a:srgbClr val="FF0000"/>
+                </a:solidFill>
+                <a:latin typeface="黑体" panose="02010609060101010101" pitchFamily="49" charset="-122"/>
+                <a:ea typeface="黑体" panose="02010609060101010101" pitchFamily="49" charset="-122"/>
+              </a:rPr>
+              <a:t>）</a:t>
+            </a:r>
+            <a:r>
+              <a:rPr lang="zh-CN" altLang="en-US" b="1" dirty="0">
+                <a:solidFill>
+                  <a:schemeClr val="bg1">
+                    <a:lumMod val="95000"/>
+                  </a:schemeClr>
+                </a:solidFill>
+                <a:latin typeface="黑体" panose="02010609060101010101" pitchFamily="49" charset="-122"/>
+                <a:ea typeface="黑体" panose="02010609060101010101" pitchFamily="49" charset="-122"/>
+              </a:rPr>
+              <a:t>抓住屏幕中跑动的羊（</a:t>
+            </a:r>
+            <a:r>
+              <a:rPr lang="zh-CN" altLang="en-US" b="1" dirty="0">
+                <a:solidFill>
+                  <a:srgbClr val="FFA500"/>
+                </a:solidFill>
+                <a:latin typeface="黑体" panose="02010609060101010101" pitchFamily="49" charset="-122"/>
+                <a:ea typeface="黑体" panose="02010609060101010101" pitchFamily="49" charset="-122"/>
+              </a:rPr>
+              <a:t>黄色小球</a:t>
+            </a:r>
+            <a:r>
+              <a:rPr lang="zh-CN" altLang="en-US" b="1" dirty="0">
+                <a:solidFill>
+                  <a:schemeClr val="bg1">
+                    <a:lumMod val="95000"/>
+                  </a:schemeClr>
+                </a:solidFill>
+                <a:latin typeface="黑体" panose="02010609060101010101" pitchFamily="49" charset="-122"/>
+                <a:ea typeface="黑体" panose="02010609060101010101" pitchFamily="49" charset="-122"/>
+              </a:rPr>
+              <a:t>）</a:t>
+            </a:r>
+            <a:endParaRPr lang="en-US" altLang="zh-CN" b="1" dirty="0">
+              <a:solidFill>
+                <a:schemeClr val="bg1">
+                  <a:lumMod val="95000"/>
+                </a:schemeClr>
+              </a:solidFill>
+              <a:latin typeface="黑体" panose="02010609060101010101" pitchFamily="49" charset="-122"/>
+              <a:ea typeface="黑体" panose="02010609060101010101" pitchFamily="49" charset="-122"/>
+            </a:endParaRPr>
+          </a:p>
+          <a:p>
+            <a:pPr>
+              <a:lnSpc>
+                <a:spcPct val="150000"/>
+              </a:lnSpc>
+              <a:spcBef>
+                <a:spcPts val="200"/>
+              </a:spcBef>
+              <a:spcAft>
+                <a:spcPts val="200"/>
+              </a:spcAft>
+            </a:pPr>
+            <a:r>
+              <a:rPr lang="en-US" altLang="zh-CN" b="1" dirty="0">
+                <a:solidFill>
+                  <a:schemeClr val="bg1">
+                    <a:lumMod val="95000"/>
+                  </a:schemeClr>
+                </a:solidFill>
+                <a:latin typeface="黑体" panose="02010609060101010101" pitchFamily="49" charset="-122"/>
+                <a:ea typeface="黑体" panose="02010609060101010101" pitchFamily="49" charset="-122"/>
+              </a:rPr>
+              <a:t>2</a:t>
+            </a:r>
+            <a:r>
+              <a:rPr lang="zh-CN" altLang="en-US" b="1" dirty="0">
+                <a:solidFill>
+                  <a:schemeClr val="bg1">
+                    <a:lumMod val="95000"/>
+                  </a:schemeClr>
+                </a:solidFill>
+                <a:latin typeface="黑体" panose="02010609060101010101" pitchFamily="49" charset="-122"/>
+                <a:ea typeface="黑体" panose="02010609060101010101" pitchFamily="49" charset="-122"/>
+              </a:rPr>
+              <a:t>）</a:t>
+            </a:r>
+            <a:r>
+              <a:rPr lang="zh-CN" altLang="en-US" b="1" dirty="0">
+                <a:solidFill>
+                  <a:srgbClr val="FF0000"/>
+                </a:solidFill>
+                <a:latin typeface="黑体" panose="02010609060101010101" pitchFamily="49" charset="-122"/>
+                <a:ea typeface="黑体" panose="02010609060101010101" pitchFamily="49" charset="-122"/>
+              </a:rPr>
+              <a:t>每抓到一只羊</a:t>
+            </a:r>
+            <a:r>
+              <a:rPr lang="zh-CN" altLang="en-US" b="1" dirty="0">
+                <a:solidFill>
+                  <a:schemeClr val="bg1">
+                    <a:lumMod val="95000"/>
+                  </a:schemeClr>
+                </a:solidFill>
+                <a:latin typeface="黑体" panose="02010609060101010101" pitchFamily="49" charset="-122"/>
+                <a:ea typeface="黑体" panose="02010609060101010101" pitchFamily="49" charset="-122"/>
+              </a:rPr>
+              <a:t>或</a:t>
+            </a:r>
+            <a:r>
+              <a:rPr lang="en-US" altLang="zh-CN" b="1" dirty="0">
+                <a:solidFill>
+                  <a:srgbClr val="FF0000"/>
+                </a:solidFill>
+                <a:latin typeface="黑体" panose="02010609060101010101" pitchFamily="49" charset="-122"/>
+                <a:ea typeface="黑体" panose="02010609060101010101" pitchFamily="49" charset="-122"/>
+              </a:rPr>
+              <a:t>15s</a:t>
+            </a:r>
+            <a:r>
+              <a:rPr lang="zh-CN" altLang="en-US" b="1" dirty="0">
+                <a:solidFill>
+                  <a:srgbClr val="FF0000"/>
+                </a:solidFill>
+                <a:latin typeface="黑体" panose="02010609060101010101" pitchFamily="49" charset="-122"/>
+                <a:ea typeface="黑体" panose="02010609060101010101" pitchFamily="49" charset="-122"/>
+              </a:rPr>
+              <a:t>内两名玩家均未抓到羊</a:t>
+            </a:r>
+            <a:r>
+              <a:rPr lang="zh-CN" altLang="en-US" b="1" dirty="0">
+                <a:solidFill>
+                  <a:schemeClr val="bg1">
+                    <a:lumMod val="95000"/>
+                  </a:schemeClr>
+                </a:solidFill>
+                <a:latin typeface="黑体" panose="02010609060101010101" pitchFamily="49" charset="-122"/>
+                <a:ea typeface="黑体" panose="02010609060101010101" pitchFamily="49" charset="-122"/>
+              </a:rPr>
+              <a:t>，则立即进入下一轮游戏。此时游戏界面刷新，两名玩家的位置也会刷新</a:t>
+            </a:r>
+            <a:endParaRPr lang="en-US" altLang="zh-CN" b="1" dirty="0">
+              <a:solidFill>
+                <a:schemeClr val="bg1">
+                  <a:lumMod val="95000"/>
+                </a:schemeClr>
+              </a:solidFill>
+              <a:latin typeface="黑体" panose="02010609060101010101" pitchFamily="49" charset="-122"/>
+              <a:ea typeface="黑体" panose="02010609060101010101" pitchFamily="49" charset="-122"/>
+            </a:endParaRPr>
+          </a:p>
+          <a:p>
+            <a:pPr>
+              <a:lnSpc>
+                <a:spcPct val="150000"/>
+              </a:lnSpc>
+              <a:spcBef>
+                <a:spcPts val="200"/>
+              </a:spcBef>
+              <a:spcAft>
+                <a:spcPts val="200"/>
+              </a:spcAft>
+            </a:pPr>
+            <a:r>
+              <a:rPr lang="en-US" altLang="zh-CN" b="1" dirty="0">
+                <a:solidFill>
+                  <a:schemeClr val="bg1">
+                    <a:lumMod val="95000"/>
+                  </a:schemeClr>
+                </a:solidFill>
+                <a:latin typeface="黑体" panose="02010609060101010101" pitchFamily="49" charset="-122"/>
+                <a:ea typeface="黑体" panose="02010609060101010101" pitchFamily="49" charset="-122"/>
+              </a:rPr>
+              <a:t>3</a:t>
+            </a:r>
+            <a:r>
+              <a:rPr lang="zh-CN" altLang="en-US" b="1" dirty="0">
+                <a:solidFill>
+                  <a:schemeClr val="bg1">
+                    <a:lumMod val="95000"/>
+                  </a:schemeClr>
+                </a:solidFill>
+                <a:latin typeface="黑体" panose="02010609060101010101" pitchFamily="49" charset="-122"/>
+                <a:ea typeface="黑体" panose="02010609060101010101" pitchFamily="49" charset="-122"/>
+              </a:rPr>
+              <a:t>）实验报酬和最终总分数相关</a:t>
+            </a:r>
+          </a:p>
+          <a:p>
+            <a:pPr algn="ctr">
+              <a:lnSpc>
+                <a:spcPct val="150000"/>
+              </a:lnSpc>
+              <a:spcBef>
+                <a:spcPts val="200"/>
+              </a:spcBef>
+              <a:spcAft>
+                <a:spcPts val="200"/>
+              </a:spcAft>
+            </a:pPr>
+            <a:r>
+              <a:rPr lang="zh-CN" altLang="en-US" b="1" dirty="0">
+                <a:solidFill>
+                  <a:schemeClr val="bg1">
+                    <a:lumMod val="95000"/>
+                  </a:schemeClr>
+                </a:solidFill>
+                <a:latin typeface="黑体" panose="02010609060101010101" pitchFamily="49" charset="-122"/>
+                <a:ea typeface="黑体" panose="02010609060101010101" pitchFamily="49" charset="-122"/>
+              </a:rPr>
+              <a:t>明确自己的任务后，请按下</a:t>
+            </a:r>
+            <a:r>
+              <a:rPr lang="en-US" altLang="zh-CN" b="1" dirty="0">
+                <a:solidFill>
+                  <a:schemeClr val="bg1">
+                    <a:lumMod val="95000"/>
+                  </a:schemeClr>
+                </a:solidFill>
+                <a:latin typeface="黑体" panose="02010609060101010101" pitchFamily="49" charset="-122"/>
+                <a:ea typeface="黑体" panose="02010609060101010101" pitchFamily="49" charset="-122"/>
+              </a:rPr>
+              <a:t>a</a:t>
+            </a:r>
+            <a:r>
+              <a:rPr lang="zh-CN" altLang="en-US" b="1" dirty="0">
+                <a:solidFill>
+                  <a:schemeClr val="bg1">
+                    <a:lumMod val="95000"/>
+                  </a:schemeClr>
+                </a:solidFill>
+                <a:latin typeface="黑体" panose="02010609060101010101" pitchFamily="49" charset="-122"/>
+                <a:ea typeface="黑体" panose="02010609060101010101" pitchFamily="49" charset="-122"/>
+              </a:rPr>
+              <a:t>键。</a:t>
+            </a:r>
+            <a:endParaRPr lang="en-US" altLang="zh-CN" b="1" dirty="0">
+              <a:solidFill>
+                <a:schemeClr val="bg1">
+                  <a:lumMod val="95000"/>
+                </a:schemeClr>
+              </a:solidFill>
+              <a:latin typeface="黑体" panose="02010609060101010101" pitchFamily="49" charset="-122"/>
+              <a:ea typeface="黑体" panose="02010609060101010101" pitchFamily="49" charset="-122"/>
+            </a:endParaRPr>
+          </a:p>
+          <a:p>
+            <a:pPr algn="ctr">
+              <a:lnSpc>
+                <a:spcPct val="150000"/>
+              </a:lnSpc>
+              <a:spcBef>
+                <a:spcPts val="200"/>
+              </a:spcBef>
+              <a:spcAft>
+                <a:spcPts val="200"/>
+              </a:spcAft>
+            </a:pPr>
+            <a:r>
+              <a:rPr lang="zh-CN" altLang="en-US" b="1" dirty="0">
+                <a:solidFill>
+                  <a:schemeClr val="bg1">
+                    <a:lumMod val="95000"/>
+                  </a:schemeClr>
+                </a:solidFill>
+                <a:latin typeface="黑体" panose="02010609060101010101" pitchFamily="49" charset="-122"/>
+                <a:ea typeface="黑体" panose="02010609060101010101" pitchFamily="49" charset="-122"/>
+              </a:rPr>
+              <a:t>等待双方确认后游戏开始。</a:t>
+            </a:r>
+          </a:p>
+        </p:txBody>
+      </p:sp>
       <p:grpSp>
         <p:nvGrpSpPr>
-          <p:cNvPr id="2" name="组合 1">
+          <p:cNvPr id="21" name="组合 20">
             <a:extLst>
               <a:ext uri="{FF2B5EF4-FFF2-40B4-BE49-F238E27FC236}">
-                <a16:creationId xmlns:a16="http://schemas.microsoft.com/office/drawing/2014/main" id="{5C1ADCE9-75A5-4986-8406-661703EA1194}"/>
+                <a16:creationId xmlns:a16="http://schemas.microsoft.com/office/drawing/2014/main" id="{9F2B02E8-9C41-47D6-907D-91E2787EDDD9}"/>
               </a:ext>
             </a:extLst>
           </p:cNvPr>
@@ -7723,543 +8088,12 @@
         </p:nvGrpSpPr>
         <p:grpSpPr>
           <a:xfrm>
-            <a:off x="887506" y="416859"/>
-            <a:ext cx="8767482" cy="6131859"/>
-            <a:chOff x="887506" y="416859"/>
-            <a:chExt cx="8767482" cy="6131859"/>
+            <a:off x="4652185" y="1651508"/>
+            <a:ext cx="2251866" cy="1823211"/>
+            <a:chOff x="5353225" y="1737433"/>
+            <a:chExt cx="2251866" cy="1823211"/>
           </a:xfrm>
         </p:grpSpPr>
-        <p:sp>
-          <p:nvSpPr>
-            <p:cNvPr id="4" name="矩形 3"/>
-            <p:cNvSpPr/>
-            <p:nvPr/>
-          </p:nvSpPr>
-          <p:spPr>
-            <a:xfrm>
-              <a:off x="887506" y="416859"/>
-              <a:ext cx="8767482" cy="6131859"/>
-            </a:xfrm>
-            <a:prstGeom prst="rect">
-              <a:avLst/>
-            </a:prstGeom>
-            <a:solidFill>
-              <a:schemeClr val="bg2">
-                <a:lumMod val="25000"/>
-              </a:schemeClr>
-            </a:solidFill>
-            <a:ln>
-              <a:noFill/>
-            </a:ln>
-          </p:spPr>
-          <p:style>
-            <a:lnRef idx="3">
-              <a:schemeClr val="lt1"/>
-            </a:lnRef>
-            <a:fillRef idx="1">
-              <a:schemeClr val="accent3"/>
-            </a:fillRef>
-            <a:effectRef idx="1">
-              <a:schemeClr val="accent3"/>
-            </a:effectRef>
-            <a:fontRef idx="minor">
-              <a:schemeClr val="lt1"/>
-            </a:fontRef>
-          </p:style>
-          <p:txBody>
-            <a:bodyPr rtlCol="0" anchor="ctr"/>
-            <a:lstStyle/>
-            <a:p>
-              <a:pPr>
-                <a:lnSpc>
-                  <a:spcPct val="150000"/>
-                </a:lnSpc>
-                <a:spcBef>
-                  <a:spcPts val="200"/>
-                </a:spcBef>
-                <a:spcAft>
-                  <a:spcPts val="200"/>
-                </a:spcAft>
-              </a:pPr>
-              <a:endParaRPr lang="zh-CN" altLang="en-US" sz="2000" dirty="0">
-                <a:latin typeface="黑体" panose="02010609060101010101" pitchFamily="49" charset="-122"/>
-                <a:ea typeface="黑体" panose="02010609060101010101" pitchFamily="49" charset="-122"/>
-              </a:endParaRPr>
-            </a:p>
-          </p:txBody>
-        </p:sp>
-        <p:sp>
-          <p:nvSpPr>
-            <p:cNvPr id="3" name="文本框 2"/>
-            <p:cNvSpPr txBox="1"/>
-            <p:nvPr/>
-          </p:nvSpPr>
-          <p:spPr>
-            <a:xfrm>
-              <a:off x="1257300" y="726389"/>
-              <a:ext cx="7879976" cy="5059527"/>
-            </a:xfrm>
-            <a:prstGeom prst="rect">
-              <a:avLst/>
-            </a:prstGeom>
-            <a:noFill/>
-          </p:spPr>
-          <p:txBody>
-            <a:bodyPr wrap="square" rtlCol="0">
-              <a:spAutoFit/>
-            </a:bodyPr>
-            <a:lstStyle/>
-            <a:p>
-              <a:pPr algn="ctr">
-                <a:lnSpc>
-                  <a:spcPct val="150000"/>
-                </a:lnSpc>
-                <a:spcBef>
-                  <a:spcPts val="200"/>
-                </a:spcBef>
-                <a:spcAft>
-                  <a:spcPts val="200"/>
-                </a:spcAft>
-              </a:pPr>
-              <a:r>
-                <a:rPr lang="zh-CN" altLang="en-US" b="1" dirty="0">
-                  <a:solidFill>
-                    <a:schemeClr val="bg1">
-                      <a:lumMod val="95000"/>
-                    </a:schemeClr>
-                  </a:solidFill>
-                  <a:latin typeface="黑体" panose="02010609060101010101" pitchFamily="49" charset="-122"/>
-                  <a:ea typeface="黑体" panose="02010609060101010101" pitchFamily="49" charset="-122"/>
-                </a:rPr>
-                <a:t>您好，欢迎参与“狼追羊”游戏！</a:t>
-              </a:r>
-              <a:endParaRPr lang="en-US" altLang="zh-CN" b="1" dirty="0">
-                <a:solidFill>
-                  <a:schemeClr val="bg1">
-                    <a:lumMod val="95000"/>
-                  </a:schemeClr>
-                </a:solidFill>
-                <a:latin typeface="黑体" panose="02010609060101010101" pitchFamily="49" charset="-122"/>
-                <a:ea typeface="黑体" panose="02010609060101010101" pitchFamily="49" charset="-122"/>
-              </a:endParaRPr>
-            </a:p>
-            <a:p>
-              <a:pPr>
-                <a:lnSpc>
-                  <a:spcPct val="150000"/>
-                </a:lnSpc>
-                <a:spcBef>
-                  <a:spcPts val="200"/>
-                </a:spcBef>
-                <a:spcAft>
-                  <a:spcPts val="200"/>
-                </a:spcAft>
-              </a:pPr>
-              <a:r>
-                <a:rPr lang="zh-CN" altLang="en-US" b="1" dirty="0">
-                  <a:solidFill>
-                    <a:schemeClr val="bg1">
-                      <a:lumMod val="95000"/>
-                    </a:schemeClr>
-                  </a:solidFill>
-                  <a:latin typeface="黑体" panose="02010609060101010101" pitchFamily="49" charset="-122"/>
-                  <a:ea typeface="黑体" panose="02010609060101010101" pitchFamily="49" charset="-122"/>
-                </a:rPr>
-                <a:t>游戏即将开始，您可以通过操纵游戏手柄左上角的摇杆来控制狼的移动</a:t>
-              </a:r>
-              <a:endParaRPr lang="en-US" altLang="zh-CN" b="1" dirty="0">
-                <a:solidFill>
-                  <a:schemeClr val="bg1">
-                    <a:lumMod val="95000"/>
-                  </a:schemeClr>
-                </a:solidFill>
-                <a:latin typeface="黑体" panose="02010609060101010101" pitchFamily="49" charset="-122"/>
-                <a:ea typeface="黑体" panose="02010609060101010101" pitchFamily="49" charset="-122"/>
-              </a:endParaRPr>
-            </a:p>
-            <a:p>
-              <a:pPr>
-                <a:lnSpc>
-                  <a:spcPct val="150000"/>
-                </a:lnSpc>
-                <a:spcBef>
-                  <a:spcPts val="200"/>
-                </a:spcBef>
-                <a:spcAft>
-                  <a:spcPts val="200"/>
-                </a:spcAft>
-              </a:pPr>
-              <a:endParaRPr lang="en-US" altLang="zh-CN" b="1" dirty="0">
-                <a:solidFill>
-                  <a:schemeClr val="bg1">
-                    <a:lumMod val="95000"/>
-                  </a:schemeClr>
-                </a:solidFill>
-                <a:latin typeface="黑体" panose="02010609060101010101" pitchFamily="49" charset="-122"/>
-                <a:ea typeface="黑体" panose="02010609060101010101" pitchFamily="49" charset="-122"/>
-              </a:endParaRPr>
-            </a:p>
-            <a:p>
-              <a:pPr>
-                <a:lnSpc>
-                  <a:spcPct val="150000"/>
-                </a:lnSpc>
-                <a:spcBef>
-                  <a:spcPts val="200"/>
-                </a:spcBef>
-                <a:spcAft>
-                  <a:spcPts val="200"/>
-                </a:spcAft>
-              </a:pPr>
-              <a:endParaRPr lang="en-US" altLang="zh-CN" b="1" dirty="0">
-                <a:solidFill>
-                  <a:schemeClr val="bg1">
-                    <a:lumMod val="95000"/>
-                  </a:schemeClr>
-                </a:solidFill>
-                <a:latin typeface="黑体" panose="02010609060101010101" pitchFamily="49" charset="-122"/>
-                <a:ea typeface="黑体" panose="02010609060101010101" pitchFamily="49" charset="-122"/>
-              </a:endParaRPr>
-            </a:p>
-            <a:p>
-              <a:pPr>
-                <a:lnSpc>
-                  <a:spcPct val="150000"/>
-                </a:lnSpc>
-                <a:spcBef>
-                  <a:spcPts val="200"/>
-                </a:spcBef>
-                <a:spcAft>
-                  <a:spcPts val="200"/>
-                </a:spcAft>
-              </a:pPr>
-              <a:endParaRPr lang="en-US" altLang="zh-CN" b="1" dirty="0">
-                <a:solidFill>
-                  <a:schemeClr val="bg1">
-                    <a:lumMod val="95000"/>
-                  </a:schemeClr>
-                </a:solidFill>
-                <a:latin typeface="黑体" panose="02010609060101010101" pitchFamily="49" charset="-122"/>
-                <a:ea typeface="黑体" panose="02010609060101010101" pitchFamily="49" charset="-122"/>
-              </a:endParaRPr>
-            </a:p>
-            <a:p>
-              <a:pPr>
-                <a:lnSpc>
-                  <a:spcPct val="150000"/>
-                </a:lnSpc>
-                <a:spcBef>
-                  <a:spcPts val="200"/>
-                </a:spcBef>
-                <a:spcAft>
-                  <a:spcPts val="200"/>
-                </a:spcAft>
-              </a:pPr>
-              <a:r>
-                <a:rPr lang="zh-CN" altLang="en-US" b="1" dirty="0">
-                  <a:solidFill>
-                    <a:schemeClr val="bg1">
-                      <a:lumMod val="95000"/>
-                    </a:schemeClr>
-                  </a:solidFill>
-                  <a:latin typeface="黑体" panose="02010609060101010101" pitchFamily="49" charset="-122"/>
-                  <a:ea typeface="黑体" panose="02010609060101010101" pitchFamily="49" charset="-122"/>
-                </a:rPr>
-                <a:t>再次提醒：</a:t>
-              </a:r>
-              <a:endParaRPr lang="en-US" altLang="zh-CN" b="1" dirty="0">
-                <a:solidFill>
-                  <a:schemeClr val="bg1">
-                    <a:lumMod val="95000"/>
-                  </a:schemeClr>
-                </a:solidFill>
-                <a:latin typeface="黑体" panose="02010609060101010101" pitchFamily="49" charset="-122"/>
-                <a:ea typeface="黑体" panose="02010609060101010101" pitchFamily="49" charset="-122"/>
-              </a:endParaRPr>
-            </a:p>
-            <a:p>
-              <a:pPr>
-                <a:lnSpc>
-                  <a:spcPct val="150000"/>
-                </a:lnSpc>
-                <a:spcBef>
-                  <a:spcPts val="200"/>
-                </a:spcBef>
-                <a:spcAft>
-                  <a:spcPts val="200"/>
-                </a:spcAft>
-              </a:pPr>
-              <a:r>
-                <a:rPr lang="en-US" altLang="zh-CN" b="1" dirty="0">
-                  <a:solidFill>
-                    <a:schemeClr val="bg1">
-                      <a:lumMod val="95000"/>
-                    </a:schemeClr>
-                  </a:solidFill>
-                  <a:latin typeface="黑体" panose="02010609060101010101" pitchFamily="49" charset="-122"/>
-                  <a:ea typeface="黑体" panose="02010609060101010101" pitchFamily="49" charset="-122"/>
-                </a:rPr>
-                <a:t>1</a:t>
-              </a:r>
-              <a:r>
-                <a:rPr lang="zh-CN" altLang="en-US" b="1" dirty="0">
-                  <a:solidFill>
-                    <a:schemeClr val="bg1">
-                      <a:lumMod val="95000"/>
-                    </a:schemeClr>
-                  </a:solidFill>
-                  <a:latin typeface="黑体" panose="02010609060101010101" pitchFamily="49" charset="-122"/>
-                  <a:ea typeface="黑体" panose="02010609060101010101" pitchFamily="49" charset="-122"/>
-                </a:rPr>
-                <a:t>）游戏任务是尽快地在</a:t>
-              </a:r>
-              <a:r>
-                <a:rPr lang="zh-CN" altLang="en-US" b="1" dirty="0">
-                  <a:solidFill>
-                    <a:srgbClr val="FF0000"/>
-                  </a:solidFill>
-                  <a:latin typeface="黑体" panose="02010609060101010101" pitchFamily="49" charset="-122"/>
-                  <a:ea typeface="黑体" panose="02010609060101010101" pitchFamily="49" charset="-122"/>
-                </a:rPr>
-                <a:t>规定时间内（</a:t>
-              </a:r>
-              <a:r>
-                <a:rPr lang="en-US" altLang="zh-CN" b="1" dirty="0">
-                  <a:solidFill>
-                    <a:srgbClr val="FF0000"/>
-                  </a:solidFill>
-                  <a:latin typeface="黑体" panose="02010609060101010101" pitchFamily="49" charset="-122"/>
-                  <a:ea typeface="黑体" panose="02010609060101010101" pitchFamily="49" charset="-122"/>
-                </a:rPr>
-                <a:t>15s</a:t>
-              </a:r>
-              <a:r>
-                <a:rPr lang="zh-CN" altLang="en-US" b="1" dirty="0">
-                  <a:solidFill>
-                    <a:srgbClr val="FF0000"/>
-                  </a:solidFill>
-                  <a:latin typeface="黑体" panose="02010609060101010101" pitchFamily="49" charset="-122"/>
-                  <a:ea typeface="黑体" panose="02010609060101010101" pitchFamily="49" charset="-122"/>
-                </a:rPr>
-                <a:t>）</a:t>
-              </a:r>
-              <a:r>
-                <a:rPr lang="zh-CN" altLang="en-US" b="1" dirty="0">
-                  <a:solidFill>
-                    <a:schemeClr val="bg1">
-                      <a:lumMod val="95000"/>
-                    </a:schemeClr>
-                  </a:solidFill>
-                  <a:latin typeface="黑体" panose="02010609060101010101" pitchFamily="49" charset="-122"/>
-                  <a:ea typeface="黑体" panose="02010609060101010101" pitchFamily="49" charset="-122"/>
-                </a:rPr>
-                <a:t>抓住屏幕中跑动的羊（</a:t>
-              </a:r>
-              <a:r>
-                <a:rPr lang="zh-CN" altLang="en-US" b="1" dirty="0">
-                  <a:solidFill>
-                    <a:srgbClr val="FFA500"/>
-                  </a:solidFill>
-                  <a:latin typeface="黑体" panose="02010609060101010101" pitchFamily="49" charset="-122"/>
-                  <a:ea typeface="黑体" panose="02010609060101010101" pitchFamily="49" charset="-122"/>
-                </a:rPr>
-                <a:t>黄色小球</a:t>
-              </a:r>
-              <a:r>
-                <a:rPr lang="zh-CN" altLang="en-US" b="1" dirty="0">
-                  <a:solidFill>
-                    <a:schemeClr val="bg1">
-                      <a:lumMod val="95000"/>
-                    </a:schemeClr>
-                  </a:solidFill>
-                  <a:latin typeface="黑体" panose="02010609060101010101" pitchFamily="49" charset="-122"/>
-                  <a:ea typeface="黑体" panose="02010609060101010101" pitchFamily="49" charset="-122"/>
-                </a:rPr>
-                <a:t>）</a:t>
-              </a:r>
-              <a:endParaRPr lang="en-US" altLang="zh-CN" b="1" dirty="0">
-                <a:solidFill>
-                  <a:schemeClr val="bg1">
-                    <a:lumMod val="95000"/>
-                  </a:schemeClr>
-                </a:solidFill>
-                <a:latin typeface="黑体" panose="02010609060101010101" pitchFamily="49" charset="-122"/>
-                <a:ea typeface="黑体" panose="02010609060101010101" pitchFamily="49" charset="-122"/>
-              </a:endParaRPr>
-            </a:p>
-            <a:p>
-              <a:pPr>
-                <a:lnSpc>
-                  <a:spcPct val="150000"/>
-                </a:lnSpc>
-                <a:spcBef>
-                  <a:spcPts val="200"/>
-                </a:spcBef>
-                <a:spcAft>
-                  <a:spcPts val="200"/>
-                </a:spcAft>
-              </a:pPr>
-              <a:r>
-                <a:rPr lang="en-US" altLang="zh-CN" b="1" dirty="0">
-                  <a:solidFill>
-                    <a:schemeClr val="bg1">
-                      <a:lumMod val="95000"/>
-                    </a:schemeClr>
-                  </a:solidFill>
-                  <a:latin typeface="黑体" panose="02010609060101010101" pitchFamily="49" charset="-122"/>
-                  <a:ea typeface="黑体" panose="02010609060101010101" pitchFamily="49" charset="-122"/>
-                </a:rPr>
-                <a:t>2</a:t>
-              </a:r>
-              <a:r>
-                <a:rPr lang="zh-CN" altLang="en-US" b="1" dirty="0">
-                  <a:solidFill>
-                    <a:schemeClr val="bg1">
-                      <a:lumMod val="95000"/>
-                    </a:schemeClr>
-                  </a:solidFill>
-                  <a:latin typeface="黑体" panose="02010609060101010101" pitchFamily="49" charset="-122"/>
-                  <a:ea typeface="黑体" panose="02010609060101010101" pitchFamily="49" charset="-122"/>
-                </a:rPr>
-                <a:t>）</a:t>
-              </a:r>
-              <a:r>
-                <a:rPr lang="zh-CN" altLang="en-US" b="1" dirty="0">
-                  <a:solidFill>
-                    <a:srgbClr val="FF0000"/>
-                  </a:solidFill>
-                  <a:latin typeface="黑体" panose="02010609060101010101" pitchFamily="49" charset="-122"/>
-                  <a:ea typeface="黑体" panose="02010609060101010101" pitchFamily="49" charset="-122"/>
-                </a:rPr>
-                <a:t>每抓到一只羊</a:t>
-              </a:r>
-              <a:r>
-                <a:rPr lang="zh-CN" altLang="en-US" b="1" dirty="0">
-                  <a:solidFill>
-                    <a:schemeClr val="bg1">
-                      <a:lumMod val="95000"/>
-                    </a:schemeClr>
-                  </a:solidFill>
-                  <a:latin typeface="黑体" panose="02010609060101010101" pitchFamily="49" charset="-122"/>
-                  <a:ea typeface="黑体" panose="02010609060101010101" pitchFamily="49" charset="-122"/>
-                </a:rPr>
-                <a:t>或</a:t>
-              </a:r>
-              <a:r>
-                <a:rPr lang="en-US" altLang="zh-CN" b="1" dirty="0">
-                  <a:solidFill>
-                    <a:srgbClr val="FF0000"/>
-                  </a:solidFill>
-                  <a:latin typeface="黑体" panose="02010609060101010101" pitchFamily="49" charset="-122"/>
-                  <a:ea typeface="黑体" panose="02010609060101010101" pitchFamily="49" charset="-122"/>
-                </a:rPr>
-                <a:t>15s</a:t>
-              </a:r>
-              <a:r>
-                <a:rPr lang="zh-CN" altLang="en-US" b="1" dirty="0">
-                  <a:solidFill>
-                    <a:srgbClr val="FF0000"/>
-                  </a:solidFill>
-                  <a:latin typeface="黑体" panose="02010609060101010101" pitchFamily="49" charset="-122"/>
-                  <a:ea typeface="黑体" panose="02010609060101010101" pitchFamily="49" charset="-122"/>
-                </a:rPr>
-                <a:t>内两名玩家均未抓到羊</a:t>
-              </a:r>
-              <a:r>
-                <a:rPr lang="zh-CN" altLang="en-US" b="1" dirty="0">
-                  <a:solidFill>
-                    <a:schemeClr val="bg1">
-                      <a:lumMod val="95000"/>
-                    </a:schemeClr>
-                  </a:solidFill>
-                  <a:latin typeface="黑体" panose="02010609060101010101" pitchFamily="49" charset="-122"/>
-                  <a:ea typeface="黑体" panose="02010609060101010101" pitchFamily="49" charset="-122"/>
-                </a:rPr>
-                <a:t>，则立即进入下一轮游戏。此时游戏界面刷新，两名玩家的位置也会刷新</a:t>
-              </a:r>
-              <a:endParaRPr lang="en-US" altLang="zh-CN" b="1" dirty="0">
-                <a:solidFill>
-                  <a:schemeClr val="bg1">
-                    <a:lumMod val="95000"/>
-                  </a:schemeClr>
-                </a:solidFill>
-                <a:latin typeface="黑体" panose="02010609060101010101" pitchFamily="49" charset="-122"/>
-                <a:ea typeface="黑体" panose="02010609060101010101" pitchFamily="49" charset="-122"/>
-              </a:endParaRPr>
-            </a:p>
-            <a:p>
-              <a:pPr>
-                <a:lnSpc>
-                  <a:spcPct val="150000"/>
-                </a:lnSpc>
-                <a:spcBef>
-                  <a:spcPts val="200"/>
-                </a:spcBef>
-                <a:spcAft>
-                  <a:spcPts val="200"/>
-                </a:spcAft>
-              </a:pPr>
-              <a:r>
-                <a:rPr lang="en-US" altLang="zh-CN" b="1" dirty="0">
-                  <a:solidFill>
-                    <a:schemeClr val="bg1">
-                      <a:lumMod val="95000"/>
-                    </a:schemeClr>
-                  </a:solidFill>
-                  <a:latin typeface="黑体" panose="02010609060101010101" pitchFamily="49" charset="-122"/>
-                  <a:ea typeface="黑体" panose="02010609060101010101" pitchFamily="49" charset="-122"/>
-                </a:rPr>
-                <a:t>3</a:t>
-              </a:r>
-              <a:r>
-                <a:rPr lang="zh-CN" altLang="en-US" b="1" dirty="0">
-                  <a:solidFill>
-                    <a:schemeClr val="bg1">
-                      <a:lumMod val="95000"/>
-                    </a:schemeClr>
-                  </a:solidFill>
-                  <a:latin typeface="黑体" panose="02010609060101010101" pitchFamily="49" charset="-122"/>
-                  <a:ea typeface="黑体" panose="02010609060101010101" pitchFamily="49" charset="-122"/>
-                </a:rPr>
-                <a:t>）实验报酬和最终总分数相关</a:t>
-              </a:r>
-              <a:endParaRPr lang="en-US" altLang="zh-CN" b="1" dirty="0">
-                <a:solidFill>
-                  <a:schemeClr val="bg1">
-                    <a:lumMod val="95000"/>
-                  </a:schemeClr>
-                </a:solidFill>
-                <a:latin typeface="黑体" panose="02010609060101010101" pitchFamily="49" charset="-122"/>
-                <a:ea typeface="黑体" panose="02010609060101010101" pitchFamily="49" charset="-122"/>
-              </a:endParaRPr>
-            </a:p>
-            <a:p>
-              <a:pPr algn="ctr">
-                <a:lnSpc>
-                  <a:spcPct val="150000"/>
-                </a:lnSpc>
-                <a:spcBef>
-                  <a:spcPts val="200"/>
-                </a:spcBef>
-                <a:spcAft>
-                  <a:spcPts val="200"/>
-                </a:spcAft>
-              </a:pPr>
-              <a:r>
-                <a:rPr lang="zh-CN" altLang="en-US" b="1" dirty="0">
-                  <a:solidFill>
-                    <a:schemeClr val="bg1">
-                      <a:lumMod val="95000"/>
-                    </a:schemeClr>
-                  </a:solidFill>
-                  <a:latin typeface="黑体" panose="02010609060101010101" pitchFamily="49" charset="-122"/>
-                  <a:ea typeface="黑体" panose="02010609060101010101" pitchFamily="49" charset="-122"/>
-                </a:rPr>
-                <a:t>明确自己的任务后，请示意主试开始实验吧。</a:t>
-              </a:r>
-            </a:p>
-          </p:txBody>
-        </p:sp>
         <p:pic>
           <p:nvPicPr>
             <p:cNvPr id="6" name="图片 5"/>
@@ -8282,7 +8116,7 @@
           </p:blipFill>
           <p:spPr>
             <a:xfrm>
-              <a:off x="4039355" y="1705297"/>
+              <a:off x="5353225" y="1737433"/>
               <a:ext cx="2251866" cy="1823211"/>
             </a:xfrm>
             <a:prstGeom prst="rect">
@@ -8292,36 +8126,55 @@
         </p:pic>
         <p:sp>
           <p:nvSpPr>
-            <p:cNvPr id="8" name="椭圆 7"/>
+            <p:cNvPr id="2" name="椭圆 1">
+              <a:extLst>
+                <a:ext uri="{FF2B5EF4-FFF2-40B4-BE49-F238E27FC236}">
+                  <a16:creationId xmlns:a16="http://schemas.microsoft.com/office/drawing/2014/main" id="{C9F31F1E-724C-4821-B3C3-5B5D255452E7}"/>
+                </a:ext>
+              </a:extLst>
+            </p:cNvPr>
             <p:cNvSpPr/>
             <p:nvPr/>
           </p:nvSpPr>
           <p:spPr>
             <a:xfrm>
-              <a:off x="4274678" y="1998675"/>
-              <a:ext cx="647394" cy="598152"/>
+              <a:off x="7064841" y="2457685"/>
+              <a:ext cx="160855" cy="160855"/>
             </a:xfrm>
             <a:prstGeom prst="ellipse">
               <a:avLst/>
             </a:prstGeom>
-            <a:noFill/>
-            <a:ln w="57150">
-              <a:solidFill>
-                <a:srgbClr val="FF0000"/>
-              </a:solidFill>
+            <a:ln>
+              <a:noFill/>
             </a:ln>
+            <a:effectLst>
+              <a:outerShdw blurRad="149987" dist="250190" dir="8460000" algn="ctr">
+                <a:srgbClr val="000000">
+                  <a:alpha val="28000"/>
+                </a:srgbClr>
+              </a:outerShdw>
+            </a:effectLst>
+            <a:scene3d>
+              <a:camera prst="orthographicFront">
+                <a:rot lat="0" lon="0" rev="0"/>
+              </a:camera>
+              <a:lightRig rig="contrasting" dir="t">
+                <a:rot lat="0" lon="0" rev="1500000"/>
+              </a:lightRig>
+            </a:scene3d>
+            <a:sp3d prstMaterial="metal">
+              <a:bevelT w="88900" h="88900"/>
+            </a:sp3d>
           </p:spPr>
           <p:style>
-            <a:lnRef idx="2">
-              <a:schemeClr val="accent1">
-                <a:shade val="50000"/>
-              </a:schemeClr>
+            <a:lnRef idx="0">
+              <a:schemeClr val="dk1"/>
             </a:lnRef>
-            <a:fillRef idx="1">
-              <a:schemeClr val="accent1"/>
+            <a:fillRef idx="3">
+              <a:schemeClr val="dk1"/>
             </a:fillRef>
-            <a:effectRef idx="0">
-              <a:schemeClr val="accent1"/>
+            <a:effectRef idx="3">
+              <a:schemeClr val="dk1"/>
             </a:effectRef>
             <a:fontRef idx="minor">
               <a:schemeClr val="lt1"/>
@@ -8332,15 +8185,429 @@
             <a:lstStyle/>
             <a:p>
               <a:pPr algn="ctr"/>
-              <a:endParaRPr lang="zh-CN" altLang="en-US"/>
+              <a:r>
+                <a:rPr lang="en-US" altLang="zh-CN" sz="1100" b="1" dirty="0">
+                  <a:solidFill>
+                    <a:schemeClr val="accent6">
+                      <a:lumMod val="75000"/>
+                    </a:schemeClr>
+                  </a:solidFill>
+                </a:rPr>
+                <a:t>A</a:t>
+              </a:r>
+              <a:endParaRPr lang="zh-CN" altLang="en-US" sz="1100" b="1" dirty="0">
+                <a:solidFill>
+                  <a:schemeClr val="accent6">
+                    <a:lumMod val="75000"/>
+                  </a:schemeClr>
+                </a:solidFill>
+              </a:endParaRPr>
+            </a:p>
+          </p:txBody>
+        </p:sp>
+        <p:sp>
+          <p:nvSpPr>
+            <p:cNvPr id="11" name="椭圆 10">
+              <a:extLst>
+                <a:ext uri="{FF2B5EF4-FFF2-40B4-BE49-F238E27FC236}">
+                  <a16:creationId xmlns:a16="http://schemas.microsoft.com/office/drawing/2014/main" id="{15864A80-F4CD-45E0-9577-F1ED6F131CD2}"/>
+                </a:ext>
+              </a:extLst>
+            </p:cNvPr>
+            <p:cNvSpPr/>
+            <p:nvPr/>
+          </p:nvSpPr>
+          <p:spPr>
+            <a:xfrm>
+              <a:off x="6889581" y="2288171"/>
+              <a:ext cx="175260" cy="175260"/>
+            </a:xfrm>
+            <a:prstGeom prst="ellipse">
+              <a:avLst/>
+            </a:prstGeom>
+            <a:ln>
+              <a:noFill/>
+            </a:ln>
+            <a:effectLst>
+              <a:outerShdw blurRad="149987" dist="250190" dir="8460000" algn="ctr">
+                <a:srgbClr val="000000">
+                  <a:alpha val="28000"/>
+                </a:srgbClr>
+              </a:outerShdw>
+            </a:effectLst>
+            <a:scene3d>
+              <a:camera prst="orthographicFront">
+                <a:rot lat="0" lon="0" rev="0"/>
+              </a:camera>
+              <a:lightRig rig="contrasting" dir="t">
+                <a:rot lat="0" lon="0" rev="1500000"/>
+              </a:lightRig>
+            </a:scene3d>
+            <a:sp3d prstMaterial="metal">
+              <a:bevelT w="88900" h="88900"/>
+            </a:sp3d>
+          </p:spPr>
+          <p:style>
+            <a:lnRef idx="0">
+              <a:schemeClr val="dk1"/>
+            </a:lnRef>
+            <a:fillRef idx="3">
+              <a:schemeClr val="dk1"/>
+            </a:fillRef>
+            <a:effectRef idx="3">
+              <a:schemeClr val="dk1"/>
+            </a:effectRef>
+            <a:fontRef idx="minor">
+              <a:schemeClr val="lt1"/>
+            </a:fontRef>
+          </p:style>
+          <p:txBody>
+            <a:bodyPr rtlCol="0" anchor="ctr"/>
+            <a:lstStyle/>
+            <a:p>
+              <a:pPr algn="ctr"/>
+              <a:r>
+                <a:rPr lang="en-US" altLang="zh-CN" sz="1100" b="1" dirty="0">
+                  <a:solidFill>
+                    <a:schemeClr val="accent1">
+                      <a:lumMod val="75000"/>
+                    </a:schemeClr>
+                  </a:solidFill>
+                </a:rPr>
+                <a:t>X</a:t>
+              </a:r>
+              <a:endParaRPr lang="zh-CN" altLang="en-US" sz="1100" b="1" dirty="0">
+                <a:solidFill>
+                  <a:schemeClr val="accent1">
+                    <a:lumMod val="75000"/>
+                  </a:schemeClr>
+                </a:solidFill>
+              </a:endParaRPr>
             </a:p>
           </p:txBody>
         </p:sp>
       </p:grpSp>
+      <p:sp>
+        <p:nvSpPr>
+          <p:cNvPr id="8" name="椭圆 7"/>
+          <p:cNvSpPr/>
+          <p:nvPr/>
+        </p:nvSpPr>
+        <p:spPr>
+          <a:xfrm>
+            <a:off x="4887508" y="1944886"/>
+            <a:ext cx="647394" cy="598152"/>
+          </a:xfrm>
+          <a:prstGeom prst="ellipse">
+            <a:avLst/>
+          </a:prstGeom>
+          <a:noFill/>
+          <a:ln w="57150">
+            <a:solidFill>
+              <a:srgbClr val="FF0000"/>
+            </a:solidFill>
+          </a:ln>
+        </p:spPr>
+        <p:style>
+          <a:lnRef idx="2">
+            <a:schemeClr val="accent1">
+              <a:shade val="50000"/>
+            </a:schemeClr>
+          </a:lnRef>
+          <a:fillRef idx="1">
+            <a:schemeClr val="accent1"/>
+          </a:fillRef>
+          <a:effectRef idx="0">
+            <a:schemeClr val="accent1"/>
+          </a:effectRef>
+          <a:fontRef idx="minor">
+            <a:schemeClr val="lt1"/>
+          </a:fontRef>
+        </p:style>
+        <p:txBody>
+          <a:bodyPr rtlCol="0" anchor="ctr"/>
+          <a:lstStyle/>
+          <a:p>
+            <a:pPr algn="ctr"/>
+            <a:endParaRPr lang="zh-CN" altLang="en-US"/>
+          </a:p>
+        </p:txBody>
+      </p:sp>
+      <p:grpSp>
+        <p:nvGrpSpPr>
+          <p:cNvPr id="22" name="组合 21">
+            <a:extLst>
+              <a:ext uri="{FF2B5EF4-FFF2-40B4-BE49-F238E27FC236}">
+                <a16:creationId xmlns:a16="http://schemas.microsoft.com/office/drawing/2014/main" id="{46DD7B19-044E-4E77-BEFC-170FCAF55F50}"/>
+              </a:ext>
+            </a:extLst>
+          </p:cNvPr>
+          <p:cNvGrpSpPr/>
+          <p:nvPr/>
+        </p:nvGrpSpPr>
+        <p:grpSpPr>
+          <a:xfrm>
+            <a:off x="7712648" y="5108977"/>
+            <a:ext cx="1346201" cy="1089944"/>
+            <a:chOff x="5353225" y="1737433"/>
+            <a:chExt cx="2251866" cy="1823211"/>
+          </a:xfrm>
+        </p:grpSpPr>
+        <p:pic>
+          <p:nvPicPr>
+            <p:cNvPr id="23" name="图片 22">
+              <a:extLst>
+                <a:ext uri="{FF2B5EF4-FFF2-40B4-BE49-F238E27FC236}">
+                  <a16:creationId xmlns:a16="http://schemas.microsoft.com/office/drawing/2014/main" id="{B8F80D19-AFE6-4EC4-B9FA-3823250DD84D}"/>
+                </a:ext>
+              </a:extLst>
+            </p:cNvPr>
+            <p:cNvPicPr>
+              <a:picLocks noChangeAspect="1"/>
+            </p:cNvPicPr>
+            <p:nvPr/>
+          </p:nvPicPr>
+          <p:blipFill>
+            <a:blip r:embed="rId2" cstate="print">
+              <a:extLst>
+                <a:ext uri="{28A0092B-C50C-407E-A947-70E740481C1C}">
+                  <a14:useLocalDpi xmlns:a14="http://schemas.microsoft.com/office/drawing/2010/main" val="0"/>
+                </a:ext>
+              </a:extLst>
+            </a:blip>
+            <a:stretch>
+              <a:fillRect/>
+            </a:stretch>
+          </p:blipFill>
+          <p:spPr>
+            <a:xfrm>
+              <a:off x="5353225" y="1737433"/>
+              <a:ext cx="2251866" cy="1823211"/>
+            </a:xfrm>
+            <a:prstGeom prst="rect">
+              <a:avLst/>
+            </a:prstGeom>
+          </p:spPr>
+        </p:pic>
+        <p:sp>
+          <p:nvSpPr>
+            <p:cNvPr id="24" name="椭圆 23">
+              <a:extLst>
+                <a:ext uri="{FF2B5EF4-FFF2-40B4-BE49-F238E27FC236}">
+                  <a16:creationId xmlns:a16="http://schemas.microsoft.com/office/drawing/2014/main" id="{B3E8E41F-BE7B-4C0F-BFB9-305A60C40FEE}"/>
+                </a:ext>
+              </a:extLst>
+            </p:cNvPr>
+            <p:cNvSpPr/>
+            <p:nvPr/>
+          </p:nvSpPr>
+          <p:spPr>
+            <a:xfrm>
+              <a:off x="7064841" y="2457685"/>
+              <a:ext cx="160855" cy="160855"/>
+            </a:xfrm>
+            <a:prstGeom prst="ellipse">
+              <a:avLst/>
+            </a:prstGeom>
+            <a:ln>
+              <a:noFill/>
+            </a:ln>
+            <a:effectLst>
+              <a:outerShdw blurRad="149987" dist="250190" dir="8460000" algn="ctr">
+                <a:srgbClr val="000000">
+                  <a:alpha val="28000"/>
+                </a:srgbClr>
+              </a:outerShdw>
+            </a:effectLst>
+            <a:scene3d>
+              <a:camera prst="orthographicFront">
+                <a:rot lat="0" lon="0" rev="0"/>
+              </a:camera>
+              <a:lightRig rig="contrasting" dir="t">
+                <a:rot lat="0" lon="0" rev="1500000"/>
+              </a:lightRig>
+            </a:scene3d>
+            <a:sp3d prstMaterial="metal">
+              <a:bevelT w="88900" h="88900"/>
+            </a:sp3d>
+          </p:spPr>
+          <p:style>
+            <a:lnRef idx="0">
+              <a:schemeClr val="dk1"/>
+            </a:lnRef>
+            <a:fillRef idx="3">
+              <a:schemeClr val="dk1"/>
+            </a:fillRef>
+            <a:effectRef idx="3">
+              <a:schemeClr val="dk1"/>
+            </a:effectRef>
+            <a:fontRef idx="minor">
+              <a:schemeClr val="lt1"/>
+            </a:fontRef>
+          </p:style>
+          <p:txBody>
+            <a:bodyPr rtlCol="0" anchor="ctr"/>
+            <a:lstStyle/>
+            <a:p>
+              <a:pPr algn="ctr"/>
+              <a:r>
+                <a:rPr lang="en-US" altLang="zh-CN" sz="700" b="1" dirty="0">
+                  <a:solidFill>
+                    <a:schemeClr val="accent6">
+                      <a:lumMod val="75000"/>
+                    </a:schemeClr>
+                  </a:solidFill>
+                </a:rPr>
+                <a:t>A</a:t>
+              </a:r>
+              <a:endParaRPr lang="zh-CN" altLang="en-US" sz="700" b="1" dirty="0">
+                <a:solidFill>
+                  <a:schemeClr val="accent6">
+                    <a:lumMod val="75000"/>
+                  </a:schemeClr>
+                </a:solidFill>
+              </a:endParaRPr>
+            </a:p>
+          </p:txBody>
+        </p:sp>
+        <p:sp>
+          <p:nvSpPr>
+            <p:cNvPr id="25" name="椭圆 24">
+              <a:extLst>
+                <a:ext uri="{FF2B5EF4-FFF2-40B4-BE49-F238E27FC236}">
+                  <a16:creationId xmlns:a16="http://schemas.microsoft.com/office/drawing/2014/main" id="{C3090250-0A4B-4C6E-B035-011B99D9F993}"/>
+                </a:ext>
+              </a:extLst>
+            </p:cNvPr>
+            <p:cNvSpPr/>
+            <p:nvPr/>
+          </p:nvSpPr>
+          <p:spPr>
+            <a:xfrm>
+              <a:off x="6889581" y="2288171"/>
+              <a:ext cx="175260" cy="175260"/>
+            </a:xfrm>
+            <a:prstGeom prst="ellipse">
+              <a:avLst/>
+            </a:prstGeom>
+            <a:ln>
+              <a:noFill/>
+            </a:ln>
+            <a:effectLst>
+              <a:outerShdw blurRad="149987" dist="250190" dir="8460000" algn="ctr">
+                <a:srgbClr val="000000">
+                  <a:alpha val="28000"/>
+                </a:srgbClr>
+              </a:outerShdw>
+            </a:effectLst>
+            <a:scene3d>
+              <a:camera prst="orthographicFront">
+                <a:rot lat="0" lon="0" rev="0"/>
+              </a:camera>
+              <a:lightRig rig="contrasting" dir="t">
+                <a:rot lat="0" lon="0" rev="1500000"/>
+              </a:lightRig>
+            </a:scene3d>
+            <a:sp3d prstMaterial="metal">
+              <a:bevelT w="88900" h="88900"/>
+            </a:sp3d>
+          </p:spPr>
+          <p:style>
+            <a:lnRef idx="0">
+              <a:schemeClr val="dk1"/>
+            </a:lnRef>
+            <a:fillRef idx="3">
+              <a:schemeClr val="dk1"/>
+            </a:fillRef>
+            <a:effectRef idx="3">
+              <a:schemeClr val="dk1"/>
+            </a:effectRef>
+            <a:fontRef idx="minor">
+              <a:schemeClr val="lt1"/>
+            </a:fontRef>
+          </p:style>
+          <p:txBody>
+            <a:bodyPr rtlCol="0" anchor="ctr"/>
+            <a:lstStyle/>
+            <a:p>
+              <a:pPr algn="ctr"/>
+              <a:r>
+                <a:rPr lang="en-US" altLang="zh-CN" sz="700" b="1" dirty="0">
+                  <a:solidFill>
+                    <a:schemeClr val="accent1">
+                      <a:lumMod val="75000"/>
+                    </a:schemeClr>
+                  </a:solidFill>
+                </a:rPr>
+                <a:t>X</a:t>
+              </a:r>
+              <a:endParaRPr lang="zh-CN" altLang="en-US" sz="1200" b="1" dirty="0">
+                <a:solidFill>
+                  <a:schemeClr val="accent1">
+                    <a:lumMod val="75000"/>
+                  </a:schemeClr>
+                </a:solidFill>
+              </a:endParaRPr>
+            </a:p>
+          </p:txBody>
+        </p:sp>
+      </p:grpSp>
+      <p:sp>
+        <p:nvSpPr>
+          <p:cNvPr id="26" name="椭圆 25">
+            <a:extLst>
+              <a:ext uri="{FF2B5EF4-FFF2-40B4-BE49-F238E27FC236}">
+                <a16:creationId xmlns:a16="http://schemas.microsoft.com/office/drawing/2014/main" id="{E3AC1C80-FC39-4E56-B8A1-99229B28D6A1}"/>
+              </a:ext>
+            </a:extLst>
+          </p:cNvPr>
+          <p:cNvSpPr/>
+          <p:nvPr/>
+        </p:nvSpPr>
+        <p:spPr>
+          <a:xfrm>
+            <a:off x="8704386" y="5515832"/>
+            <a:ext cx="159149" cy="147044"/>
+          </a:xfrm>
+          <a:prstGeom prst="ellipse">
+            <a:avLst/>
+          </a:prstGeom>
+          <a:noFill/>
+          <a:ln w="28575">
+            <a:solidFill>
+              <a:srgbClr val="FF0000"/>
+            </a:solidFill>
+          </a:ln>
+        </p:spPr>
+        <p:style>
+          <a:lnRef idx="2">
+            <a:schemeClr val="accent1">
+              <a:shade val="50000"/>
+            </a:schemeClr>
+          </a:lnRef>
+          <a:fillRef idx="1">
+            <a:schemeClr val="accent1"/>
+          </a:fillRef>
+          <a:effectRef idx="0">
+            <a:schemeClr val="accent1"/>
+          </a:effectRef>
+          <a:fontRef idx="minor">
+            <a:schemeClr val="lt1"/>
+          </a:fontRef>
+        </p:style>
+        <p:txBody>
+          <a:bodyPr rtlCol="0" anchor="ctr"/>
+          <a:lstStyle/>
+          <a:p>
+            <a:pPr algn="ctr"/>
+            <a:endParaRPr lang="zh-CN" altLang="en-US"/>
+          </a:p>
+        </p:txBody>
+      </p:sp>
     </p:spTree>
     <p:extLst>
       <p:ext uri="{BB962C8B-B14F-4D97-AF65-F5344CB8AC3E}">
-        <p14:creationId xmlns:p14="http://schemas.microsoft.com/office/powerpoint/2010/main" val="2346977452"/>
+        <p14:creationId xmlns:p14="http://schemas.microsoft.com/office/powerpoint/2010/main" val="381854249"/>
       </p:ext>
     </p:extLst>
   </p:cSld>
@@ -8367,12 +8634,136 @@
           <a:chExt cx="0" cy="0"/>
         </a:xfrm>
       </p:grpSpPr>
+      <p:sp>
+        <p:nvSpPr>
+          <p:cNvPr id="4" name="矩形 3"/>
+          <p:cNvSpPr/>
+          <p:nvPr/>
+        </p:nvSpPr>
+        <p:spPr>
+          <a:xfrm>
+            <a:off x="2177392" y="363070"/>
+            <a:ext cx="6705999" cy="6131859"/>
+          </a:xfrm>
+          <a:prstGeom prst="rect">
+            <a:avLst/>
+          </a:prstGeom>
+          <a:solidFill>
+            <a:schemeClr val="bg2">
+              <a:lumMod val="25000"/>
+            </a:schemeClr>
+          </a:solidFill>
+          <a:ln>
+            <a:noFill/>
+          </a:ln>
+        </p:spPr>
+        <p:style>
+          <a:lnRef idx="3">
+            <a:schemeClr val="lt1"/>
+          </a:lnRef>
+          <a:fillRef idx="1">
+            <a:schemeClr val="accent3"/>
+          </a:fillRef>
+          <a:effectRef idx="1">
+            <a:schemeClr val="accent3"/>
+          </a:effectRef>
+          <a:fontRef idx="minor">
+            <a:schemeClr val="lt1"/>
+          </a:fontRef>
+        </p:style>
+        <p:txBody>
+          <a:bodyPr rtlCol="0" anchor="t"/>
+          <a:lstStyle/>
+          <a:p>
+            <a:pPr marL="0" lvl="4" algn="ctr">
+              <a:lnSpc>
+                <a:spcPct val="150000"/>
+              </a:lnSpc>
+            </a:pPr>
+            <a:endParaRPr lang="en-US" altLang="zh-CN" sz="3600" b="1" dirty="0">
+              <a:latin typeface="黑体" panose="02010609060101010101" pitchFamily="49" charset="-122"/>
+              <a:ea typeface="黑体" panose="02010609060101010101" pitchFamily="49" charset="-122"/>
+            </a:endParaRPr>
+          </a:p>
+          <a:p>
+            <a:pPr marL="0" lvl="4" algn="ctr">
+              <a:lnSpc>
+                <a:spcPct val="150000"/>
+              </a:lnSpc>
+            </a:pPr>
+            <a:endParaRPr lang="en-US" altLang="zh-CN" sz="3600" b="1" dirty="0">
+              <a:latin typeface="黑体" panose="02010609060101010101" pitchFamily="49" charset="-122"/>
+              <a:ea typeface="黑体" panose="02010609060101010101" pitchFamily="49" charset="-122"/>
+            </a:endParaRPr>
+          </a:p>
+          <a:p>
+            <a:pPr marL="0" lvl="4" algn="ctr">
+              <a:lnSpc>
+                <a:spcPct val="150000"/>
+              </a:lnSpc>
+            </a:pPr>
+            <a:r>
+              <a:rPr lang="zh-CN" altLang="en-US" sz="2800" b="1" dirty="0">
+                <a:latin typeface="黑体" panose="02010609060101010101" pitchFamily="49" charset="-122"/>
+                <a:ea typeface="黑体" panose="02010609060101010101" pitchFamily="49" charset="-122"/>
+              </a:rPr>
+              <a:t>请休息片刻，</a:t>
+            </a:r>
+          </a:p>
+          <a:p>
+            <a:pPr marL="0" lvl="4" algn="ctr">
+              <a:lnSpc>
+                <a:spcPct val="150000"/>
+              </a:lnSpc>
+            </a:pPr>
+            <a:r>
+              <a:rPr lang="zh-CN" altLang="en-US" sz="2800" b="1" dirty="0">
+                <a:latin typeface="黑体" panose="02010609060101010101" pitchFamily="49" charset="-122"/>
+                <a:ea typeface="黑体" panose="02010609060101010101" pitchFamily="49" charset="-122"/>
+              </a:rPr>
+              <a:t>休息好后请按手柄</a:t>
+            </a:r>
+            <a:r>
+              <a:rPr lang="en-US" altLang="zh-CN" sz="2800" b="1" dirty="0">
+                <a:latin typeface="黑体" panose="02010609060101010101" pitchFamily="49" charset="-122"/>
+                <a:ea typeface="黑体" panose="02010609060101010101" pitchFamily="49" charset="-122"/>
+              </a:rPr>
+              <a:t>A</a:t>
+            </a:r>
+            <a:r>
+              <a:rPr lang="zh-CN" altLang="en-US" sz="2800" b="1" dirty="0">
+                <a:latin typeface="黑体" panose="02010609060101010101" pitchFamily="49" charset="-122"/>
+                <a:ea typeface="黑体" panose="02010609060101010101" pitchFamily="49" charset="-122"/>
+              </a:rPr>
+              <a:t>键</a:t>
+            </a:r>
+          </a:p>
+          <a:p>
+            <a:pPr marL="0" lvl="4" algn="ctr">
+              <a:lnSpc>
+                <a:spcPct val="150000"/>
+              </a:lnSpc>
+            </a:pPr>
+            <a:r>
+              <a:rPr lang="zh-CN" altLang="en-US" sz="2800" b="1" dirty="0">
+                <a:latin typeface="黑体" panose="02010609060101010101" pitchFamily="49" charset="-122"/>
+                <a:ea typeface="黑体" panose="02010609060101010101" pitchFamily="49" charset="-122"/>
+              </a:rPr>
+              <a:t>等待双方确认后游戏继续。</a:t>
+            </a:r>
+            <a:endParaRPr lang="zh-CN" altLang="en-US" sz="3600" b="1" dirty="0">
+              <a:latin typeface="黑体" panose="02010609060101010101" pitchFamily="49" charset="-122"/>
+              <a:ea typeface="黑体" panose="02010609060101010101" pitchFamily="49" charset="-122"/>
+            </a:endParaRPr>
+          </a:p>
+        </p:txBody>
+      </p:sp>
       <p:grpSp>
         <p:nvGrpSpPr>
-          <p:cNvPr id="10" name="组合 9">
+          <p:cNvPr id="6" name="组合 5">
             <a:extLst>
               <a:ext uri="{FF2B5EF4-FFF2-40B4-BE49-F238E27FC236}">
-                <a16:creationId xmlns:a16="http://schemas.microsoft.com/office/drawing/2014/main" id="{CD6FDFA4-D305-489B-9844-B0EF9A4EDB69}"/>
+                <a16:creationId xmlns:a16="http://schemas.microsoft.com/office/drawing/2014/main" id="{4F38F176-AFB8-485F-AD93-AAA92E0E6BD1}"/>
               </a:ext>
             </a:extLst>
           </p:cNvPr>
@@ -8381,683 +8772,18 @@
         </p:nvGrpSpPr>
         <p:grpSpPr>
           <a:xfrm>
-            <a:off x="887506" y="416859"/>
-            <a:ext cx="8767482" cy="6131859"/>
-            <a:chOff x="887506" y="416859"/>
-            <a:chExt cx="8767482" cy="6131859"/>
+            <a:off x="4275622" y="3947287"/>
+            <a:ext cx="2251866" cy="1823211"/>
+            <a:chOff x="5353225" y="1737433"/>
+            <a:chExt cx="2251866" cy="1823211"/>
           </a:xfrm>
         </p:grpSpPr>
-        <p:sp>
-          <p:nvSpPr>
-            <p:cNvPr id="4" name="矩形 3"/>
-            <p:cNvSpPr/>
-            <p:nvPr/>
-          </p:nvSpPr>
-          <p:spPr>
-            <a:xfrm>
-              <a:off x="887506" y="416859"/>
-              <a:ext cx="8767482" cy="6131859"/>
-            </a:xfrm>
-            <a:prstGeom prst="rect">
-              <a:avLst/>
-            </a:prstGeom>
-            <a:solidFill>
-              <a:schemeClr val="bg2">
-                <a:lumMod val="25000"/>
-              </a:schemeClr>
-            </a:solidFill>
-            <a:ln>
-              <a:noFill/>
-            </a:ln>
-          </p:spPr>
-          <p:style>
-            <a:lnRef idx="3">
-              <a:schemeClr val="lt1"/>
-            </a:lnRef>
-            <a:fillRef idx="1">
-              <a:schemeClr val="accent3"/>
-            </a:fillRef>
-            <a:effectRef idx="1">
-              <a:schemeClr val="accent3"/>
-            </a:effectRef>
-            <a:fontRef idx="minor">
-              <a:schemeClr val="lt1"/>
-            </a:fontRef>
-          </p:style>
-          <p:txBody>
-            <a:bodyPr rtlCol="0" anchor="ctr"/>
-            <a:lstStyle/>
-            <a:p>
-              <a:pPr>
-                <a:lnSpc>
-                  <a:spcPct val="150000"/>
-                </a:lnSpc>
-                <a:spcBef>
-                  <a:spcPts val="200"/>
-                </a:spcBef>
-                <a:spcAft>
-                  <a:spcPts val="200"/>
-                </a:spcAft>
-              </a:pPr>
-              <a:endParaRPr lang="zh-CN" altLang="en-US" sz="2000" dirty="0">
-                <a:latin typeface="黑体" panose="02010609060101010101" pitchFamily="49" charset="-122"/>
-                <a:ea typeface="黑体" panose="02010609060101010101" pitchFamily="49" charset="-122"/>
-              </a:endParaRPr>
-            </a:p>
-          </p:txBody>
-        </p:sp>
-        <p:sp>
-          <p:nvSpPr>
-            <p:cNvPr id="3" name="文本框 2"/>
-            <p:cNvSpPr txBox="1"/>
-            <p:nvPr/>
-          </p:nvSpPr>
-          <p:spPr>
-            <a:xfrm>
-              <a:off x="1257300" y="726389"/>
-              <a:ext cx="7879976" cy="5526321"/>
-            </a:xfrm>
-            <a:prstGeom prst="rect">
-              <a:avLst/>
-            </a:prstGeom>
-            <a:noFill/>
-          </p:spPr>
-          <p:txBody>
-            <a:bodyPr wrap="square" rtlCol="0">
-              <a:spAutoFit/>
-            </a:bodyPr>
-            <a:lstStyle/>
-            <a:p>
-              <a:pPr algn="ctr">
-                <a:lnSpc>
-                  <a:spcPct val="150000"/>
-                </a:lnSpc>
-                <a:spcBef>
-                  <a:spcPts val="200"/>
-                </a:spcBef>
-                <a:spcAft>
-                  <a:spcPts val="200"/>
-                </a:spcAft>
-              </a:pPr>
-              <a:r>
-                <a:rPr lang="zh-CN" altLang="en-US" b="1" dirty="0">
-                  <a:solidFill>
-                    <a:schemeClr val="bg1">
-                      <a:lumMod val="95000"/>
-                    </a:schemeClr>
-                  </a:solidFill>
-                  <a:latin typeface="黑体" panose="02010609060101010101" pitchFamily="49" charset="-122"/>
-                  <a:ea typeface="黑体" panose="02010609060101010101" pitchFamily="49" charset="-122"/>
-                </a:rPr>
-                <a:t>您好，欢迎参与“狼追羊”游戏！</a:t>
-              </a:r>
-              <a:endParaRPr lang="en-US" altLang="zh-CN" b="1" dirty="0">
-                <a:solidFill>
-                  <a:schemeClr val="bg1">
-                    <a:lumMod val="95000"/>
-                  </a:schemeClr>
-                </a:solidFill>
-                <a:latin typeface="黑体" panose="02010609060101010101" pitchFamily="49" charset="-122"/>
-                <a:ea typeface="黑体" panose="02010609060101010101" pitchFamily="49" charset="-122"/>
-              </a:endParaRPr>
-            </a:p>
-            <a:p>
-              <a:pPr>
-                <a:lnSpc>
-                  <a:spcPct val="150000"/>
-                </a:lnSpc>
-                <a:spcBef>
-                  <a:spcPts val="200"/>
-                </a:spcBef>
-                <a:spcAft>
-                  <a:spcPts val="200"/>
-                </a:spcAft>
-              </a:pPr>
-              <a:r>
-                <a:rPr lang="zh-CN" altLang="en-US" b="1" dirty="0">
-                  <a:solidFill>
-                    <a:schemeClr val="bg1">
-                      <a:lumMod val="95000"/>
-                    </a:schemeClr>
-                  </a:solidFill>
-                  <a:latin typeface="黑体" panose="02010609060101010101" pitchFamily="49" charset="-122"/>
-                  <a:ea typeface="黑体" panose="02010609060101010101" pitchFamily="49" charset="-122"/>
-                </a:rPr>
-                <a:t>游戏即将开始，您可以通过操纵游戏手柄左上角的摇杆来控制狼的移动</a:t>
-              </a:r>
-              <a:endParaRPr lang="en-US" altLang="zh-CN" b="1" dirty="0">
-                <a:solidFill>
-                  <a:schemeClr val="bg1">
-                    <a:lumMod val="95000"/>
-                  </a:schemeClr>
-                </a:solidFill>
-                <a:latin typeface="黑体" panose="02010609060101010101" pitchFamily="49" charset="-122"/>
-                <a:ea typeface="黑体" panose="02010609060101010101" pitchFamily="49" charset="-122"/>
-              </a:endParaRPr>
-            </a:p>
-            <a:p>
-              <a:pPr>
-                <a:lnSpc>
-                  <a:spcPct val="150000"/>
-                </a:lnSpc>
-                <a:spcBef>
-                  <a:spcPts val="200"/>
-                </a:spcBef>
-                <a:spcAft>
-                  <a:spcPts val="200"/>
-                </a:spcAft>
-              </a:pPr>
-              <a:endParaRPr lang="en-US" altLang="zh-CN" b="1" dirty="0">
-                <a:solidFill>
-                  <a:schemeClr val="bg1">
-                    <a:lumMod val="95000"/>
-                  </a:schemeClr>
-                </a:solidFill>
-                <a:latin typeface="黑体" panose="02010609060101010101" pitchFamily="49" charset="-122"/>
-                <a:ea typeface="黑体" panose="02010609060101010101" pitchFamily="49" charset="-122"/>
-              </a:endParaRPr>
-            </a:p>
-            <a:p>
-              <a:pPr>
-                <a:lnSpc>
-                  <a:spcPct val="150000"/>
-                </a:lnSpc>
-                <a:spcBef>
-                  <a:spcPts val="200"/>
-                </a:spcBef>
-                <a:spcAft>
-                  <a:spcPts val="200"/>
-                </a:spcAft>
-              </a:pPr>
-              <a:endParaRPr lang="en-US" altLang="zh-CN" b="1" dirty="0">
-                <a:solidFill>
-                  <a:schemeClr val="bg1">
-                    <a:lumMod val="95000"/>
-                  </a:schemeClr>
-                </a:solidFill>
-                <a:latin typeface="黑体" panose="02010609060101010101" pitchFamily="49" charset="-122"/>
-                <a:ea typeface="黑体" panose="02010609060101010101" pitchFamily="49" charset="-122"/>
-              </a:endParaRPr>
-            </a:p>
-            <a:p>
-              <a:pPr>
-                <a:lnSpc>
-                  <a:spcPct val="150000"/>
-                </a:lnSpc>
-                <a:spcBef>
-                  <a:spcPts val="200"/>
-                </a:spcBef>
-                <a:spcAft>
-                  <a:spcPts val="200"/>
-                </a:spcAft>
-              </a:pPr>
-              <a:endParaRPr lang="en-US" altLang="zh-CN" b="1" dirty="0">
-                <a:solidFill>
-                  <a:schemeClr val="bg1">
-                    <a:lumMod val="95000"/>
-                  </a:schemeClr>
-                </a:solidFill>
-                <a:latin typeface="黑体" panose="02010609060101010101" pitchFamily="49" charset="-122"/>
-                <a:ea typeface="黑体" panose="02010609060101010101" pitchFamily="49" charset="-122"/>
-              </a:endParaRPr>
-            </a:p>
-            <a:p>
-              <a:pPr>
-                <a:lnSpc>
-                  <a:spcPct val="150000"/>
-                </a:lnSpc>
-                <a:spcBef>
-                  <a:spcPts val="200"/>
-                </a:spcBef>
-                <a:spcAft>
-                  <a:spcPts val="200"/>
-                </a:spcAft>
-              </a:pPr>
-              <a:r>
-                <a:rPr lang="zh-CN" altLang="en-US" b="1" dirty="0">
-                  <a:solidFill>
-                    <a:schemeClr val="bg1">
-                      <a:lumMod val="95000"/>
-                    </a:schemeClr>
-                  </a:solidFill>
-                  <a:latin typeface="黑体" panose="02010609060101010101" pitchFamily="49" charset="-122"/>
-                  <a:ea typeface="黑体" panose="02010609060101010101" pitchFamily="49" charset="-122"/>
-                </a:rPr>
-                <a:t>再次提醒：</a:t>
-              </a:r>
-              <a:endParaRPr lang="en-US" altLang="zh-CN" b="1" dirty="0">
-                <a:solidFill>
-                  <a:schemeClr val="bg1">
-                    <a:lumMod val="95000"/>
-                  </a:schemeClr>
-                </a:solidFill>
-                <a:latin typeface="黑体" panose="02010609060101010101" pitchFamily="49" charset="-122"/>
-                <a:ea typeface="黑体" panose="02010609060101010101" pitchFamily="49" charset="-122"/>
-              </a:endParaRPr>
-            </a:p>
-            <a:p>
-              <a:pPr>
-                <a:lnSpc>
-                  <a:spcPct val="150000"/>
-                </a:lnSpc>
-                <a:spcBef>
-                  <a:spcPts val="200"/>
-                </a:spcBef>
-                <a:spcAft>
-                  <a:spcPts val="200"/>
-                </a:spcAft>
-              </a:pPr>
-              <a:r>
-                <a:rPr lang="en-US" altLang="zh-CN" b="1" dirty="0">
-                  <a:solidFill>
-                    <a:schemeClr val="bg1">
-                      <a:lumMod val="95000"/>
-                    </a:schemeClr>
-                  </a:solidFill>
-                  <a:latin typeface="黑体" panose="02010609060101010101" pitchFamily="49" charset="-122"/>
-                  <a:ea typeface="黑体" panose="02010609060101010101" pitchFamily="49" charset="-122"/>
-                </a:rPr>
-                <a:t>1</a:t>
-              </a:r>
-              <a:r>
-                <a:rPr lang="zh-CN" altLang="en-US" b="1" dirty="0">
-                  <a:solidFill>
-                    <a:schemeClr val="bg1">
-                      <a:lumMod val="95000"/>
-                    </a:schemeClr>
-                  </a:solidFill>
-                  <a:latin typeface="黑体" panose="02010609060101010101" pitchFamily="49" charset="-122"/>
-                  <a:ea typeface="黑体" panose="02010609060101010101" pitchFamily="49" charset="-122"/>
-                </a:rPr>
-                <a:t>）游戏任务是尽快地在</a:t>
-              </a:r>
-              <a:r>
-                <a:rPr lang="zh-CN" altLang="en-US" b="1" dirty="0">
-                  <a:solidFill>
-                    <a:srgbClr val="FF0000"/>
-                  </a:solidFill>
-                  <a:latin typeface="黑体" panose="02010609060101010101" pitchFamily="49" charset="-122"/>
-                  <a:ea typeface="黑体" panose="02010609060101010101" pitchFamily="49" charset="-122"/>
-                </a:rPr>
-                <a:t>规定时间内（</a:t>
-              </a:r>
-              <a:r>
-                <a:rPr lang="en-US" altLang="zh-CN" b="1" dirty="0">
-                  <a:solidFill>
-                    <a:srgbClr val="FF0000"/>
-                  </a:solidFill>
-                  <a:latin typeface="黑体" panose="02010609060101010101" pitchFamily="49" charset="-122"/>
-                  <a:ea typeface="黑体" panose="02010609060101010101" pitchFamily="49" charset="-122"/>
-                </a:rPr>
-                <a:t>15s</a:t>
-              </a:r>
-              <a:r>
-                <a:rPr lang="zh-CN" altLang="en-US" b="1" dirty="0">
-                  <a:solidFill>
-                    <a:srgbClr val="FF0000"/>
-                  </a:solidFill>
-                  <a:latin typeface="黑体" panose="02010609060101010101" pitchFamily="49" charset="-122"/>
-                  <a:ea typeface="黑体" panose="02010609060101010101" pitchFamily="49" charset="-122"/>
-                </a:rPr>
-                <a:t>）</a:t>
-              </a:r>
-              <a:r>
-                <a:rPr lang="zh-CN" altLang="en-US" b="1" dirty="0">
-                  <a:solidFill>
-                    <a:schemeClr val="bg1">
-                      <a:lumMod val="95000"/>
-                    </a:schemeClr>
-                  </a:solidFill>
-                  <a:latin typeface="黑体" panose="02010609060101010101" pitchFamily="49" charset="-122"/>
-                  <a:ea typeface="黑体" panose="02010609060101010101" pitchFamily="49" charset="-122"/>
-                </a:rPr>
-                <a:t>抓住屏幕中跑动的羊（</a:t>
-              </a:r>
-              <a:r>
-                <a:rPr lang="zh-CN" altLang="en-US" b="1" dirty="0">
-                  <a:solidFill>
-                    <a:srgbClr val="FFA500"/>
-                  </a:solidFill>
-                  <a:latin typeface="黑体" panose="02010609060101010101" pitchFamily="49" charset="-122"/>
-                  <a:ea typeface="黑体" panose="02010609060101010101" pitchFamily="49" charset="-122"/>
-                </a:rPr>
-                <a:t>黄色小球</a:t>
-              </a:r>
-              <a:r>
-                <a:rPr lang="zh-CN" altLang="en-US" b="1" dirty="0">
-                  <a:solidFill>
-                    <a:schemeClr val="bg1">
-                      <a:lumMod val="95000"/>
-                    </a:schemeClr>
-                  </a:solidFill>
-                  <a:latin typeface="黑体" panose="02010609060101010101" pitchFamily="49" charset="-122"/>
-                  <a:ea typeface="黑体" panose="02010609060101010101" pitchFamily="49" charset="-122"/>
-                </a:rPr>
-                <a:t>）</a:t>
-              </a:r>
-              <a:endParaRPr lang="en-US" altLang="zh-CN" b="1" dirty="0">
-                <a:solidFill>
-                  <a:schemeClr val="bg1">
-                    <a:lumMod val="95000"/>
-                  </a:schemeClr>
-                </a:solidFill>
-                <a:latin typeface="黑体" panose="02010609060101010101" pitchFamily="49" charset="-122"/>
-                <a:ea typeface="黑体" panose="02010609060101010101" pitchFamily="49" charset="-122"/>
-              </a:endParaRPr>
-            </a:p>
-            <a:p>
-              <a:pPr>
-                <a:lnSpc>
-                  <a:spcPct val="150000"/>
-                </a:lnSpc>
-                <a:spcBef>
-                  <a:spcPts val="200"/>
-                </a:spcBef>
-                <a:spcAft>
-                  <a:spcPts val="200"/>
-                </a:spcAft>
-              </a:pPr>
-              <a:r>
-                <a:rPr lang="en-US" altLang="zh-CN" b="1" dirty="0">
-                  <a:solidFill>
-                    <a:schemeClr val="bg1">
-                      <a:lumMod val="95000"/>
-                    </a:schemeClr>
-                  </a:solidFill>
-                  <a:latin typeface="黑体" panose="02010609060101010101" pitchFamily="49" charset="-122"/>
-                  <a:ea typeface="黑体" panose="02010609060101010101" pitchFamily="49" charset="-122"/>
-                </a:rPr>
-                <a:t>2</a:t>
-              </a:r>
-              <a:r>
-                <a:rPr lang="zh-CN" altLang="en-US" b="1" dirty="0">
-                  <a:solidFill>
-                    <a:schemeClr val="bg1">
-                      <a:lumMod val="95000"/>
-                    </a:schemeClr>
-                  </a:solidFill>
-                  <a:latin typeface="黑体" panose="02010609060101010101" pitchFamily="49" charset="-122"/>
-                  <a:ea typeface="黑体" panose="02010609060101010101" pitchFamily="49" charset="-122"/>
-                </a:rPr>
-                <a:t>）</a:t>
-              </a:r>
-              <a:r>
-                <a:rPr lang="zh-CN" altLang="en-US" b="1" dirty="0">
-                  <a:solidFill>
-                    <a:srgbClr val="FF0000"/>
-                  </a:solidFill>
-                  <a:latin typeface="黑体" panose="02010609060101010101" pitchFamily="49" charset="-122"/>
-                  <a:ea typeface="黑体" panose="02010609060101010101" pitchFamily="49" charset="-122"/>
-                </a:rPr>
-                <a:t>每抓到一只羊</a:t>
-              </a:r>
-              <a:r>
-                <a:rPr lang="zh-CN" altLang="en-US" b="1" dirty="0">
-                  <a:solidFill>
-                    <a:schemeClr val="bg1">
-                      <a:lumMod val="95000"/>
-                    </a:schemeClr>
-                  </a:solidFill>
-                  <a:latin typeface="黑体" panose="02010609060101010101" pitchFamily="49" charset="-122"/>
-                  <a:ea typeface="黑体" panose="02010609060101010101" pitchFamily="49" charset="-122"/>
-                </a:rPr>
-                <a:t>或</a:t>
-              </a:r>
-              <a:r>
-                <a:rPr lang="en-US" altLang="zh-CN" b="1" dirty="0">
-                  <a:solidFill>
-                    <a:srgbClr val="FF0000"/>
-                  </a:solidFill>
-                  <a:latin typeface="黑体" panose="02010609060101010101" pitchFamily="49" charset="-122"/>
-                  <a:ea typeface="黑体" panose="02010609060101010101" pitchFamily="49" charset="-122"/>
-                </a:rPr>
-                <a:t>15s</a:t>
-              </a:r>
-              <a:r>
-                <a:rPr lang="zh-CN" altLang="en-US" b="1" dirty="0">
-                  <a:solidFill>
-                    <a:srgbClr val="FF0000"/>
-                  </a:solidFill>
-                  <a:latin typeface="黑体" panose="02010609060101010101" pitchFamily="49" charset="-122"/>
-                  <a:ea typeface="黑体" panose="02010609060101010101" pitchFamily="49" charset="-122"/>
-                </a:rPr>
-                <a:t>内两名玩家均未抓到羊</a:t>
-              </a:r>
-              <a:r>
-                <a:rPr lang="zh-CN" altLang="en-US" b="1" dirty="0">
-                  <a:solidFill>
-                    <a:schemeClr val="bg1">
-                      <a:lumMod val="95000"/>
-                    </a:schemeClr>
-                  </a:solidFill>
-                  <a:latin typeface="黑体" panose="02010609060101010101" pitchFamily="49" charset="-122"/>
-                  <a:ea typeface="黑体" panose="02010609060101010101" pitchFamily="49" charset="-122"/>
-                </a:rPr>
-                <a:t>，则立即进入下一轮游戏。此时游戏界面刷新，两名玩家的位置也会刷新</a:t>
-              </a:r>
-              <a:endParaRPr lang="en-US" altLang="zh-CN" b="1" dirty="0">
-                <a:solidFill>
-                  <a:schemeClr val="bg1">
-                    <a:lumMod val="95000"/>
-                  </a:schemeClr>
-                </a:solidFill>
-                <a:latin typeface="黑体" panose="02010609060101010101" pitchFamily="49" charset="-122"/>
-                <a:ea typeface="黑体" panose="02010609060101010101" pitchFamily="49" charset="-122"/>
-              </a:endParaRPr>
-            </a:p>
-            <a:p>
-              <a:pPr>
-                <a:lnSpc>
-                  <a:spcPct val="150000"/>
-                </a:lnSpc>
-                <a:spcBef>
-                  <a:spcPts val="200"/>
-                </a:spcBef>
-                <a:spcAft>
-                  <a:spcPts val="200"/>
-                </a:spcAft>
-              </a:pPr>
-              <a:r>
-                <a:rPr lang="en-US" altLang="zh-CN" b="1" dirty="0">
-                  <a:solidFill>
-                    <a:schemeClr val="bg1">
-                      <a:lumMod val="95000"/>
-                    </a:schemeClr>
-                  </a:solidFill>
-                  <a:latin typeface="黑体" panose="02010609060101010101" pitchFamily="49" charset="-122"/>
-                  <a:ea typeface="黑体" panose="02010609060101010101" pitchFamily="49" charset="-122"/>
-                </a:rPr>
-                <a:t>3</a:t>
-              </a:r>
-              <a:r>
-                <a:rPr lang="zh-CN" altLang="en-US" b="1" dirty="0">
-                  <a:solidFill>
-                    <a:schemeClr val="bg1">
-                      <a:lumMod val="95000"/>
-                    </a:schemeClr>
-                  </a:solidFill>
-                  <a:latin typeface="黑体" panose="02010609060101010101" pitchFamily="49" charset="-122"/>
-                  <a:ea typeface="黑体" panose="02010609060101010101" pitchFamily="49" charset="-122"/>
-                </a:rPr>
-                <a:t>）实验报酬和最终总分数相关</a:t>
-              </a:r>
-              <a:endParaRPr lang="en-US" altLang="zh-CN" b="1" dirty="0">
-                <a:solidFill>
-                  <a:schemeClr val="bg1">
-                    <a:lumMod val="95000"/>
-                  </a:schemeClr>
-                </a:solidFill>
-                <a:latin typeface="黑体" panose="02010609060101010101" pitchFamily="49" charset="-122"/>
-                <a:ea typeface="黑体" panose="02010609060101010101" pitchFamily="49" charset="-122"/>
-              </a:endParaRPr>
-            </a:p>
-            <a:p>
-              <a:pPr algn="ctr">
-                <a:lnSpc>
-                  <a:spcPct val="150000"/>
-                </a:lnSpc>
-                <a:spcBef>
-                  <a:spcPts val="200"/>
-                </a:spcBef>
-                <a:spcAft>
-                  <a:spcPts val="200"/>
-                </a:spcAft>
-              </a:pPr>
-              <a:r>
-                <a:rPr lang="zh-CN" altLang="en-US" b="1" dirty="0">
-                  <a:solidFill>
-                    <a:schemeClr val="bg1">
-                      <a:lumMod val="95000"/>
-                    </a:schemeClr>
-                  </a:solidFill>
-                  <a:latin typeface="黑体" panose="02010609060101010101" pitchFamily="49" charset="-122"/>
-                  <a:ea typeface="黑体" panose="02010609060101010101" pitchFamily="49" charset="-122"/>
-                </a:rPr>
-                <a:t>明确自己的任务后，请按下</a:t>
-              </a:r>
-              <a:r>
-                <a:rPr lang="en-US" altLang="zh-CN" b="1" dirty="0">
-                  <a:solidFill>
-                    <a:schemeClr val="bg1">
-                      <a:lumMod val="95000"/>
-                    </a:schemeClr>
-                  </a:solidFill>
-                  <a:latin typeface="黑体" panose="02010609060101010101" pitchFamily="49" charset="-122"/>
-                  <a:ea typeface="黑体" panose="02010609060101010101" pitchFamily="49" charset="-122"/>
-                </a:rPr>
-                <a:t>a</a:t>
-              </a:r>
-              <a:r>
-                <a:rPr lang="zh-CN" altLang="en-US" b="1" dirty="0">
-                  <a:solidFill>
-                    <a:schemeClr val="bg1">
-                      <a:lumMod val="95000"/>
-                    </a:schemeClr>
-                  </a:solidFill>
-                  <a:latin typeface="黑体" panose="02010609060101010101" pitchFamily="49" charset="-122"/>
-                  <a:ea typeface="黑体" panose="02010609060101010101" pitchFamily="49" charset="-122"/>
-                </a:rPr>
-                <a:t>键。</a:t>
-              </a:r>
-              <a:endParaRPr lang="en-US" altLang="zh-CN" b="1" dirty="0">
-                <a:solidFill>
-                  <a:schemeClr val="bg1">
-                    <a:lumMod val="95000"/>
-                  </a:schemeClr>
-                </a:solidFill>
-                <a:latin typeface="黑体" panose="02010609060101010101" pitchFamily="49" charset="-122"/>
-                <a:ea typeface="黑体" panose="02010609060101010101" pitchFamily="49" charset="-122"/>
-              </a:endParaRPr>
-            </a:p>
-            <a:p>
-              <a:pPr algn="ctr">
-                <a:lnSpc>
-                  <a:spcPct val="150000"/>
-                </a:lnSpc>
-                <a:spcBef>
-                  <a:spcPts val="200"/>
-                </a:spcBef>
-                <a:spcAft>
-                  <a:spcPts val="200"/>
-                </a:spcAft>
-              </a:pPr>
-              <a:r>
-                <a:rPr lang="zh-CN" altLang="en-US" b="1" dirty="0">
-                  <a:solidFill>
-                    <a:schemeClr val="bg1">
-                      <a:lumMod val="95000"/>
-                    </a:schemeClr>
-                  </a:solidFill>
-                  <a:latin typeface="黑体" panose="02010609060101010101" pitchFamily="49" charset="-122"/>
-                  <a:ea typeface="黑体" panose="02010609060101010101" pitchFamily="49" charset="-122"/>
-                </a:rPr>
-                <a:t>等待双方确认后游戏开始。</a:t>
-              </a:r>
-            </a:p>
-          </p:txBody>
-        </p:sp>
-        <p:pic>
-          <p:nvPicPr>
-            <p:cNvPr id="6" name="图片 5"/>
-            <p:cNvPicPr>
-              <a:picLocks noChangeAspect="1"/>
-            </p:cNvPicPr>
-            <p:nvPr/>
-          </p:nvPicPr>
-          <p:blipFill>
-            <a:blip r:embed="rId2" cstate="print">
-              <a:extLst>
-                <a:ext uri="{28A0092B-C50C-407E-A947-70E740481C1C}">
-                  <a14:useLocalDpi xmlns:a14="http://schemas.microsoft.com/office/drawing/2010/main" val="0"/>
-                </a:ext>
-              </a:extLst>
-            </a:blip>
-            <a:stretch>
-              <a:fillRect/>
-            </a:stretch>
-          </p:blipFill>
-          <p:spPr>
-            <a:xfrm>
-              <a:off x="4039355" y="1705297"/>
-              <a:ext cx="2251866" cy="1823211"/>
-            </a:xfrm>
-            <a:prstGeom prst="rect">
-              <a:avLst/>
-            </a:prstGeom>
-          </p:spPr>
-        </p:pic>
-        <p:sp>
-          <p:nvSpPr>
-            <p:cNvPr id="8" name="椭圆 7"/>
-            <p:cNvSpPr/>
-            <p:nvPr/>
-          </p:nvSpPr>
-          <p:spPr>
-            <a:xfrm>
-              <a:off x="4274678" y="1998675"/>
-              <a:ext cx="647394" cy="598152"/>
-            </a:xfrm>
-            <a:prstGeom prst="ellipse">
-              <a:avLst/>
-            </a:prstGeom>
-            <a:noFill/>
-            <a:ln w="57150">
-              <a:solidFill>
-                <a:srgbClr val="FF0000"/>
-              </a:solidFill>
-            </a:ln>
-          </p:spPr>
-          <p:style>
-            <a:lnRef idx="2">
-              <a:schemeClr val="accent1">
-                <a:shade val="50000"/>
-              </a:schemeClr>
-            </a:lnRef>
-            <a:fillRef idx="1">
-              <a:schemeClr val="accent1"/>
-            </a:fillRef>
-            <a:effectRef idx="0">
-              <a:schemeClr val="accent1"/>
-            </a:effectRef>
-            <a:fontRef idx="minor">
-              <a:schemeClr val="lt1"/>
-            </a:fontRef>
-          </p:style>
-          <p:txBody>
-            <a:bodyPr rtlCol="0" anchor="ctr"/>
-            <a:lstStyle/>
-            <a:p>
-              <a:pPr algn="ctr"/>
-              <a:endParaRPr lang="zh-CN" altLang="en-US"/>
-            </a:p>
-          </p:txBody>
-        </p:sp>
         <p:pic>
           <p:nvPicPr>
             <p:cNvPr id="7" name="图片 6">
               <a:extLst>
                 <a:ext uri="{FF2B5EF4-FFF2-40B4-BE49-F238E27FC236}">
-                  <a16:creationId xmlns:a16="http://schemas.microsoft.com/office/drawing/2014/main" id="{B360C853-40A3-4763-A0CA-BFE6FA2B8BE1}"/>
+                  <a16:creationId xmlns:a16="http://schemas.microsoft.com/office/drawing/2014/main" id="{40D5060C-460E-4C97-B60C-6BFD04212732}"/>
                 </a:ext>
               </a:extLst>
             </p:cNvPr>
@@ -9080,8 +8806,8 @@
           </p:blipFill>
           <p:spPr>
             <a:xfrm>
-              <a:off x="7267626" y="5208610"/>
-              <a:ext cx="907176" cy="734490"/>
+              <a:off x="5353225" y="1737433"/>
+              <a:ext cx="2251866" cy="1823211"/>
             </a:xfrm>
             <a:prstGeom prst="rect">
               <a:avLst/>
@@ -9090,10 +8816,10 @@
         </p:pic>
         <p:sp>
           <p:nvSpPr>
-            <p:cNvPr id="9" name="椭圆 8">
+            <p:cNvPr id="8" name="椭圆 7">
               <a:extLst>
                 <a:ext uri="{FF2B5EF4-FFF2-40B4-BE49-F238E27FC236}">
-                  <a16:creationId xmlns:a16="http://schemas.microsoft.com/office/drawing/2014/main" id="{0919DD0C-02A5-4A0A-AA9F-A9D4EBB3AADD}"/>
+                  <a16:creationId xmlns:a16="http://schemas.microsoft.com/office/drawing/2014/main" id="{ED67328D-6701-440F-9DDB-66291E14A295}"/>
                 </a:ext>
               </a:extLst>
             </p:cNvPr>
@@ -9102,30 +8828,43 @@
           </p:nvSpPr>
           <p:spPr>
             <a:xfrm>
-              <a:off x="7934124" y="5470561"/>
-              <a:ext cx="129654" cy="124329"/>
+              <a:off x="7064841" y="2457685"/>
+              <a:ext cx="160855" cy="160855"/>
             </a:xfrm>
             <a:prstGeom prst="ellipse">
               <a:avLst/>
             </a:prstGeom>
-            <a:noFill/>
-            <a:ln w="57150">
-              <a:solidFill>
-                <a:srgbClr val="FF0000"/>
-              </a:solidFill>
+            <a:ln>
+              <a:noFill/>
             </a:ln>
+            <a:effectLst>
+              <a:outerShdw blurRad="149987" dist="250190" dir="8460000" algn="ctr">
+                <a:srgbClr val="000000">
+                  <a:alpha val="28000"/>
+                </a:srgbClr>
+              </a:outerShdw>
+            </a:effectLst>
+            <a:scene3d>
+              <a:camera prst="orthographicFront">
+                <a:rot lat="0" lon="0" rev="0"/>
+              </a:camera>
+              <a:lightRig rig="contrasting" dir="t">
+                <a:rot lat="0" lon="0" rev="1500000"/>
+              </a:lightRig>
+            </a:scene3d>
+            <a:sp3d prstMaterial="metal">
+              <a:bevelT w="88900" h="88900"/>
+            </a:sp3d>
           </p:spPr>
           <p:style>
-            <a:lnRef idx="2">
-              <a:schemeClr val="accent1">
-                <a:shade val="50000"/>
-              </a:schemeClr>
+            <a:lnRef idx="0">
+              <a:schemeClr val="dk1"/>
             </a:lnRef>
-            <a:fillRef idx="1">
-              <a:schemeClr val="accent1"/>
+            <a:fillRef idx="3">
+              <a:schemeClr val="dk1"/>
             </a:fillRef>
-            <a:effectRef idx="0">
-              <a:schemeClr val="accent1"/>
+            <a:effectRef idx="3">
+              <a:schemeClr val="dk1"/>
             </a:effectRef>
             <a:fontRef idx="minor">
               <a:schemeClr val="lt1"/>
@@ -9136,15 +8875,164 @@
             <a:lstStyle/>
             <a:p>
               <a:pPr algn="ctr"/>
-              <a:endParaRPr lang="zh-CN" altLang="en-US"/>
+              <a:r>
+                <a:rPr lang="en-US" altLang="zh-CN" sz="1100" b="1" dirty="0">
+                  <a:solidFill>
+                    <a:schemeClr val="accent6">
+                      <a:lumMod val="75000"/>
+                    </a:schemeClr>
+                  </a:solidFill>
+                </a:rPr>
+                <a:t>A</a:t>
+              </a:r>
+              <a:endParaRPr lang="zh-CN" altLang="en-US" sz="1100" b="1" dirty="0">
+                <a:solidFill>
+                  <a:schemeClr val="accent6">
+                    <a:lumMod val="75000"/>
+                  </a:schemeClr>
+                </a:solidFill>
+              </a:endParaRPr>
+            </a:p>
+          </p:txBody>
+        </p:sp>
+        <p:sp>
+          <p:nvSpPr>
+            <p:cNvPr id="9" name="椭圆 8">
+              <a:extLst>
+                <a:ext uri="{FF2B5EF4-FFF2-40B4-BE49-F238E27FC236}">
+                  <a16:creationId xmlns:a16="http://schemas.microsoft.com/office/drawing/2014/main" id="{63BE4DD2-C928-43D4-AAA7-BC6E9547EA55}"/>
+                </a:ext>
+              </a:extLst>
+            </p:cNvPr>
+            <p:cNvSpPr/>
+            <p:nvPr/>
+          </p:nvSpPr>
+          <p:spPr>
+            <a:xfrm>
+              <a:off x="6889581" y="2288171"/>
+              <a:ext cx="175260" cy="175260"/>
+            </a:xfrm>
+            <a:prstGeom prst="ellipse">
+              <a:avLst/>
+            </a:prstGeom>
+            <a:ln>
+              <a:noFill/>
+            </a:ln>
+            <a:effectLst>
+              <a:outerShdw blurRad="149987" dist="250190" dir="8460000" algn="ctr">
+                <a:srgbClr val="000000">
+                  <a:alpha val="28000"/>
+                </a:srgbClr>
+              </a:outerShdw>
+            </a:effectLst>
+            <a:scene3d>
+              <a:camera prst="orthographicFront">
+                <a:rot lat="0" lon="0" rev="0"/>
+              </a:camera>
+              <a:lightRig rig="contrasting" dir="t">
+                <a:rot lat="0" lon="0" rev="1500000"/>
+              </a:lightRig>
+            </a:scene3d>
+            <a:sp3d prstMaterial="metal">
+              <a:bevelT w="88900" h="88900"/>
+            </a:sp3d>
+          </p:spPr>
+          <p:style>
+            <a:lnRef idx="0">
+              <a:schemeClr val="dk1"/>
+            </a:lnRef>
+            <a:fillRef idx="3">
+              <a:schemeClr val="dk1"/>
+            </a:fillRef>
+            <a:effectRef idx="3">
+              <a:schemeClr val="dk1"/>
+            </a:effectRef>
+            <a:fontRef idx="minor">
+              <a:schemeClr val="lt1"/>
+            </a:fontRef>
+          </p:style>
+          <p:txBody>
+            <a:bodyPr rtlCol="0" anchor="ctr"/>
+            <a:lstStyle/>
+            <a:p>
+              <a:pPr algn="ctr"/>
+              <a:r>
+                <a:rPr lang="en-US" altLang="zh-CN" sz="1100" b="1" dirty="0">
+                  <a:solidFill>
+                    <a:schemeClr val="accent1">
+                      <a:lumMod val="75000"/>
+                    </a:schemeClr>
+                  </a:solidFill>
+                </a:rPr>
+                <a:t>X</a:t>
+              </a:r>
+              <a:endParaRPr lang="zh-CN" altLang="en-US" sz="1100" b="1" dirty="0">
+                <a:solidFill>
+                  <a:schemeClr val="accent1">
+                    <a:lumMod val="75000"/>
+                  </a:schemeClr>
+                </a:solidFill>
+              </a:endParaRPr>
             </a:p>
           </p:txBody>
         </p:sp>
       </p:grpSp>
+      <p:sp>
+        <p:nvSpPr>
+          <p:cNvPr id="10" name="椭圆 9">
+            <a:extLst>
+              <a:ext uri="{FF2B5EF4-FFF2-40B4-BE49-F238E27FC236}">
+                <a16:creationId xmlns:a16="http://schemas.microsoft.com/office/drawing/2014/main" id="{596FE044-186A-4F5C-92AB-F45DEAB6B90F}"/>
+              </a:ext>
+            </a:extLst>
+          </p:cNvPr>
+          <p:cNvSpPr/>
+          <p:nvPr/>
+        </p:nvSpPr>
+        <p:spPr>
+          <a:xfrm>
+            <a:off x="5928733" y="4605938"/>
+            <a:ext cx="263788" cy="252954"/>
+          </a:xfrm>
+          <a:prstGeom prst="ellipse">
+            <a:avLst/>
+          </a:prstGeom>
+          <a:noFill/>
+          <a:ln w="57150">
+            <a:solidFill>
+              <a:srgbClr val="FF0000"/>
+            </a:solidFill>
+          </a:ln>
+        </p:spPr>
+        <p:style>
+          <a:lnRef idx="2">
+            <a:schemeClr val="accent1">
+              <a:shade val="50000"/>
+            </a:schemeClr>
+          </a:lnRef>
+          <a:fillRef idx="1">
+            <a:schemeClr val="accent1"/>
+          </a:fillRef>
+          <a:effectRef idx="0">
+            <a:schemeClr val="accent1"/>
+          </a:effectRef>
+          <a:fontRef idx="minor">
+            <a:schemeClr val="lt1"/>
+          </a:fontRef>
+        </p:style>
+        <p:txBody>
+          <a:bodyPr rtlCol="0" anchor="ctr"/>
+          <a:lstStyle/>
+          <a:p>
+            <a:pPr algn="ctr"/>
+            <a:endParaRPr lang="zh-CN" altLang="en-US"/>
+          </a:p>
+        </p:txBody>
+      </p:sp>
     </p:spTree>
     <p:extLst>
       <p:ext uri="{BB962C8B-B14F-4D97-AF65-F5344CB8AC3E}">
-        <p14:creationId xmlns:p14="http://schemas.microsoft.com/office/powerpoint/2010/main" val="381854249"/>
+        <p14:creationId xmlns:p14="http://schemas.microsoft.com/office/powerpoint/2010/main" val="3309565191"/>
       </p:ext>
     </p:extLst>
   </p:cSld>
@@ -9155,251 +9043,6 @@
 </file>
 
 <file path=ppt/slides/slide7.xml><?xml version="1.0" encoding="utf-8"?>
-<p:sld xmlns:a="http://schemas.openxmlformats.org/drawingml/2006/main" xmlns:r="http://schemas.openxmlformats.org/officeDocument/2006/relationships" xmlns:p="http://schemas.openxmlformats.org/presentationml/2006/main">
-  <p:cSld>
-    <p:spTree>
-      <p:nvGrpSpPr>
-        <p:cNvPr id="1" name=""/>
-        <p:cNvGrpSpPr/>
-        <p:nvPr/>
-      </p:nvGrpSpPr>
-      <p:grpSpPr>
-        <a:xfrm>
-          <a:off x="0" y="0"/>
-          <a:ext cx="0" cy="0"/>
-          <a:chOff x="0" y="0"/>
-          <a:chExt cx="0" cy="0"/>
-        </a:xfrm>
-      </p:grpSpPr>
-      <p:grpSp>
-        <p:nvGrpSpPr>
-          <p:cNvPr id="2" name="组合 1">
-            <a:extLst>
-              <a:ext uri="{FF2B5EF4-FFF2-40B4-BE49-F238E27FC236}">
-                <a16:creationId xmlns:a16="http://schemas.microsoft.com/office/drawing/2014/main" id="{0849DFFE-3586-41EE-8DDA-07B89DFDF9C3}"/>
-              </a:ext>
-            </a:extLst>
-          </p:cNvPr>
-          <p:cNvGrpSpPr/>
-          <p:nvPr/>
-        </p:nvGrpSpPr>
-        <p:grpSpPr>
-          <a:xfrm>
-            <a:off x="887506" y="416859"/>
-            <a:ext cx="9321723" cy="6131859"/>
-            <a:chOff x="887506" y="416859"/>
-            <a:chExt cx="9321723" cy="6131859"/>
-          </a:xfrm>
-        </p:grpSpPr>
-        <p:sp>
-          <p:nvSpPr>
-            <p:cNvPr id="4" name="矩形 3"/>
-            <p:cNvSpPr/>
-            <p:nvPr/>
-          </p:nvSpPr>
-          <p:spPr>
-            <a:xfrm>
-              <a:off x="887506" y="416859"/>
-              <a:ext cx="9321723" cy="6131859"/>
-            </a:xfrm>
-            <a:prstGeom prst="rect">
-              <a:avLst/>
-            </a:prstGeom>
-            <a:solidFill>
-              <a:schemeClr val="bg2">
-                <a:lumMod val="25000"/>
-              </a:schemeClr>
-            </a:solidFill>
-            <a:ln>
-              <a:noFill/>
-            </a:ln>
-          </p:spPr>
-          <p:style>
-            <a:lnRef idx="3">
-              <a:schemeClr val="lt1"/>
-            </a:lnRef>
-            <a:fillRef idx="1">
-              <a:schemeClr val="accent3"/>
-            </a:fillRef>
-            <a:effectRef idx="1">
-              <a:schemeClr val="accent3"/>
-            </a:effectRef>
-            <a:fontRef idx="minor">
-              <a:schemeClr val="lt1"/>
-            </a:fontRef>
-          </p:style>
-          <p:txBody>
-            <a:bodyPr rtlCol="0" anchor="ctr"/>
-            <a:lstStyle/>
-            <a:p>
-              <a:pPr marL="0" lvl="4" algn="ctr">
-                <a:lnSpc>
-                  <a:spcPct val="150000"/>
-                </a:lnSpc>
-              </a:pPr>
-              <a:r>
-                <a:rPr lang="zh-CN" altLang="en-US" sz="5400" b="1" dirty="0">
-                  <a:latin typeface="黑体" panose="02010609060101010101" pitchFamily="49" charset="-122"/>
-                  <a:ea typeface="黑体" panose="02010609060101010101" pitchFamily="49" charset="-122"/>
-                </a:rPr>
-                <a:t>请休息片刻，</a:t>
-              </a:r>
-              <a:endParaRPr lang="en-US" altLang="zh-CN" sz="5400" b="1" dirty="0">
-                <a:latin typeface="黑体" panose="02010609060101010101" pitchFamily="49" charset="-122"/>
-                <a:ea typeface="黑体" panose="02010609060101010101" pitchFamily="49" charset="-122"/>
-              </a:endParaRPr>
-            </a:p>
-            <a:p>
-              <a:pPr marL="0" lvl="4" algn="ctr">
-                <a:lnSpc>
-                  <a:spcPct val="150000"/>
-                </a:lnSpc>
-              </a:pPr>
-              <a:r>
-                <a:rPr lang="zh-CN" altLang="en-US" sz="5400" b="1" dirty="0">
-                  <a:latin typeface="黑体" panose="02010609060101010101" pitchFamily="49" charset="-122"/>
-                  <a:ea typeface="黑体" panose="02010609060101010101" pitchFamily="49" charset="-122"/>
-                </a:rPr>
-                <a:t>休息好后请按手柄</a:t>
-              </a:r>
-              <a:r>
-                <a:rPr lang="en-US" altLang="zh-CN" sz="5400" b="1" dirty="0">
-                  <a:latin typeface="黑体" panose="02010609060101010101" pitchFamily="49" charset="-122"/>
-                  <a:ea typeface="黑体" panose="02010609060101010101" pitchFamily="49" charset="-122"/>
-                </a:rPr>
-                <a:t>A</a:t>
-              </a:r>
-              <a:r>
-                <a:rPr lang="zh-CN" altLang="en-US" sz="5400" b="1" dirty="0">
-                  <a:latin typeface="黑体" panose="02010609060101010101" pitchFamily="49" charset="-122"/>
-                  <a:ea typeface="黑体" panose="02010609060101010101" pitchFamily="49" charset="-122"/>
-                </a:rPr>
-                <a:t>键</a:t>
-              </a:r>
-              <a:endParaRPr lang="en-US" altLang="zh-CN" sz="5400" b="1" dirty="0">
-                <a:latin typeface="黑体" panose="02010609060101010101" pitchFamily="49" charset="-122"/>
-                <a:ea typeface="黑体" panose="02010609060101010101" pitchFamily="49" charset="-122"/>
-              </a:endParaRPr>
-            </a:p>
-            <a:p>
-              <a:pPr marL="0" lvl="4" algn="ctr">
-                <a:lnSpc>
-                  <a:spcPct val="150000"/>
-                </a:lnSpc>
-              </a:pPr>
-              <a:r>
-                <a:rPr lang="zh-CN" altLang="en-US" sz="5400" b="1" dirty="0">
-                  <a:latin typeface="黑体" panose="02010609060101010101" pitchFamily="49" charset="-122"/>
-                  <a:ea typeface="黑体" panose="02010609060101010101" pitchFamily="49" charset="-122"/>
-                </a:rPr>
-                <a:t>等待双方确认后游戏继续。</a:t>
-              </a:r>
-            </a:p>
-          </p:txBody>
-        </p:sp>
-        <p:pic>
-          <p:nvPicPr>
-            <p:cNvPr id="3" name="图片 2">
-              <a:extLst>
-                <a:ext uri="{FF2B5EF4-FFF2-40B4-BE49-F238E27FC236}">
-                  <a16:creationId xmlns:a16="http://schemas.microsoft.com/office/drawing/2014/main" id="{3C822DDD-1CC0-42BA-8663-BC9C0805C09A}"/>
-                </a:ext>
-              </a:extLst>
-            </p:cNvPr>
-            <p:cNvPicPr>
-              <a:picLocks noChangeAspect="1"/>
-            </p:cNvPicPr>
-            <p:nvPr/>
-          </p:nvPicPr>
-          <p:blipFill>
-            <a:blip r:embed="rId2" cstate="print">
-              <a:extLst>
-                <a:ext uri="{28A0092B-C50C-407E-A947-70E740481C1C}">
-                  <a14:useLocalDpi xmlns:a14="http://schemas.microsoft.com/office/drawing/2010/main" val="0"/>
-                </a:ext>
-              </a:extLst>
-            </a:blip>
-            <a:stretch>
-              <a:fillRect/>
-            </a:stretch>
-          </p:blipFill>
-          <p:spPr>
-            <a:xfrm>
-              <a:off x="7517844" y="1181028"/>
-              <a:ext cx="2251866" cy="1823211"/>
-            </a:xfrm>
-            <a:prstGeom prst="rect">
-              <a:avLst/>
-            </a:prstGeom>
-          </p:spPr>
-        </p:pic>
-        <p:sp>
-          <p:nvSpPr>
-            <p:cNvPr id="5" name="椭圆 4">
-              <a:extLst>
-                <a:ext uri="{FF2B5EF4-FFF2-40B4-BE49-F238E27FC236}">
-                  <a16:creationId xmlns:a16="http://schemas.microsoft.com/office/drawing/2014/main" id="{0678F68E-C440-4046-BA2B-53E0637B9B78}"/>
-                </a:ext>
-              </a:extLst>
-            </p:cNvPr>
-            <p:cNvSpPr/>
-            <p:nvPr/>
-          </p:nvSpPr>
-          <p:spPr>
-            <a:xfrm>
-              <a:off x="9172279" y="1831264"/>
-              <a:ext cx="321838" cy="308620"/>
-            </a:xfrm>
-            <a:prstGeom prst="ellipse">
-              <a:avLst/>
-            </a:prstGeom>
-            <a:noFill/>
-            <a:ln w="57150">
-              <a:solidFill>
-                <a:srgbClr val="FF0000"/>
-              </a:solidFill>
-            </a:ln>
-          </p:spPr>
-          <p:style>
-            <a:lnRef idx="2">
-              <a:schemeClr val="accent1">
-                <a:shade val="50000"/>
-              </a:schemeClr>
-            </a:lnRef>
-            <a:fillRef idx="1">
-              <a:schemeClr val="accent1"/>
-            </a:fillRef>
-            <a:effectRef idx="0">
-              <a:schemeClr val="accent1"/>
-            </a:effectRef>
-            <a:fontRef idx="minor">
-              <a:schemeClr val="lt1"/>
-            </a:fontRef>
-          </p:style>
-          <p:txBody>
-            <a:bodyPr rtlCol="0" anchor="ctr"/>
-            <a:lstStyle/>
-            <a:p>
-              <a:pPr algn="ctr"/>
-              <a:endParaRPr lang="zh-CN" altLang="en-US"/>
-            </a:p>
-          </p:txBody>
-        </p:sp>
-      </p:grpSp>
-    </p:spTree>
-    <p:extLst>
-      <p:ext uri="{BB962C8B-B14F-4D97-AF65-F5344CB8AC3E}">
-        <p14:creationId xmlns:p14="http://schemas.microsoft.com/office/powerpoint/2010/main" val="2676883907"/>
-      </p:ext>
-    </p:extLst>
-  </p:cSld>
-  <p:clrMapOvr>
-    <a:masterClrMapping/>
-  </p:clrMapOvr>
-</p:sld>
-</file>
-
-<file path=ppt/slides/slide8.xml><?xml version="1.0" encoding="utf-8"?>
 <p:sld xmlns:a="http://schemas.openxmlformats.org/drawingml/2006/main" xmlns:r="http://schemas.openxmlformats.org/officeDocument/2006/relationships" xmlns:p="http://schemas.openxmlformats.org/presentationml/2006/main">
   <p:cSld>
     <p:spTree>
@@ -9503,6 +9146,110 @@
 </p:sld>
 </file>
 
+<file path=ppt/slides/slide8.xml><?xml version="1.0" encoding="utf-8"?>
+<p:sld xmlns:a="http://schemas.openxmlformats.org/drawingml/2006/main" xmlns:r="http://schemas.openxmlformats.org/officeDocument/2006/relationships" xmlns:p="http://schemas.openxmlformats.org/presentationml/2006/main">
+  <p:cSld>
+    <p:spTree>
+      <p:nvGrpSpPr>
+        <p:cNvPr id="1" name=""/>
+        <p:cNvGrpSpPr/>
+        <p:nvPr/>
+      </p:nvGrpSpPr>
+      <p:grpSpPr>
+        <a:xfrm>
+          <a:off x="0" y="0"/>
+          <a:ext cx="0" cy="0"/>
+          <a:chOff x="0" y="0"/>
+          <a:chExt cx="0" cy="0"/>
+        </a:xfrm>
+      </p:grpSpPr>
+      <p:sp>
+        <p:nvSpPr>
+          <p:cNvPr id="4" name="矩形 3"/>
+          <p:cNvSpPr/>
+          <p:nvPr/>
+        </p:nvSpPr>
+        <p:spPr>
+          <a:xfrm>
+            <a:off x="887506" y="416859"/>
+            <a:ext cx="8767482" cy="6131859"/>
+          </a:xfrm>
+          <a:prstGeom prst="rect">
+            <a:avLst/>
+          </a:prstGeom>
+          <a:solidFill>
+            <a:schemeClr val="bg2">
+              <a:lumMod val="25000"/>
+            </a:schemeClr>
+          </a:solidFill>
+          <a:ln>
+            <a:noFill/>
+          </a:ln>
+        </p:spPr>
+        <p:style>
+          <a:lnRef idx="3">
+            <a:schemeClr val="lt1"/>
+          </a:lnRef>
+          <a:fillRef idx="1">
+            <a:schemeClr val="accent3"/>
+          </a:fillRef>
+          <a:effectRef idx="1">
+            <a:schemeClr val="accent3"/>
+          </a:effectRef>
+          <a:fontRef idx="minor">
+            <a:schemeClr val="lt1"/>
+          </a:fontRef>
+        </p:style>
+        <p:txBody>
+          <a:bodyPr rtlCol="0" anchor="ctr"/>
+          <a:lstStyle/>
+          <a:p>
+            <a:pPr lvl="6">
+              <a:lnSpc>
+                <a:spcPct val="150000"/>
+              </a:lnSpc>
+            </a:pPr>
+            <a:r>
+              <a:rPr lang="zh-CN" altLang="en-US" sz="5400" b="1" dirty="0">
+                <a:latin typeface="黑体" panose="02010609060101010101" pitchFamily="49" charset="-122"/>
+                <a:ea typeface="黑体" panose="02010609060101010101" pitchFamily="49" charset="-122"/>
+              </a:rPr>
+              <a:t>实验结束，</a:t>
+            </a:r>
+            <a:endParaRPr lang="en-US" altLang="zh-CN" sz="5400" b="1" dirty="0">
+              <a:latin typeface="黑体" panose="02010609060101010101" pitchFamily="49" charset="-122"/>
+              <a:ea typeface="黑体" panose="02010609060101010101" pitchFamily="49" charset="-122"/>
+            </a:endParaRPr>
+          </a:p>
+          <a:p>
+            <a:pPr lvl="6">
+              <a:lnSpc>
+                <a:spcPct val="150000"/>
+              </a:lnSpc>
+            </a:pPr>
+            <a:r>
+              <a:rPr lang="zh-CN" altLang="en-US" sz="5400" b="1" dirty="0">
+                <a:latin typeface="黑体" panose="02010609060101010101" pitchFamily="49" charset="-122"/>
+                <a:ea typeface="黑体" panose="02010609060101010101" pitchFamily="49" charset="-122"/>
+              </a:rPr>
+              <a:t>请联系主试。</a:t>
+            </a:r>
+          </a:p>
+        </p:txBody>
+      </p:sp>
+    </p:spTree>
+    <p:extLst>
+      <p:ext uri="{BB962C8B-B14F-4D97-AF65-F5344CB8AC3E}">
+        <p14:creationId xmlns:p14="http://schemas.microsoft.com/office/powerpoint/2010/main" val="856994835"/>
+      </p:ext>
+    </p:extLst>
+  </p:cSld>
+  <p:clrMapOvr>
+    <a:masterClrMapping/>
+  </p:clrMapOvr>
+</p:sld>
+</file>
+
 <file path=ppt/slides/slide9.xml><?xml version="1.0" encoding="utf-8"?>
 <p:sld xmlns:a="http://schemas.openxmlformats.org/drawingml/2006/main" xmlns:r="http://schemas.openxmlformats.org/officeDocument/2006/relationships" xmlns:p="http://schemas.openxmlformats.org/presentationml/2006/main">
   <p:cSld>
@@ -9520,243 +9267,91 @@
           <a:chExt cx="0" cy="0"/>
         </a:xfrm>
       </p:grpSpPr>
-      <p:grpSp>
-        <p:nvGrpSpPr>
-          <p:cNvPr id="2" name="组合 1">
-            <a:extLst>
-              <a:ext uri="{FF2B5EF4-FFF2-40B4-BE49-F238E27FC236}">
-                <a16:creationId xmlns:a16="http://schemas.microsoft.com/office/drawing/2014/main" id="{2D561553-C373-4E61-9C6C-32886A39CC0B}"/>
-              </a:ext>
-            </a:extLst>
-          </p:cNvPr>
-          <p:cNvGrpSpPr/>
+      <p:sp>
+        <p:nvSpPr>
+          <p:cNvPr id="4" name="矩形 3"/>
+          <p:cNvSpPr/>
           <p:nvPr/>
-        </p:nvGrpSpPr>
-        <p:grpSpPr>
+        </p:nvSpPr>
+        <p:spPr>
           <a:xfrm>
-            <a:off x="2177392" y="146253"/>
-            <a:ext cx="6705999" cy="6131859"/>
-            <a:chOff x="887506" y="416859"/>
-            <a:chExt cx="8457999" cy="6131859"/>
+            <a:off x="887506" y="416859"/>
+            <a:ext cx="8767482" cy="6131859"/>
           </a:xfrm>
-        </p:grpSpPr>
-        <p:sp>
-          <p:nvSpPr>
-            <p:cNvPr id="4" name="矩形 3"/>
-            <p:cNvSpPr/>
-            <p:nvPr/>
-          </p:nvSpPr>
-          <p:spPr>
-            <a:xfrm>
-              <a:off x="887506" y="416859"/>
-              <a:ext cx="8457999" cy="6131859"/>
-            </a:xfrm>
-            <a:prstGeom prst="rect">
-              <a:avLst/>
-            </a:prstGeom>
-            <a:solidFill>
-              <a:schemeClr val="bg2">
-                <a:lumMod val="25000"/>
-              </a:schemeClr>
-            </a:solidFill>
-            <a:ln>
-              <a:noFill/>
-            </a:ln>
-          </p:spPr>
-          <p:style>
-            <a:lnRef idx="3">
-              <a:schemeClr val="lt1"/>
-            </a:lnRef>
-            <a:fillRef idx="1">
-              <a:schemeClr val="accent3"/>
-            </a:fillRef>
-            <a:effectRef idx="1">
-              <a:schemeClr val="accent3"/>
-            </a:effectRef>
-            <a:fontRef idx="minor">
-              <a:schemeClr val="lt1"/>
-            </a:fontRef>
-          </p:style>
-          <p:txBody>
-            <a:bodyPr rtlCol="0" anchor="t"/>
-            <a:lstStyle/>
-            <a:p>
-              <a:pPr marL="0" lvl="4" algn="ctr">
-                <a:lnSpc>
-                  <a:spcPct val="150000"/>
-                </a:lnSpc>
-              </a:pPr>
-              <a:endParaRPr lang="en-US" altLang="zh-CN" sz="3600" b="1" dirty="0">
+          <a:prstGeom prst="rect">
+            <a:avLst/>
+          </a:prstGeom>
+          <a:solidFill>
+            <a:schemeClr val="bg2">
+              <a:lumMod val="25000"/>
+            </a:schemeClr>
+          </a:solidFill>
+          <a:ln>
+            <a:noFill/>
+          </a:ln>
+        </p:spPr>
+        <p:style>
+          <a:lnRef idx="3">
+            <a:schemeClr val="lt1"/>
+          </a:lnRef>
+          <a:fillRef idx="1">
+            <a:schemeClr val="accent3"/>
+          </a:fillRef>
+          <a:effectRef idx="1">
+            <a:schemeClr val="accent3"/>
+          </a:effectRef>
+          <a:fontRef idx="minor">
+            <a:schemeClr val="lt1"/>
+          </a:fontRef>
+        </p:style>
+        <p:txBody>
+          <a:bodyPr rtlCol="0" anchor="ctr"/>
+          <a:lstStyle/>
+          <a:p>
+            <a:pPr lvl="4">
+              <a:lnSpc>
+                <a:spcPct val="150000"/>
+              </a:lnSpc>
+            </a:pPr>
+            <a:r>
+              <a:rPr lang="zh-CN" altLang="en-US" sz="5400" b="1" dirty="0">
                 <a:latin typeface="黑体" panose="02010609060101010101" pitchFamily="49" charset="-122"/>
                 <a:ea typeface="黑体" panose="02010609060101010101" pitchFamily="49" charset="-122"/>
-              </a:endParaRPr>
-            </a:p>
-            <a:p>
-              <a:pPr marL="0" lvl="4" algn="ctr">
-                <a:lnSpc>
-                  <a:spcPct val="150000"/>
-                </a:lnSpc>
-              </a:pPr>
-              <a:endParaRPr lang="en-US" altLang="zh-CN" sz="3600" b="1" dirty="0">
+              </a:rPr>
+              <a:t>请休息片刻，</a:t>
+            </a:r>
+            <a:endParaRPr lang="en-US" altLang="zh-CN" sz="5400" b="1" dirty="0">
+              <a:latin typeface="黑体" panose="02010609060101010101" pitchFamily="49" charset="-122"/>
+              <a:ea typeface="黑体" panose="02010609060101010101" pitchFamily="49" charset="-122"/>
+            </a:endParaRPr>
+          </a:p>
+          <a:p>
+            <a:pPr lvl="4">
+              <a:lnSpc>
+                <a:spcPct val="150000"/>
+              </a:lnSpc>
+            </a:pPr>
+            <a:r>
+              <a:rPr lang="en-US" altLang="zh-CN" sz="5400" b="1" dirty="0">
                 <a:latin typeface="黑体" panose="02010609060101010101" pitchFamily="49" charset="-122"/>
                 <a:ea typeface="黑体" panose="02010609060101010101" pitchFamily="49" charset="-122"/>
-              </a:endParaRPr>
-            </a:p>
-            <a:p>
-              <a:pPr marL="0" lvl="4" algn="ctr">
-                <a:lnSpc>
-                  <a:spcPct val="150000"/>
-                </a:lnSpc>
-              </a:pPr>
-              <a:r>
-                <a:rPr lang="zh-CN" altLang="en-US" sz="2800" b="1" dirty="0">
-                  <a:latin typeface="黑体" panose="02010609060101010101" pitchFamily="49" charset="-122"/>
-                  <a:ea typeface="黑体" panose="02010609060101010101" pitchFamily="49" charset="-122"/>
-                </a:rPr>
-                <a:t>请休息片刻，</a:t>
-              </a:r>
-            </a:p>
-            <a:p>
-              <a:pPr marL="0" lvl="4" algn="ctr">
-                <a:lnSpc>
-                  <a:spcPct val="150000"/>
-                </a:lnSpc>
-              </a:pPr>
-              <a:r>
-                <a:rPr lang="zh-CN" altLang="en-US" sz="2800" b="1" dirty="0">
-                  <a:latin typeface="黑体" panose="02010609060101010101" pitchFamily="49" charset="-122"/>
-                  <a:ea typeface="黑体" panose="02010609060101010101" pitchFamily="49" charset="-122"/>
-                </a:rPr>
-                <a:t>休息好后请按手柄</a:t>
-              </a:r>
-              <a:r>
-                <a:rPr lang="en-US" altLang="zh-CN" sz="2800" b="1" dirty="0">
-                  <a:latin typeface="黑体" panose="02010609060101010101" pitchFamily="49" charset="-122"/>
-                  <a:ea typeface="黑体" panose="02010609060101010101" pitchFamily="49" charset="-122"/>
-                </a:rPr>
-                <a:t>A</a:t>
-              </a:r>
-              <a:r>
-                <a:rPr lang="zh-CN" altLang="en-US" sz="2800" b="1" dirty="0">
-                  <a:latin typeface="黑体" panose="02010609060101010101" pitchFamily="49" charset="-122"/>
-                  <a:ea typeface="黑体" panose="02010609060101010101" pitchFamily="49" charset="-122"/>
-                </a:rPr>
-                <a:t>键</a:t>
-              </a:r>
-            </a:p>
-            <a:p>
-              <a:pPr marL="0" lvl="4" algn="ctr">
-                <a:lnSpc>
-                  <a:spcPct val="150000"/>
-                </a:lnSpc>
-              </a:pPr>
-              <a:r>
-                <a:rPr lang="zh-CN" altLang="en-US" sz="2800" b="1" dirty="0">
-                  <a:latin typeface="黑体" panose="02010609060101010101" pitchFamily="49" charset="-122"/>
-                  <a:ea typeface="黑体" panose="02010609060101010101" pitchFamily="49" charset="-122"/>
-                </a:rPr>
-                <a:t>等待双方确认后游戏继续。</a:t>
-              </a:r>
-              <a:endParaRPr lang="zh-CN" altLang="en-US" sz="3600" b="1" dirty="0">
+              </a:rPr>
+              <a:t>30s</a:t>
+            </a:r>
+            <a:r>
+              <a:rPr lang="zh-CN" altLang="en-US" sz="5400" b="1" dirty="0">
                 <a:latin typeface="黑体" panose="02010609060101010101" pitchFamily="49" charset="-122"/>
                 <a:ea typeface="黑体" panose="02010609060101010101" pitchFamily="49" charset="-122"/>
-              </a:endParaRPr>
-            </a:p>
-          </p:txBody>
-        </p:sp>
-        <p:pic>
-          <p:nvPicPr>
-            <p:cNvPr id="3" name="图片 2">
-              <a:extLst>
-                <a:ext uri="{FF2B5EF4-FFF2-40B4-BE49-F238E27FC236}">
-                  <a16:creationId xmlns:a16="http://schemas.microsoft.com/office/drawing/2014/main" id="{5CE8B433-609C-457E-AB7E-3F796E1A1A7E}"/>
-                </a:ext>
-              </a:extLst>
-            </p:cNvPr>
-            <p:cNvPicPr>
-              <a:picLocks noChangeAspect="1"/>
-            </p:cNvPicPr>
-            <p:nvPr/>
-          </p:nvPicPr>
-          <p:blipFill>
-            <a:blip r:embed="rId2" cstate="print">
-              <a:extLst>
-                <a:ext uri="{28A0092B-C50C-407E-A947-70E740481C1C}">
-                  <a14:useLocalDpi xmlns:a14="http://schemas.microsoft.com/office/drawing/2010/main" val="0"/>
-                </a:ext>
-              </a:extLst>
-            </a:blip>
-            <a:stretch>
-              <a:fillRect/>
-            </a:stretch>
-          </p:blipFill>
-          <p:spPr>
-            <a:xfrm>
-              <a:off x="4011843" y="3886520"/>
-              <a:ext cx="2251866" cy="1823211"/>
-            </a:xfrm>
-            <a:prstGeom prst="rect">
-              <a:avLst/>
-            </a:prstGeom>
-          </p:spPr>
-        </p:pic>
-        <p:sp>
-          <p:nvSpPr>
-            <p:cNvPr id="5" name="椭圆 4">
-              <a:extLst>
-                <a:ext uri="{FF2B5EF4-FFF2-40B4-BE49-F238E27FC236}">
-                  <a16:creationId xmlns:a16="http://schemas.microsoft.com/office/drawing/2014/main" id="{0E0463B8-DCCC-46EB-B82F-AB1AE445C244}"/>
-                </a:ext>
-              </a:extLst>
-            </p:cNvPr>
-            <p:cNvSpPr/>
-            <p:nvPr/>
-          </p:nvSpPr>
-          <p:spPr>
-            <a:xfrm>
-              <a:off x="5666279" y="4536756"/>
-              <a:ext cx="321838" cy="308620"/>
-            </a:xfrm>
-            <a:prstGeom prst="ellipse">
-              <a:avLst/>
-            </a:prstGeom>
-            <a:noFill/>
-            <a:ln w="57150">
-              <a:solidFill>
-                <a:srgbClr val="FF0000"/>
-              </a:solidFill>
-            </a:ln>
-          </p:spPr>
-          <p:style>
-            <a:lnRef idx="2">
-              <a:schemeClr val="accent1">
-                <a:shade val="50000"/>
-              </a:schemeClr>
-            </a:lnRef>
-            <a:fillRef idx="1">
-              <a:schemeClr val="accent1"/>
-            </a:fillRef>
-            <a:effectRef idx="0">
-              <a:schemeClr val="accent1"/>
-            </a:effectRef>
-            <a:fontRef idx="minor">
-              <a:schemeClr val="lt1"/>
-            </a:fontRef>
-          </p:style>
-          <p:txBody>
-            <a:bodyPr rtlCol="0" anchor="ctr"/>
-            <a:lstStyle/>
-            <a:p>
-              <a:pPr algn="ctr"/>
-              <a:endParaRPr lang="zh-CN" altLang="en-US"/>
-            </a:p>
-          </p:txBody>
-        </p:sp>
-      </p:grpSp>
+              </a:rPr>
+              <a:t>后游戏继续。</a:t>
+            </a:r>
+          </a:p>
+        </p:txBody>
+      </p:sp>
     </p:spTree>
     <p:extLst>
       <p:ext uri="{BB962C8B-B14F-4D97-AF65-F5344CB8AC3E}">
-        <p14:creationId xmlns:p14="http://schemas.microsoft.com/office/powerpoint/2010/main" val="3309565191"/>
+        <p14:creationId xmlns:p14="http://schemas.microsoft.com/office/powerpoint/2010/main" val="3226466048"/>
       </p:ext>
     </p:extLst>
   </p:cSld>

</xml_diff>

<commit_message>
add various sheep policy(allSheep/selfishSheep)
</commit_message>
<xml_diff>
--- a/pictures/introduction.pptx
+++ b/pictures/introduction.pptx
@@ -5,18 +5,17 @@
     <p:sldMasterId id="2147483648" r:id="rId1"/>
   </p:sldMasterIdLst>
   <p:notesMasterIdLst>
-    <p:notesMasterId r:id="rId11"/>
+    <p:notesMasterId r:id="rId10"/>
   </p:notesMasterIdLst>
   <p:sldIdLst>
     <p:sldId id="261" r:id="rId2"/>
     <p:sldId id="267" r:id="rId3"/>
-    <p:sldId id="268" r:id="rId4"/>
-    <p:sldId id="275" r:id="rId5"/>
-    <p:sldId id="278" r:id="rId6"/>
-    <p:sldId id="276" r:id="rId7"/>
-    <p:sldId id="277" r:id="rId8"/>
-    <p:sldId id="259" r:id="rId9"/>
-    <p:sldId id="279" r:id="rId10"/>
+    <p:sldId id="275" r:id="rId4"/>
+    <p:sldId id="278" r:id="rId5"/>
+    <p:sldId id="276" r:id="rId6"/>
+    <p:sldId id="277" r:id="rId7"/>
+    <p:sldId id="259" r:id="rId8"/>
+    <p:sldId id="279" r:id="rId9"/>
   </p:sldIdLst>
   <p:sldSz cx="12192000" cy="6858000"/>
   <p:notesSz cx="6858000" cy="9144000"/>
@@ -122,7 +121,6 @@
           <p14:sldIdLst>
             <p14:sldId id="261"/>
             <p14:sldId id="267"/>
-            <p14:sldId id="268"/>
             <p14:sldId id="275"/>
           </p14:sldIdLst>
         </p14:section>
@@ -242,7 +240,7 @@
           <a:p>
             <a:fld id="{C0546B5F-B17E-4A11-A9CD-A10C644EC78D}" type="datetimeFigureOut">
               <a:rPr lang="zh-CN" altLang="en-US" smtClean="0"/>
-              <a:t>2021/9/15</a:t>
+              <a:t>2021/11/18</a:t>
             </a:fld>
             <a:endParaRPr lang="zh-CN" altLang="en-US"/>
           </a:p>
@@ -717,110 +715,6 @@
 </p:notes>
 </file>
 
-<file path=ppt/notesSlides/notesSlide3.xml><?xml version="1.0" encoding="utf-8"?>
-<p:notes xmlns:a="http://schemas.openxmlformats.org/drawingml/2006/main" xmlns:r="http://schemas.openxmlformats.org/officeDocument/2006/relationships" xmlns:p="http://schemas.openxmlformats.org/presentationml/2006/main">
-  <p:cSld>
-    <p:spTree>
-      <p:nvGrpSpPr>
-        <p:cNvPr id="1" name=""/>
-        <p:cNvGrpSpPr/>
-        <p:nvPr/>
-      </p:nvGrpSpPr>
-      <p:grpSpPr>
-        <a:xfrm>
-          <a:off x="0" y="0"/>
-          <a:ext cx="0" cy="0"/>
-          <a:chOff x="0" y="0"/>
-          <a:chExt cx="0" cy="0"/>
-        </a:xfrm>
-      </p:grpSpPr>
-      <p:sp>
-        <p:nvSpPr>
-          <p:cNvPr id="2" name="幻灯片图像占位符 1"/>
-          <p:cNvSpPr>
-            <a:spLocks noGrp="1" noRot="1" noChangeAspect="1"/>
-          </p:cNvSpPr>
-          <p:nvPr>
-            <p:ph type="sldImg"/>
-          </p:nvPr>
-        </p:nvSpPr>
-        <p:spPr/>
-      </p:sp>
-      <p:sp>
-        <p:nvSpPr>
-          <p:cNvPr id="3" name="备注占位符 2"/>
-          <p:cNvSpPr>
-            <a:spLocks noGrp="1"/>
-          </p:cNvSpPr>
-          <p:nvPr>
-            <p:ph type="body" idx="1"/>
-          </p:nvPr>
-        </p:nvSpPr>
-        <p:spPr/>
-        <p:txBody>
-          <a:bodyPr/>
-          <a:lstStyle/>
-          <a:p>
-            <a:pPr marL="0" marR="0" lvl="0" indent="0" algn="l" defTabSz="914400" rtl="0" eaLnBrk="1" fontAlgn="auto" latinLnBrk="0" hangingPunct="1">
-              <a:lnSpc>
-                <a:spcPct val="100000"/>
-              </a:lnSpc>
-              <a:spcBef>
-                <a:spcPts val="0"/>
-              </a:spcBef>
-              <a:spcAft>
-                <a:spcPts val="0"/>
-              </a:spcAft>
-              <a:buClrTx/>
-              <a:buSzTx/>
-              <a:buFontTx/>
-              <a:buNone/>
-              <a:tabLst/>
-              <a:defRPr/>
-            </a:pPr>
-            <a:r>
-              <a:rPr lang="zh-CN" altLang="en-US" dirty="0"/>
-              <a:t>分数计算</a:t>
-            </a:r>
-          </a:p>
-        </p:txBody>
-      </p:sp>
-      <p:sp>
-        <p:nvSpPr>
-          <p:cNvPr id="4" name="灯片编号占位符 3"/>
-          <p:cNvSpPr>
-            <a:spLocks noGrp="1"/>
-          </p:cNvSpPr>
-          <p:nvPr>
-            <p:ph type="sldNum" sz="quarter" idx="5"/>
-          </p:nvPr>
-        </p:nvSpPr>
-        <p:spPr/>
-        <p:txBody>
-          <a:bodyPr/>
-          <a:lstStyle/>
-          <a:p>
-            <a:fld id="{19214DBA-04C0-4AE0-9391-D985D3AC6701}" type="slidenum">
-              <a:rPr lang="zh-CN" altLang="en-US" smtClean="0"/>
-              <a:t>3</a:t>
-            </a:fld>
-            <a:endParaRPr lang="zh-CN" altLang="en-US"/>
-          </a:p>
-        </p:txBody>
-      </p:sp>
-    </p:spTree>
-    <p:extLst>
-      <p:ext uri="{BB962C8B-B14F-4D97-AF65-F5344CB8AC3E}">
-        <p14:creationId xmlns:p14="http://schemas.microsoft.com/office/powerpoint/2010/main" val="158989708"/>
-      </p:ext>
-    </p:extLst>
-  </p:cSld>
-  <p:clrMapOvr>
-    <a:masterClrMapping/>
-  </p:clrMapOvr>
-</p:notes>
-</file>
-
 <file path=ppt/slideLayouts/slideLayout1.xml><?xml version="1.0" encoding="utf-8"?>
 <p:sldLayout xmlns:a="http://schemas.openxmlformats.org/drawingml/2006/main" xmlns:r="http://schemas.openxmlformats.org/officeDocument/2006/relationships" xmlns:p="http://schemas.openxmlformats.org/presentationml/2006/main" type="title" preserve="1">
   <p:cSld name="标题幻灯片">
@@ -968,7 +862,7 @@
           <a:p>
             <a:fld id="{22C6D5CB-9E91-4D8B-8A6F-E7E64CE5E759}" type="datetimeFigureOut">
               <a:rPr lang="zh-CN" altLang="en-US" smtClean="0"/>
-              <a:t>2021/9/15</a:t>
+              <a:t>2021/11/18</a:t>
             </a:fld>
             <a:endParaRPr lang="zh-CN" altLang="en-US"/>
           </a:p>
@@ -1166,7 +1060,7 @@
           <a:p>
             <a:fld id="{22C6D5CB-9E91-4D8B-8A6F-E7E64CE5E759}" type="datetimeFigureOut">
               <a:rPr lang="zh-CN" altLang="en-US" smtClean="0"/>
-              <a:t>2021/9/15</a:t>
+              <a:t>2021/11/18</a:t>
             </a:fld>
             <a:endParaRPr lang="zh-CN" altLang="en-US"/>
           </a:p>
@@ -1374,7 +1268,7 @@
           <a:p>
             <a:fld id="{22C6D5CB-9E91-4D8B-8A6F-E7E64CE5E759}" type="datetimeFigureOut">
               <a:rPr lang="zh-CN" altLang="en-US" smtClean="0"/>
-              <a:t>2021/9/15</a:t>
+              <a:t>2021/11/18</a:t>
             </a:fld>
             <a:endParaRPr lang="zh-CN" altLang="en-US"/>
           </a:p>
@@ -1572,7 +1466,7 @@
           <a:p>
             <a:fld id="{22C6D5CB-9E91-4D8B-8A6F-E7E64CE5E759}" type="datetimeFigureOut">
               <a:rPr lang="zh-CN" altLang="en-US" smtClean="0"/>
-              <a:t>2021/9/15</a:t>
+              <a:t>2021/11/18</a:t>
             </a:fld>
             <a:endParaRPr lang="zh-CN" altLang="en-US"/>
           </a:p>
@@ -1847,7 +1741,7 @@
           <a:p>
             <a:fld id="{22C6D5CB-9E91-4D8B-8A6F-E7E64CE5E759}" type="datetimeFigureOut">
               <a:rPr lang="zh-CN" altLang="en-US" smtClean="0"/>
-              <a:t>2021/9/15</a:t>
+              <a:t>2021/11/18</a:t>
             </a:fld>
             <a:endParaRPr lang="zh-CN" altLang="en-US"/>
           </a:p>
@@ -2112,7 +2006,7 @@
           <a:p>
             <a:fld id="{22C6D5CB-9E91-4D8B-8A6F-E7E64CE5E759}" type="datetimeFigureOut">
               <a:rPr lang="zh-CN" altLang="en-US" smtClean="0"/>
-              <a:t>2021/9/15</a:t>
+              <a:t>2021/11/18</a:t>
             </a:fld>
             <a:endParaRPr lang="zh-CN" altLang="en-US"/>
           </a:p>
@@ -2524,7 +2418,7 @@
           <a:p>
             <a:fld id="{22C6D5CB-9E91-4D8B-8A6F-E7E64CE5E759}" type="datetimeFigureOut">
               <a:rPr lang="zh-CN" altLang="en-US" smtClean="0"/>
-              <a:t>2021/9/15</a:t>
+              <a:t>2021/11/18</a:t>
             </a:fld>
             <a:endParaRPr lang="zh-CN" altLang="en-US"/>
           </a:p>
@@ -2665,7 +2559,7 @@
           <a:p>
             <a:fld id="{22C6D5CB-9E91-4D8B-8A6F-E7E64CE5E759}" type="datetimeFigureOut">
               <a:rPr lang="zh-CN" altLang="en-US" smtClean="0"/>
-              <a:t>2021/9/15</a:t>
+              <a:t>2021/11/18</a:t>
             </a:fld>
             <a:endParaRPr lang="zh-CN" altLang="en-US"/>
           </a:p>
@@ -2778,7 +2672,7 @@
           <a:p>
             <a:fld id="{22C6D5CB-9E91-4D8B-8A6F-E7E64CE5E759}" type="datetimeFigureOut">
               <a:rPr lang="zh-CN" altLang="en-US" smtClean="0"/>
-              <a:t>2021/9/15</a:t>
+              <a:t>2021/11/18</a:t>
             </a:fld>
             <a:endParaRPr lang="zh-CN" altLang="en-US"/>
           </a:p>
@@ -3089,7 +2983,7 @@
           <a:p>
             <a:fld id="{22C6D5CB-9E91-4D8B-8A6F-E7E64CE5E759}" type="datetimeFigureOut">
               <a:rPr lang="zh-CN" altLang="en-US" smtClean="0"/>
-              <a:t>2021/9/15</a:t>
+              <a:t>2021/11/18</a:t>
             </a:fld>
             <a:endParaRPr lang="zh-CN" altLang="en-US"/>
           </a:p>
@@ -3377,7 +3271,7 @@
           <a:p>
             <a:fld id="{22C6D5CB-9E91-4D8B-8A6F-E7E64CE5E759}" type="datetimeFigureOut">
               <a:rPr lang="zh-CN" altLang="en-US" smtClean="0"/>
-              <a:t>2021/9/15</a:t>
+              <a:t>2021/11/18</a:t>
             </a:fld>
             <a:endParaRPr lang="zh-CN" altLang="en-US"/>
           </a:p>
@@ -3618,7 +3512,7 @@
           <a:p>
             <a:fld id="{22C6D5CB-9E91-4D8B-8A6F-E7E64CE5E759}" type="datetimeFigureOut">
               <a:rPr lang="zh-CN" altLang="en-US" smtClean="0"/>
-              <a:t>2021/9/15</a:t>
+              <a:t>2021/11/18</a:t>
             </a:fld>
             <a:endParaRPr lang="zh-CN" altLang="en-US"/>
           </a:p>
@@ -4055,7 +3949,7 @@
         <p:spPr>
           <a:xfrm>
             <a:off x="1126380" y="291072"/>
-            <a:ext cx="9608904" cy="1456489"/>
+            <a:ext cx="10176358" cy="1456489"/>
           </a:xfrm>
           <a:prstGeom prst="rect">
             <a:avLst/>
@@ -4089,7 +3983,7 @@
                 <a:latin typeface="黑体" panose="02010609060101010101" pitchFamily="49" charset="-122"/>
                 <a:ea typeface="黑体" panose="02010609060101010101" pitchFamily="49" charset="-122"/>
               </a:rPr>
-              <a:t>您好，欢迎参与“狼追羊”游戏！</a:t>
+              <a:t>您好，欢迎参与“赏金猎人”游戏！</a:t>
             </a:r>
             <a:endParaRPr lang="en-US" altLang="zh-CN" sz="2000" dirty="0">
               <a:solidFill>
@@ -4123,7 +4017,17 @@
                 <a:latin typeface="黑体" panose="02010609060101010101" pitchFamily="49" charset="-122"/>
                 <a:ea typeface="黑体" panose="02010609060101010101" pitchFamily="49" charset="-122"/>
               </a:rPr>
-              <a:t>在本游戏中，您与另一玩家将同时扮演“狼”（</a:t>
+              <a:t>在本游戏中，两名玩家将同时扮演“赏金猎人”（</a:t>
+            </a:r>
+            <a:r>
+              <a:rPr lang="zh-CN" altLang="en-US" sz="2000" dirty="0">
+                <a:solidFill>
+                  <a:srgbClr val="FF0000"/>
+                </a:solidFill>
+                <a:latin typeface="黑体" panose="02010609060101010101" pitchFamily="49" charset="-122"/>
+                <a:ea typeface="黑体" panose="02010609060101010101" pitchFamily="49" charset="-122"/>
+              </a:rPr>
+              <a:t>玩家</a:t>
             </a:r>
             <a:r>
               <a:rPr lang="en-US" altLang="zh-CN" sz="2000" dirty="0">
@@ -4143,7 +4047,7 @@
                 <a:latin typeface="黑体" panose="02010609060101010101" pitchFamily="49" charset="-122"/>
                 <a:ea typeface="黑体" panose="02010609060101010101" pitchFamily="49" charset="-122"/>
               </a:rPr>
-              <a:t>号玩家：红色小球</a:t>
+              <a:t>：红色小球</a:t>
             </a:r>
             <a:r>
               <a:rPr lang="zh-CN" altLang="en-US" sz="2000" dirty="0">
@@ -4158,6 +4062,16 @@
               <a:t>，</a:t>
             </a:r>
             <a:r>
+              <a:rPr lang="zh-CN" altLang="en-US" sz="2000" dirty="0">
+                <a:solidFill>
+                  <a:srgbClr val="0000FF"/>
+                </a:solidFill>
+                <a:latin typeface="黑体" panose="02010609060101010101" pitchFamily="49" charset="-122"/>
+                <a:ea typeface="黑体" panose="02010609060101010101" pitchFamily="49" charset="-122"/>
+              </a:rPr>
+              <a:t>玩家</a:t>
+            </a:r>
+            <a:r>
               <a:rPr lang="en-US" altLang="zh-CN" sz="2000" dirty="0">
                 <a:solidFill>
                   <a:srgbClr val="0000FF"/>
@@ -4175,7 +4089,7 @@
                 <a:latin typeface="黑体" panose="02010609060101010101" pitchFamily="49" charset="-122"/>
                 <a:ea typeface="黑体" panose="02010609060101010101" pitchFamily="49" charset="-122"/>
               </a:rPr>
-              <a:t>号玩家：蓝色小球</a:t>
+              <a:t>：蓝色小球</a:t>
             </a:r>
             <a:r>
               <a:rPr lang="zh-CN" altLang="en-US" sz="2000" dirty="0">
@@ -4190,14 +4104,21 @@
               <a:t>），你们的任务是</a:t>
             </a:r>
             <a:r>
-              <a:rPr lang="zh-CN" altLang="en-US" sz="2000" dirty="0">
+              <a:rPr lang="zh-CN" altLang="en-US" sz="2000" b="1" dirty="0">
                 <a:solidFill>
                   <a:srgbClr val="92D050"/>
                 </a:solidFill>
+                <a:effectLst>
+                  <a:outerShdw blurRad="38100" dist="38100" dir="2700000" algn="tl">
+                    <a:srgbClr val="000000">
+                      <a:alpha val="43137"/>
+                    </a:srgbClr>
+                  </a:outerShdw>
+                </a:effectLst>
                 <a:latin typeface="黑体" panose="02010609060101010101" pitchFamily="49" charset="-122"/>
                 <a:ea typeface="黑体" panose="02010609060101010101" pitchFamily="49" charset="-122"/>
               </a:rPr>
-              <a:t>尽快</a:t>
+              <a:t>尽可能多</a:t>
             </a:r>
             <a:r>
               <a:rPr lang="zh-CN" altLang="en-US" sz="2000" dirty="0">
@@ -4228,7 +4149,7 @@
                 <a:latin typeface="黑体" panose="02010609060101010101" pitchFamily="49" charset="-122"/>
                 <a:ea typeface="黑体" panose="02010609060101010101" pitchFamily="49" charset="-122"/>
               </a:rPr>
-              <a:t>抓住屏幕中跑动的“羊”（</a:t>
+              <a:t>抓住屏幕中逃跑的“小偷”（</a:t>
             </a:r>
             <a:r>
               <a:rPr lang="zh-CN" altLang="en-US" sz="2000" dirty="0">
@@ -4278,7 +4199,7 @@
         </p:nvGrpSpPr>
         <p:grpSpPr>
           <a:xfrm>
-            <a:off x="3711544" y="1794768"/>
+            <a:off x="3546376" y="1860756"/>
             <a:ext cx="4768912" cy="4772160"/>
             <a:chOff x="3750055" y="1650006"/>
             <a:chExt cx="5040000" cy="5043433"/>
@@ -4642,11 +4563,11 @@
                 <a:avLst/>
               </a:prstGeom>
               <a:solidFill>
-                <a:srgbClr val="FF0000"/>
+                <a:srgbClr val="C00000"/>
               </a:solidFill>
               <a:ln>
                 <a:solidFill>
-                  <a:srgbClr val="FF0000"/>
+                  <a:srgbClr val="C00000"/>
                 </a:solidFill>
               </a:ln>
             </p:spPr>
@@ -4671,7 +4592,11 @@
               <a:lstStyle/>
               <a:p>
                 <a:pPr algn="ctr"/>
-                <a:endParaRPr lang="zh-CN" altLang="en-US"/>
+                <a:endParaRPr lang="zh-CN" altLang="en-US" dirty="0">
+                  <a:solidFill>
+                    <a:srgbClr val="C00000"/>
+                  </a:solidFill>
+                </a:endParaRPr>
               </a:p>
             </p:txBody>
           </p:sp>
@@ -4696,11 +4621,11 @@
                 <a:avLst/>
               </a:prstGeom>
               <a:solidFill>
-                <a:srgbClr val="0000FF"/>
+                <a:srgbClr val="0000CD"/>
               </a:solidFill>
               <a:ln>
                 <a:solidFill>
-                  <a:srgbClr val="0000FF"/>
+                  <a:srgbClr val="0000CD"/>
                 </a:solidFill>
               </a:ln>
             </p:spPr>
@@ -5126,8 +5051,8 @@
         </p:nvSpPr>
         <p:spPr>
           <a:xfrm>
-            <a:off x="5353548" y="2008258"/>
-            <a:ext cx="6797491" cy="2841483"/>
+            <a:off x="5134627" y="994004"/>
+            <a:ext cx="6763060" cy="4681218"/>
           </a:xfrm>
           <a:prstGeom prst="rect">
             <a:avLst/>
@@ -5142,7 +5067,7 @@
           <a:p>
             <a:pPr marL="285750" indent="-285750">
               <a:lnSpc>
-                <a:spcPct val="150000"/>
+                <a:spcPct val="200000"/>
               </a:lnSpc>
               <a:spcBef>
                 <a:spcPts val="200"/>
@@ -5154,7 +5079,7 @@
               <a:buChar char="•"/>
             </a:pPr>
             <a:r>
-              <a:rPr lang="zh-CN" altLang="en-US" sz="2000" dirty="0">
+              <a:rPr lang="zh-CN" altLang="en-US" dirty="0">
                 <a:solidFill>
                   <a:schemeClr val="bg1">
                     <a:lumMod val="95000"/>
@@ -5163,20 +5088,20 @@
                 <a:latin typeface="黑体" panose="02010609060101010101" pitchFamily="49" charset="-122"/>
                 <a:ea typeface="黑体" panose="02010609060101010101" pitchFamily="49" charset="-122"/>
               </a:rPr>
-              <a:t>每轮游戏中，屏幕上会出现</a:t>
-            </a:r>
-            <a:r>
-              <a:rPr lang="zh-CN" altLang="en-US" sz="2000" dirty="0">
+              <a:t>每轮游戏时间为</a:t>
+            </a:r>
+            <a:r>
+              <a:rPr lang="en-US" altLang="zh-CN" dirty="0">
                 <a:solidFill>
                   <a:srgbClr val="92D050"/>
                 </a:solidFill>
                 <a:latin typeface="黑体" panose="02010609060101010101" pitchFamily="49" charset="-122"/>
                 <a:ea typeface="黑体" panose="02010609060101010101" pitchFamily="49" charset="-122"/>
               </a:rPr>
-              <a:t>若干只羊</a:t>
-            </a:r>
-            <a:r>
-              <a:rPr lang="zh-CN" altLang="en-US" sz="2000" dirty="0">
+              <a:t>15s</a:t>
+            </a:r>
+            <a:r>
+              <a:rPr lang="zh-CN" altLang="en-US" dirty="0">
                 <a:solidFill>
                   <a:schemeClr val="bg1">
                     <a:lumMod val="95000"/>
@@ -5185,88 +5110,13 @@
                 <a:latin typeface="黑体" panose="02010609060101010101" pitchFamily="49" charset="-122"/>
                 <a:ea typeface="黑体" panose="02010609060101010101" pitchFamily="49" charset="-122"/>
               </a:rPr>
-              <a:t>，当您</a:t>
-            </a:r>
-            <a:r>
-              <a:rPr lang="zh-CN" altLang="en-US" sz="2000" dirty="0">
-                <a:solidFill>
-                  <a:srgbClr val="92D050"/>
-                </a:solidFill>
-                <a:latin typeface="黑体" panose="02010609060101010101" pitchFamily="49" charset="-122"/>
-                <a:ea typeface="黑体" panose="02010609060101010101" pitchFamily="49" charset="-122"/>
-              </a:rPr>
-              <a:t>或</a:t>
-            </a:r>
-            <a:r>
-              <a:rPr lang="zh-CN" altLang="en-US" sz="2000" dirty="0">
-                <a:solidFill>
-                  <a:schemeClr val="bg1">
-                    <a:lumMod val="95000"/>
-                  </a:schemeClr>
-                </a:solidFill>
-                <a:latin typeface="黑体" panose="02010609060101010101" pitchFamily="49" charset="-122"/>
-                <a:ea typeface="黑体" panose="02010609060101010101" pitchFamily="49" charset="-122"/>
-              </a:rPr>
-              <a:t>另一玩家扮演的狼</a:t>
-            </a:r>
-            <a:r>
-              <a:rPr lang="zh-CN" altLang="en-US" sz="2000" dirty="0">
-                <a:solidFill>
-                  <a:srgbClr val="92D050"/>
-                </a:solidFill>
-                <a:latin typeface="黑体" panose="02010609060101010101" pitchFamily="49" charset="-122"/>
-                <a:ea typeface="黑体" panose="02010609060101010101" pitchFamily="49" charset="-122"/>
-              </a:rPr>
-              <a:t>碰到任意一只羊</a:t>
-            </a:r>
-            <a:r>
-              <a:rPr lang="zh-CN" altLang="en-US" sz="2000" dirty="0">
-                <a:solidFill>
-                  <a:schemeClr val="bg1">
-                    <a:lumMod val="95000"/>
-                  </a:schemeClr>
-                </a:solidFill>
-                <a:latin typeface="黑体" panose="02010609060101010101" pitchFamily="49" charset="-122"/>
-                <a:ea typeface="黑体" panose="02010609060101010101" pitchFamily="49" charset="-122"/>
-              </a:rPr>
-              <a:t>时，即视为成功抓到羊，而后</a:t>
-            </a:r>
-            <a:r>
-              <a:rPr lang="zh-CN" altLang="en-US" sz="2000" dirty="0">
-                <a:solidFill>
-                  <a:srgbClr val="92D050"/>
-                </a:solidFill>
-                <a:latin typeface="黑体" panose="02010609060101010101" pitchFamily="49" charset="-122"/>
-                <a:ea typeface="黑体" panose="02010609060101010101" pitchFamily="49" charset="-122"/>
-              </a:rPr>
-              <a:t>立即进入下一轮游戏</a:t>
-            </a:r>
-            <a:r>
-              <a:rPr lang="zh-CN" altLang="en-US" sz="2000" dirty="0">
-                <a:solidFill>
-                  <a:schemeClr val="bg1">
-                    <a:lumMod val="95000"/>
-                  </a:schemeClr>
-                </a:solidFill>
-                <a:latin typeface="黑体" panose="02010609060101010101" pitchFamily="49" charset="-122"/>
-                <a:ea typeface="黑体" panose="02010609060101010101" pitchFamily="49" charset="-122"/>
-              </a:rPr>
-              <a:t>。</a:t>
-            </a:r>
-            <a:endParaRPr lang="en-US" altLang="zh-CN" sz="2000" dirty="0">
-              <a:solidFill>
-                <a:schemeClr val="bg1">
-                  <a:lumMod val="95000"/>
-                </a:schemeClr>
-              </a:solidFill>
-              <a:latin typeface="黑体" panose="02010609060101010101" pitchFamily="49" charset="-122"/>
-              <a:ea typeface="黑体" panose="02010609060101010101" pitchFamily="49" charset="-122"/>
-            </a:endParaRPr>
+              <a:t>，屏幕左上方显示该轮游戏剩余时间。</a:t>
+            </a:r>
           </a:p>
           <a:p>
             <a:pPr marL="285750" indent="-285750">
               <a:lnSpc>
-                <a:spcPct val="150000"/>
+                <a:spcPct val="200000"/>
               </a:lnSpc>
               <a:spcBef>
                 <a:spcPts val="200"/>
@@ -5278,7 +5128,7 @@
               <a:buChar char="•"/>
             </a:pPr>
             <a:r>
-              <a:rPr lang="zh-CN" altLang="en-US" sz="2000" dirty="0">
+              <a:rPr lang="zh-CN" altLang="en-US" dirty="0">
                 <a:solidFill>
                   <a:schemeClr val="bg1">
                     <a:lumMod val="95000"/>
@@ -5287,20 +5137,20 @@
                 <a:latin typeface="黑体" panose="02010609060101010101" pitchFamily="49" charset="-122"/>
                 <a:ea typeface="黑体" panose="02010609060101010101" pitchFamily="49" charset="-122"/>
               </a:rPr>
-              <a:t>每轮游戏时间为</a:t>
-            </a:r>
-            <a:r>
-              <a:rPr lang="en-US" altLang="zh-CN" sz="2000" dirty="0">
+              <a:t>每轮游戏中，屏幕上会出现</a:t>
+            </a:r>
+            <a:r>
+              <a:rPr lang="zh-CN" altLang="en-US" dirty="0">
                 <a:solidFill>
                   <a:srgbClr val="92D050"/>
                 </a:solidFill>
                 <a:latin typeface="黑体" panose="02010609060101010101" pitchFamily="49" charset="-122"/>
                 <a:ea typeface="黑体" panose="02010609060101010101" pitchFamily="49" charset="-122"/>
               </a:rPr>
-              <a:t>15s</a:t>
-            </a:r>
-            <a:r>
-              <a:rPr lang="zh-CN" altLang="en-US" sz="2000" dirty="0">
+              <a:t>若干个小偷</a:t>
+            </a:r>
+            <a:r>
+              <a:rPr lang="zh-CN" altLang="en-US" dirty="0">
                 <a:solidFill>
                   <a:schemeClr val="bg1">
                     <a:lumMod val="95000"/>
@@ -5309,10 +5159,20 @@
                 <a:latin typeface="黑体" panose="02010609060101010101" pitchFamily="49" charset="-122"/>
                 <a:ea typeface="黑体" panose="02010609060101010101" pitchFamily="49" charset="-122"/>
               </a:rPr>
-              <a:t>，屏幕上方会显示该轮游戏剩余时间。若</a:t>
-            </a:r>
-            <a:r>
-              <a:rPr lang="en-US" altLang="zh-CN" sz="2000" dirty="0">
+              <a:t>，当您</a:t>
+            </a:r>
+            <a:r>
+              <a:rPr lang="zh-CN" altLang="en-US" dirty="0">
+                <a:solidFill>
+                  <a:srgbClr val="92D050"/>
+                </a:solidFill>
+                <a:latin typeface="黑体" panose="02010609060101010101" pitchFamily="49" charset="-122"/>
+                <a:ea typeface="黑体" panose="02010609060101010101" pitchFamily="49" charset="-122"/>
+              </a:rPr>
+              <a:t>或</a:t>
+            </a:r>
+            <a:r>
+              <a:rPr lang="zh-CN" altLang="en-US" dirty="0">
                 <a:solidFill>
                   <a:schemeClr val="bg1">
                     <a:lumMod val="95000"/>
@@ -5321,10 +5181,20 @@
                 <a:latin typeface="黑体" panose="02010609060101010101" pitchFamily="49" charset="-122"/>
                 <a:ea typeface="黑体" panose="02010609060101010101" pitchFamily="49" charset="-122"/>
               </a:rPr>
-              <a:t>15s</a:t>
-            </a:r>
-            <a:r>
-              <a:rPr lang="zh-CN" altLang="en-US" sz="2000" dirty="0">
+              <a:t>另一玩家扮演的赏金猎人</a:t>
+            </a:r>
+            <a:r>
+              <a:rPr lang="zh-CN" altLang="en-US" dirty="0">
+                <a:solidFill>
+                  <a:srgbClr val="92D050"/>
+                </a:solidFill>
+                <a:latin typeface="黑体" panose="02010609060101010101" pitchFamily="49" charset="-122"/>
+                <a:ea typeface="黑体" panose="02010609060101010101" pitchFamily="49" charset="-122"/>
+              </a:rPr>
+              <a:t>碰到任意一个小偷</a:t>
+            </a:r>
+            <a:r>
+              <a:rPr lang="zh-CN" altLang="en-US" dirty="0">
                 <a:solidFill>
                   <a:schemeClr val="bg1">
                     <a:lumMod val="95000"/>
@@ -5333,20 +5203,70 @@
                 <a:latin typeface="黑体" panose="02010609060101010101" pitchFamily="49" charset="-122"/>
                 <a:ea typeface="黑体" panose="02010609060101010101" pitchFamily="49" charset="-122"/>
               </a:rPr>
-              <a:t>内两名玩家都未抓到羊，则该轮游戏结束，</a:t>
-            </a:r>
-            <a:r>
-              <a:rPr lang="zh-CN" altLang="en-US" sz="2000" dirty="0">
-                <a:solidFill>
-                  <a:srgbClr val="92D050"/>
+              <a:t>时，即视为成功抓到小偷。</a:t>
+            </a:r>
+            <a:endParaRPr lang="en-US" altLang="zh-CN" dirty="0">
+              <a:solidFill>
+                <a:schemeClr val="bg1">
+                  <a:lumMod val="95000"/>
+                </a:schemeClr>
+              </a:solidFill>
+              <a:latin typeface="黑体" panose="02010609060101010101" pitchFamily="49" charset="-122"/>
+              <a:ea typeface="黑体" panose="02010609060101010101" pitchFamily="49" charset="-122"/>
+            </a:endParaRPr>
+          </a:p>
+          <a:p>
+            <a:pPr marL="285750" indent="-285750">
+              <a:lnSpc>
+                <a:spcPct val="200000"/>
+              </a:lnSpc>
+              <a:spcBef>
+                <a:spcPts val="200"/>
+              </a:spcBef>
+              <a:spcAft>
+                <a:spcPts val="200"/>
+              </a:spcAft>
+              <a:buFont typeface="Arial" panose="020B0604020202020204" pitchFamily="34" charset="0"/>
+              <a:buChar char="•"/>
+            </a:pPr>
+            <a:r>
+              <a:rPr lang="zh-CN" altLang="en-US" dirty="0">
+                <a:solidFill>
+                  <a:schemeClr val="bg1">
+                    <a:lumMod val="95000"/>
+                  </a:schemeClr>
                 </a:solidFill>
                 <a:latin typeface="黑体" panose="02010609060101010101" pitchFamily="49" charset="-122"/>
                 <a:ea typeface="黑体" panose="02010609060101010101" pitchFamily="49" charset="-122"/>
               </a:rPr>
-              <a:t>直接进入下一轮游戏</a:t>
-            </a:r>
-            <a:r>
-              <a:rPr lang="zh-CN" altLang="en-US" sz="2000" dirty="0">
+              <a:t>成功抓到某个小偷后，该小偷会继续在屏幕内跑动，可以对其进行多次追捕，直到该轮游戏时间截止。</a:t>
+            </a:r>
+            <a:endParaRPr lang="en-US" altLang="zh-CN" dirty="0">
+              <a:solidFill>
+                <a:schemeClr val="bg1">
+                  <a:lumMod val="95000"/>
+                </a:schemeClr>
+              </a:solidFill>
+              <a:latin typeface="黑体" panose="02010609060101010101" pitchFamily="49" charset="-122"/>
+              <a:ea typeface="黑体" panose="02010609060101010101" pitchFamily="49" charset="-122"/>
+            </a:endParaRPr>
+          </a:p>
+          <a:p>
+            <a:pPr marL="285750" indent="-285750">
+              <a:lnSpc>
+                <a:spcPct val="200000"/>
+              </a:lnSpc>
+              <a:spcBef>
+                <a:spcPts val="200"/>
+              </a:spcBef>
+              <a:spcAft>
+                <a:spcPts val="200"/>
+              </a:spcAft>
+              <a:buFont typeface="Arial" panose="020B0604020202020204" pitchFamily="34" charset="0"/>
+              <a:buChar char="•"/>
+            </a:pPr>
+            <a:r>
+              <a:rPr lang="zh-CN" altLang="en-US" dirty="0">
                 <a:solidFill>
                   <a:schemeClr val="bg1">
                     <a:lumMod val="95000"/>
@@ -5355,8 +5275,119 @@
                 <a:latin typeface="黑体" panose="02010609060101010101" pitchFamily="49" charset="-122"/>
                 <a:ea typeface="黑体" panose="02010609060101010101" pitchFamily="49" charset="-122"/>
               </a:rPr>
-              <a:t>。</a:t>
-            </a:r>
+              <a:t>屏幕顶端将显示你们当前的</a:t>
+            </a:r>
+            <a:r>
+              <a:rPr lang="zh-CN" altLang="en-US" dirty="0">
+                <a:solidFill>
+                  <a:srgbClr val="92D050"/>
+                </a:solidFill>
+                <a:latin typeface="黑体" panose="02010609060101010101" pitchFamily="49" charset="-122"/>
+                <a:ea typeface="黑体" panose="02010609060101010101" pitchFamily="49" charset="-122"/>
+              </a:rPr>
+              <a:t>总得分</a:t>
+            </a:r>
+            <a:r>
+              <a:rPr lang="zh-CN" altLang="en-US" dirty="0">
+                <a:solidFill>
+                  <a:schemeClr val="bg1">
+                    <a:lumMod val="95000"/>
+                  </a:schemeClr>
+                </a:solidFill>
+                <a:latin typeface="黑体" panose="02010609060101010101" pitchFamily="49" charset="-122"/>
+                <a:ea typeface="黑体" panose="02010609060101010101" pitchFamily="49" charset="-122"/>
+              </a:rPr>
+              <a:t>，分数计算规则为：</a:t>
+            </a:r>
+            <a:endParaRPr lang="en-US" altLang="zh-CN" dirty="0">
+              <a:solidFill>
+                <a:schemeClr val="bg1">
+                  <a:lumMod val="95000"/>
+                </a:schemeClr>
+              </a:solidFill>
+              <a:latin typeface="黑体" panose="02010609060101010101" pitchFamily="49" charset="-122"/>
+              <a:ea typeface="黑体" panose="02010609060101010101" pitchFamily="49" charset="-122"/>
+            </a:endParaRPr>
+          </a:p>
+          <a:p>
+            <a:pPr>
+              <a:lnSpc>
+                <a:spcPct val="200000"/>
+              </a:lnSpc>
+              <a:spcBef>
+                <a:spcPts val="200"/>
+              </a:spcBef>
+              <a:spcAft>
+                <a:spcPts val="200"/>
+              </a:spcAft>
+            </a:pPr>
+            <a:r>
+              <a:rPr lang="en-US" altLang="zh-CN" dirty="0">
+                <a:solidFill>
+                  <a:schemeClr val="bg1">
+                    <a:lumMod val="95000"/>
+                  </a:schemeClr>
+                </a:solidFill>
+                <a:latin typeface="黑体" panose="02010609060101010101" pitchFamily="49" charset="-122"/>
+                <a:ea typeface="黑体" panose="02010609060101010101" pitchFamily="49" charset="-122"/>
+              </a:rPr>
+              <a:t>		</a:t>
+            </a:r>
+            <a:r>
+              <a:rPr lang="zh-CN" altLang="en-US" u="sng" dirty="0">
+                <a:solidFill>
+                  <a:schemeClr val="bg1">
+                    <a:lumMod val="95000"/>
+                  </a:schemeClr>
+                </a:solidFill>
+                <a:latin typeface="黑体" panose="02010609060101010101" pitchFamily="49" charset="-122"/>
+                <a:ea typeface="黑体" panose="02010609060101010101" pitchFamily="49" charset="-122"/>
+              </a:rPr>
+              <a:t>每抓到一次小偷，计一分。</a:t>
+            </a:r>
+            <a:endParaRPr lang="en-US" altLang="zh-CN" u="sng" dirty="0">
+              <a:solidFill>
+                <a:schemeClr val="bg1">
+                  <a:lumMod val="95000"/>
+                </a:schemeClr>
+              </a:solidFill>
+              <a:latin typeface="黑体" panose="02010609060101010101" pitchFamily="49" charset="-122"/>
+              <a:ea typeface="黑体" panose="02010609060101010101" pitchFamily="49" charset="-122"/>
+            </a:endParaRPr>
+          </a:p>
+          <a:p>
+            <a:pPr marL="285750" indent="-285750">
+              <a:lnSpc>
+                <a:spcPct val="200000"/>
+              </a:lnSpc>
+              <a:spcBef>
+                <a:spcPts val="200"/>
+              </a:spcBef>
+              <a:spcAft>
+                <a:spcPts val="200"/>
+              </a:spcAft>
+              <a:buFont typeface="Arial" panose="020B0604020202020204" pitchFamily="34" charset="0"/>
+              <a:buChar char="•"/>
+            </a:pPr>
+            <a:r>
+              <a:rPr lang="zh-CN" altLang="en-US" dirty="0">
+                <a:solidFill>
+                  <a:srgbClr val="92D050"/>
+                </a:solidFill>
+                <a:latin typeface="黑体" panose="02010609060101010101" pitchFamily="49" charset="-122"/>
+                <a:ea typeface="黑体" panose="02010609060101010101" pitchFamily="49" charset="-122"/>
+              </a:rPr>
+              <a:t>游戏结束后总分越高，最终实验报酬越高。</a:t>
+            </a:r>
+            <a:endParaRPr lang="zh-CN" altLang="en-US" dirty="0">
+              <a:solidFill>
+                <a:schemeClr val="bg1">
+                  <a:lumMod val="95000"/>
+                </a:schemeClr>
+              </a:solidFill>
+              <a:latin typeface="黑体" panose="02010609060101010101" pitchFamily="49" charset="-122"/>
+              <a:ea typeface="黑体" panose="02010609060101010101" pitchFamily="49" charset="-122"/>
+            </a:endParaRPr>
           </a:p>
         </p:txBody>
       </p:sp>
@@ -5374,7 +5405,7 @@
         </p:nvGrpSpPr>
         <p:grpSpPr>
           <a:xfrm>
-            <a:off x="379884" y="1070906"/>
+            <a:off x="294313" y="1070906"/>
             <a:ext cx="4712977" cy="4716187"/>
             <a:chOff x="3576000" y="203170"/>
             <a:chExt cx="5040000" cy="5043433"/>
@@ -5738,11 +5769,11 @@
                 <a:avLst/>
               </a:prstGeom>
               <a:solidFill>
-                <a:srgbClr val="FF0000"/>
+                <a:srgbClr val="C00000"/>
               </a:solidFill>
               <a:ln>
                 <a:solidFill>
-                  <a:srgbClr val="FF0000"/>
+                  <a:srgbClr val="C00000"/>
                 </a:solidFill>
               </a:ln>
             </p:spPr>
@@ -5792,11 +5823,11 @@
                 <a:avLst/>
               </a:prstGeom>
               <a:solidFill>
-                <a:srgbClr val="0000FF"/>
+                <a:srgbClr val="0000CD"/>
               </a:solidFill>
               <a:ln>
                 <a:solidFill>
-                  <a:srgbClr val="0000FF"/>
+                  <a:srgbClr val="0000CD"/>
                 </a:solidFill>
               </a:ln>
             </p:spPr>
@@ -6117,7 +6148,7 @@
                     <a:srgbClr val="00FF00"/>
                   </a:solidFill>
                 </a:rPr>
-                <a:t>Total Score: 3.5</a:t>
+                <a:t>Total Score: 10</a:t>
               </a:r>
               <a:endParaRPr lang="zh-CN" altLang="en-US" b="1" dirty="0">
                 <a:solidFill>
@@ -6142,1220 +6173,6 @@
 </file>
 
 <file path=ppt/slides/slide3.xml><?xml version="1.0" encoding="utf-8"?>
-<p:sld xmlns:a="http://schemas.openxmlformats.org/drawingml/2006/main" xmlns:r="http://schemas.openxmlformats.org/officeDocument/2006/relationships" xmlns:p="http://schemas.openxmlformats.org/presentationml/2006/main">
-  <p:cSld>
-    <p:bg>
-      <p:bgPr>
-        <a:solidFill>
-          <a:schemeClr val="tx1">
-            <a:lumMod val="75000"/>
-            <a:lumOff val="25000"/>
-          </a:schemeClr>
-        </a:solidFill>
-        <a:effectLst/>
-      </p:bgPr>
-    </p:bg>
-    <p:spTree>
-      <p:nvGrpSpPr>
-        <p:cNvPr id="1" name=""/>
-        <p:cNvGrpSpPr/>
-        <p:nvPr/>
-      </p:nvGrpSpPr>
-      <p:grpSpPr>
-        <a:xfrm>
-          <a:off x="0" y="0"/>
-          <a:ext cx="0" cy="0"/>
-          <a:chOff x="0" y="0"/>
-          <a:chExt cx="0" cy="0"/>
-        </a:xfrm>
-      </p:grpSpPr>
-      <p:sp>
-        <p:nvSpPr>
-          <p:cNvPr id="3" name="文本框 2"/>
-          <p:cNvSpPr txBox="1"/>
-          <p:nvPr/>
-        </p:nvSpPr>
-        <p:spPr>
-          <a:xfrm>
-            <a:off x="5197046" y="2082637"/>
-            <a:ext cx="6712929" cy="2692725"/>
-          </a:xfrm>
-          <a:prstGeom prst="rect">
-            <a:avLst/>
-          </a:prstGeom>
-          <a:noFill/>
-        </p:spPr>
-        <p:txBody>
-          <a:bodyPr wrap="square" rtlCol="0">
-            <a:spAutoFit/>
-          </a:bodyPr>
-          <a:lstStyle/>
-          <a:p>
-            <a:pPr marL="285750" indent="-285750">
-              <a:lnSpc>
-                <a:spcPct val="130000"/>
-              </a:lnSpc>
-              <a:spcBef>
-                <a:spcPts val="200"/>
-              </a:spcBef>
-              <a:spcAft>
-                <a:spcPts val="200"/>
-              </a:spcAft>
-              <a:buFont typeface="Arial" panose="020B0604020202020204" pitchFamily="34" charset="0"/>
-              <a:buChar char="•"/>
-            </a:pPr>
-            <a:r>
-              <a:rPr lang="zh-CN" altLang="en-US" sz="2000" dirty="0">
-                <a:solidFill>
-                  <a:schemeClr val="bg1">
-                    <a:lumMod val="95000"/>
-                  </a:schemeClr>
-                </a:solidFill>
-                <a:latin typeface="黑体" panose="02010609060101010101" pitchFamily="49" charset="-122"/>
-                <a:ea typeface="黑体" panose="02010609060101010101" pitchFamily="49" charset="-122"/>
-              </a:rPr>
-              <a:t>屏幕顶端将显示你们当前的</a:t>
-            </a:r>
-            <a:r>
-              <a:rPr lang="zh-CN" altLang="en-US" sz="2000" dirty="0">
-                <a:solidFill>
-                  <a:srgbClr val="92D050"/>
-                </a:solidFill>
-                <a:latin typeface="黑体" panose="02010609060101010101" pitchFamily="49" charset="-122"/>
-                <a:ea typeface="黑体" panose="02010609060101010101" pitchFamily="49" charset="-122"/>
-              </a:rPr>
-              <a:t>总得分</a:t>
-            </a:r>
-            <a:r>
-              <a:rPr lang="zh-CN" altLang="en-US" sz="2000" dirty="0">
-                <a:solidFill>
-                  <a:schemeClr val="bg1">
-                    <a:lumMod val="95000"/>
-                  </a:schemeClr>
-                </a:solidFill>
-                <a:latin typeface="黑体" panose="02010609060101010101" pitchFamily="49" charset="-122"/>
-                <a:ea typeface="黑体" panose="02010609060101010101" pitchFamily="49" charset="-122"/>
-              </a:rPr>
-              <a:t>，分数计算规则为：</a:t>
-            </a:r>
-            <a:endParaRPr lang="en-US" altLang="zh-CN" sz="2000" dirty="0">
-              <a:solidFill>
-                <a:schemeClr val="bg1">
-                  <a:lumMod val="95000"/>
-                </a:schemeClr>
-              </a:solidFill>
-              <a:latin typeface="黑体" panose="02010609060101010101" pitchFamily="49" charset="-122"/>
-              <a:ea typeface="黑体" panose="02010609060101010101" pitchFamily="49" charset="-122"/>
-            </a:endParaRPr>
-          </a:p>
-          <a:p>
-            <a:pPr marL="742950" lvl="1" indent="-285750">
-              <a:lnSpc>
-                <a:spcPct val="130000"/>
-              </a:lnSpc>
-              <a:spcBef>
-                <a:spcPts val="200"/>
-              </a:spcBef>
-              <a:spcAft>
-                <a:spcPts val="200"/>
-              </a:spcAft>
-              <a:buFont typeface="Wingdings" panose="05000000000000000000" pitchFamily="2" charset="2"/>
-              <a:buChar char="Ø"/>
-            </a:pPr>
-            <a:r>
-              <a:rPr lang="zh-CN" altLang="en-US" sz="2000" dirty="0">
-                <a:solidFill>
-                  <a:schemeClr val="bg1">
-                    <a:lumMod val="95000"/>
-                  </a:schemeClr>
-                </a:solidFill>
-                <a:latin typeface="黑体" panose="02010609060101010101" pitchFamily="49" charset="-122"/>
-                <a:ea typeface="黑体" panose="02010609060101010101" pitchFamily="49" charset="-122"/>
-              </a:rPr>
-              <a:t>若</a:t>
-            </a:r>
-            <a:r>
-              <a:rPr lang="en-US" altLang="zh-CN" sz="2000" dirty="0">
-                <a:solidFill>
-                  <a:schemeClr val="bg1">
-                    <a:lumMod val="95000"/>
-                  </a:schemeClr>
-                </a:solidFill>
-                <a:latin typeface="黑体" panose="02010609060101010101" pitchFamily="49" charset="-122"/>
-                <a:ea typeface="黑体" panose="02010609060101010101" pitchFamily="49" charset="-122"/>
-              </a:rPr>
-              <a:t>15s</a:t>
-            </a:r>
-            <a:r>
-              <a:rPr lang="zh-CN" altLang="en-US" sz="2000" dirty="0">
-                <a:solidFill>
-                  <a:schemeClr val="bg1">
-                    <a:lumMod val="95000"/>
-                  </a:schemeClr>
-                </a:solidFill>
-                <a:latin typeface="黑体" panose="02010609060101010101" pitchFamily="49" charset="-122"/>
-                <a:ea typeface="黑体" panose="02010609060101010101" pitchFamily="49" charset="-122"/>
-              </a:rPr>
-              <a:t>内抓到羊，该轮游戏得分。</a:t>
-            </a:r>
-            <a:endParaRPr lang="en-US" altLang="zh-CN" sz="2000" dirty="0">
-              <a:solidFill>
-                <a:schemeClr val="bg1">
-                  <a:lumMod val="95000"/>
-                </a:schemeClr>
-              </a:solidFill>
-              <a:latin typeface="黑体" panose="02010609060101010101" pitchFamily="49" charset="-122"/>
-              <a:ea typeface="黑体" panose="02010609060101010101" pitchFamily="49" charset="-122"/>
-            </a:endParaRPr>
-          </a:p>
-          <a:p>
-            <a:pPr marL="742950" lvl="1" indent="-285750">
-              <a:lnSpc>
-                <a:spcPct val="130000"/>
-              </a:lnSpc>
-              <a:spcBef>
-                <a:spcPts val="200"/>
-              </a:spcBef>
-              <a:spcAft>
-                <a:spcPts val="200"/>
-              </a:spcAft>
-              <a:buFont typeface="Wingdings" panose="05000000000000000000" pitchFamily="2" charset="2"/>
-              <a:buChar char="Ø"/>
-            </a:pPr>
-            <a:r>
-              <a:rPr lang="zh-CN" altLang="en-US" sz="2000" dirty="0">
-                <a:solidFill>
-                  <a:schemeClr val="bg1">
-                    <a:lumMod val="95000"/>
-                  </a:schemeClr>
-                </a:solidFill>
-                <a:latin typeface="黑体" panose="02010609060101010101" pitchFamily="49" charset="-122"/>
-                <a:ea typeface="黑体" panose="02010609060101010101" pitchFamily="49" charset="-122"/>
-              </a:rPr>
-              <a:t>分数依据追逐时长计算，</a:t>
-            </a:r>
-            <a:r>
-              <a:rPr lang="zh-CN" altLang="en-US" sz="2000" dirty="0">
-                <a:solidFill>
-                  <a:srgbClr val="92D050"/>
-                </a:solidFill>
-                <a:latin typeface="黑体" panose="02010609060101010101" pitchFamily="49" charset="-122"/>
-                <a:ea typeface="黑体" panose="02010609060101010101" pitchFamily="49" charset="-122"/>
-              </a:rPr>
-              <a:t>用时越短</a:t>
-            </a:r>
-            <a:r>
-              <a:rPr lang="zh-CN" altLang="en-US" sz="2000" dirty="0">
-                <a:solidFill>
-                  <a:schemeClr val="bg1">
-                    <a:lumMod val="95000"/>
-                  </a:schemeClr>
-                </a:solidFill>
-                <a:latin typeface="黑体" panose="02010609060101010101" pitchFamily="49" charset="-122"/>
-                <a:ea typeface="黑体" panose="02010609060101010101" pitchFamily="49" charset="-122"/>
-              </a:rPr>
-              <a:t>，</a:t>
-            </a:r>
-            <a:r>
-              <a:rPr lang="zh-CN" altLang="en-US" sz="2000" dirty="0">
-                <a:solidFill>
-                  <a:srgbClr val="92D050"/>
-                </a:solidFill>
-                <a:latin typeface="黑体" panose="02010609060101010101" pitchFamily="49" charset="-122"/>
-                <a:ea typeface="黑体" panose="02010609060101010101" pitchFamily="49" charset="-122"/>
-              </a:rPr>
-              <a:t>得分越高</a:t>
-            </a:r>
-            <a:endParaRPr lang="en-US" altLang="zh-CN" sz="2000" dirty="0">
-              <a:solidFill>
-                <a:srgbClr val="92D050"/>
-              </a:solidFill>
-              <a:latin typeface="黑体" panose="02010609060101010101" pitchFamily="49" charset="-122"/>
-              <a:ea typeface="黑体" panose="02010609060101010101" pitchFamily="49" charset="-122"/>
-            </a:endParaRPr>
-          </a:p>
-          <a:p>
-            <a:pPr lvl="1">
-              <a:lnSpc>
-                <a:spcPct val="130000"/>
-              </a:lnSpc>
-              <a:spcBef>
-                <a:spcPts val="200"/>
-              </a:spcBef>
-              <a:spcAft>
-                <a:spcPts val="200"/>
-              </a:spcAft>
-            </a:pPr>
-            <a:r>
-              <a:rPr lang="zh-CN" altLang="en-US" sz="2000" dirty="0">
-                <a:solidFill>
-                  <a:schemeClr val="bg1">
-                    <a:lumMod val="95000"/>
-                  </a:schemeClr>
-                </a:solidFill>
-                <a:latin typeface="黑体" panose="02010609060101010101" pitchFamily="49" charset="-122"/>
-                <a:ea typeface="黑体" panose="02010609060101010101" pitchFamily="49" charset="-122"/>
-              </a:rPr>
-              <a:t>（每剩余</a:t>
-            </a:r>
-            <a:r>
-              <a:rPr lang="en-US" altLang="zh-CN" sz="2000" dirty="0">
-                <a:solidFill>
-                  <a:schemeClr val="bg1">
-                    <a:lumMod val="95000"/>
-                  </a:schemeClr>
-                </a:solidFill>
-                <a:latin typeface="黑体" panose="02010609060101010101" pitchFamily="49" charset="-122"/>
-                <a:ea typeface="黑体" panose="02010609060101010101" pitchFamily="49" charset="-122"/>
-              </a:rPr>
-              <a:t>1s</a:t>
-            </a:r>
-            <a:r>
-              <a:rPr lang="zh-CN" altLang="en-US" sz="2000" dirty="0">
-                <a:solidFill>
-                  <a:schemeClr val="bg1">
-                    <a:lumMod val="95000"/>
-                  </a:schemeClr>
-                </a:solidFill>
-                <a:latin typeface="黑体" panose="02010609060101010101" pitchFamily="49" charset="-122"/>
-                <a:ea typeface="黑体" panose="02010609060101010101" pitchFamily="49" charset="-122"/>
-              </a:rPr>
-              <a:t>，总分增加</a:t>
-            </a:r>
-            <a:r>
-              <a:rPr lang="en-US" altLang="zh-CN" sz="2000" dirty="0">
-                <a:solidFill>
-                  <a:schemeClr val="bg1">
-                    <a:lumMod val="95000"/>
-                  </a:schemeClr>
-                </a:solidFill>
-                <a:latin typeface="黑体" panose="02010609060101010101" pitchFamily="49" charset="-122"/>
-                <a:ea typeface="黑体" panose="02010609060101010101" pitchFamily="49" charset="-122"/>
-              </a:rPr>
-              <a:t>0.5</a:t>
-            </a:r>
-            <a:r>
-              <a:rPr lang="zh-CN" altLang="en-US" sz="2000" dirty="0">
-                <a:solidFill>
-                  <a:schemeClr val="bg1">
-                    <a:lumMod val="95000"/>
-                  </a:schemeClr>
-                </a:solidFill>
-                <a:latin typeface="黑体" panose="02010609060101010101" pitchFamily="49" charset="-122"/>
-                <a:ea typeface="黑体" panose="02010609060101010101" pitchFamily="49" charset="-122"/>
-              </a:rPr>
-              <a:t>分；即至多可得</a:t>
-            </a:r>
-            <a:r>
-              <a:rPr lang="en-US" altLang="zh-CN" sz="2000" dirty="0">
-                <a:solidFill>
-                  <a:schemeClr val="bg1">
-                    <a:lumMod val="95000"/>
-                  </a:schemeClr>
-                </a:solidFill>
-                <a:latin typeface="黑体" panose="02010609060101010101" pitchFamily="49" charset="-122"/>
-                <a:ea typeface="黑体" panose="02010609060101010101" pitchFamily="49" charset="-122"/>
-              </a:rPr>
-              <a:t>7.5</a:t>
-            </a:r>
-            <a:r>
-              <a:rPr lang="zh-CN" altLang="en-US" sz="2000" dirty="0">
-                <a:solidFill>
-                  <a:schemeClr val="bg1">
-                    <a:lumMod val="95000"/>
-                  </a:schemeClr>
-                </a:solidFill>
-                <a:latin typeface="黑体" panose="02010609060101010101" pitchFamily="49" charset="-122"/>
-                <a:ea typeface="黑体" panose="02010609060101010101" pitchFamily="49" charset="-122"/>
-              </a:rPr>
-              <a:t>分）</a:t>
-            </a:r>
-            <a:endParaRPr lang="en-US" altLang="zh-CN" sz="2000" dirty="0">
-              <a:solidFill>
-                <a:schemeClr val="bg1">
-                  <a:lumMod val="95000"/>
-                </a:schemeClr>
-              </a:solidFill>
-              <a:latin typeface="黑体" panose="02010609060101010101" pitchFamily="49" charset="-122"/>
-              <a:ea typeface="黑体" panose="02010609060101010101" pitchFamily="49" charset="-122"/>
-            </a:endParaRPr>
-          </a:p>
-          <a:p>
-            <a:pPr marL="742950" lvl="1" indent="-285750">
-              <a:lnSpc>
-                <a:spcPct val="130000"/>
-              </a:lnSpc>
-              <a:spcBef>
-                <a:spcPts val="200"/>
-              </a:spcBef>
-              <a:spcAft>
-                <a:spcPts val="200"/>
-              </a:spcAft>
-              <a:buFont typeface="Wingdings" panose="05000000000000000000" pitchFamily="2" charset="2"/>
-              <a:buChar char="Ø"/>
-            </a:pPr>
-            <a:r>
-              <a:rPr lang="zh-CN" altLang="en-US" sz="2000" dirty="0">
-                <a:solidFill>
-                  <a:schemeClr val="bg1">
-                    <a:lumMod val="95000"/>
-                  </a:schemeClr>
-                </a:solidFill>
-                <a:latin typeface="黑体" panose="02010609060101010101" pitchFamily="49" charset="-122"/>
-                <a:ea typeface="黑体" panose="02010609060101010101" pitchFamily="49" charset="-122"/>
-              </a:rPr>
-              <a:t>若</a:t>
-            </a:r>
-            <a:r>
-              <a:rPr lang="en-US" altLang="zh-CN" sz="2000" dirty="0">
-                <a:solidFill>
-                  <a:schemeClr val="bg1">
-                    <a:lumMod val="95000"/>
-                  </a:schemeClr>
-                </a:solidFill>
-                <a:latin typeface="黑体" panose="02010609060101010101" pitchFamily="49" charset="-122"/>
-                <a:ea typeface="黑体" panose="02010609060101010101" pitchFamily="49" charset="-122"/>
-              </a:rPr>
-              <a:t>15s</a:t>
-            </a:r>
-            <a:r>
-              <a:rPr lang="zh-CN" altLang="en-US" sz="2000" dirty="0">
-                <a:solidFill>
-                  <a:schemeClr val="bg1">
-                    <a:lumMod val="95000"/>
-                  </a:schemeClr>
-                </a:solidFill>
-                <a:latin typeface="黑体" panose="02010609060101010101" pitchFamily="49" charset="-122"/>
-                <a:ea typeface="黑体" panose="02010609060101010101" pitchFamily="49" charset="-122"/>
-              </a:rPr>
-              <a:t>内两名玩家都没有抓到羊，不得分</a:t>
-            </a:r>
-            <a:endParaRPr lang="en-US" altLang="zh-CN" sz="2000" dirty="0">
-              <a:solidFill>
-                <a:srgbClr val="92D050"/>
-              </a:solidFill>
-              <a:latin typeface="黑体" panose="02010609060101010101" pitchFamily="49" charset="-122"/>
-              <a:ea typeface="黑体" panose="02010609060101010101" pitchFamily="49" charset="-122"/>
-            </a:endParaRPr>
-          </a:p>
-          <a:p>
-            <a:pPr marL="285750" indent="-285750">
-              <a:lnSpc>
-                <a:spcPct val="130000"/>
-              </a:lnSpc>
-              <a:spcBef>
-                <a:spcPts val="200"/>
-              </a:spcBef>
-              <a:spcAft>
-                <a:spcPts val="200"/>
-              </a:spcAft>
-              <a:buFont typeface="Arial" panose="020B0604020202020204" pitchFamily="34" charset="0"/>
-              <a:buChar char="•"/>
-            </a:pPr>
-            <a:r>
-              <a:rPr lang="zh-CN" altLang="en-US" sz="2000" dirty="0">
-                <a:solidFill>
-                  <a:srgbClr val="92D050"/>
-                </a:solidFill>
-                <a:latin typeface="黑体" panose="02010609060101010101" pitchFamily="49" charset="-122"/>
-                <a:ea typeface="黑体" panose="02010609060101010101" pitchFamily="49" charset="-122"/>
-              </a:rPr>
-              <a:t>游戏结束后总分越高，最终实验报酬越高。</a:t>
-            </a:r>
-            <a:endParaRPr lang="zh-CN" altLang="en-US" sz="2000" dirty="0">
-              <a:solidFill>
-                <a:schemeClr val="bg1">
-                  <a:lumMod val="95000"/>
-                </a:schemeClr>
-              </a:solidFill>
-              <a:latin typeface="黑体" panose="02010609060101010101" pitchFamily="49" charset="-122"/>
-              <a:ea typeface="黑体" panose="02010609060101010101" pitchFamily="49" charset="-122"/>
-            </a:endParaRPr>
-          </a:p>
-        </p:txBody>
-      </p:sp>
-      <p:grpSp>
-        <p:nvGrpSpPr>
-          <p:cNvPr id="43" name="组合 42">
-            <a:extLst>
-              <a:ext uri="{FF2B5EF4-FFF2-40B4-BE49-F238E27FC236}">
-                <a16:creationId xmlns:a16="http://schemas.microsoft.com/office/drawing/2014/main" id="{18EC41A5-CED0-48E0-BFD2-2319417C736D}"/>
-              </a:ext>
-            </a:extLst>
-          </p:cNvPr>
-          <p:cNvGrpSpPr/>
-          <p:nvPr/>
-        </p:nvGrpSpPr>
-        <p:grpSpPr>
-          <a:xfrm>
-            <a:off x="379884" y="1070906"/>
-            <a:ext cx="4712977" cy="4716187"/>
-            <a:chOff x="3576000" y="203170"/>
-            <a:chExt cx="5040000" cy="5043433"/>
-          </a:xfrm>
-        </p:grpSpPr>
-        <p:sp>
-          <p:nvSpPr>
-            <p:cNvPr id="44" name="矩形 43">
-              <a:extLst>
-                <a:ext uri="{FF2B5EF4-FFF2-40B4-BE49-F238E27FC236}">
-                  <a16:creationId xmlns:a16="http://schemas.microsoft.com/office/drawing/2014/main" id="{28FAF185-B123-4DC4-9C87-53DCF401E0D2}"/>
-                </a:ext>
-              </a:extLst>
-            </p:cNvPr>
-            <p:cNvSpPr/>
-            <p:nvPr/>
-          </p:nvSpPr>
-          <p:spPr>
-            <a:xfrm>
-              <a:off x="3576000" y="206603"/>
-              <a:ext cx="5040000" cy="5040000"/>
-            </a:xfrm>
-            <a:prstGeom prst="rect">
-              <a:avLst/>
-            </a:prstGeom>
-            <a:solidFill>
-              <a:schemeClr val="tx1"/>
-            </a:solidFill>
-            <a:ln>
-              <a:noFill/>
-            </a:ln>
-          </p:spPr>
-          <p:style>
-            <a:lnRef idx="2">
-              <a:schemeClr val="accent3">
-                <a:shade val="50000"/>
-              </a:schemeClr>
-            </a:lnRef>
-            <a:fillRef idx="1">
-              <a:schemeClr val="accent3"/>
-            </a:fillRef>
-            <a:effectRef idx="0">
-              <a:schemeClr val="accent3"/>
-            </a:effectRef>
-            <a:fontRef idx="minor">
-              <a:schemeClr val="lt1"/>
-            </a:fontRef>
-          </p:style>
-          <p:txBody>
-            <a:bodyPr rtlCol="0" anchor="ctr"/>
-            <a:lstStyle/>
-            <a:p>
-              <a:pPr algn="ctr"/>
-              <a:endParaRPr lang="zh-CN" altLang="en-US" dirty="0"/>
-            </a:p>
-          </p:txBody>
-        </p:sp>
-        <p:grpSp>
-          <p:nvGrpSpPr>
-            <p:cNvPr id="45" name="组合 44">
-              <a:extLst>
-                <a:ext uri="{FF2B5EF4-FFF2-40B4-BE49-F238E27FC236}">
-                  <a16:creationId xmlns:a16="http://schemas.microsoft.com/office/drawing/2014/main" id="{B39497F9-C3A8-4A78-81DD-CA66F9263F21}"/>
-                </a:ext>
-              </a:extLst>
-            </p:cNvPr>
-            <p:cNvGrpSpPr/>
-            <p:nvPr/>
-          </p:nvGrpSpPr>
-          <p:grpSpPr>
-            <a:xfrm>
-              <a:off x="3979435" y="610038"/>
-              <a:ext cx="4233130" cy="4233131"/>
-              <a:chOff x="3533447" y="1779270"/>
-              <a:chExt cx="3291401" cy="3318711"/>
-            </a:xfrm>
-          </p:grpSpPr>
-          <p:sp>
-            <p:nvSpPr>
-              <p:cNvPr id="52" name="矩形 51">
-                <a:extLst>
-                  <a:ext uri="{FF2B5EF4-FFF2-40B4-BE49-F238E27FC236}">
-                    <a16:creationId xmlns:a16="http://schemas.microsoft.com/office/drawing/2014/main" id="{DF477829-C188-44EF-B063-306F912190EE}"/>
-                  </a:ext>
-                </a:extLst>
-              </p:cNvPr>
-              <p:cNvSpPr/>
-              <p:nvPr/>
-            </p:nvSpPr>
-            <p:spPr>
-              <a:xfrm>
-                <a:off x="3533447" y="1779270"/>
-                <a:ext cx="3291401" cy="3318711"/>
-              </a:xfrm>
-              <a:prstGeom prst="rect">
-                <a:avLst/>
-              </a:prstGeom>
-              <a:ln>
-                <a:noFill/>
-              </a:ln>
-            </p:spPr>
-            <p:style>
-              <a:lnRef idx="2">
-                <a:schemeClr val="accent3">
-                  <a:shade val="50000"/>
-                </a:schemeClr>
-              </a:lnRef>
-              <a:fillRef idx="1">
-                <a:schemeClr val="accent3"/>
-              </a:fillRef>
-              <a:effectRef idx="0">
-                <a:schemeClr val="accent3"/>
-              </a:effectRef>
-              <a:fontRef idx="minor">
-                <a:schemeClr val="lt1"/>
-              </a:fontRef>
-            </p:style>
-            <p:txBody>
-              <a:bodyPr rtlCol="0" anchor="ctr"/>
-              <a:lstStyle/>
-              <a:p>
-                <a:pPr algn="ctr"/>
-                <a:endParaRPr lang="zh-CN" altLang="en-US" dirty="0"/>
-              </a:p>
-            </p:txBody>
-          </p:sp>
-          <p:sp>
-            <p:nvSpPr>
-              <p:cNvPr id="53" name="椭圆 52">
-                <a:extLst>
-                  <a:ext uri="{FF2B5EF4-FFF2-40B4-BE49-F238E27FC236}">
-                    <a16:creationId xmlns:a16="http://schemas.microsoft.com/office/drawing/2014/main" id="{F36E2DFA-E5BA-4311-8577-1FA61765E9FD}"/>
-                  </a:ext>
-                </a:extLst>
-              </p:cNvPr>
-              <p:cNvSpPr/>
-              <p:nvPr/>
-            </p:nvSpPr>
-            <p:spPr>
-              <a:xfrm>
-                <a:off x="3898231" y="2569945"/>
-                <a:ext cx="173256" cy="173256"/>
-              </a:xfrm>
-              <a:prstGeom prst="ellipse">
-                <a:avLst/>
-              </a:prstGeom>
-              <a:solidFill>
-                <a:srgbClr val="FFA500"/>
-              </a:solidFill>
-              <a:ln>
-                <a:solidFill>
-                  <a:srgbClr val="FFA500"/>
-                </a:solidFill>
-              </a:ln>
-            </p:spPr>
-            <p:style>
-              <a:lnRef idx="2">
-                <a:schemeClr val="accent2">
-                  <a:shade val="50000"/>
-                </a:schemeClr>
-              </a:lnRef>
-              <a:fillRef idx="1">
-                <a:schemeClr val="accent2"/>
-              </a:fillRef>
-              <a:effectRef idx="0">
-                <a:schemeClr val="accent2"/>
-              </a:effectRef>
-              <a:fontRef idx="minor">
-                <a:schemeClr val="lt1"/>
-              </a:fontRef>
-            </p:style>
-            <p:txBody>
-              <a:bodyPr rtlCol="0" anchor="ctr"/>
-              <a:lstStyle/>
-              <a:p>
-                <a:pPr algn="ctr"/>
-                <a:endParaRPr lang="zh-CN" altLang="en-US"/>
-              </a:p>
-            </p:txBody>
-          </p:sp>
-          <p:sp>
-            <p:nvSpPr>
-              <p:cNvPr id="54" name="椭圆 53">
-                <a:extLst>
-                  <a:ext uri="{FF2B5EF4-FFF2-40B4-BE49-F238E27FC236}">
-                    <a16:creationId xmlns:a16="http://schemas.microsoft.com/office/drawing/2014/main" id="{F23BE09D-5C76-45B7-A347-32FA484AFB96}"/>
-                  </a:ext>
-                </a:extLst>
-              </p:cNvPr>
-              <p:cNvSpPr/>
-              <p:nvPr/>
-            </p:nvSpPr>
-            <p:spPr>
-              <a:xfrm>
-                <a:off x="6081562" y="3049604"/>
-                <a:ext cx="173256" cy="173256"/>
-              </a:xfrm>
-              <a:prstGeom prst="ellipse">
-                <a:avLst/>
-              </a:prstGeom>
-              <a:solidFill>
-                <a:srgbClr val="FFA500"/>
-              </a:solidFill>
-              <a:ln>
-                <a:solidFill>
-                  <a:srgbClr val="FFA500"/>
-                </a:solidFill>
-              </a:ln>
-            </p:spPr>
-            <p:style>
-              <a:lnRef idx="2">
-                <a:schemeClr val="accent2">
-                  <a:shade val="50000"/>
-                </a:schemeClr>
-              </a:lnRef>
-              <a:fillRef idx="1">
-                <a:schemeClr val="accent2"/>
-              </a:fillRef>
-              <a:effectRef idx="0">
-                <a:schemeClr val="accent2"/>
-              </a:effectRef>
-              <a:fontRef idx="minor">
-                <a:schemeClr val="lt1"/>
-              </a:fontRef>
-            </p:style>
-            <p:txBody>
-              <a:bodyPr rtlCol="0" anchor="ctr"/>
-              <a:lstStyle/>
-              <a:p>
-                <a:pPr algn="ctr"/>
-                <a:endParaRPr lang="zh-CN" altLang="en-US"/>
-              </a:p>
-            </p:txBody>
-          </p:sp>
-          <p:sp>
-            <p:nvSpPr>
-              <p:cNvPr id="55" name="椭圆 54">
-                <a:extLst>
-                  <a:ext uri="{FF2B5EF4-FFF2-40B4-BE49-F238E27FC236}">
-                    <a16:creationId xmlns:a16="http://schemas.microsoft.com/office/drawing/2014/main" id="{43453865-4F81-4F6D-9F0A-04745CB7E583}"/>
-                  </a:ext>
-                </a:extLst>
-              </p:cNvPr>
-              <p:cNvSpPr/>
-              <p:nvPr/>
-            </p:nvSpPr>
-            <p:spPr>
-              <a:xfrm>
-                <a:off x="4198125" y="3438626"/>
-                <a:ext cx="173256" cy="173256"/>
-              </a:xfrm>
-              <a:prstGeom prst="ellipse">
-                <a:avLst/>
-              </a:prstGeom>
-              <a:solidFill>
-                <a:srgbClr val="FFA500"/>
-              </a:solidFill>
-              <a:ln>
-                <a:solidFill>
-                  <a:srgbClr val="FFA500"/>
-                </a:solidFill>
-              </a:ln>
-            </p:spPr>
-            <p:style>
-              <a:lnRef idx="2">
-                <a:schemeClr val="accent2">
-                  <a:shade val="50000"/>
-                </a:schemeClr>
-              </a:lnRef>
-              <a:fillRef idx="1">
-                <a:schemeClr val="accent2"/>
-              </a:fillRef>
-              <a:effectRef idx="0">
-                <a:schemeClr val="accent2"/>
-              </a:effectRef>
-              <a:fontRef idx="minor">
-                <a:schemeClr val="lt1"/>
-              </a:fontRef>
-            </p:style>
-            <p:txBody>
-              <a:bodyPr rtlCol="0" anchor="ctr"/>
-              <a:lstStyle/>
-              <a:p>
-                <a:pPr algn="ctr"/>
-                <a:endParaRPr lang="zh-CN" altLang="en-US"/>
-              </a:p>
-            </p:txBody>
-          </p:sp>
-          <p:sp>
-            <p:nvSpPr>
-              <p:cNvPr id="56" name="椭圆 55">
-                <a:extLst>
-                  <a:ext uri="{FF2B5EF4-FFF2-40B4-BE49-F238E27FC236}">
-                    <a16:creationId xmlns:a16="http://schemas.microsoft.com/office/drawing/2014/main" id="{CA1111EB-7F07-4897-84D2-E9357704CC0B}"/>
-                  </a:ext>
-                </a:extLst>
-              </p:cNvPr>
-              <p:cNvSpPr/>
-              <p:nvPr/>
-            </p:nvSpPr>
-            <p:spPr>
-              <a:xfrm>
-                <a:off x="5005891" y="4676273"/>
-                <a:ext cx="173256" cy="173256"/>
-              </a:xfrm>
-              <a:prstGeom prst="ellipse">
-                <a:avLst/>
-              </a:prstGeom>
-              <a:solidFill>
-                <a:srgbClr val="FFA500"/>
-              </a:solidFill>
-              <a:ln>
-                <a:solidFill>
-                  <a:srgbClr val="FFA500"/>
-                </a:solidFill>
-              </a:ln>
-            </p:spPr>
-            <p:style>
-              <a:lnRef idx="2">
-                <a:schemeClr val="accent2">
-                  <a:shade val="50000"/>
-                </a:schemeClr>
-              </a:lnRef>
-              <a:fillRef idx="1">
-                <a:schemeClr val="accent2"/>
-              </a:fillRef>
-              <a:effectRef idx="0">
-                <a:schemeClr val="accent2"/>
-              </a:effectRef>
-              <a:fontRef idx="minor">
-                <a:schemeClr val="lt1"/>
-              </a:fontRef>
-            </p:style>
-            <p:txBody>
-              <a:bodyPr rtlCol="0" anchor="ctr"/>
-              <a:lstStyle/>
-              <a:p>
-                <a:pPr algn="ctr"/>
-                <a:endParaRPr lang="zh-CN" altLang="en-US"/>
-              </a:p>
-            </p:txBody>
-          </p:sp>
-          <p:sp>
-            <p:nvSpPr>
-              <p:cNvPr id="57" name="椭圆 56">
-                <a:extLst>
-                  <a:ext uri="{FF2B5EF4-FFF2-40B4-BE49-F238E27FC236}">
-                    <a16:creationId xmlns:a16="http://schemas.microsoft.com/office/drawing/2014/main" id="{5E80226B-DE41-4432-8257-C61106B7FFF1}"/>
-                  </a:ext>
-                </a:extLst>
-              </p:cNvPr>
-              <p:cNvSpPr/>
-              <p:nvPr/>
-            </p:nvSpPr>
-            <p:spPr>
-              <a:xfrm>
-                <a:off x="5134040" y="3525254"/>
-                <a:ext cx="173256" cy="173256"/>
-              </a:xfrm>
-              <a:prstGeom prst="ellipse">
-                <a:avLst/>
-              </a:prstGeom>
-              <a:solidFill>
-                <a:srgbClr val="FF0000"/>
-              </a:solidFill>
-              <a:ln>
-                <a:solidFill>
-                  <a:srgbClr val="FF0000"/>
-                </a:solidFill>
-              </a:ln>
-            </p:spPr>
-            <p:style>
-              <a:lnRef idx="2">
-                <a:schemeClr val="accent1">
-                  <a:shade val="50000"/>
-                </a:schemeClr>
-              </a:lnRef>
-              <a:fillRef idx="1">
-                <a:schemeClr val="accent1"/>
-              </a:fillRef>
-              <a:effectRef idx="0">
-                <a:schemeClr val="accent1"/>
-              </a:effectRef>
-              <a:fontRef idx="minor">
-                <a:schemeClr val="lt1"/>
-              </a:fontRef>
-            </p:style>
-            <p:txBody>
-              <a:bodyPr rtlCol="0" anchor="ctr"/>
-              <a:lstStyle/>
-              <a:p>
-                <a:pPr algn="ctr"/>
-                <a:endParaRPr lang="zh-CN" altLang="en-US"/>
-              </a:p>
-            </p:txBody>
-          </p:sp>
-          <p:sp>
-            <p:nvSpPr>
-              <p:cNvPr id="58" name="椭圆 57">
-                <a:extLst>
-                  <a:ext uri="{FF2B5EF4-FFF2-40B4-BE49-F238E27FC236}">
-                    <a16:creationId xmlns:a16="http://schemas.microsoft.com/office/drawing/2014/main" id="{4F73B961-C567-4D4F-8CE9-AEA822AD9868}"/>
-                  </a:ext>
-                </a:extLst>
-              </p:cNvPr>
-              <p:cNvSpPr/>
-              <p:nvPr/>
-            </p:nvSpPr>
-            <p:spPr>
-              <a:xfrm>
-                <a:off x="6187441" y="3202272"/>
-                <a:ext cx="173256" cy="173256"/>
-              </a:xfrm>
-              <a:prstGeom prst="ellipse">
-                <a:avLst/>
-              </a:prstGeom>
-              <a:solidFill>
-                <a:srgbClr val="0000FF"/>
-              </a:solidFill>
-              <a:ln>
-                <a:solidFill>
-                  <a:srgbClr val="0000FF"/>
-                </a:solidFill>
-              </a:ln>
-            </p:spPr>
-            <p:style>
-              <a:lnRef idx="2">
-                <a:schemeClr val="accent4">
-                  <a:shade val="50000"/>
-                </a:schemeClr>
-              </a:lnRef>
-              <a:fillRef idx="1">
-                <a:schemeClr val="accent4"/>
-              </a:fillRef>
-              <a:effectRef idx="0">
-                <a:schemeClr val="accent4"/>
-              </a:effectRef>
-              <a:fontRef idx="minor">
-                <a:schemeClr val="lt1"/>
-              </a:fontRef>
-            </p:style>
-            <p:txBody>
-              <a:bodyPr rtlCol="0" anchor="ctr"/>
-              <a:lstStyle/>
-              <a:p>
-                <a:pPr algn="ctr"/>
-                <a:endParaRPr lang="zh-CN" altLang="en-US"/>
-              </a:p>
-            </p:txBody>
-          </p:sp>
-          <p:cxnSp>
-            <p:nvCxnSpPr>
-              <p:cNvPr id="59" name="连接符: 曲线 58">
-                <a:extLst>
-                  <a:ext uri="{FF2B5EF4-FFF2-40B4-BE49-F238E27FC236}">
-                    <a16:creationId xmlns:a16="http://schemas.microsoft.com/office/drawing/2014/main" id="{4EDF4B75-032B-4BFC-836C-FA839F365C64}"/>
-                  </a:ext>
-                </a:extLst>
-              </p:cNvPr>
-              <p:cNvCxnSpPr>
-                <a:cxnSpLocks/>
-                <a:stCxn id="57" idx="0"/>
-              </p:cNvCxnSpPr>
-              <p:nvPr/>
-            </p:nvCxnSpPr>
-            <p:spPr>
-              <a:xfrm rot="5400000" flipH="1" flipV="1">
-                <a:off x="5446979" y="2909921"/>
-                <a:ext cx="389022" cy="841644"/>
-              </a:xfrm>
-              <a:prstGeom prst="curvedConnector2">
-                <a:avLst/>
-              </a:prstGeom>
-              <a:ln>
-                <a:solidFill>
-                  <a:srgbClr val="FF0000"/>
-                </a:solidFill>
-                <a:tailEnd type="triangle"/>
-              </a:ln>
-            </p:spPr>
-            <p:style>
-              <a:lnRef idx="1">
-                <a:schemeClr val="dk1"/>
-              </a:lnRef>
-              <a:fillRef idx="0">
-                <a:schemeClr val="dk1"/>
-              </a:fillRef>
-              <a:effectRef idx="0">
-                <a:schemeClr val="dk1"/>
-              </a:effectRef>
-              <a:fontRef idx="minor">
-                <a:schemeClr val="tx1"/>
-              </a:fontRef>
-            </p:style>
-          </p:cxnSp>
-        </p:grpSp>
-        <p:cxnSp>
-          <p:nvCxnSpPr>
-            <p:cNvPr id="46" name="连接符: 曲线 45">
-              <a:extLst>
-                <a:ext uri="{FF2B5EF4-FFF2-40B4-BE49-F238E27FC236}">
-                  <a16:creationId xmlns:a16="http://schemas.microsoft.com/office/drawing/2014/main" id="{EF0AA8AC-3B98-4290-95DD-2E175D4E60DE}"/>
-                </a:ext>
-              </a:extLst>
-            </p:cNvPr>
-            <p:cNvCxnSpPr>
-              <a:cxnSpLocks/>
-              <a:stCxn id="54" idx="7"/>
-            </p:cNvCxnSpPr>
-            <p:nvPr/>
-          </p:nvCxnSpPr>
-          <p:spPr>
-            <a:xfrm rot="5400000" flipH="1" flipV="1">
-              <a:off x="7596699" y="1742188"/>
-              <a:ext cx="370679" cy="670460"/>
-            </a:xfrm>
-            <a:prstGeom prst="curvedConnector2">
-              <a:avLst/>
-            </a:prstGeom>
-            <a:ln>
-              <a:tailEnd type="triangle"/>
-            </a:ln>
-          </p:spPr>
-          <p:style>
-            <a:lnRef idx="1">
-              <a:schemeClr val="accent2"/>
-            </a:lnRef>
-            <a:fillRef idx="0">
-              <a:schemeClr val="accent2"/>
-            </a:fillRef>
-            <a:effectRef idx="0">
-              <a:schemeClr val="accent2"/>
-            </a:effectRef>
-            <a:fontRef idx="minor">
-              <a:schemeClr val="tx1"/>
-            </a:fontRef>
-          </p:style>
-        </p:cxnSp>
-        <p:cxnSp>
-          <p:nvCxnSpPr>
-            <p:cNvPr id="47" name="连接符: 曲线 46">
-              <a:extLst>
-                <a:ext uri="{FF2B5EF4-FFF2-40B4-BE49-F238E27FC236}">
-                  <a16:creationId xmlns:a16="http://schemas.microsoft.com/office/drawing/2014/main" id="{8694B1EF-EBB3-4860-8771-376DBF03FB4B}"/>
-                </a:ext>
-              </a:extLst>
-            </p:cNvPr>
-            <p:cNvCxnSpPr>
-              <a:cxnSpLocks/>
-              <a:stCxn id="53" idx="1"/>
-            </p:cNvCxnSpPr>
-            <p:nvPr/>
-          </p:nvCxnSpPr>
-          <p:spPr>
-            <a:xfrm rot="16200000" flipV="1">
-              <a:off x="4204064" y="1373777"/>
-              <a:ext cx="238695" cy="315622"/>
-            </a:xfrm>
-            <a:prstGeom prst="curvedConnector2">
-              <a:avLst/>
-            </a:prstGeom>
-            <a:ln>
-              <a:tailEnd type="triangle"/>
-            </a:ln>
-          </p:spPr>
-          <p:style>
-            <a:lnRef idx="1">
-              <a:schemeClr val="accent2"/>
-            </a:lnRef>
-            <a:fillRef idx="0">
-              <a:schemeClr val="accent2"/>
-            </a:fillRef>
-            <a:effectRef idx="0">
-              <a:schemeClr val="accent2"/>
-            </a:effectRef>
-            <a:fontRef idx="minor">
-              <a:schemeClr val="tx1"/>
-            </a:fontRef>
-          </p:style>
-        </p:cxnSp>
-        <p:cxnSp>
-          <p:nvCxnSpPr>
-            <p:cNvPr id="48" name="连接符: 曲线 47">
-              <a:extLst>
-                <a:ext uri="{FF2B5EF4-FFF2-40B4-BE49-F238E27FC236}">
-                  <a16:creationId xmlns:a16="http://schemas.microsoft.com/office/drawing/2014/main" id="{CCD14046-ABD2-40FB-ACC3-D58B3303A061}"/>
-                </a:ext>
-              </a:extLst>
-            </p:cNvPr>
-            <p:cNvCxnSpPr>
-              <a:cxnSpLocks/>
-              <a:stCxn id="55" idx="0"/>
-            </p:cNvCxnSpPr>
-            <p:nvPr/>
-          </p:nvCxnSpPr>
-          <p:spPr>
-            <a:xfrm rot="16200000" flipV="1">
-              <a:off x="4603033" y="2383933"/>
-              <a:ext cx="301478" cy="383863"/>
-            </a:xfrm>
-            <a:prstGeom prst="curvedConnector2">
-              <a:avLst/>
-            </a:prstGeom>
-            <a:ln>
-              <a:tailEnd type="triangle"/>
-            </a:ln>
-          </p:spPr>
-          <p:style>
-            <a:lnRef idx="1">
-              <a:schemeClr val="accent2"/>
-            </a:lnRef>
-            <a:fillRef idx="0">
-              <a:schemeClr val="accent2"/>
-            </a:fillRef>
-            <a:effectRef idx="0">
-              <a:schemeClr val="accent2"/>
-            </a:effectRef>
-            <a:fontRef idx="minor">
-              <a:schemeClr val="tx1"/>
-            </a:fontRef>
-          </p:style>
-        </p:cxnSp>
-        <p:cxnSp>
-          <p:nvCxnSpPr>
-            <p:cNvPr id="49" name="连接符: 曲线 48">
-              <a:extLst>
-                <a:ext uri="{FF2B5EF4-FFF2-40B4-BE49-F238E27FC236}">
-                  <a16:creationId xmlns:a16="http://schemas.microsoft.com/office/drawing/2014/main" id="{D161C767-DF3C-4799-B8B4-7F9B27171BDA}"/>
-                </a:ext>
-              </a:extLst>
-            </p:cNvPr>
-            <p:cNvCxnSpPr>
-              <a:cxnSpLocks/>
-              <a:stCxn id="56" idx="1"/>
-            </p:cNvCxnSpPr>
-            <p:nvPr/>
-          </p:nvCxnSpPr>
-          <p:spPr>
-            <a:xfrm rot="16200000" flipV="1">
-              <a:off x="5508487" y="3940313"/>
-              <a:ext cx="354910" cy="439724"/>
-            </a:xfrm>
-            <a:prstGeom prst="curvedConnector2">
-              <a:avLst/>
-            </a:prstGeom>
-            <a:ln>
-              <a:tailEnd type="triangle"/>
-            </a:ln>
-          </p:spPr>
-          <p:style>
-            <a:lnRef idx="1">
-              <a:schemeClr val="accent2"/>
-            </a:lnRef>
-            <a:fillRef idx="0">
-              <a:schemeClr val="accent2"/>
-            </a:fillRef>
-            <a:effectRef idx="0">
-              <a:schemeClr val="accent2"/>
-            </a:effectRef>
-            <a:fontRef idx="minor">
-              <a:schemeClr val="tx1"/>
-            </a:fontRef>
-          </p:style>
-        </p:cxnSp>
-        <p:sp>
-          <p:nvSpPr>
-            <p:cNvPr id="50" name="文本框 49">
-              <a:extLst>
-                <a:ext uri="{FF2B5EF4-FFF2-40B4-BE49-F238E27FC236}">
-                  <a16:creationId xmlns:a16="http://schemas.microsoft.com/office/drawing/2014/main" id="{4C00D25D-8E0D-44D2-A810-E230093E4031}"/>
-                </a:ext>
-              </a:extLst>
-            </p:cNvPr>
-            <p:cNvSpPr txBox="1"/>
-            <p:nvPr/>
-          </p:nvSpPr>
-          <p:spPr>
-            <a:xfrm>
-              <a:off x="3900516" y="203170"/>
-              <a:ext cx="1318977" cy="417518"/>
-            </a:xfrm>
-            <a:prstGeom prst="rect">
-              <a:avLst/>
-            </a:prstGeom>
-            <a:noFill/>
-          </p:spPr>
-          <p:txBody>
-            <a:bodyPr wrap="square" rtlCol="0">
-              <a:spAutoFit/>
-            </a:bodyPr>
-            <a:lstStyle/>
-            <a:p>
-              <a:r>
-                <a:rPr lang="en-US" altLang="zh-CN" b="1" dirty="0">
-                  <a:solidFill>
-                    <a:schemeClr val="bg1"/>
-                  </a:solidFill>
-                </a:rPr>
-                <a:t>Time: 7s</a:t>
-              </a:r>
-              <a:endParaRPr lang="zh-CN" altLang="en-US" b="1" dirty="0">
-                <a:solidFill>
-                  <a:schemeClr val="bg1"/>
-                </a:solidFill>
-              </a:endParaRPr>
-            </a:p>
-          </p:txBody>
-        </p:sp>
-        <p:sp>
-          <p:nvSpPr>
-            <p:cNvPr id="51" name="文本框 50">
-              <a:extLst>
-                <a:ext uri="{FF2B5EF4-FFF2-40B4-BE49-F238E27FC236}">
-                  <a16:creationId xmlns:a16="http://schemas.microsoft.com/office/drawing/2014/main" id="{B84F7D7A-25EA-42A2-85EE-53AA79DC25F5}"/>
-                </a:ext>
-              </a:extLst>
-            </p:cNvPr>
-            <p:cNvSpPr txBox="1"/>
-            <p:nvPr/>
-          </p:nvSpPr>
-          <p:spPr>
-            <a:xfrm>
-              <a:off x="6404750" y="208361"/>
-              <a:ext cx="2072528" cy="394959"/>
-            </a:xfrm>
-            <a:prstGeom prst="rect">
-              <a:avLst/>
-            </a:prstGeom>
-            <a:noFill/>
-          </p:spPr>
-          <p:txBody>
-            <a:bodyPr wrap="square" rtlCol="0">
-              <a:spAutoFit/>
-            </a:bodyPr>
-            <a:lstStyle/>
-            <a:p>
-              <a:r>
-                <a:rPr lang="en-US" altLang="zh-CN" b="1" dirty="0">
-                  <a:solidFill>
-                    <a:srgbClr val="00FF00"/>
-                  </a:solidFill>
-                </a:rPr>
-                <a:t>Total Score: 3.5</a:t>
-              </a:r>
-              <a:endParaRPr lang="zh-CN" altLang="en-US" b="1" dirty="0">
-                <a:solidFill>
-                  <a:srgbClr val="00FF00"/>
-                </a:solidFill>
-              </a:endParaRPr>
-            </a:p>
-          </p:txBody>
-        </p:sp>
-      </p:grpSp>
-    </p:spTree>
-    <p:extLst>
-      <p:ext uri="{BB962C8B-B14F-4D97-AF65-F5344CB8AC3E}">
-        <p14:creationId xmlns:p14="http://schemas.microsoft.com/office/powerpoint/2010/main" val="952694587"/>
-      </p:ext>
-    </p:extLst>
-  </p:cSld>
-  <p:clrMapOvr>
-    <a:masterClrMapping/>
-  </p:clrMapOvr>
-</p:sld>
-</file>
-
-<file path=ppt/slides/slide4.xml><?xml version="1.0" encoding="utf-8"?>
 <p:sld xmlns:a="http://schemas.openxmlformats.org/drawingml/2006/main" xmlns:r="http://schemas.openxmlformats.org/officeDocument/2006/relationships" xmlns:p="http://schemas.openxmlformats.org/presentationml/2006/main" show="0">
   <p:cSld>
     <p:spTree>
@@ -7477,7 +6294,7 @@
 </p:sld>
 </file>
 
-<file path=ppt/slides/slide5.xml><?xml version="1.0" encoding="utf-8"?>
+<file path=ppt/slides/slide4.xml><?xml version="1.0" encoding="utf-8"?>
 <p:sld xmlns:a="http://schemas.openxmlformats.org/drawingml/2006/main" xmlns:r="http://schemas.openxmlformats.org/officeDocument/2006/relationships" xmlns:p="http://schemas.openxmlformats.org/presentationml/2006/main">
   <p:cSld>
     <p:spTree>
@@ -7561,8 +6378,8 @@
         </p:nvSpPr>
         <p:spPr>
           <a:xfrm>
-            <a:off x="1870130" y="672600"/>
-            <a:ext cx="7879976" cy="5526321"/>
+            <a:off x="1643766" y="711558"/>
+            <a:ext cx="8624052" cy="5110823"/>
           </a:xfrm>
           <a:prstGeom prst="rect">
             <a:avLst/>
@@ -7596,7 +6413,7 @@
                 <a:latin typeface="黑体" panose="02010609060101010101" pitchFamily="49" charset="-122"/>
                 <a:ea typeface="黑体" panose="02010609060101010101" pitchFamily="49" charset="-122"/>
               </a:rPr>
-              <a:t>您好，欢迎参与“狼追羊”游戏！</a:t>
+              <a:t>您好，欢迎参与“赏金猎人”游戏！</a:t>
             </a:r>
             <a:endParaRPr lang="en-US" altLang="zh-CN" b="1" dirty="0">
               <a:solidFill>
@@ -7630,7 +6447,7 @@
                 <a:latin typeface="黑体" panose="02010609060101010101" pitchFamily="49" charset="-122"/>
                 <a:ea typeface="黑体" panose="02010609060101010101" pitchFamily="49" charset="-122"/>
               </a:rPr>
-              <a:t>游戏即将开始，您可以通过操纵游戏手柄左上角的摇杆来控制狼的移动</a:t>
+              <a:t>游戏即将开始，您可以通过操纵游戏手柄左上角的摇杆来控制赏金猎人的移动</a:t>
             </a:r>
             <a:endParaRPr lang="en-US" altLang="zh-CN" b="1" dirty="0">
               <a:solidFill>
@@ -7776,7 +6593,7 @@
                 <a:latin typeface="黑体" panose="02010609060101010101" pitchFamily="49" charset="-122"/>
                 <a:ea typeface="黑体" panose="02010609060101010101" pitchFamily="49" charset="-122"/>
               </a:rPr>
-              <a:t>）游戏任务是尽快地在</a:t>
+              <a:t>）游戏任务是尽可能多地在</a:t>
             </a:r>
             <a:r>
               <a:rPr lang="zh-CN" altLang="en-US" b="1" dirty="0">
@@ -7818,7 +6635,7 @@
                 <a:latin typeface="黑体" panose="02010609060101010101" pitchFamily="49" charset="-122"/>
                 <a:ea typeface="黑体" panose="02010609060101010101" pitchFamily="49" charset="-122"/>
               </a:rPr>
-              <a:t>抓住屏幕中跑动的羊（</a:t>
+              <a:t>抓住屏幕中逃跑的小偷（</a:t>
             </a:r>
             <a:r>
               <a:rPr lang="zh-CN" altLang="en-US" b="1" dirty="0">
@@ -7889,28 +6706,6 @@
               <a:t>）</a:t>
             </a:r>
             <a:r>
-              <a:rPr lang="zh-CN" altLang="en-US" b="1" dirty="0">
-                <a:solidFill>
-                  <a:srgbClr val="FF0000"/>
-                </a:solidFill>
-                <a:latin typeface="黑体" panose="02010609060101010101" pitchFamily="49" charset="-122"/>
-                <a:ea typeface="黑体" panose="02010609060101010101" pitchFamily="49" charset="-122"/>
-              </a:rPr>
-              <a:t>每抓到一只羊</a:t>
-            </a:r>
-            <a:r>
-              <a:rPr lang="zh-CN" altLang="en-US" b="1" dirty="0">
-                <a:solidFill>
-                  <a:schemeClr val="bg1">
-                    <a:lumMod val="95000"/>
-                  </a:schemeClr>
-                </a:solidFill>
-                <a:latin typeface="黑体" panose="02010609060101010101" pitchFamily="49" charset="-122"/>
-                <a:ea typeface="黑体" panose="02010609060101010101" pitchFamily="49" charset="-122"/>
-              </a:rPr>
-              <a:t>或</a:t>
-            </a:r>
-            <a:r>
               <a:rPr lang="en-US" altLang="zh-CN" b="1" dirty="0">
                 <a:solidFill>
                   <a:srgbClr val="FF0000"/>
@@ -7928,7 +6723,7 @@
                 <a:latin typeface="黑体" panose="02010609060101010101" pitchFamily="49" charset="-122"/>
                 <a:ea typeface="黑体" panose="02010609060101010101" pitchFamily="49" charset="-122"/>
               </a:rPr>
-              <a:t>内两名玩家均未抓到羊</a:t>
+              <a:t>倒计时结束后，</a:t>
             </a:r>
             <a:r>
               <a:rPr lang="zh-CN" altLang="en-US" b="1" dirty="0">
@@ -7940,7 +6735,7 @@
                 <a:latin typeface="黑体" panose="02010609060101010101" pitchFamily="49" charset="-122"/>
                 <a:ea typeface="黑体" panose="02010609060101010101" pitchFamily="49" charset="-122"/>
               </a:rPr>
-              <a:t>，则立即进入下一轮游戏。此时游戏界面刷新，两名玩家的位置也会刷新</a:t>
+              <a:t>游戏界面刷新，两名玩家的位置也会刷新</a:t>
             </a:r>
             <a:endParaRPr lang="en-US" altLang="zh-CN" b="1" dirty="0">
               <a:solidFill>
@@ -8617,7 +7412,7 @@
 </p:sld>
 </file>
 
-<file path=ppt/slides/slide6.xml><?xml version="1.0" encoding="utf-8"?>
+<file path=ppt/slides/slide5.xml><?xml version="1.0" encoding="utf-8"?>
 <p:sld xmlns:a="http://schemas.openxmlformats.org/drawingml/2006/main" xmlns:r="http://schemas.openxmlformats.org/officeDocument/2006/relationships" xmlns:p="http://schemas.openxmlformats.org/presentationml/2006/main">
   <p:cSld>
     <p:spTree>
@@ -9042,7 +7837,7 @@
 </p:sld>
 </file>
 
-<file path=ppt/slides/slide7.xml><?xml version="1.0" encoding="utf-8"?>
+<file path=ppt/slides/slide6.xml><?xml version="1.0" encoding="utf-8"?>
 <p:sld xmlns:a="http://schemas.openxmlformats.org/drawingml/2006/main" xmlns:r="http://schemas.openxmlformats.org/officeDocument/2006/relationships" xmlns:p="http://schemas.openxmlformats.org/presentationml/2006/main">
   <p:cSld>
     <p:spTree>
@@ -9146,7 +7941,7 @@
 </p:sld>
 </file>
 
-<file path=ppt/slides/slide8.xml><?xml version="1.0" encoding="utf-8"?>
+<file path=ppt/slides/slide7.xml><?xml version="1.0" encoding="utf-8"?>
 <p:sld xmlns:a="http://schemas.openxmlformats.org/drawingml/2006/main" xmlns:r="http://schemas.openxmlformats.org/officeDocument/2006/relationships" xmlns:p="http://schemas.openxmlformats.org/presentationml/2006/main">
   <p:cSld>
     <p:spTree>
@@ -9250,7 +8045,7 @@
 </p:sld>
 </file>
 
-<file path=ppt/slides/slide9.xml><?xml version="1.0" encoding="utf-8"?>
+<file path=ppt/slides/slide8.xml><?xml version="1.0" encoding="utf-8"?>
 <p:sld xmlns:a="http://schemas.openxmlformats.org/drawingml/2006/main" xmlns:r="http://schemas.openxmlformats.org/officeDocument/2006/relationships" xmlns:p="http://schemas.openxmlformats.org/presentationml/2006/main">
   <p:cSld>
     <p:spTree>

</xml_diff>

<commit_message>
1.simplify codes 2.add Exp2 codes for reproducing trajectories and recognizing
</commit_message>
<xml_diff>
--- a/pictures/introduction.pptx
+++ b/pictures/introduction.pptx
@@ -5,17 +5,18 @@
     <p:sldMasterId id="2147483648" r:id="rId1"/>
   </p:sldMasterIdLst>
   <p:notesMasterIdLst>
-    <p:notesMasterId r:id="rId10"/>
+    <p:notesMasterId r:id="rId11"/>
   </p:notesMasterIdLst>
   <p:sldIdLst>
     <p:sldId id="261" r:id="rId2"/>
     <p:sldId id="267" r:id="rId3"/>
     <p:sldId id="275" r:id="rId4"/>
-    <p:sldId id="278" r:id="rId5"/>
-    <p:sldId id="276" r:id="rId6"/>
-    <p:sldId id="277" r:id="rId7"/>
-    <p:sldId id="259" r:id="rId8"/>
-    <p:sldId id="279" r:id="rId9"/>
+    <p:sldId id="280" r:id="rId5"/>
+    <p:sldId id="281" r:id="rId6"/>
+    <p:sldId id="284" r:id="rId7"/>
+    <p:sldId id="278" r:id="rId8"/>
+    <p:sldId id="276" r:id="rId9"/>
+    <p:sldId id="259" r:id="rId10"/>
   </p:sldIdLst>
   <p:sldSz cx="12192000" cy="6858000"/>
   <p:notesSz cx="6858000" cy="9144000"/>
@@ -117,24 +118,25 @@
   <p:extLst>
     <p:ext uri="{521415D9-36F7-43E2-AB2F-B90AF26B5E84}">
       <p14:sectionLst xmlns:p14="http://schemas.microsoft.com/office/powerpoint/2010/main">
-        <p14:section name="introduction" id="{C928C6DD-A8B0-4EDF-9A2A-EB8EEBB6A25F}">
+        <p14:section name="2 people" id="{C928C6DD-A8B0-4EDF-9A2A-EB8EEBB6A25F}">
           <p14:sldIdLst>
             <p14:sldId id="261"/>
             <p14:sldId id="267"/>
             <p14:sldId id="275"/>
           </p14:sldIdLst>
         </p14:section>
+        <p14:section name="3 people" id="{EDAB0C94-83D3-419B-9162-21705C3C41E5}">
+          <p14:sldIdLst>
+            <p14:sldId id="280"/>
+            <p14:sldId id="281"/>
+            <p14:sldId id="284"/>
+          </p14:sldIdLst>
+        </p14:section>
         <p14:section name="insert pictures" id="{0987D39C-2E96-485A-8C68-510B317FB800}">
           <p14:sldIdLst>
             <p14:sldId id="278"/>
             <p14:sldId id="276"/>
-            <p14:sldId id="277"/>
             <p14:sldId id="259"/>
-          </p14:sldIdLst>
-        </p14:section>
-        <p14:section name="not used" id="{8EF0A4D0-8265-4F5F-BE1A-CBA81FBCC78C}">
-          <p14:sldIdLst>
-            <p14:sldId id="279"/>
           </p14:sldIdLst>
         </p14:section>
       </p14:sectionLst>
@@ -240,7 +242,7 @@
           <a:p>
             <a:fld id="{C0546B5F-B17E-4A11-A9CD-A10C644EC78D}" type="datetimeFigureOut">
               <a:rPr lang="zh-CN" altLang="en-US" smtClean="0"/>
-              <a:t>2021/11/18</a:t>
+              <a:t>2021/11/26</a:t>
             </a:fld>
             <a:endParaRPr lang="zh-CN" altLang="en-US"/>
           </a:p>
@@ -715,6 +717,334 @@
 </p:notes>
 </file>
 
+<file path=ppt/notesSlides/notesSlide3.xml><?xml version="1.0" encoding="utf-8"?>
+<p:notes xmlns:a="http://schemas.openxmlformats.org/drawingml/2006/main" xmlns:r="http://schemas.openxmlformats.org/officeDocument/2006/relationships" xmlns:p="http://schemas.openxmlformats.org/presentationml/2006/main">
+  <p:cSld>
+    <p:spTree>
+      <p:nvGrpSpPr>
+        <p:cNvPr id="1" name=""/>
+        <p:cNvGrpSpPr/>
+        <p:nvPr/>
+      </p:nvGrpSpPr>
+      <p:grpSpPr>
+        <a:xfrm>
+          <a:off x="0" y="0"/>
+          <a:ext cx="0" cy="0"/>
+          <a:chOff x="0" y="0"/>
+          <a:chExt cx="0" cy="0"/>
+        </a:xfrm>
+      </p:grpSpPr>
+      <p:sp>
+        <p:nvSpPr>
+          <p:cNvPr id="2" name="幻灯片图像占位符 1"/>
+          <p:cNvSpPr>
+            <a:spLocks noGrp="1" noRot="1" noChangeAspect="1"/>
+          </p:cNvSpPr>
+          <p:nvPr>
+            <p:ph type="sldImg"/>
+          </p:nvPr>
+        </p:nvSpPr>
+        <p:spPr/>
+      </p:sp>
+      <p:sp>
+        <p:nvSpPr>
+          <p:cNvPr id="3" name="备注占位符 2"/>
+          <p:cNvSpPr>
+            <a:spLocks noGrp="1"/>
+          </p:cNvSpPr>
+          <p:nvPr>
+            <p:ph type="body" idx="1"/>
+          </p:nvPr>
+        </p:nvSpPr>
+        <p:spPr/>
+        <p:txBody>
+          <a:bodyPr/>
+          <a:lstStyle/>
+          <a:p>
+            <a:pPr marL="0" marR="0" lvl="0" indent="0" algn="l" defTabSz="914400" rtl="0" eaLnBrk="1" fontAlgn="auto" latinLnBrk="0" hangingPunct="1">
+              <a:lnSpc>
+                <a:spcPct val="100000"/>
+              </a:lnSpc>
+              <a:spcBef>
+                <a:spcPts val="0"/>
+              </a:spcBef>
+              <a:spcAft>
+                <a:spcPts val="0"/>
+              </a:spcAft>
+              <a:buClrTx/>
+              <a:buSzTx/>
+              <a:buFontTx/>
+              <a:buNone/>
+              <a:tabLst/>
+              <a:defRPr/>
+            </a:pPr>
+            <a:r>
+              <a:rPr lang="zh-CN" altLang="en-US" dirty="0"/>
+              <a:t>角色说明</a:t>
+            </a:r>
+          </a:p>
+        </p:txBody>
+      </p:sp>
+      <p:sp>
+        <p:nvSpPr>
+          <p:cNvPr id="4" name="灯片编号占位符 3"/>
+          <p:cNvSpPr>
+            <a:spLocks noGrp="1"/>
+          </p:cNvSpPr>
+          <p:nvPr>
+            <p:ph type="sldNum" sz="quarter" idx="5"/>
+          </p:nvPr>
+        </p:nvSpPr>
+        <p:spPr/>
+        <p:txBody>
+          <a:bodyPr/>
+          <a:lstStyle/>
+          <a:p>
+            <a:pPr marL="0" marR="0" lvl="0" indent="0" algn="r" defTabSz="914400" rtl="0" eaLnBrk="1" fontAlgn="auto" latinLnBrk="0" hangingPunct="1">
+              <a:lnSpc>
+                <a:spcPct val="100000"/>
+              </a:lnSpc>
+              <a:spcBef>
+                <a:spcPts val="0"/>
+              </a:spcBef>
+              <a:spcAft>
+                <a:spcPts val="0"/>
+              </a:spcAft>
+              <a:buClrTx/>
+              <a:buSzTx/>
+              <a:buFontTx/>
+              <a:buNone/>
+              <a:tabLst/>
+              <a:defRPr/>
+            </a:pPr>
+            <a:fld id="{19214DBA-04C0-4AE0-9391-D985D3AC6701}" type="slidenum">
+              <a:rPr kumimoji="0" lang="zh-CN" altLang="en-US" sz="1200" b="0" i="0" u="none" strike="noStrike" kern="1200" cap="none" spc="0" normalizeH="0" baseline="0" noProof="0" smtClean="0">
+                <a:ln>
+                  <a:noFill/>
+                </a:ln>
+                <a:solidFill>
+                  <a:prstClr val="black"/>
+                </a:solidFill>
+                <a:effectLst/>
+                <a:uLnTx/>
+                <a:uFillTx/>
+                <a:latin typeface="等线" panose="020F0502020204030204"/>
+                <a:ea typeface="等线" panose="02010600030101010101" pitchFamily="2" charset="-122"/>
+                <a:cs typeface="+mn-cs"/>
+              </a:rPr>
+              <a:pPr marL="0" marR="0" lvl="0" indent="0" algn="r" defTabSz="914400" rtl="0" eaLnBrk="1" fontAlgn="auto" latinLnBrk="0" hangingPunct="1">
+                <a:lnSpc>
+                  <a:spcPct val="100000"/>
+                </a:lnSpc>
+                <a:spcBef>
+                  <a:spcPts val="0"/>
+                </a:spcBef>
+                <a:spcAft>
+                  <a:spcPts val="0"/>
+                </a:spcAft>
+                <a:buClrTx/>
+                <a:buSzTx/>
+                <a:buFontTx/>
+                <a:buNone/>
+                <a:tabLst/>
+                <a:defRPr/>
+              </a:pPr>
+              <a:t>4</a:t>
+            </a:fld>
+            <a:endParaRPr kumimoji="0" lang="zh-CN" altLang="en-US" sz="1200" b="0" i="0" u="none" strike="noStrike" kern="1200" cap="none" spc="0" normalizeH="0" baseline="0" noProof="0">
+              <a:ln>
+                <a:noFill/>
+              </a:ln>
+              <a:solidFill>
+                <a:prstClr val="black"/>
+              </a:solidFill>
+              <a:effectLst/>
+              <a:uLnTx/>
+              <a:uFillTx/>
+              <a:latin typeface="等线" panose="020F0502020204030204"/>
+              <a:ea typeface="等线" panose="02010600030101010101" pitchFamily="2" charset="-122"/>
+              <a:cs typeface="+mn-cs"/>
+            </a:endParaRPr>
+          </a:p>
+        </p:txBody>
+      </p:sp>
+    </p:spTree>
+    <p:extLst>
+      <p:ext uri="{BB962C8B-B14F-4D97-AF65-F5344CB8AC3E}">
+        <p14:creationId xmlns:p14="http://schemas.microsoft.com/office/powerpoint/2010/main" val="1893075693"/>
+      </p:ext>
+    </p:extLst>
+  </p:cSld>
+  <p:clrMapOvr>
+    <a:masterClrMapping/>
+  </p:clrMapOvr>
+</p:notes>
+</file>
+
+<file path=ppt/notesSlides/notesSlide4.xml><?xml version="1.0" encoding="utf-8"?>
+<p:notes xmlns:a="http://schemas.openxmlformats.org/drawingml/2006/main" xmlns:r="http://schemas.openxmlformats.org/officeDocument/2006/relationships" xmlns:p="http://schemas.openxmlformats.org/presentationml/2006/main">
+  <p:cSld>
+    <p:spTree>
+      <p:nvGrpSpPr>
+        <p:cNvPr id="1" name=""/>
+        <p:cNvGrpSpPr/>
+        <p:nvPr/>
+      </p:nvGrpSpPr>
+      <p:grpSpPr>
+        <a:xfrm>
+          <a:off x="0" y="0"/>
+          <a:ext cx="0" cy="0"/>
+          <a:chOff x="0" y="0"/>
+          <a:chExt cx="0" cy="0"/>
+        </a:xfrm>
+      </p:grpSpPr>
+      <p:sp>
+        <p:nvSpPr>
+          <p:cNvPr id="2" name="幻灯片图像占位符 1"/>
+          <p:cNvSpPr>
+            <a:spLocks noGrp="1" noRot="1" noChangeAspect="1"/>
+          </p:cNvSpPr>
+          <p:nvPr>
+            <p:ph type="sldImg"/>
+          </p:nvPr>
+        </p:nvSpPr>
+        <p:spPr/>
+      </p:sp>
+      <p:sp>
+        <p:nvSpPr>
+          <p:cNvPr id="3" name="备注占位符 2"/>
+          <p:cNvSpPr>
+            <a:spLocks noGrp="1"/>
+          </p:cNvSpPr>
+          <p:nvPr>
+            <p:ph type="body" idx="1"/>
+          </p:nvPr>
+        </p:nvSpPr>
+        <p:spPr/>
+        <p:txBody>
+          <a:bodyPr/>
+          <a:lstStyle/>
+          <a:p>
+            <a:pPr marL="0" marR="0" lvl="0" indent="0" algn="l" defTabSz="914400" rtl="0" eaLnBrk="1" fontAlgn="auto" latinLnBrk="0" hangingPunct="1">
+              <a:lnSpc>
+                <a:spcPct val="100000"/>
+              </a:lnSpc>
+              <a:spcBef>
+                <a:spcPts val="0"/>
+              </a:spcBef>
+              <a:spcAft>
+                <a:spcPts val="0"/>
+              </a:spcAft>
+              <a:buClrTx/>
+              <a:buSzTx/>
+              <a:buFontTx/>
+              <a:buNone/>
+              <a:tabLst/>
+              <a:defRPr/>
+            </a:pPr>
+            <a:r>
+              <a:rPr lang="zh-CN" altLang="en-US" dirty="0"/>
+              <a:t>规则定义</a:t>
+            </a:r>
+          </a:p>
+        </p:txBody>
+      </p:sp>
+      <p:sp>
+        <p:nvSpPr>
+          <p:cNvPr id="4" name="灯片编号占位符 3"/>
+          <p:cNvSpPr>
+            <a:spLocks noGrp="1"/>
+          </p:cNvSpPr>
+          <p:nvPr>
+            <p:ph type="sldNum" sz="quarter" idx="5"/>
+          </p:nvPr>
+        </p:nvSpPr>
+        <p:spPr/>
+        <p:txBody>
+          <a:bodyPr/>
+          <a:lstStyle/>
+          <a:p>
+            <a:pPr marL="0" marR="0" lvl="0" indent="0" algn="r" defTabSz="914400" rtl="0" eaLnBrk="1" fontAlgn="auto" latinLnBrk="0" hangingPunct="1">
+              <a:lnSpc>
+                <a:spcPct val="100000"/>
+              </a:lnSpc>
+              <a:spcBef>
+                <a:spcPts val="0"/>
+              </a:spcBef>
+              <a:spcAft>
+                <a:spcPts val="0"/>
+              </a:spcAft>
+              <a:buClrTx/>
+              <a:buSzTx/>
+              <a:buFontTx/>
+              <a:buNone/>
+              <a:tabLst/>
+              <a:defRPr/>
+            </a:pPr>
+            <a:fld id="{19214DBA-04C0-4AE0-9391-D985D3AC6701}" type="slidenum">
+              <a:rPr kumimoji="0" lang="zh-CN" altLang="en-US" sz="1200" b="0" i="0" u="none" strike="noStrike" kern="1200" cap="none" spc="0" normalizeH="0" baseline="0" noProof="0" smtClean="0">
+                <a:ln>
+                  <a:noFill/>
+                </a:ln>
+                <a:solidFill>
+                  <a:prstClr val="black"/>
+                </a:solidFill>
+                <a:effectLst/>
+                <a:uLnTx/>
+                <a:uFillTx/>
+                <a:latin typeface="等线" panose="020F0502020204030204"/>
+                <a:ea typeface="等线" panose="02010600030101010101" pitchFamily="2" charset="-122"/>
+                <a:cs typeface="+mn-cs"/>
+              </a:rPr>
+              <a:pPr marL="0" marR="0" lvl="0" indent="0" algn="r" defTabSz="914400" rtl="0" eaLnBrk="1" fontAlgn="auto" latinLnBrk="0" hangingPunct="1">
+                <a:lnSpc>
+                  <a:spcPct val="100000"/>
+                </a:lnSpc>
+                <a:spcBef>
+                  <a:spcPts val="0"/>
+                </a:spcBef>
+                <a:spcAft>
+                  <a:spcPts val="0"/>
+                </a:spcAft>
+                <a:buClrTx/>
+                <a:buSzTx/>
+                <a:buFontTx/>
+                <a:buNone/>
+                <a:tabLst/>
+                <a:defRPr/>
+              </a:pPr>
+              <a:t>5</a:t>
+            </a:fld>
+            <a:endParaRPr kumimoji="0" lang="zh-CN" altLang="en-US" sz="1200" b="0" i="0" u="none" strike="noStrike" kern="1200" cap="none" spc="0" normalizeH="0" baseline="0" noProof="0">
+              <a:ln>
+                <a:noFill/>
+              </a:ln>
+              <a:solidFill>
+                <a:prstClr val="black"/>
+              </a:solidFill>
+              <a:effectLst/>
+              <a:uLnTx/>
+              <a:uFillTx/>
+              <a:latin typeface="等线" panose="020F0502020204030204"/>
+              <a:ea typeface="等线" panose="02010600030101010101" pitchFamily="2" charset="-122"/>
+              <a:cs typeface="+mn-cs"/>
+            </a:endParaRPr>
+          </a:p>
+        </p:txBody>
+      </p:sp>
+    </p:spTree>
+    <p:extLst>
+      <p:ext uri="{BB962C8B-B14F-4D97-AF65-F5344CB8AC3E}">
+        <p14:creationId xmlns:p14="http://schemas.microsoft.com/office/powerpoint/2010/main" val="4112305785"/>
+      </p:ext>
+    </p:extLst>
+  </p:cSld>
+  <p:clrMapOvr>
+    <a:masterClrMapping/>
+  </p:clrMapOvr>
+</p:notes>
+</file>
+
 <file path=ppt/slideLayouts/slideLayout1.xml><?xml version="1.0" encoding="utf-8"?>
 <p:sldLayout xmlns:a="http://schemas.openxmlformats.org/drawingml/2006/main" xmlns:r="http://schemas.openxmlformats.org/officeDocument/2006/relationships" xmlns:p="http://schemas.openxmlformats.org/presentationml/2006/main" type="title" preserve="1">
   <p:cSld name="标题幻灯片">
@@ -862,7 +1192,7 @@
           <a:p>
             <a:fld id="{22C6D5CB-9E91-4D8B-8A6F-E7E64CE5E759}" type="datetimeFigureOut">
               <a:rPr lang="zh-CN" altLang="en-US" smtClean="0"/>
-              <a:t>2021/11/18</a:t>
+              <a:t>2021/11/26</a:t>
             </a:fld>
             <a:endParaRPr lang="zh-CN" altLang="en-US"/>
           </a:p>
@@ -1060,7 +1390,7 @@
           <a:p>
             <a:fld id="{22C6D5CB-9E91-4D8B-8A6F-E7E64CE5E759}" type="datetimeFigureOut">
               <a:rPr lang="zh-CN" altLang="en-US" smtClean="0"/>
-              <a:t>2021/11/18</a:t>
+              <a:t>2021/11/26</a:t>
             </a:fld>
             <a:endParaRPr lang="zh-CN" altLang="en-US"/>
           </a:p>
@@ -1268,7 +1598,7 @@
           <a:p>
             <a:fld id="{22C6D5CB-9E91-4D8B-8A6F-E7E64CE5E759}" type="datetimeFigureOut">
               <a:rPr lang="zh-CN" altLang="en-US" smtClean="0"/>
-              <a:t>2021/11/18</a:t>
+              <a:t>2021/11/26</a:t>
             </a:fld>
             <a:endParaRPr lang="zh-CN" altLang="en-US"/>
           </a:p>
@@ -1466,7 +1796,7 @@
           <a:p>
             <a:fld id="{22C6D5CB-9E91-4D8B-8A6F-E7E64CE5E759}" type="datetimeFigureOut">
               <a:rPr lang="zh-CN" altLang="en-US" smtClean="0"/>
-              <a:t>2021/11/18</a:t>
+              <a:t>2021/11/26</a:t>
             </a:fld>
             <a:endParaRPr lang="zh-CN" altLang="en-US"/>
           </a:p>
@@ -1741,7 +2071,7 @@
           <a:p>
             <a:fld id="{22C6D5CB-9E91-4D8B-8A6F-E7E64CE5E759}" type="datetimeFigureOut">
               <a:rPr lang="zh-CN" altLang="en-US" smtClean="0"/>
-              <a:t>2021/11/18</a:t>
+              <a:t>2021/11/26</a:t>
             </a:fld>
             <a:endParaRPr lang="zh-CN" altLang="en-US"/>
           </a:p>
@@ -2006,7 +2336,7 @@
           <a:p>
             <a:fld id="{22C6D5CB-9E91-4D8B-8A6F-E7E64CE5E759}" type="datetimeFigureOut">
               <a:rPr lang="zh-CN" altLang="en-US" smtClean="0"/>
-              <a:t>2021/11/18</a:t>
+              <a:t>2021/11/26</a:t>
             </a:fld>
             <a:endParaRPr lang="zh-CN" altLang="en-US"/>
           </a:p>
@@ -2418,7 +2748,7 @@
           <a:p>
             <a:fld id="{22C6D5CB-9E91-4D8B-8A6F-E7E64CE5E759}" type="datetimeFigureOut">
               <a:rPr lang="zh-CN" altLang="en-US" smtClean="0"/>
-              <a:t>2021/11/18</a:t>
+              <a:t>2021/11/26</a:t>
             </a:fld>
             <a:endParaRPr lang="zh-CN" altLang="en-US"/>
           </a:p>
@@ -2559,7 +2889,7 @@
           <a:p>
             <a:fld id="{22C6D5CB-9E91-4D8B-8A6F-E7E64CE5E759}" type="datetimeFigureOut">
               <a:rPr lang="zh-CN" altLang="en-US" smtClean="0"/>
-              <a:t>2021/11/18</a:t>
+              <a:t>2021/11/26</a:t>
             </a:fld>
             <a:endParaRPr lang="zh-CN" altLang="en-US"/>
           </a:p>
@@ -2672,7 +3002,7 @@
           <a:p>
             <a:fld id="{22C6D5CB-9E91-4D8B-8A6F-E7E64CE5E759}" type="datetimeFigureOut">
               <a:rPr lang="zh-CN" altLang="en-US" smtClean="0"/>
-              <a:t>2021/11/18</a:t>
+              <a:t>2021/11/26</a:t>
             </a:fld>
             <a:endParaRPr lang="zh-CN" altLang="en-US"/>
           </a:p>
@@ -2983,7 +3313,7 @@
           <a:p>
             <a:fld id="{22C6D5CB-9E91-4D8B-8A6F-E7E64CE5E759}" type="datetimeFigureOut">
               <a:rPr lang="zh-CN" altLang="en-US" smtClean="0"/>
-              <a:t>2021/11/18</a:t>
+              <a:t>2021/11/26</a:t>
             </a:fld>
             <a:endParaRPr lang="zh-CN" altLang="en-US"/>
           </a:p>
@@ -3271,7 +3601,7 @@
           <a:p>
             <a:fld id="{22C6D5CB-9E91-4D8B-8A6F-E7E64CE5E759}" type="datetimeFigureOut">
               <a:rPr lang="zh-CN" altLang="en-US" smtClean="0"/>
-              <a:t>2021/11/18</a:t>
+              <a:t>2021/11/26</a:t>
             </a:fld>
             <a:endParaRPr lang="zh-CN" altLang="en-US"/>
           </a:p>
@@ -3512,7 +3842,7 @@
           <a:p>
             <a:fld id="{22C6D5CB-9E91-4D8B-8A6F-E7E64CE5E759}" type="datetimeFigureOut">
               <a:rPr lang="zh-CN" altLang="en-US" smtClean="0"/>
-              <a:t>2021/11/18</a:t>
+              <a:t>2021/11/26</a:t>
             </a:fld>
             <a:endParaRPr lang="zh-CN" altLang="en-US"/>
           </a:p>
@@ -4654,96 +4984,6 @@
               </a:p>
             </p:txBody>
           </p:sp>
-          <p:cxnSp>
-            <p:nvCxnSpPr>
-              <p:cNvPr id="14" name="连接符: 曲线 13">
-                <a:extLst>
-                  <a:ext uri="{FF2B5EF4-FFF2-40B4-BE49-F238E27FC236}">
-                    <a16:creationId xmlns:a16="http://schemas.microsoft.com/office/drawing/2014/main" id="{2D0772AF-397B-41F2-AEF9-99E3A640EAFA}"/>
-                  </a:ext>
-                </a:extLst>
-              </p:cNvPr>
-              <p:cNvCxnSpPr>
-                <a:cxnSpLocks/>
-                <a:stCxn id="10" idx="0"/>
-              </p:cNvCxnSpPr>
-              <p:nvPr/>
-            </p:nvCxnSpPr>
-            <p:spPr>
-              <a:xfrm rot="5400000" flipH="1" flipV="1">
-                <a:off x="5446979" y="2909921"/>
-                <a:ext cx="389022" cy="841644"/>
-              </a:xfrm>
-              <a:prstGeom prst="curvedConnector2">
-                <a:avLst/>
-              </a:prstGeom>
-              <a:ln>
-                <a:solidFill>
-                  <a:srgbClr val="FF0000"/>
-                </a:solidFill>
-                <a:tailEnd type="triangle"/>
-              </a:ln>
-            </p:spPr>
-            <p:style>
-              <a:lnRef idx="1">
-                <a:schemeClr val="dk1"/>
-              </a:lnRef>
-              <a:fillRef idx="0">
-                <a:schemeClr val="dk1"/>
-              </a:fillRef>
-              <a:effectRef idx="0">
-                <a:schemeClr val="dk1"/>
-              </a:effectRef>
-              <a:fontRef idx="minor">
-                <a:schemeClr val="tx1"/>
-              </a:fontRef>
-            </p:style>
-          </p:cxnSp>
-          <p:cxnSp>
-            <p:nvCxnSpPr>
-              <p:cNvPr id="27" name="连接符: 曲线 26">
-                <a:extLst>
-                  <a:ext uri="{FF2B5EF4-FFF2-40B4-BE49-F238E27FC236}">
-                    <a16:creationId xmlns:a16="http://schemas.microsoft.com/office/drawing/2014/main" id="{3438D6D3-B864-4C39-B68B-A80B1B91FFBB}"/>
-                  </a:ext>
-                </a:extLst>
-              </p:cNvPr>
-              <p:cNvCxnSpPr>
-                <a:cxnSpLocks/>
-                <a:stCxn id="11" idx="6"/>
-              </p:cNvCxnSpPr>
-              <p:nvPr/>
-            </p:nvCxnSpPr>
-            <p:spPr>
-              <a:xfrm flipV="1">
-                <a:off x="6148940" y="3288632"/>
-                <a:ext cx="65772" cy="590350"/>
-              </a:xfrm>
-              <a:prstGeom prst="curvedConnector2">
-                <a:avLst/>
-              </a:prstGeom>
-              <a:ln>
-                <a:solidFill>
-                  <a:srgbClr val="0000FF"/>
-                </a:solidFill>
-                <a:tailEnd type="triangle"/>
-              </a:ln>
-            </p:spPr>
-            <p:style>
-              <a:lnRef idx="1">
-                <a:schemeClr val="dk1"/>
-              </a:lnRef>
-              <a:fillRef idx="0">
-                <a:schemeClr val="dk1"/>
-              </a:fillRef>
-              <a:effectRef idx="0">
-                <a:schemeClr val="dk1"/>
-              </a:effectRef>
-              <a:fontRef idx="minor">
-                <a:schemeClr val="tx1"/>
-              </a:fontRef>
-            </p:style>
-          </p:cxnSp>
         </p:grpSp>
         <p:cxnSp>
           <p:nvCxnSpPr>
@@ -6173,7 +6413,7 @@
 </file>
 
 <file path=ppt/slides/slide3.xml><?xml version="1.0" encoding="utf-8"?>
-<p:sld xmlns:a="http://schemas.openxmlformats.org/drawingml/2006/main" xmlns:r="http://schemas.openxmlformats.org/officeDocument/2006/relationships" xmlns:p="http://schemas.openxmlformats.org/presentationml/2006/main" show="0">
+<p:sld xmlns:a="http://schemas.openxmlformats.org/drawingml/2006/main" xmlns:r="http://schemas.openxmlformats.org/officeDocument/2006/relationships" xmlns:p="http://schemas.openxmlformats.org/presentationml/2006/main">
   <p:cSld>
     <p:spTree>
       <p:nvGrpSpPr>
@@ -6240,7 +6480,7 @@
                 <a:latin typeface="黑体" panose="02010609060101010101" pitchFamily="49" charset="-122"/>
                 <a:ea typeface="黑体" panose="02010609060101010101" pitchFamily="49" charset="-122"/>
               </a:rPr>
-              <a:t>我们将先进行几轮练习，</a:t>
+              <a:t>游戏开始后，前面六轮将作为练习，</a:t>
             </a:r>
             <a:endParaRPr lang="en-US" altLang="zh-CN" sz="2800" dirty="0">
               <a:latin typeface="黑体" panose="02010609060101010101" pitchFamily="49" charset="-122"/>
@@ -6258,7 +6498,7 @@
                 <a:latin typeface="黑体" panose="02010609060101010101" pitchFamily="49" charset="-122"/>
                 <a:ea typeface="黑体" panose="02010609060101010101" pitchFamily="49" charset="-122"/>
               </a:rPr>
-              <a:t>便于进一步理解规则以及熟悉操作。</a:t>
+              <a:t>便于进一步理解规则以及熟悉操作，不计入成绩。</a:t>
             </a:r>
             <a:endParaRPr lang="en-US" altLang="zh-CN" sz="2800" dirty="0">
               <a:latin typeface="黑体" panose="02010609060101010101" pitchFamily="49" charset="-122"/>
@@ -6295,6 +6535,3505 @@
 </file>
 
 <file path=ppt/slides/slide4.xml><?xml version="1.0" encoding="utf-8"?>
+<p:sld xmlns:a="http://schemas.openxmlformats.org/drawingml/2006/main" xmlns:r="http://schemas.openxmlformats.org/officeDocument/2006/relationships" xmlns:p="http://schemas.openxmlformats.org/presentationml/2006/main">
+  <p:cSld>
+    <p:bg>
+      <p:bgPr>
+        <a:solidFill>
+          <a:schemeClr val="tx1">
+            <a:lumMod val="75000"/>
+            <a:lumOff val="25000"/>
+          </a:schemeClr>
+        </a:solidFill>
+        <a:effectLst/>
+      </p:bgPr>
+    </p:bg>
+    <p:spTree>
+      <p:nvGrpSpPr>
+        <p:cNvPr id="1" name=""/>
+        <p:cNvGrpSpPr/>
+        <p:nvPr/>
+      </p:nvGrpSpPr>
+      <p:grpSpPr>
+        <a:xfrm>
+          <a:off x="0" y="0"/>
+          <a:ext cx="0" cy="0"/>
+          <a:chOff x="0" y="0"/>
+          <a:chExt cx="0" cy="0"/>
+        </a:xfrm>
+      </p:grpSpPr>
+      <p:sp>
+        <p:nvSpPr>
+          <p:cNvPr id="3" name="文本框 2"/>
+          <p:cNvSpPr txBox="1"/>
+          <p:nvPr/>
+        </p:nvSpPr>
+        <p:spPr>
+          <a:xfrm>
+            <a:off x="1126380" y="291072"/>
+            <a:ext cx="10176358" cy="1918154"/>
+          </a:xfrm>
+          <a:prstGeom prst="rect">
+            <a:avLst/>
+          </a:prstGeom>
+          <a:noFill/>
+        </p:spPr>
+        <p:txBody>
+          <a:bodyPr wrap="square" rtlCol="0">
+            <a:spAutoFit/>
+          </a:bodyPr>
+          <a:lstStyle/>
+          <a:p>
+            <a:pPr marL="0" marR="0" lvl="0" indent="0" algn="l" defTabSz="914400" rtl="0" eaLnBrk="1" fontAlgn="auto" latinLnBrk="0" hangingPunct="1">
+              <a:lnSpc>
+                <a:spcPct val="150000"/>
+              </a:lnSpc>
+              <a:spcBef>
+                <a:spcPts val="200"/>
+              </a:spcBef>
+              <a:spcAft>
+                <a:spcPts val="200"/>
+              </a:spcAft>
+              <a:buClrTx/>
+              <a:buSzTx/>
+              <a:buFontTx/>
+              <a:buNone/>
+              <a:tabLst/>
+              <a:defRPr/>
+            </a:pPr>
+            <a:r>
+              <a:rPr kumimoji="0" lang="zh-CN" altLang="en-US" sz="2000" b="0" i="0" u="none" strike="noStrike" kern="1200" cap="none" spc="0" normalizeH="0" baseline="0" noProof="0" dirty="0">
+                <a:ln>
+                  <a:noFill/>
+                </a:ln>
+                <a:solidFill>
+                  <a:prstClr val="white">
+                    <a:lumMod val="95000"/>
+                  </a:prstClr>
+                </a:solidFill>
+                <a:effectLst/>
+                <a:uLnTx/>
+                <a:uFillTx/>
+                <a:latin typeface="黑体" panose="02010609060101010101" pitchFamily="49" charset="-122"/>
+                <a:ea typeface="黑体" panose="02010609060101010101" pitchFamily="49" charset="-122"/>
+                <a:cs typeface="+mn-cs"/>
+              </a:rPr>
+              <a:t>您好，欢迎参与“赏金猎人”游戏！</a:t>
+            </a:r>
+            <a:endParaRPr kumimoji="0" lang="en-US" altLang="zh-CN" sz="2000" b="0" i="0" u="none" strike="noStrike" kern="1200" cap="none" spc="0" normalizeH="0" baseline="0" noProof="0" dirty="0">
+              <a:ln>
+                <a:noFill/>
+              </a:ln>
+              <a:solidFill>
+                <a:prstClr val="white">
+                  <a:lumMod val="95000"/>
+                </a:prstClr>
+              </a:solidFill>
+              <a:effectLst/>
+              <a:uLnTx/>
+              <a:uFillTx/>
+              <a:latin typeface="黑体" panose="02010609060101010101" pitchFamily="49" charset="-122"/>
+              <a:ea typeface="黑体" panose="02010609060101010101" pitchFamily="49" charset="-122"/>
+              <a:cs typeface="+mn-cs"/>
+            </a:endParaRPr>
+          </a:p>
+          <a:p>
+            <a:pPr marL="0" marR="0" lvl="0" indent="0" algn="l" defTabSz="914400" rtl="0" eaLnBrk="1" fontAlgn="auto" latinLnBrk="0" hangingPunct="1">
+              <a:lnSpc>
+                <a:spcPct val="150000"/>
+              </a:lnSpc>
+              <a:spcBef>
+                <a:spcPts val="200"/>
+              </a:spcBef>
+              <a:spcAft>
+                <a:spcPts val="200"/>
+              </a:spcAft>
+              <a:buClrTx/>
+              <a:buSzTx/>
+              <a:buFontTx/>
+              <a:buNone/>
+              <a:tabLst/>
+              <a:defRPr/>
+            </a:pPr>
+            <a:r>
+              <a:rPr kumimoji="0" lang="zh-CN" altLang="en-US" sz="2000" b="0" i="0" u="none" strike="noStrike" kern="1200" cap="none" spc="0" normalizeH="0" baseline="0" noProof="0" dirty="0">
+                <a:ln>
+                  <a:noFill/>
+                </a:ln>
+                <a:solidFill>
+                  <a:prstClr val="white">
+                    <a:lumMod val="95000"/>
+                  </a:prstClr>
+                </a:solidFill>
+                <a:effectLst/>
+                <a:uLnTx/>
+                <a:uFillTx/>
+                <a:latin typeface="黑体" panose="02010609060101010101" pitchFamily="49" charset="-122"/>
+                <a:ea typeface="黑体" panose="02010609060101010101" pitchFamily="49" charset="-122"/>
+                <a:cs typeface="+mn-cs"/>
+              </a:rPr>
+              <a:t>在本游戏中，两名玩家将同时扮演“赏金猎人”（</a:t>
+            </a:r>
+            <a:r>
+              <a:rPr kumimoji="0" lang="zh-CN" altLang="en-US" sz="2000" b="0" i="0" u="none" strike="noStrike" kern="1200" cap="none" spc="0" normalizeH="0" baseline="0" noProof="0" dirty="0">
+                <a:ln>
+                  <a:noFill/>
+                </a:ln>
+                <a:solidFill>
+                  <a:srgbClr val="FF0000"/>
+                </a:solidFill>
+                <a:effectLst/>
+                <a:uLnTx/>
+                <a:uFillTx/>
+                <a:latin typeface="黑体" panose="02010609060101010101" pitchFamily="49" charset="-122"/>
+                <a:ea typeface="黑体" panose="02010609060101010101" pitchFamily="49" charset="-122"/>
+                <a:cs typeface="+mn-cs"/>
+              </a:rPr>
+              <a:t>玩家</a:t>
+            </a:r>
+            <a:r>
+              <a:rPr kumimoji="0" lang="en-US" altLang="zh-CN" sz="2000" b="0" i="0" u="none" strike="noStrike" kern="1200" cap="none" spc="0" normalizeH="0" baseline="0" noProof="0" dirty="0">
+                <a:ln>
+                  <a:noFill/>
+                </a:ln>
+                <a:solidFill>
+                  <a:srgbClr val="FF0000"/>
+                </a:solidFill>
+                <a:effectLst/>
+                <a:uLnTx/>
+                <a:uFillTx/>
+                <a:latin typeface="黑体" panose="02010609060101010101" pitchFamily="49" charset="-122"/>
+                <a:ea typeface="黑体" panose="02010609060101010101" pitchFamily="49" charset="-122"/>
+                <a:cs typeface="+mn-cs"/>
+              </a:rPr>
+              <a:t>1</a:t>
+            </a:r>
+            <a:r>
+              <a:rPr kumimoji="0" lang="zh-CN" altLang="en-US" sz="2000" b="0" i="0" u="none" strike="noStrike" kern="1200" cap="none" spc="0" normalizeH="0" baseline="0" noProof="0" dirty="0">
+                <a:ln>
+                  <a:noFill/>
+                </a:ln>
+                <a:solidFill>
+                  <a:srgbClr val="FF0000"/>
+                </a:solidFill>
+                <a:effectLst/>
+                <a:uLnTx/>
+                <a:uFillTx/>
+                <a:latin typeface="黑体" panose="02010609060101010101" pitchFamily="49" charset="-122"/>
+                <a:ea typeface="黑体" panose="02010609060101010101" pitchFamily="49" charset="-122"/>
+                <a:cs typeface="+mn-cs"/>
+              </a:rPr>
+              <a:t>：红色小球</a:t>
+            </a:r>
+            <a:r>
+              <a:rPr kumimoji="0" lang="zh-CN" altLang="en-US" sz="2000" b="0" i="0" u="none" strike="noStrike" kern="1200" cap="none" spc="0" normalizeH="0" baseline="0" noProof="0" dirty="0">
+                <a:ln>
+                  <a:noFill/>
+                </a:ln>
+                <a:solidFill>
+                  <a:prstClr val="white">
+                    <a:lumMod val="95000"/>
+                  </a:prstClr>
+                </a:solidFill>
+                <a:effectLst/>
+                <a:uLnTx/>
+                <a:uFillTx/>
+                <a:latin typeface="黑体" panose="02010609060101010101" pitchFamily="49" charset="-122"/>
+                <a:ea typeface="黑体" panose="02010609060101010101" pitchFamily="49" charset="-122"/>
+                <a:cs typeface="+mn-cs"/>
+              </a:rPr>
+              <a:t>，</a:t>
+            </a:r>
+            <a:r>
+              <a:rPr kumimoji="0" lang="zh-CN" altLang="en-US" sz="2000" b="0" i="0" u="none" strike="noStrike" kern="1200" cap="none" spc="0" normalizeH="0" baseline="0" noProof="0" dirty="0">
+                <a:ln>
+                  <a:noFill/>
+                </a:ln>
+                <a:solidFill>
+                  <a:srgbClr val="0000FF"/>
+                </a:solidFill>
+                <a:effectLst/>
+                <a:uLnTx/>
+                <a:uFillTx/>
+                <a:latin typeface="黑体" panose="02010609060101010101" pitchFamily="49" charset="-122"/>
+                <a:ea typeface="黑体" panose="02010609060101010101" pitchFamily="49" charset="-122"/>
+                <a:cs typeface="+mn-cs"/>
+              </a:rPr>
+              <a:t>玩家</a:t>
+            </a:r>
+            <a:r>
+              <a:rPr kumimoji="0" lang="en-US" altLang="zh-CN" sz="2000" b="0" i="0" u="none" strike="noStrike" kern="1200" cap="none" spc="0" normalizeH="0" baseline="0" noProof="0" dirty="0">
+                <a:ln>
+                  <a:noFill/>
+                </a:ln>
+                <a:solidFill>
+                  <a:srgbClr val="0000FF"/>
+                </a:solidFill>
+                <a:effectLst/>
+                <a:uLnTx/>
+                <a:uFillTx/>
+                <a:latin typeface="黑体" panose="02010609060101010101" pitchFamily="49" charset="-122"/>
+                <a:ea typeface="黑体" panose="02010609060101010101" pitchFamily="49" charset="-122"/>
+                <a:cs typeface="+mn-cs"/>
+              </a:rPr>
+              <a:t>2</a:t>
+            </a:r>
+            <a:r>
+              <a:rPr kumimoji="0" lang="zh-CN" altLang="en-US" sz="2000" b="0" i="0" u="none" strike="noStrike" kern="1200" cap="none" spc="0" normalizeH="0" baseline="0" noProof="0" dirty="0">
+                <a:ln>
+                  <a:noFill/>
+                </a:ln>
+                <a:solidFill>
+                  <a:srgbClr val="0000FF"/>
+                </a:solidFill>
+                <a:effectLst/>
+                <a:uLnTx/>
+                <a:uFillTx/>
+                <a:latin typeface="黑体" panose="02010609060101010101" pitchFamily="49" charset="-122"/>
+                <a:ea typeface="黑体" panose="02010609060101010101" pitchFamily="49" charset="-122"/>
+                <a:cs typeface="+mn-cs"/>
+              </a:rPr>
+              <a:t>：蓝色小球</a:t>
+            </a:r>
+            <a:r>
+              <a:rPr kumimoji="0" lang="zh-CN" altLang="en-US" sz="2000" b="0" i="0" u="none" strike="noStrike" kern="1200" cap="none" spc="0" normalizeH="0" baseline="0" noProof="0" dirty="0">
+                <a:ln>
+                  <a:noFill/>
+                </a:ln>
+                <a:solidFill>
+                  <a:prstClr val="white">
+                    <a:lumMod val="95000"/>
+                  </a:prstClr>
+                </a:solidFill>
+                <a:effectLst/>
+                <a:uLnTx/>
+                <a:uFillTx/>
+                <a:latin typeface="黑体" panose="02010609060101010101" pitchFamily="49" charset="-122"/>
+                <a:ea typeface="黑体" panose="02010609060101010101" pitchFamily="49" charset="-122"/>
+                <a:cs typeface="+mn-cs"/>
+              </a:rPr>
+              <a:t>，</a:t>
+            </a:r>
+            <a:r>
+              <a:rPr kumimoji="0" lang="zh-CN" altLang="en-US" sz="2000" b="0" i="0" u="none" strike="noStrike" kern="1200" cap="none" spc="0" normalizeH="0" baseline="0" noProof="0" dirty="0">
+                <a:ln>
+                  <a:noFill/>
+                </a:ln>
+                <a:solidFill>
+                  <a:schemeClr val="accent6">
+                    <a:lumMod val="75000"/>
+                  </a:schemeClr>
+                </a:solidFill>
+                <a:effectLst/>
+                <a:uLnTx/>
+                <a:uFillTx/>
+                <a:latin typeface="黑体" panose="02010609060101010101" pitchFamily="49" charset="-122"/>
+                <a:ea typeface="黑体" panose="02010609060101010101" pitchFamily="49" charset="-122"/>
+                <a:cs typeface="+mn-cs"/>
+              </a:rPr>
+              <a:t>玩家</a:t>
+            </a:r>
+            <a:r>
+              <a:rPr kumimoji="0" lang="en-US" altLang="zh-CN" sz="2000" b="0" i="0" u="none" strike="noStrike" kern="1200" cap="none" spc="0" normalizeH="0" baseline="0" noProof="0" dirty="0">
+                <a:ln>
+                  <a:noFill/>
+                </a:ln>
+                <a:solidFill>
+                  <a:schemeClr val="accent6">
+                    <a:lumMod val="75000"/>
+                  </a:schemeClr>
+                </a:solidFill>
+                <a:effectLst/>
+                <a:uLnTx/>
+                <a:uFillTx/>
+                <a:latin typeface="黑体" panose="02010609060101010101" pitchFamily="49" charset="-122"/>
+                <a:ea typeface="黑体" panose="02010609060101010101" pitchFamily="49" charset="-122"/>
+                <a:cs typeface="+mn-cs"/>
+              </a:rPr>
+              <a:t>3</a:t>
+            </a:r>
+            <a:r>
+              <a:rPr kumimoji="0" lang="zh-CN" altLang="en-US" sz="2000" b="0" i="0" u="none" strike="noStrike" kern="1200" cap="none" spc="0" normalizeH="0" baseline="0" noProof="0" dirty="0">
+                <a:ln>
+                  <a:noFill/>
+                </a:ln>
+                <a:solidFill>
+                  <a:schemeClr val="accent6">
+                    <a:lumMod val="75000"/>
+                  </a:schemeClr>
+                </a:solidFill>
+                <a:effectLst/>
+                <a:uLnTx/>
+                <a:uFillTx/>
+                <a:latin typeface="黑体" panose="02010609060101010101" pitchFamily="49" charset="-122"/>
+                <a:ea typeface="黑体" panose="02010609060101010101" pitchFamily="49" charset="-122"/>
+                <a:cs typeface="+mn-cs"/>
+              </a:rPr>
+              <a:t>：绿色小球</a:t>
+            </a:r>
+            <a:r>
+              <a:rPr kumimoji="0" lang="zh-CN" altLang="en-US" sz="2000" b="0" i="0" u="none" strike="noStrike" kern="1200" cap="none" spc="0" normalizeH="0" baseline="0" noProof="0" dirty="0">
+                <a:ln>
+                  <a:noFill/>
+                </a:ln>
+                <a:solidFill>
+                  <a:prstClr val="white">
+                    <a:lumMod val="95000"/>
+                  </a:prstClr>
+                </a:solidFill>
+                <a:effectLst/>
+                <a:uLnTx/>
+                <a:uFillTx/>
+                <a:latin typeface="黑体" panose="02010609060101010101" pitchFamily="49" charset="-122"/>
+                <a:ea typeface="黑体" panose="02010609060101010101" pitchFamily="49" charset="-122"/>
+                <a:cs typeface="+mn-cs"/>
+              </a:rPr>
+              <a:t>），你们的任务是</a:t>
+            </a:r>
+            <a:r>
+              <a:rPr kumimoji="0" lang="zh-CN" altLang="en-US" sz="2000" b="1" i="0" u="none" strike="noStrike" kern="1200" cap="none" spc="0" normalizeH="0" baseline="0" noProof="0" dirty="0">
+                <a:ln>
+                  <a:noFill/>
+                </a:ln>
+                <a:solidFill>
+                  <a:srgbClr val="92D050"/>
+                </a:solidFill>
+                <a:effectLst>
+                  <a:outerShdw blurRad="38100" dist="38100" dir="2700000" algn="tl">
+                    <a:srgbClr val="000000">
+                      <a:alpha val="43137"/>
+                    </a:srgbClr>
+                  </a:outerShdw>
+                </a:effectLst>
+                <a:uLnTx/>
+                <a:uFillTx/>
+                <a:latin typeface="黑体" panose="02010609060101010101" pitchFamily="49" charset="-122"/>
+                <a:ea typeface="黑体" panose="02010609060101010101" pitchFamily="49" charset="-122"/>
+                <a:cs typeface="+mn-cs"/>
+              </a:rPr>
+              <a:t>尽可能多</a:t>
+            </a:r>
+            <a:r>
+              <a:rPr kumimoji="0" lang="zh-CN" altLang="en-US" sz="2000" b="0" i="0" u="none" strike="noStrike" kern="1200" cap="none" spc="0" normalizeH="0" baseline="0" noProof="0" dirty="0">
+                <a:ln>
+                  <a:noFill/>
+                </a:ln>
+                <a:solidFill>
+                  <a:prstClr val="white">
+                    <a:lumMod val="95000"/>
+                  </a:prstClr>
+                </a:solidFill>
+                <a:effectLst>
+                  <a:outerShdw blurRad="38100" dist="38100" dir="2700000" algn="tl">
+                    <a:srgbClr val="000000">
+                      <a:alpha val="43137"/>
+                    </a:srgbClr>
+                  </a:outerShdw>
+                </a:effectLst>
+                <a:uLnTx/>
+                <a:uFillTx/>
+                <a:latin typeface="黑体" panose="02010609060101010101" pitchFamily="49" charset="-122"/>
+                <a:ea typeface="黑体" panose="02010609060101010101" pitchFamily="49" charset="-122"/>
+                <a:cs typeface="+mn-cs"/>
+              </a:rPr>
+              <a:t>地在规定时间内</a:t>
+            </a:r>
+            <a:r>
+              <a:rPr kumimoji="0" lang="zh-CN" altLang="en-US" sz="2000" b="0" i="0" u="none" strike="noStrike" kern="1200" cap="none" spc="0" normalizeH="0" baseline="0" noProof="0" dirty="0">
+                <a:ln>
+                  <a:noFill/>
+                </a:ln>
+                <a:solidFill>
+                  <a:prstClr val="white">
+                    <a:lumMod val="95000"/>
+                  </a:prstClr>
+                </a:solidFill>
+                <a:effectLst/>
+                <a:uLnTx/>
+                <a:uFillTx/>
+                <a:latin typeface="黑体" panose="02010609060101010101" pitchFamily="49" charset="-122"/>
+                <a:ea typeface="黑体" panose="02010609060101010101" pitchFamily="49" charset="-122"/>
+                <a:cs typeface="+mn-cs"/>
+              </a:rPr>
+              <a:t>抓住屏幕中逃跑的“小偷”（</a:t>
+            </a:r>
+            <a:r>
+              <a:rPr kumimoji="0" lang="zh-CN" altLang="en-US" sz="2000" b="0" i="0" u="none" strike="noStrike" kern="1200" cap="none" spc="0" normalizeH="0" baseline="0" noProof="0" dirty="0">
+                <a:ln>
+                  <a:noFill/>
+                </a:ln>
+                <a:solidFill>
+                  <a:srgbClr val="FFA500"/>
+                </a:solidFill>
+                <a:effectLst/>
+                <a:uLnTx/>
+                <a:uFillTx/>
+                <a:latin typeface="黑体" panose="02010609060101010101" pitchFamily="49" charset="-122"/>
+                <a:ea typeface="黑体" panose="02010609060101010101" pitchFamily="49" charset="-122"/>
+                <a:cs typeface="+mn-cs"/>
+              </a:rPr>
+              <a:t>黄色小球</a:t>
+            </a:r>
+            <a:r>
+              <a:rPr kumimoji="0" lang="zh-CN" altLang="en-US" sz="2000" b="0" i="0" u="none" strike="noStrike" kern="1200" cap="none" spc="0" normalizeH="0" baseline="0" noProof="0" dirty="0">
+                <a:ln>
+                  <a:noFill/>
+                </a:ln>
+                <a:solidFill>
+                  <a:prstClr val="white">
+                    <a:lumMod val="95000"/>
+                  </a:prstClr>
+                </a:solidFill>
+                <a:effectLst/>
+                <a:uLnTx/>
+                <a:uFillTx/>
+                <a:latin typeface="黑体" panose="02010609060101010101" pitchFamily="49" charset="-122"/>
+                <a:ea typeface="黑体" panose="02010609060101010101" pitchFamily="49" charset="-122"/>
+                <a:cs typeface="+mn-cs"/>
+              </a:rPr>
+              <a:t>）。</a:t>
+            </a:r>
+            <a:endParaRPr kumimoji="0" lang="en-US" altLang="zh-CN" sz="2000" b="0" i="0" u="none" strike="noStrike" kern="1200" cap="none" spc="0" normalizeH="0" baseline="0" noProof="0" dirty="0">
+              <a:ln>
+                <a:noFill/>
+              </a:ln>
+              <a:solidFill>
+                <a:prstClr val="white">
+                  <a:lumMod val="95000"/>
+                </a:prstClr>
+              </a:solidFill>
+              <a:effectLst/>
+              <a:uLnTx/>
+              <a:uFillTx/>
+              <a:latin typeface="黑体" panose="02010609060101010101" pitchFamily="49" charset="-122"/>
+              <a:ea typeface="黑体" panose="02010609060101010101" pitchFamily="49" charset="-122"/>
+              <a:cs typeface="+mn-cs"/>
+            </a:endParaRPr>
+          </a:p>
+        </p:txBody>
+      </p:sp>
+      <p:grpSp>
+        <p:nvGrpSpPr>
+          <p:cNvPr id="38" name="组合 37">
+            <a:extLst>
+              <a:ext uri="{FF2B5EF4-FFF2-40B4-BE49-F238E27FC236}">
+                <a16:creationId xmlns:a16="http://schemas.microsoft.com/office/drawing/2014/main" id="{16DA0D35-F9ED-43F4-A24F-4625BF4DBD34}"/>
+              </a:ext>
+            </a:extLst>
+          </p:cNvPr>
+          <p:cNvGrpSpPr/>
+          <p:nvPr/>
+        </p:nvGrpSpPr>
+        <p:grpSpPr>
+          <a:xfrm>
+            <a:off x="3546376" y="1819485"/>
+            <a:ext cx="4768912" cy="4772160"/>
+            <a:chOff x="3750055" y="1650006"/>
+            <a:chExt cx="5040000" cy="5043433"/>
+          </a:xfrm>
+        </p:grpSpPr>
+        <p:sp>
+          <p:nvSpPr>
+            <p:cNvPr id="36" name="矩形 35">
+              <a:extLst>
+                <a:ext uri="{FF2B5EF4-FFF2-40B4-BE49-F238E27FC236}">
+                  <a16:creationId xmlns:a16="http://schemas.microsoft.com/office/drawing/2014/main" id="{53C8A41C-5F42-48BD-97FB-9908A02038F8}"/>
+                </a:ext>
+              </a:extLst>
+            </p:cNvPr>
+            <p:cNvSpPr/>
+            <p:nvPr/>
+          </p:nvSpPr>
+          <p:spPr>
+            <a:xfrm>
+              <a:off x="3750055" y="1653439"/>
+              <a:ext cx="5040000" cy="5040000"/>
+            </a:xfrm>
+            <a:prstGeom prst="rect">
+              <a:avLst/>
+            </a:prstGeom>
+            <a:solidFill>
+              <a:schemeClr val="tx1"/>
+            </a:solidFill>
+            <a:ln>
+              <a:noFill/>
+            </a:ln>
+          </p:spPr>
+          <p:style>
+            <a:lnRef idx="2">
+              <a:schemeClr val="accent3">
+                <a:shade val="50000"/>
+              </a:schemeClr>
+            </a:lnRef>
+            <a:fillRef idx="1">
+              <a:schemeClr val="accent3"/>
+            </a:fillRef>
+            <a:effectRef idx="0">
+              <a:schemeClr val="accent3"/>
+            </a:effectRef>
+            <a:fontRef idx="minor">
+              <a:schemeClr val="lt1"/>
+            </a:fontRef>
+          </p:style>
+          <p:txBody>
+            <a:bodyPr rtlCol="0" anchor="ctr"/>
+            <a:lstStyle/>
+            <a:p>
+              <a:pPr marL="0" marR="0" lvl="0" indent="0" algn="ctr" defTabSz="914400" rtl="0" eaLnBrk="1" fontAlgn="auto" latinLnBrk="0" hangingPunct="1">
+                <a:lnSpc>
+                  <a:spcPct val="100000"/>
+                </a:lnSpc>
+                <a:spcBef>
+                  <a:spcPts val="0"/>
+                </a:spcBef>
+                <a:spcAft>
+                  <a:spcPts val="0"/>
+                </a:spcAft>
+                <a:buClrTx/>
+                <a:buSzTx/>
+                <a:buFontTx/>
+                <a:buNone/>
+                <a:tabLst/>
+                <a:defRPr/>
+              </a:pPr>
+              <a:endParaRPr kumimoji="0" lang="zh-CN" altLang="en-US" sz="1800" b="0" i="0" u="none" strike="noStrike" kern="1200" cap="none" spc="0" normalizeH="0" baseline="0" noProof="0" dirty="0">
+                <a:ln>
+                  <a:noFill/>
+                </a:ln>
+                <a:solidFill>
+                  <a:prstClr val="white"/>
+                </a:solidFill>
+                <a:effectLst/>
+                <a:uLnTx/>
+                <a:uFillTx/>
+                <a:latin typeface="等线" panose="020F0502020204030204"/>
+                <a:ea typeface="等线" panose="02010600030101010101" pitchFamily="2" charset="-122"/>
+                <a:cs typeface="+mn-cs"/>
+              </a:endParaRPr>
+            </a:p>
+          </p:txBody>
+        </p:sp>
+        <p:grpSp>
+          <p:nvGrpSpPr>
+            <p:cNvPr id="29" name="组合 28">
+              <a:extLst>
+                <a:ext uri="{FF2B5EF4-FFF2-40B4-BE49-F238E27FC236}">
+                  <a16:creationId xmlns:a16="http://schemas.microsoft.com/office/drawing/2014/main" id="{6A1A71DB-CCFF-46C0-876C-31A54E1E0EB5}"/>
+                </a:ext>
+              </a:extLst>
+            </p:cNvPr>
+            <p:cNvGrpSpPr/>
+            <p:nvPr/>
+          </p:nvGrpSpPr>
+          <p:grpSpPr>
+            <a:xfrm>
+              <a:off x="4153490" y="2056874"/>
+              <a:ext cx="4233130" cy="4233131"/>
+              <a:chOff x="3533447" y="1779270"/>
+              <a:chExt cx="3291401" cy="3318711"/>
+            </a:xfrm>
+          </p:grpSpPr>
+          <p:sp>
+            <p:nvSpPr>
+              <p:cNvPr id="5" name="矩形 4">
+                <a:extLst>
+                  <a:ext uri="{FF2B5EF4-FFF2-40B4-BE49-F238E27FC236}">
+                    <a16:creationId xmlns:a16="http://schemas.microsoft.com/office/drawing/2014/main" id="{0B043D4D-433E-4948-8A1D-948858D8CF9C}"/>
+                  </a:ext>
+                </a:extLst>
+              </p:cNvPr>
+              <p:cNvSpPr/>
+              <p:nvPr/>
+            </p:nvSpPr>
+            <p:spPr>
+              <a:xfrm>
+                <a:off x="3533447" y="1779270"/>
+                <a:ext cx="3291401" cy="3318711"/>
+              </a:xfrm>
+              <a:prstGeom prst="rect">
+                <a:avLst/>
+              </a:prstGeom>
+              <a:ln>
+                <a:noFill/>
+              </a:ln>
+            </p:spPr>
+            <p:style>
+              <a:lnRef idx="2">
+                <a:schemeClr val="accent3">
+                  <a:shade val="50000"/>
+                </a:schemeClr>
+              </a:lnRef>
+              <a:fillRef idx="1">
+                <a:schemeClr val="accent3"/>
+              </a:fillRef>
+              <a:effectRef idx="0">
+                <a:schemeClr val="accent3"/>
+              </a:effectRef>
+              <a:fontRef idx="minor">
+                <a:schemeClr val="lt1"/>
+              </a:fontRef>
+            </p:style>
+            <p:txBody>
+              <a:bodyPr rtlCol="0" anchor="ctr"/>
+              <a:lstStyle/>
+              <a:p>
+                <a:pPr marL="0" marR="0" lvl="0" indent="0" algn="ctr" defTabSz="914400" rtl="0" eaLnBrk="1" fontAlgn="auto" latinLnBrk="0" hangingPunct="1">
+                  <a:lnSpc>
+                    <a:spcPct val="100000"/>
+                  </a:lnSpc>
+                  <a:spcBef>
+                    <a:spcPts val="0"/>
+                  </a:spcBef>
+                  <a:spcAft>
+                    <a:spcPts val="0"/>
+                  </a:spcAft>
+                  <a:buClrTx/>
+                  <a:buSzTx/>
+                  <a:buFontTx/>
+                  <a:buNone/>
+                  <a:tabLst/>
+                  <a:defRPr/>
+                </a:pPr>
+                <a:endParaRPr kumimoji="0" lang="zh-CN" altLang="en-US" sz="1800" b="0" i="0" u="none" strike="noStrike" kern="1200" cap="none" spc="0" normalizeH="0" baseline="0" noProof="0" dirty="0">
+                  <a:ln>
+                    <a:noFill/>
+                  </a:ln>
+                  <a:solidFill>
+                    <a:prstClr val="white"/>
+                  </a:solidFill>
+                  <a:effectLst/>
+                  <a:uLnTx/>
+                  <a:uFillTx/>
+                  <a:latin typeface="等线" panose="020F0502020204030204"/>
+                  <a:ea typeface="等线" panose="02010600030101010101" pitchFamily="2" charset="-122"/>
+                  <a:cs typeface="+mn-cs"/>
+                </a:endParaRPr>
+              </a:p>
+            </p:txBody>
+          </p:sp>
+          <p:sp>
+            <p:nvSpPr>
+              <p:cNvPr id="6" name="椭圆 5">
+                <a:extLst>
+                  <a:ext uri="{FF2B5EF4-FFF2-40B4-BE49-F238E27FC236}">
+                    <a16:creationId xmlns:a16="http://schemas.microsoft.com/office/drawing/2014/main" id="{66086F7F-60B8-4A83-97AB-FA74605F968A}"/>
+                  </a:ext>
+                </a:extLst>
+              </p:cNvPr>
+              <p:cNvSpPr/>
+              <p:nvPr/>
+            </p:nvSpPr>
+            <p:spPr>
+              <a:xfrm>
+                <a:off x="3898231" y="2569945"/>
+                <a:ext cx="173256" cy="173256"/>
+              </a:xfrm>
+              <a:prstGeom prst="ellipse">
+                <a:avLst/>
+              </a:prstGeom>
+              <a:solidFill>
+                <a:srgbClr val="FFA500"/>
+              </a:solidFill>
+              <a:ln>
+                <a:solidFill>
+                  <a:srgbClr val="FFA500"/>
+                </a:solidFill>
+              </a:ln>
+            </p:spPr>
+            <p:style>
+              <a:lnRef idx="2">
+                <a:schemeClr val="accent2">
+                  <a:shade val="50000"/>
+                </a:schemeClr>
+              </a:lnRef>
+              <a:fillRef idx="1">
+                <a:schemeClr val="accent2"/>
+              </a:fillRef>
+              <a:effectRef idx="0">
+                <a:schemeClr val="accent2"/>
+              </a:effectRef>
+              <a:fontRef idx="minor">
+                <a:schemeClr val="lt1"/>
+              </a:fontRef>
+            </p:style>
+            <p:txBody>
+              <a:bodyPr rtlCol="0" anchor="ctr"/>
+              <a:lstStyle/>
+              <a:p>
+                <a:pPr marL="0" marR="0" lvl="0" indent="0" algn="ctr" defTabSz="914400" rtl="0" eaLnBrk="1" fontAlgn="auto" latinLnBrk="0" hangingPunct="1">
+                  <a:lnSpc>
+                    <a:spcPct val="100000"/>
+                  </a:lnSpc>
+                  <a:spcBef>
+                    <a:spcPts val="0"/>
+                  </a:spcBef>
+                  <a:spcAft>
+                    <a:spcPts val="0"/>
+                  </a:spcAft>
+                  <a:buClrTx/>
+                  <a:buSzTx/>
+                  <a:buFontTx/>
+                  <a:buNone/>
+                  <a:tabLst/>
+                  <a:defRPr/>
+                </a:pPr>
+                <a:endParaRPr kumimoji="0" lang="zh-CN" altLang="en-US" sz="1800" b="0" i="0" u="none" strike="noStrike" kern="1200" cap="none" spc="0" normalizeH="0" baseline="0" noProof="0">
+                  <a:ln>
+                    <a:noFill/>
+                  </a:ln>
+                  <a:solidFill>
+                    <a:prstClr val="white"/>
+                  </a:solidFill>
+                  <a:effectLst/>
+                  <a:uLnTx/>
+                  <a:uFillTx/>
+                  <a:latin typeface="等线" panose="020F0502020204030204"/>
+                  <a:ea typeface="等线" panose="02010600030101010101" pitchFamily="2" charset="-122"/>
+                  <a:cs typeface="+mn-cs"/>
+                </a:endParaRPr>
+              </a:p>
+            </p:txBody>
+          </p:sp>
+          <p:sp>
+            <p:nvSpPr>
+              <p:cNvPr id="7" name="椭圆 6">
+                <a:extLst>
+                  <a:ext uri="{FF2B5EF4-FFF2-40B4-BE49-F238E27FC236}">
+                    <a16:creationId xmlns:a16="http://schemas.microsoft.com/office/drawing/2014/main" id="{DC100545-0C66-42DA-A5CD-3C36ED6E7C8D}"/>
+                  </a:ext>
+                </a:extLst>
+              </p:cNvPr>
+              <p:cNvSpPr/>
+              <p:nvPr/>
+            </p:nvSpPr>
+            <p:spPr>
+              <a:xfrm>
+                <a:off x="6081562" y="3049604"/>
+                <a:ext cx="173256" cy="173256"/>
+              </a:xfrm>
+              <a:prstGeom prst="ellipse">
+                <a:avLst/>
+              </a:prstGeom>
+              <a:solidFill>
+                <a:srgbClr val="FFA500"/>
+              </a:solidFill>
+              <a:ln>
+                <a:solidFill>
+                  <a:srgbClr val="FFA500"/>
+                </a:solidFill>
+              </a:ln>
+            </p:spPr>
+            <p:style>
+              <a:lnRef idx="2">
+                <a:schemeClr val="accent2">
+                  <a:shade val="50000"/>
+                </a:schemeClr>
+              </a:lnRef>
+              <a:fillRef idx="1">
+                <a:schemeClr val="accent2"/>
+              </a:fillRef>
+              <a:effectRef idx="0">
+                <a:schemeClr val="accent2"/>
+              </a:effectRef>
+              <a:fontRef idx="minor">
+                <a:schemeClr val="lt1"/>
+              </a:fontRef>
+            </p:style>
+            <p:txBody>
+              <a:bodyPr rtlCol="0" anchor="ctr"/>
+              <a:lstStyle/>
+              <a:p>
+                <a:pPr marL="0" marR="0" lvl="0" indent="0" algn="ctr" defTabSz="914400" rtl="0" eaLnBrk="1" fontAlgn="auto" latinLnBrk="0" hangingPunct="1">
+                  <a:lnSpc>
+                    <a:spcPct val="100000"/>
+                  </a:lnSpc>
+                  <a:spcBef>
+                    <a:spcPts val="0"/>
+                  </a:spcBef>
+                  <a:spcAft>
+                    <a:spcPts val="0"/>
+                  </a:spcAft>
+                  <a:buClrTx/>
+                  <a:buSzTx/>
+                  <a:buFontTx/>
+                  <a:buNone/>
+                  <a:tabLst/>
+                  <a:defRPr/>
+                </a:pPr>
+                <a:endParaRPr kumimoji="0" lang="zh-CN" altLang="en-US" sz="1800" b="0" i="0" u="none" strike="noStrike" kern="1200" cap="none" spc="0" normalizeH="0" baseline="0" noProof="0">
+                  <a:ln>
+                    <a:noFill/>
+                  </a:ln>
+                  <a:solidFill>
+                    <a:prstClr val="white"/>
+                  </a:solidFill>
+                  <a:effectLst/>
+                  <a:uLnTx/>
+                  <a:uFillTx/>
+                  <a:latin typeface="等线" panose="020F0502020204030204"/>
+                  <a:ea typeface="等线" panose="02010600030101010101" pitchFamily="2" charset="-122"/>
+                  <a:cs typeface="+mn-cs"/>
+                </a:endParaRPr>
+              </a:p>
+            </p:txBody>
+          </p:sp>
+          <p:sp>
+            <p:nvSpPr>
+              <p:cNvPr id="8" name="椭圆 7">
+                <a:extLst>
+                  <a:ext uri="{FF2B5EF4-FFF2-40B4-BE49-F238E27FC236}">
+                    <a16:creationId xmlns:a16="http://schemas.microsoft.com/office/drawing/2014/main" id="{81D5187F-EC26-42A7-BCB8-5CDECA8697D8}"/>
+                  </a:ext>
+                </a:extLst>
+              </p:cNvPr>
+              <p:cNvSpPr/>
+              <p:nvPr/>
+            </p:nvSpPr>
+            <p:spPr>
+              <a:xfrm>
+                <a:off x="4198125" y="3438626"/>
+                <a:ext cx="173256" cy="173256"/>
+              </a:xfrm>
+              <a:prstGeom prst="ellipse">
+                <a:avLst/>
+              </a:prstGeom>
+              <a:solidFill>
+                <a:srgbClr val="FFA500"/>
+              </a:solidFill>
+              <a:ln>
+                <a:solidFill>
+                  <a:srgbClr val="FFA500"/>
+                </a:solidFill>
+              </a:ln>
+            </p:spPr>
+            <p:style>
+              <a:lnRef idx="2">
+                <a:schemeClr val="accent2">
+                  <a:shade val="50000"/>
+                </a:schemeClr>
+              </a:lnRef>
+              <a:fillRef idx="1">
+                <a:schemeClr val="accent2"/>
+              </a:fillRef>
+              <a:effectRef idx="0">
+                <a:schemeClr val="accent2"/>
+              </a:effectRef>
+              <a:fontRef idx="minor">
+                <a:schemeClr val="lt1"/>
+              </a:fontRef>
+            </p:style>
+            <p:txBody>
+              <a:bodyPr rtlCol="0" anchor="ctr"/>
+              <a:lstStyle/>
+              <a:p>
+                <a:pPr marL="0" marR="0" lvl="0" indent="0" algn="ctr" defTabSz="914400" rtl="0" eaLnBrk="1" fontAlgn="auto" latinLnBrk="0" hangingPunct="1">
+                  <a:lnSpc>
+                    <a:spcPct val="100000"/>
+                  </a:lnSpc>
+                  <a:spcBef>
+                    <a:spcPts val="0"/>
+                  </a:spcBef>
+                  <a:spcAft>
+                    <a:spcPts val="0"/>
+                  </a:spcAft>
+                  <a:buClrTx/>
+                  <a:buSzTx/>
+                  <a:buFontTx/>
+                  <a:buNone/>
+                  <a:tabLst/>
+                  <a:defRPr/>
+                </a:pPr>
+                <a:endParaRPr kumimoji="0" lang="zh-CN" altLang="en-US" sz="1800" b="0" i="0" u="none" strike="noStrike" kern="1200" cap="none" spc="0" normalizeH="0" baseline="0" noProof="0">
+                  <a:ln>
+                    <a:noFill/>
+                  </a:ln>
+                  <a:solidFill>
+                    <a:prstClr val="white"/>
+                  </a:solidFill>
+                  <a:effectLst/>
+                  <a:uLnTx/>
+                  <a:uFillTx/>
+                  <a:latin typeface="等线" panose="020F0502020204030204"/>
+                  <a:ea typeface="等线" panose="02010600030101010101" pitchFamily="2" charset="-122"/>
+                  <a:cs typeface="+mn-cs"/>
+                </a:endParaRPr>
+              </a:p>
+            </p:txBody>
+          </p:sp>
+          <p:sp>
+            <p:nvSpPr>
+              <p:cNvPr id="9" name="椭圆 8">
+                <a:extLst>
+                  <a:ext uri="{FF2B5EF4-FFF2-40B4-BE49-F238E27FC236}">
+                    <a16:creationId xmlns:a16="http://schemas.microsoft.com/office/drawing/2014/main" id="{8AB024DF-FD6F-4DEC-A1A6-A76E5D25F6AB}"/>
+                  </a:ext>
+                </a:extLst>
+              </p:cNvPr>
+              <p:cNvSpPr/>
+              <p:nvPr/>
+            </p:nvSpPr>
+            <p:spPr>
+              <a:xfrm>
+                <a:off x="5005891" y="4676273"/>
+                <a:ext cx="173256" cy="173256"/>
+              </a:xfrm>
+              <a:prstGeom prst="ellipse">
+                <a:avLst/>
+              </a:prstGeom>
+              <a:solidFill>
+                <a:srgbClr val="FFA500"/>
+              </a:solidFill>
+              <a:ln>
+                <a:solidFill>
+                  <a:srgbClr val="FFA500"/>
+                </a:solidFill>
+              </a:ln>
+            </p:spPr>
+            <p:style>
+              <a:lnRef idx="2">
+                <a:schemeClr val="accent2">
+                  <a:shade val="50000"/>
+                </a:schemeClr>
+              </a:lnRef>
+              <a:fillRef idx="1">
+                <a:schemeClr val="accent2"/>
+              </a:fillRef>
+              <a:effectRef idx="0">
+                <a:schemeClr val="accent2"/>
+              </a:effectRef>
+              <a:fontRef idx="minor">
+                <a:schemeClr val="lt1"/>
+              </a:fontRef>
+            </p:style>
+            <p:txBody>
+              <a:bodyPr rtlCol="0" anchor="ctr"/>
+              <a:lstStyle/>
+              <a:p>
+                <a:pPr marL="0" marR="0" lvl="0" indent="0" algn="ctr" defTabSz="914400" rtl="0" eaLnBrk="1" fontAlgn="auto" latinLnBrk="0" hangingPunct="1">
+                  <a:lnSpc>
+                    <a:spcPct val="100000"/>
+                  </a:lnSpc>
+                  <a:spcBef>
+                    <a:spcPts val="0"/>
+                  </a:spcBef>
+                  <a:spcAft>
+                    <a:spcPts val="0"/>
+                  </a:spcAft>
+                  <a:buClrTx/>
+                  <a:buSzTx/>
+                  <a:buFontTx/>
+                  <a:buNone/>
+                  <a:tabLst/>
+                  <a:defRPr/>
+                </a:pPr>
+                <a:endParaRPr kumimoji="0" lang="zh-CN" altLang="en-US" sz="1800" b="0" i="0" u="none" strike="noStrike" kern="1200" cap="none" spc="0" normalizeH="0" baseline="0" noProof="0">
+                  <a:ln>
+                    <a:noFill/>
+                  </a:ln>
+                  <a:solidFill>
+                    <a:prstClr val="white"/>
+                  </a:solidFill>
+                  <a:effectLst/>
+                  <a:uLnTx/>
+                  <a:uFillTx/>
+                  <a:latin typeface="等线" panose="020F0502020204030204"/>
+                  <a:ea typeface="等线" panose="02010600030101010101" pitchFamily="2" charset="-122"/>
+                  <a:cs typeface="+mn-cs"/>
+                </a:endParaRPr>
+              </a:p>
+            </p:txBody>
+          </p:sp>
+          <p:sp>
+            <p:nvSpPr>
+              <p:cNvPr id="10" name="椭圆 9">
+                <a:extLst>
+                  <a:ext uri="{FF2B5EF4-FFF2-40B4-BE49-F238E27FC236}">
+                    <a16:creationId xmlns:a16="http://schemas.microsoft.com/office/drawing/2014/main" id="{85281FF0-F85C-498D-AA10-9F8265AB568F}"/>
+                  </a:ext>
+                </a:extLst>
+              </p:cNvPr>
+              <p:cNvSpPr/>
+              <p:nvPr/>
+            </p:nvSpPr>
+            <p:spPr>
+              <a:xfrm>
+                <a:off x="5134040" y="3525254"/>
+                <a:ext cx="173256" cy="173256"/>
+              </a:xfrm>
+              <a:prstGeom prst="ellipse">
+                <a:avLst/>
+              </a:prstGeom>
+              <a:solidFill>
+                <a:srgbClr val="C00000"/>
+              </a:solidFill>
+              <a:ln>
+                <a:solidFill>
+                  <a:srgbClr val="C00000"/>
+                </a:solidFill>
+              </a:ln>
+            </p:spPr>
+            <p:style>
+              <a:lnRef idx="2">
+                <a:schemeClr val="accent1">
+                  <a:shade val="50000"/>
+                </a:schemeClr>
+              </a:lnRef>
+              <a:fillRef idx="1">
+                <a:schemeClr val="accent1"/>
+              </a:fillRef>
+              <a:effectRef idx="0">
+                <a:schemeClr val="accent1"/>
+              </a:effectRef>
+              <a:fontRef idx="minor">
+                <a:schemeClr val="lt1"/>
+              </a:fontRef>
+            </p:style>
+            <p:txBody>
+              <a:bodyPr rtlCol="0" anchor="ctr"/>
+              <a:lstStyle/>
+              <a:p>
+                <a:pPr marL="0" marR="0" lvl="0" indent="0" algn="ctr" defTabSz="914400" rtl="0" eaLnBrk="1" fontAlgn="auto" latinLnBrk="0" hangingPunct="1">
+                  <a:lnSpc>
+                    <a:spcPct val="100000"/>
+                  </a:lnSpc>
+                  <a:spcBef>
+                    <a:spcPts val="0"/>
+                  </a:spcBef>
+                  <a:spcAft>
+                    <a:spcPts val="0"/>
+                  </a:spcAft>
+                  <a:buClrTx/>
+                  <a:buSzTx/>
+                  <a:buFontTx/>
+                  <a:buNone/>
+                  <a:tabLst/>
+                  <a:defRPr/>
+                </a:pPr>
+                <a:endParaRPr kumimoji="0" lang="zh-CN" altLang="en-US" sz="1800" b="0" i="0" u="none" strike="noStrike" kern="1200" cap="none" spc="0" normalizeH="0" baseline="0" noProof="0" dirty="0">
+                  <a:ln>
+                    <a:noFill/>
+                  </a:ln>
+                  <a:solidFill>
+                    <a:srgbClr val="C00000"/>
+                  </a:solidFill>
+                  <a:effectLst/>
+                  <a:uLnTx/>
+                  <a:uFillTx/>
+                  <a:latin typeface="等线" panose="020F0502020204030204"/>
+                  <a:ea typeface="等线" panose="02010600030101010101" pitchFamily="2" charset="-122"/>
+                  <a:cs typeface="+mn-cs"/>
+                </a:endParaRPr>
+              </a:p>
+            </p:txBody>
+          </p:sp>
+          <p:sp>
+            <p:nvSpPr>
+              <p:cNvPr id="11" name="椭圆 10">
+                <a:extLst>
+                  <a:ext uri="{FF2B5EF4-FFF2-40B4-BE49-F238E27FC236}">
+                    <a16:creationId xmlns:a16="http://schemas.microsoft.com/office/drawing/2014/main" id="{80A792D0-7DC2-4A65-AE32-FF35A391FB25}"/>
+                  </a:ext>
+                </a:extLst>
+              </p:cNvPr>
+              <p:cNvSpPr/>
+              <p:nvPr/>
+            </p:nvSpPr>
+            <p:spPr>
+              <a:xfrm>
+                <a:off x="5975684" y="3792354"/>
+                <a:ext cx="173256" cy="173256"/>
+              </a:xfrm>
+              <a:prstGeom prst="ellipse">
+                <a:avLst/>
+              </a:prstGeom>
+              <a:solidFill>
+                <a:srgbClr val="0000CD"/>
+              </a:solidFill>
+              <a:ln>
+                <a:solidFill>
+                  <a:srgbClr val="0000CD"/>
+                </a:solidFill>
+              </a:ln>
+            </p:spPr>
+            <p:style>
+              <a:lnRef idx="2">
+                <a:schemeClr val="accent4">
+                  <a:shade val="50000"/>
+                </a:schemeClr>
+              </a:lnRef>
+              <a:fillRef idx="1">
+                <a:schemeClr val="accent4"/>
+              </a:fillRef>
+              <a:effectRef idx="0">
+                <a:schemeClr val="accent4"/>
+              </a:effectRef>
+              <a:fontRef idx="minor">
+                <a:schemeClr val="lt1"/>
+              </a:fontRef>
+            </p:style>
+            <p:txBody>
+              <a:bodyPr rtlCol="0" anchor="ctr"/>
+              <a:lstStyle/>
+              <a:p>
+                <a:pPr marL="0" marR="0" lvl="0" indent="0" algn="ctr" defTabSz="914400" rtl="0" eaLnBrk="1" fontAlgn="auto" latinLnBrk="0" hangingPunct="1">
+                  <a:lnSpc>
+                    <a:spcPct val="100000"/>
+                  </a:lnSpc>
+                  <a:spcBef>
+                    <a:spcPts val="0"/>
+                  </a:spcBef>
+                  <a:spcAft>
+                    <a:spcPts val="0"/>
+                  </a:spcAft>
+                  <a:buClrTx/>
+                  <a:buSzTx/>
+                  <a:buFontTx/>
+                  <a:buNone/>
+                  <a:tabLst/>
+                  <a:defRPr/>
+                </a:pPr>
+                <a:endParaRPr kumimoji="0" lang="zh-CN" altLang="en-US" sz="1800" b="0" i="0" u="none" strike="noStrike" kern="1200" cap="none" spc="0" normalizeH="0" baseline="0" noProof="0">
+                  <a:ln>
+                    <a:noFill/>
+                  </a:ln>
+                  <a:solidFill>
+                    <a:prstClr val="white"/>
+                  </a:solidFill>
+                  <a:effectLst/>
+                  <a:uLnTx/>
+                  <a:uFillTx/>
+                  <a:latin typeface="等线" panose="020F0502020204030204"/>
+                  <a:ea typeface="等线" panose="02010600030101010101" pitchFamily="2" charset="-122"/>
+                  <a:cs typeface="+mn-cs"/>
+                </a:endParaRPr>
+              </a:p>
+            </p:txBody>
+          </p:sp>
+        </p:grpSp>
+        <p:cxnSp>
+          <p:nvCxnSpPr>
+            <p:cNvPr id="17" name="连接符: 曲线 16">
+              <a:extLst>
+                <a:ext uri="{FF2B5EF4-FFF2-40B4-BE49-F238E27FC236}">
+                  <a16:creationId xmlns:a16="http://schemas.microsoft.com/office/drawing/2014/main" id="{1BA0408C-C56D-4BA3-8343-CCB94E0EE64C}"/>
+                </a:ext>
+              </a:extLst>
+            </p:cNvPr>
+            <p:cNvCxnSpPr>
+              <a:cxnSpLocks/>
+              <a:stCxn id="7" idx="7"/>
+            </p:cNvCxnSpPr>
+            <p:nvPr/>
+          </p:nvCxnSpPr>
+          <p:spPr>
+            <a:xfrm rot="5400000" flipH="1" flipV="1">
+              <a:off x="7770754" y="3189024"/>
+              <a:ext cx="370679" cy="670460"/>
+            </a:xfrm>
+            <a:prstGeom prst="curvedConnector2">
+              <a:avLst/>
+            </a:prstGeom>
+            <a:ln>
+              <a:tailEnd type="triangle"/>
+            </a:ln>
+          </p:spPr>
+          <p:style>
+            <a:lnRef idx="1">
+              <a:schemeClr val="accent2"/>
+            </a:lnRef>
+            <a:fillRef idx="0">
+              <a:schemeClr val="accent2"/>
+            </a:fillRef>
+            <a:effectRef idx="0">
+              <a:schemeClr val="accent2"/>
+            </a:effectRef>
+            <a:fontRef idx="minor">
+              <a:schemeClr val="tx1"/>
+            </a:fontRef>
+          </p:style>
+        </p:cxnSp>
+        <p:cxnSp>
+          <p:nvCxnSpPr>
+            <p:cNvPr id="21" name="连接符: 曲线 20">
+              <a:extLst>
+                <a:ext uri="{FF2B5EF4-FFF2-40B4-BE49-F238E27FC236}">
+                  <a16:creationId xmlns:a16="http://schemas.microsoft.com/office/drawing/2014/main" id="{61449E04-70B9-4021-8B8D-F2C8170F9C67}"/>
+                </a:ext>
+              </a:extLst>
+            </p:cNvPr>
+            <p:cNvCxnSpPr>
+              <a:cxnSpLocks/>
+              <a:stCxn id="6" idx="1"/>
+            </p:cNvCxnSpPr>
+            <p:nvPr/>
+          </p:nvCxnSpPr>
+          <p:spPr>
+            <a:xfrm rot="16200000" flipV="1">
+              <a:off x="4285859" y="2728352"/>
+              <a:ext cx="335521" cy="403317"/>
+            </a:xfrm>
+            <a:prstGeom prst="curvedConnector2">
+              <a:avLst/>
+            </a:prstGeom>
+            <a:ln>
+              <a:tailEnd type="triangle"/>
+            </a:ln>
+          </p:spPr>
+          <p:style>
+            <a:lnRef idx="1">
+              <a:schemeClr val="accent2"/>
+            </a:lnRef>
+            <a:fillRef idx="0">
+              <a:schemeClr val="accent2"/>
+            </a:fillRef>
+            <a:effectRef idx="0">
+              <a:schemeClr val="accent2"/>
+            </a:effectRef>
+            <a:fontRef idx="minor">
+              <a:schemeClr val="tx1"/>
+            </a:fontRef>
+          </p:style>
+        </p:cxnSp>
+        <p:cxnSp>
+          <p:nvCxnSpPr>
+            <p:cNvPr id="24" name="连接符: 曲线 23">
+              <a:extLst>
+                <a:ext uri="{FF2B5EF4-FFF2-40B4-BE49-F238E27FC236}">
+                  <a16:creationId xmlns:a16="http://schemas.microsoft.com/office/drawing/2014/main" id="{1C1B8944-B13B-42DA-8FA6-4D9EA0E47CA1}"/>
+                </a:ext>
+              </a:extLst>
+            </p:cNvPr>
+            <p:cNvCxnSpPr>
+              <a:cxnSpLocks/>
+              <a:stCxn id="8" idx="0"/>
+            </p:cNvCxnSpPr>
+            <p:nvPr/>
+          </p:nvCxnSpPr>
+          <p:spPr>
+            <a:xfrm rot="16200000" flipV="1">
+              <a:off x="4733032" y="3786714"/>
+              <a:ext cx="385714" cy="387738"/>
+            </a:xfrm>
+            <a:prstGeom prst="curvedConnector2">
+              <a:avLst/>
+            </a:prstGeom>
+            <a:ln>
+              <a:tailEnd type="triangle"/>
+            </a:ln>
+          </p:spPr>
+          <p:style>
+            <a:lnRef idx="1">
+              <a:schemeClr val="accent2"/>
+            </a:lnRef>
+            <a:fillRef idx="0">
+              <a:schemeClr val="accent2"/>
+            </a:fillRef>
+            <a:effectRef idx="0">
+              <a:schemeClr val="accent2"/>
+            </a:effectRef>
+            <a:fontRef idx="minor">
+              <a:schemeClr val="tx1"/>
+            </a:fontRef>
+          </p:style>
+        </p:cxnSp>
+        <p:cxnSp>
+          <p:nvCxnSpPr>
+            <p:cNvPr id="28" name="连接符: 曲线 27">
+              <a:extLst>
+                <a:ext uri="{FF2B5EF4-FFF2-40B4-BE49-F238E27FC236}">
+                  <a16:creationId xmlns:a16="http://schemas.microsoft.com/office/drawing/2014/main" id="{211A2E74-9904-4451-AF5C-1A6D7177562E}"/>
+                </a:ext>
+              </a:extLst>
+            </p:cNvPr>
+            <p:cNvCxnSpPr>
+              <a:cxnSpLocks/>
+              <a:stCxn id="9" idx="1"/>
+            </p:cNvCxnSpPr>
+            <p:nvPr/>
+          </p:nvCxnSpPr>
+          <p:spPr>
+            <a:xfrm rot="16200000" flipV="1">
+              <a:off x="5740777" y="5445383"/>
+              <a:ext cx="305686" cy="372479"/>
+            </a:xfrm>
+            <a:prstGeom prst="curvedConnector2">
+              <a:avLst/>
+            </a:prstGeom>
+            <a:ln>
+              <a:tailEnd type="triangle"/>
+            </a:ln>
+          </p:spPr>
+          <p:style>
+            <a:lnRef idx="1">
+              <a:schemeClr val="accent2"/>
+            </a:lnRef>
+            <a:fillRef idx="0">
+              <a:schemeClr val="accent2"/>
+            </a:fillRef>
+            <a:effectRef idx="0">
+              <a:schemeClr val="accent2"/>
+            </a:effectRef>
+            <a:fontRef idx="minor">
+              <a:schemeClr val="tx1"/>
+            </a:fontRef>
+          </p:style>
+        </p:cxnSp>
+        <p:sp>
+          <p:nvSpPr>
+            <p:cNvPr id="16" name="文本框 15">
+              <a:extLst>
+                <a:ext uri="{FF2B5EF4-FFF2-40B4-BE49-F238E27FC236}">
+                  <a16:creationId xmlns:a16="http://schemas.microsoft.com/office/drawing/2014/main" id="{724925E5-3D70-446F-A302-0C3CCD84CC96}"/>
+                </a:ext>
+              </a:extLst>
+            </p:cNvPr>
+            <p:cNvSpPr txBox="1"/>
+            <p:nvPr/>
+          </p:nvSpPr>
+          <p:spPr>
+            <a:xfrm>
+              <a:off x="4074570" y="1650006"/>
+              <a:ext cx="1318978" cy="400110"/>
+            </a:xfrm>
+            <a:prstGeom prst="rect">
+              <a:avLst/>
+            </a:prstGeom>
+            <a:noFill/>
+          </p:spPr>
+          <p:txBody>
+            <a:bodyPr wrap="square" rtlCol="0">
+              <a:spAutoFit/>
+            </a:bodyPr>
+            <a:lstStyle/>
+            <a:p>
+              <a:pPr marL="0" marR="0" lvl="0" indent="0" algn="l" defTabSz="914400" rtl="0" eaLnBrk="1" fontAlgn="auto" latinLnBrk="0" hangingPunct="1">
+                <a:lnSpc>
+                  <a:spcPct val="100000"/>
+                </a:lnSpc>
+                <a:spcBef>
+                  <a:spcPts val="0"/>
+                </a:spcBef>
+                <a:spcAft>
+                  <a:spcPts val="0"/>
+                </a:spcAft>
+                <a:buClrTx/>
+                <a:buSzTx/>
+                <a:buFontTx/>
+                <a:buNone/>
+                <a:tabLst/>
+                <a:defRPr/>
+              </a:pPr>
+              <a:r>
+                <a:rPr kumimoji="0" lang="en-US" altLang="zh-CN" sz="1800" b="1" i="0" u="none" strike="noStrike" kern="1200" cap="none" spc="0" normalizeH="0" baseline="0" noProof="0" dirty="0">
+                  <a:ln>
+                    <a:noFill/>
+                  </a:ln>
+                  <a:solidFill>
+                    <a:prstClr val="white"/>
+                  </a:solidFill>
+                  <a:effectLst/>
+                  <a:uLnTx/>
+                  <a:uFillTx/>
+                  <a:latin typeface="等线" panose="020F0502020204030204"/>
+                  <a:ea typeface="等线" panose="02010600030101010101" pitchFamily="2" charset="-122"/>
+                  <a:cs typeface="+mn-cs"/>
+                </a:rPr>
+                <a:t>Time: 15s</a:t>
+              </a:r>
+              <a:endParaRPr kumimoji="0" lang="zh-CN" altLang="en-US" sz="1800" b="1" i="0" u="none" strike="noStrike" kern="1200" cap="none" spc="0" normalizeH="0" baseline="0" noProof="0" dirty="0">
+                <a:ln>
+                  <a:noFill/>
+                </a:ln>
+                <a:solidFill>
+                  <a:prstClr val="white"/>
+                </a:solidFill>
+                <a:effectLst/>
+                <a:uLnTx/>
+                <a:uFillTx/>
+                <a:latin typeface="等线" panose="020F0502020204030204"/>
+                <a:ea typeface="等线" panose="02010600030101010101" pitchFamily="2" charset="-122"/>
+                <a:cs typeface="+mn-cs"/>
+              </a:endParaRPr>
+            </a:p>
+          </p:txBody>
+        </p:sp>
+        <p:sp>
+          <p:nvSpPr>
+            <p:cNvPr id="37" name="文本框 36">
+              <a:extLst>
+                <a:ext uri="{FF2B5EF4-FFF2-40B4-BE49-F238E27FC236}">
+                  <a16:creationId xmlns:a16="http://schemas.microsoft.com/office/drawing/2014/main" id="{F3F5A9F8-B6B0-4EAA-A614-89F82548397C}"/>
+                </a:ext>
+              </a:extLst>
+            </p:cNvPr>
+            <p:cNvSpPr txBox="1"/>
+            <p:nvPr/>
+          </p:nvSpPr>
+          <p:spPr>
+            <a:xfrm>
+              <a:off x="6682274" y="1655198"/>
+              <a:ext cx="1825122" cy="400110"/>
+            </a:xfrm>
+            <a:prstGeom prst="rect">
+              <a:avLst/>
+            </a:prstGeom>
+            <a:noFill/>
+          </p:spPr>
+          <p:txBody>
+            <a:bodyPr wrap="square" rtlCol="0">
+              <a:spAutoFit/>
+            </a:bodyPr>
+            <a:lstStyle/>
+            <a:p>
+              <a:pPr marL="0" marR="0" lvl="0" indent="0" algn="l" defTabSz="914400" rtl="0" eaLnBrk="1" fontAlgn="auto" latinLnBrk="0" hangingPunct="1">
+                <a:lnSpc>
+                  <a:spcPct val="100000"/>
+                </a:lnSpc>
+                <a:spcBef>
+                  <a:spcPts val="0"/>
+                </a:spcBef>
+                <a:spcAft>
+                  <a:spcPts val="0"/>
+                </a:spcAft>
+                <a:buClrTx/>
+                <a:buSzTx/>
+                <a:buFontTx/>
+                <a:buNone/>
+                <a:tabLst/>
+                <a:defRPr/>
+              </a:pPr>
+              <a:r>
+                <a:rPr kumimoji="0" lang="en-US" altLang="zh-CN" sz="1800" b="1" i="0" u="none" strike="noStrike" kern="1200" cap="none" spc="0" normalizeH="0" baseline="0" noProof="0" dirty="0">
+                  <a:ln>
+                    <a:noFill/>
+                  </a:ln>
+                  <a:solidFill>
+                    <a:srgbClr val="00FF00"/>
+                  </a:solidFill>
+                  <a:effectLst/>
+                  <a:uLnTx/>
+                  <a:uFillTx/>
+                  <a:latin typeface="等线" panose="020F0502020204030204"/>
+                  <a:ea typeface="等线" panose="02010600030101010101" pitchFamily="2" charset="-122"/>
+                  <a:cs typeface="+mn-cs"/>
+                </a:rPr>
+                <a:t>Total Score: 0</a:t>
+              </a:r>
+              <a:endParaRPr kumimoji="0" lang="zh-CN" altLang="en-US" sz="1800" b="1" i="0" u="none" strike="noStrike" kern="1200" cap="none" spc="0" normalizeH="0" baseline="0" noProof="0" dirty="0">
+                <a:ln>
+                  <a:noFill/>
+                </a:ln>
+                <a:solidFill>
+                  <a:srgbClr val="00FF00"/>
+                </a:solidFill>
+                <a:effectLst/>
+                <a:uLnTx/>
+                <a:uFillTx/>
+                <a:latin typeface="等线" panose="020F0502020204030204"/>
+                <a:ea typeface="等线" panose="02010600030101010101" pitchFamily="2" charset="-122"/>
+                <a:cs typeface="+mn-cs"/>
+              </a:endParaRPr>
+            </a:p>
+          </p:txBody>
+        </p:sp>
+      </p:grpSp>
+      <p:sp>
+        <p:nvSpPr>
+          <p:cNvPr id="22" name="椭圆 21">
+            <a:extLst>
+              <a:ext uri="{FF2B5EF4-FFF2-40B4-BE49-F238E27FC236}">
+                <a16:creationId xmlns:a16="http://schemas.microsoft.com/office/drawing/2014/main" id="{104D1C9A-BCFB-4096-853F-64B1847D993C}"/>
+              </a:ext>
+            </a:extLst>
+          </p:cNvPr>
+          <p:cNvSpPr/>
+          <p:nvPr/>
+        </p:nvSpPr>
+        <p:spPr>
+          <a:xfrm>
+            <a:off x="5557362" y="3512111"/>
+            <a:ext cx="210842" cy="209107"/>
+          </a:xfrm>
+          <a:prstGeom prst="ellipse">
+            <a:avLst/>
+          </a:prstGeom>
+          <a:solidFill>
+            <a:schemeClr val="accent6">
+              <a:lumMod val="75000"/>
+            </a:schemeClr>
+          </a:solidFill>
+          <a:ln>
+            <a:solidFill>
+              <a:schemeClr val="accent6">
+                <a:lumMod val="75000"/>
+              </a:schemeClr>
+            </a:solidFill>
+          </a:ln>
+        </p:spPr>
+        <p:style>
+          <a:lnRef idx="2">
+            <a:schemeClr val="accent1">
+              <a:shade val="50000"/>
+            </a:schemeClr>
+          </a:lnRef>
+          <a:fillRef idx="1">
+            <a:schemeClr val="accent1"/>
+          </a:fillRef>
+          <a:effectRef idx="0">
+            <a:schemeClr val="accent1"/>
+          </a:effectRef>
+          <a:fontRef idx="minor">
+            <a:schemeClr val="lt1"/>
+          </a:fontRef>
+        </p:style>
+        <p:txBody>
+          <a:bodyPr rtlCol="0" anchor="ctr"/>
+          <a:lstStyle/>
+          <a:p>
+            <a:pPr marL="0" marR="0" lvl="0" indent="0" algn="ctr" defTabSz="914400" rtl="0" eaLnBrk="1" fontAlgn="auto" latinLnBrk="0" hangingPunct="1">
+              <a:lnSpc>
+                <a:spcPct val="100000"/>
+              </a:lnSpc>
+              <a:spcBef>
+                <a:spcPts val="0"/>
+              </a:spcBef>
+              <a:spcAft>
+                <a:spcPts val="0"/>
+              </a:spcAft>
+              <a:buClrTx/>
+              <a:buSzTx/>
+              <a:buFontTx/>
+              <a:buNone/>
+              <a:tabLst/>
+              <a:defRPr/>
+            </a:pPr>
+            <a:endParaRPr kumimoji="0" lang="zh-CN" altLang="en-US" sz="1800" b="0" i="0" u="none" strike="noStrike" kern="1200" cap="none" spc="0" normalizeH="0" baseline="0" noProof="0" dirty="0">
+              <a:ln>
+                <a:noFill/>
+              </a:ln>
+              <a:solidFill>
+                <a:srgbClr val="C00000"/>
+              </a:solidFill>
+              <a:effectLst/>
+              <a:uLnTx/>
+              <a:uFillTx/>
+              <a:latin typeface="等线" panose="020F0502020204030204"/>
+              <a:ea typeface="等线" panose="02010600030101010101" pitchFamily="2" charset="-122"/>
+              <a:cs typeface="+mn-cs"/>
+            </a:endParaRPr>
+          </a:p>
+        </p:txBody>
+      </p:sp>
+    </p:spTree>
+    <p:extLst>
+      <p:ext uri="{BB962C8B-B14F-4D97-AF65-F5344CB8AC3E}">
+        <p14:creationId xmlns:p14="http://schemas.microsoft.com/office/powerpoint/2010/main" val="2522602396"/>
+      </p:ext>
+    </p:extLst>
+  </p:cSld>
+  <p:clrMapOvr>
+    <a:masterClrMapping/>
+  </p:clrMapOvr>
+</p:sld>
+</file>
+
+<file path=ppt/slides/slide5.xml><?xml version="1.0" encoding="utf-8"?>
+<p:sld xmlns:a="http://schemas.openxmlformats.org/drawingml/2006/main" xmlns:r="http://schemas.openxmlformats.org/officeDocument/2006/relationships" xmlns:p="http://schemas.openxmlformats.org/presentationml/2006/main">
+  <p:cSld>
+    <p:bg>
+      <p:bgPr>
+        <a:solidFill>
+          <a:schemeClr val="tx1">
+            <a:lumMod val="75000"/>
+            <a:lumOff val="25000"/>
+          </a:schemeClr>
+        </a:solidFill>
+        <a:effectLst/>
+      </p:bgPr>
+    </p:bg>
+    <p:spTree>
+      <p:nvGrpSpPr>
+        <p:cNvPr id="1" name=""/>
+        <p:cNvGrpSpPr/>
+        <p:nvPr/>
+      </p:nvGrpSpPr>
+      <p:grpSpPr>
+        <a:xfrm>
+          <a:off x="0" y="0"/>
+          <a:ext cx="0" cy="0"/>
+          <a:chOff x="0" y="0"/>
+          <a:chExt cx="0" cy="0"/>
+        </a:xfrm>
+      </p:grpSpPr>
+      <p:sp>
+        <p:nvSpPr>
+          <p:cNvPr id="3" name="文本框 2"/>
+          <p:cNvSpPr txBox="1"/>
+          <p:nvPr/>
+        </p:nvSpPr>
+        <p:spPr>
+          <a:xfrm>
+            <a:off x="5134627" y="994004"/>
+            <a:ext cx="6763060" cy="4681218"/>
+          </a:xfrm>
+          <a:prstGeom prst="rect">
+            <a:avLst/>
+          </a:prstGeom>
+          <a:noFill/>
+        </p:spPr>
+        <p:txBody>
+          <a:bodyPr wrap="square" rtlCol="0">
+            <a:spAutoFit/>
+          </a:bodyPr>
+          <a:lstStyle/>
+          <a:p>
+            <a:pPr marL="285750" marR="0" lvl="0" indent="-285750" algn="l" defTabSz="914400" rtl="0" eaLnBrk="1" fontAlgn="auto" latinLnBrk="0" hangingPunct="1">
+              <a:lnSpc>
+                <a:spcPct val="200000"/>
+              </a:lnSpc>
+              <a:spcBef>
+                <a:spcPts val="200"/>
+              </a:spcBef>
+              <a:spcAft>
+                <a:spcPts val="200"/>
+              </a:spcAft>
+              <a:buClrTx/>
+              <a:buSzTx/>
+              <a:buFont typeface="Arial" panose="020B0604020202020204" pitchFamily="34" charset="0"/>
+              <a:buChar char="•"/>
+              <a:tabLst/>
+              <a:defRPr/>
+            </a:pPr>
+            <a:r>
+              <a:rPr kumimoji="0" lang="zh-CN" altLang="en-US" sz="1800" b="0" i="0" u="none" strike="noStrike" kern="1200" cap="none" spc="0" normalizeH="0" baseline="0" noProof="0" dirty="0">
+                <a:ln>
+                  <a:noFill/>
+                </a:ln>
+                <a:solidFill>
+                  <a:prstClr val="white">
+                    <a:lumMod val="95000"/>
+                  </a:prstClr>
+                </a:solidFill>
+                <a:effectLst/>
+                <a:uLnTx/>
+                <a:uFillTx/>
+                <a:latin typeface="黑体" panose="02010609060101010101" pitchFamily="49" charset="-122"/>
+                <a:ea typeface="黑体" panose="02010609060101010101" pitchFamily="49" charset="-122"/>
+                <a:cs typeface="+mn-cs"/>
+              </a:rPr>
+              <a:t>每轮游戏时间为</a:t>
+            </a:r>
+            <a:r>
+              <a:rPr kumimoji="0" lang="en-US" altLang="zh-CN" sz="1800" b="0" i="0" u="none" strike="noStrike" kern="1200" cap="none" spc="0" normalizeH="0" baseline="0" noProof="0" dirty="0">
+                <a:ln>
+                  <a:noFill/>
+                </a:ln>
+                <a:solidFill>
+                  <a:srgbClr val="92D050"/>
+                </a:solidFill>
+                <a:effectLst/>
+                <a:uLnTx/>
+                <a:uFillTx/>
+                <a:latin typeface="黑体" panose="02010609060101010101" pitchFamily="49" charset="-122"/>
+                <a:ea typeface="黑体" panose="02010609060101010101" pitchFamily="49" charset="-122"/>
+                <a:cs typeface="+mn-cs"/>
+              </a:rPr>
+              <a:t>15s</a:t>
+            </a:r>
+            <a:r>
+              <a:rPr kumimoji="0" lang="zh-CN" altLang="en-US" sz="1800" b="0" i="0" u="none" strike="noStrike" kern="1200" cap="none" spc="0" normalizeH="0" baseline="0" noProof="0" dirty="0">
+                <a:ln>
+                  <a:noFill/>
+                </a:ln>
+                <a:solidFill>
+                  <a:prstClr val="white">
+                    <a:lumMod val="95000"/>
+                  </a:prstClr>
+                </a:solidFill>
+                <a:effectLst/>
+                <a:uLnTx/>
+                <a:uFillTx/>
+                <a:latin typeface="黑体" panose="02010609060101010101" pitchFamily="49" charset="-122"/>
+                <a:ea typeface="黑体" panose="02010609060101010101" pitchFamily="49" charset="-122"/>
+                <a:cs typeface="+mn-cs"/>
+              </a:rPr>
+              <a:t>，屏幕左上方显示该轮游戏剩余时间。</a:t>
+            </a:r>
+          </a:p>
+          <a:p>
+            <a:pPr marL="285750" marR="0" lvl="0" indent="-285750" algn="l" defTabSz="914400" rtl="0" eaLnBrk="1" fontAlgn="auto" latinLnBrk="0" hangingPunct="1">
+              <a:lnSpc>
+                <a:spcPct val="200000"/>
+              </a:lnSpc>
+              <a:spcBef>
+                <a:spcPts val="200"/>
+              </a:spcBef>
+              <a:spcAft>
+                <a:spcPts val="200"/>
+              </a:spcAft>
+              <a:buClrTx/>
+              <a:buSzTx/>
+              <a:buFont typeface="Arial" panose="020B0604020202020204" pitchFamily="34" charset="0"/>
+              <a:buChar char="•"/>
+              <a:tabLst/>
+              <a:defRPr/>
+            </a:pPr>
+            <a:r>
+              <a:rPr kumimoji="0" lang="zh-CN" altLang="en-US" sz="1800" b="0" i="0" u="none" strike="noStrike" kern="1200" cap="none" spc="0" normalizeH="0" baseline="0" noProof="0" dirty="0">
+                <a:ln>
+                  <a:noFill/>
+                </a:ln>
+                <a:solidFill>
+                  <a:prstClr val="white">
+                    <a:lumMod val="95000"/>
+                  </a:prstClr>
+                </a:solidFill>
+                <a:effectLst/>
+                <a:uLnTx/>
+                <a:uFillTx/>
+                <a:latin typeface="黑体" panose="02010609060101010101" pitchFamily="49" charset="-122"/>
+                <a:ea typeface="黑体" panose="02010609060101010101" pitchFamily="49" charset="-122"/>
+                <a:cs typeface="+mn-cs"/>
+              </a:rPr>
+              <a:t>每轮游戏中，屏幕上会出现</a:t>
+            </a:r>
+            <a:r>
+              <a:rPr kumimoji="0" lang="zh-CN" altLang="en-US" sz="1800" b="0" i="0" u="none" strike="noStrike" kern="1200" cap="none" spc="0" normalizeH="0" baseline="0" noProof="0" dirty="0">
+                <a:ln>
+                  <a:noFill/>
+                </a:ln>
+                <a:solidFill>
+                  <a:srgbClr val="92D050"/>
+                </a:solidFill>
+                <a:effectLst/>
+                <a:uLnTx/>
+                <a:uFillTx/>
+                <a:latin typeface="黑体" panose="02010609060101010101" pitchFamily="49" charset="-122"/>
+                <a:ea typeface="黑体" panose="02010609060101010101" pitchFamily="49" charset="-122"/>
+                <a:cs typeface="+mn-cs"/>
+              </a:rPr>
+              <a:t>若干个小偷</a:t>
+            </a:r>
+            <a:r>
+              <a:rPr kumimoji="0" lang="zh-CN" altLang="en-US" sz="1800" b="0" i="0" u="none" strike="noStrike" kern="1200" cap="none" spc="0" normalizeH="0" baseline="0" noProof="0" dirty="0">
+                <a:ln>
+                  <a:noFill/>
+                </a:ln>
+                <a:solidFill>
+                  <a:prstClr val="white">
+                    <a:lumMod val="95000"/>
+                  </a:prstClr>
+                </a:solidFill>
+                <a:effectLst/>
+                <a:uLnTx/>
+                <a:uFillTx/>
+                <a:latin typeface="黑体" panose="02010609060101010101" pitchFamily="49" charset="-122"/>
+                <a:ea typeface="黑体" panose="02010609060101010101" pitchFamily="49" charset="-122"/>
+                <a:cs typeface="+mn-cs"/>
+              </a:rPr>
+              <a:t>，当您</a:t>
+            </a:r>
+            <a:r>
+              <a:rPr kumimoji="0" lang="zh-CN" altLang="en-US" sz="1800" b="0" i="0" u="none" strike="noStrike" kern="1200" cap="none" spc="0" normalizeH="0" baseline="0" noProof="0" dirty="0">
+                <a:ln>
+                  <a:noFill/>
+                </a:ln>
+                <a:solidFill>
+                  <a:srgbClr val="92D050"/>
+                </a:solidFill>
+                <a:effectLst/>
+                <a:uLnTx/>
+                <a:uFillTx/>
+                <a:latin typeface="黑体" panose="02010609060101010101" pitchFamily="49" charset="-122"/>
+                <a:ea typeface="黑体" panose="02010609060101010101" pitchFamily="49" charset="-122"/>
+                <a:cs typeface="+mn-cs"/>
+              </a:rPr>
+              <a:t>或</a:t>
+            </a:r>
+            <a:r>
+              <a:rPr kumimoji="0" lang="zh-CN" altLang="en-US" sz="1800" b="0" i="0" u="none" strike="noStrike" kern="1200" cap="none" spc="0" normalizeH="0" baseline="0" noProof="0" dirty="0">
+                <a:ln>
+                  <a:noFill/>
+                </a:ln>
+                <a:solidFill>
+                  <a:prstClr val="white">
+                    <a:lumMod val="95000"/>
+                  </a:prstClr>
+                </a:solidFill>
+                <a:effectLst/>
+                <a:uLnTx/>
+                <a:uFillTx/>
+                <a:latin typeface="黑体" panose="02010609060101010101" pitchFamily="49" charset="-122"/>
+                <a:ea typeface="黑体" panose="02010609060101010101" pitchFamily="49" charset="-122"/>
+                <a:cs typeface="+mn-cs"/>
+              </a:rPr>
+              <a:t>另一玩家扮演的赏金猎人</a:t>
+            </a:r>
+            <a:r>
+              <a:rPr kumimoji="0" lang="zh-CN" altLang="en-US" sz="1800" b="0" i="0" u="none" strike="noStrike" kern="1200" cap="none" spc="0" normalizeH="0" baseline="0" noProof="0" dirty="0">
+                <a:ln>
+                  <a:noFill/>
+                </a:ln>
+                <a:solidFill>
+                  <a:srgbClr val="92D050"/>
+                </a:solidFill>
+                <a:effectLst/>
+                <a:uLnTx/>
+                <a:uFillTx/>
+                <a:latin typeface="黑体" panose="02010609060101010101" pitchFamily="49" charset="-122"/>
+                <a:ea typeface="黑体" panose="02010609060101010101" pitchFamily="49" charset="-122"/>
+                <a:cs typeface="+mn-cs"/>
+              </a:rPr>
+              <a:t>碰到任意一个小偷</a:t>
+            </a:r>
+            <a:r>
+              <a:rPr kumimoji="0" lang="zh-CN" altLang="en-US" sz="1800" b="0" i="0" u="none" strike="noStrike" kern="1200" cap="none" spc="0" normalizeH="0" baseline="0" noProof="0" dirty="0">
+                <a:ln>
+                  <a:noFill/>
+                </a:ln>
+                <a:solidFill>
+                  <a:prstClr val="white">
+                    <a:lumMod val="95000"/>
+                  </a:prstClr>
+                </a:solidFill>
+                <a:effectLst/>
+                <a:uLnTx/>
+                <a:uFillTx/>
+                <a:latin typeface="黑体" panose="02010609060101010101" pitchFamily="49" charset="-122"/>
+                <a:ea typeface="黑体" panose="02010609060101010101" pitchFamily="49" charset="-122"/>
+                <a:cs typeface="+mn-cs"/>
+              </a:rPr>
+              <a:t>时，即视为成功抓到小偷。</a:t>
+            </a:r>
+            <a:endParaRPr kumimoji="0" lang="en-US" altLang="zh-CN" sz="1800" b="0" i="0" u="none" strike="noStrike" kern="1200" cap="none" spc="0" normalizeH="0" baseline="0" noProof="0" dirty="0">
+              <a:ln>
+                <a:noFill/>
+              </a:ln>
+              <a:solidFill>
+                <a:prstClr val="white">
+                  <a:lumMod val="95000"/>
+                </a:prstClr>
+              </a:solidFill>
+              <a:effectLst/>
+              <a:uLnTx/>
+              <a:uFillTx/>
+              <a:latin typeface="黑体" panose="02010609060101010101" pitchFamily="49" charset="-122"/>
+              <a:ea typeface="黑体" panose="02010609060101010101" pitchFamily="49" charset="-122"/>
+              <a:cs typeface="+mn-cs"/>
+            </a:endParaRPr>
+          </a:p>
+          <a:p>
+            <a:pPr marL="285750" marR="0" lvl="0" indent="-285750" algn="l" defTabSz="914400" rtl="0" eaLnBrk="1" fontAlgn="auto" latinLnBrk="0" hangingPunct="1">
+              <a:lnSpc>
+                <a:spcPct val="200000"/>
+              </a:lnSpc>
+              <a:spcBef>
+                <a:spcPts val="200"/>
+              </a:spcBef>
+              <a:spcAft>
+                <a:spcPts val="200"/>
+              </a:spcAft>
+              <a:buClrTx/>
+              <a:buSzTx/>
+              <a:buFont typeface="Arial" panose="020B0604020202020204" pitchFamily="34" charset="0"/>
+              <a:buChar char="•"/>
+              <a:tabLst/>
+              <a:defRPr/>
+            </a:pPr>
+            <a:r>
+              <a:rPr kumimoji="0" lang="zh-CN" altLang="en-US" sz="1800" b="0" i="0" u="none" strike="noStrike" kern="1200" cap="none" spc="0" normalizeH="0" baseline="0" noProof="0" dirty="0">
+                <a:ln>
+                  <a:noFill/>
+                </a:ln>
+                <a:solidFill>
+                  <a:prstClr val="white">
+                    <a:lumMod val="95000"/>
+                  </a:prstClr>
+                </a:solidFill>
+                <a:effectLst/>
+                <a:uLnTx/>
+                <a:uFillTx/>
+                <a:latin typeface="黑体" panose="02010609060101010101" pitchFamily="49" charset="-122"/>
+                <a:ea typeface="黑体" panose="02010609060101010101" pitchFamily="49" charset="-122"/>
+                <a:cs typeface="+mn-cs"/>
+              </a:rPr>
+              <a:t>成功抓到某个小偷后，该小偷会继续在屏幕内跑动，可以对其进行多次追捕，直到该轮游戏时间截止。</a:t>
+            </a:r>
+            <a:endParaRPr kumimoji="0" lang="en-US" altLang="zh-CN" sz="1800" b="0" i="0" u="none" strike="noStrike" kern="1200" cap="none" spc="0" normalizeH="0" baseline="0" noProof="0" dirty="0">
+              <a:ln>
+                <a:noFill/>
+              </a:ln>
+              <a:solidFill>
+                <a:prstClr val="white">
+                  <a:lumMod val="95000"/>
+                </a:prstClr>
+              </a:solidFill>
+              <a:effectLst/>
+              <a:uLnTx/>
+              <a:uFillTx/>
+              <a:latin typeface="黑体" panose="02010609060101010101" pitchFamily="49" charset="-122"/>
+              <a:ea typeface="黑体" panose="02010609060101010101" pitchFamily="49" charset="-122"/>
+              <a:cs typeface="+mn-cs"/>
+            </a:endParaRPr>
+          </a:p>
+          <a:p>
+            <a:pPr marL="285750" marR="0" lvl="0" indent="-285750" algn="l" defTabSz="914400" rtl="0" eaLnBrk="1" fontAlgn="auto" latinLnBrk="0" hangingPunct="1">
+              <a:lnSpc>
+                <a:spcPct val="200000"/>
+              </a:lnSpc>
+              <a:spcBef>
+                <a:spcPts val="200"/>
+              </a:spcBef>
+              <a:spcAft>
+                <a:spcPts val="200"/>
+              </a:spcAft>
+              <a:buClrTx/>
+              <a:buSzTx/>
+              <a:buFont typeface="Arial" panose="020B0604020202020204" pitchFamily="34" charset="0"/>
+              <a:buChar char="•"/>
+              <a:tabLst/>
+              <a:defRPr/>
+            </a:pPr>
+            <a:r>
+              <a:rPr kumimoji="0" lang="zh-CN" altLang="en-US" sz="1800" b="0" i="0" u="none" strike="noStrike" kern="1200" cap="none" spc="0" normalizeH="0" baseline="0" noProof="0" dirty="0">
+                <a:ln>
+                  <a:noFill/>
+                </a:ln>
+                <a:solidFill>
+                  <a:prstClr val="white">
+                    <a:lumMod val="95000"/>
+                  </a:prstClr>
+                </a:solidFill>
+                <a:effectLst/>
+                <a:uLnTx/>
+                <a:uFillTx/>
+                <a:latin typeface="黑体" panose="02010609060101010101" pitchFamily="49" charset="-122"/>
+                <a:ea typeface="黑体" panose="02010609060101010101" pitchFamily="49" charset="-122"/>
+                <a:cs typeface="+mn-cs"/>
+              </a:rPr>
+              <a:t>屏幕顶端将显示你们当前的</a:t>
+            </a:r>
+            <a:r>
+              <a:rPr kumimoji="0" lang="zh-CN" altLang="en-US" sz="1800" b="0" i="0" u="none" strike="noStrike" kern="1200" cap="none" spc="0" normalizeH="0" baseline="0" noProof="0" dirty="0">
+                <a:ln>
+                  <a:noFill/>
+                </a:ln>
+                <a:solidFill>
+                  <a:srgbClr val="92D050"/>
+                </a:solidFill>
+                <a:effectLst/>
+                <a:uLnTx/>
+                <a:uFillTx/>
+                <a:latin typeface="黑体" panose="02010609060101010101" pitchFamily="49" charset="-122"/>
+                <a:ea typeface="黑体" panose="02010609060101010101" pitchFamily="49" charset="-122"/>
+                <a:cs typeface="+mn-cs"/>
+              </a:rPr>
+              <a:t>总得分</a:t>
+            </a:r>
+            <a:r>
+              <a:rPr kumimoji="0" lang="zh-CN" altLang="en-US" sz="1800" b="0" i="0" u="none" strike="noStrike" kern="1200" cap="none" spc="0" normalizeH="0" baseline="0" noProof="0" dirty="0">
+                <a:ln>
+                  <a:noFill/>
+                </a:ln>
+                <a:solidFill>
+                  <a:prstClr val="white">
+                    <a:lumMod val="95000"/>
+                  </a:prstClr>
+                </a:solidFill>
+                <a:effectLst/>
+                <a:uLnTx/>
+                <a:uFillTx/>
+                <a:latin typeface="黑体" panose="02010609060101010101" pitchFamily="49" charset="-122"/>
+                <a:ea typeface="黑体" panose="02010609060101010101" pitchFamily="49" charset="-122"/>
+                <a:cs typeface="+mn-cs"/>
+              </a:rPr>
+              <a:t>，分数计算规则为：</a:t>
+            </a:r>
+            <a:endParaRPr kumimoji="0" lang="en-US" altLang="zh-CN" sz="1800" b="0" i="0" u="none" strike="noStrike" kern="1200" cap="none" spc="0" normalizeH="0" baseline="0" noProof="0" dirty="0">
+              <a:ln>
+                <a:noFill/>
+              </a:ln>
+              <a:solidFill>
+                <a:prstClr val="white">
+                  <a:lumMod val="95000"/>
+                </a:prstClr>
+              </a:solidFill>
+              <a:effectLst/>
+              <a:uLnTx/>
+              <a:uFillTx/>
+              <a:latin typeface="黑体" panose="02010609060101010101" pitchFamily="49" charset="-122"/>
+              <a:ea typeface="黑体" panose="02010609060101010101" pitchFamily="49" charset="-122"/>
+              <a:cs typeface="+mn-cs"/>
+            </a:endParaRPr>
+          </a:p>
+          <a:p>
+            <a:pPr marL="0" marR="0" lvl="0" indent="0" algn="l" defTabSz="914400" rtl="0" eaLnBrk="1" fontAlgn="auto" latinLnBrk="0" hangingPunct="1">
+              <a:lnSpc>
+                <a:spcPct val="200000"/>
+              </a:lnSpc>
+              <a:spcBef>
+                <a:spcPts val="200"/>
+              </a:spcBef>
+              <a:spcAft>
+                <a:spcPts val="200"/>
+              </a:spcAft>
+              <a:buClrTx/>
+              <a:buSzTx/>
+              <a:buFontTx/>
+              <a:buNone/>
+              <a:tabLst/>
+              <a:defRPr/>
+            </a:pPr>
+            <a:r>
+              <a:rPr kumimoji="0" lang="en-US" altLang="zh-CN" sz="1800" b="0" i="0" u="none" strike="noStrike" kern="1200" cap="none" spc="0" normalizeH="0" baseline="0" noProof="0" dirty="0">
+                <a:ln>
+                  <a:noFill/>
+                </a:ln>
+                <a:solidFill>
+                  <a:prstClr val="white">
+                    <a:lumMod val="95000"/>
+                  </a:prstClr>
+                </a:solidFill>
+                <a:effectLst/>
+                <a:uLnTx/>
+                <a:uFillTx/>
+                <a:latin typeface="黑体" panose="02010609060101010101" pitchFamily="49" charset="-122"/>
+                <a:ea typeface="黑体" panose="02010609060101010101" pitchFamily="49" charset="-122"/>
+                <a:cs typeface="+mn-cs"/>
+              </a:rPr>
+              <a:t>		</a:t>
+            </a:r>
+            <a:r>
+              <a:rPr kumimoji="0" lang="zh-CN" altLang="en-US" sz="1800" b="0" i="0" u="sng" strike="noStrike" kern="1200" cap="none" spc="0" normalizeH="0" baseline="0" noProof="0" dirty="0">
+                <a:ln>
+                  <a:noFill/>
+                </a:ln>
+                <a:solidFill>
+                  <a:prstClr val="white">
+                    <a:lumMod val="95000"/>
+                  </a:prstClr>
+                </a:solidFill>
+                <a:effectLst/>
+                <a:uLnTx/>
+                <a:uFillTx/>
+                <a:latin typeface="黑体" panose="02010609060101010101" pitchFamily="49" charset="-122"/>
+                <a:ea typeface="黑体" panose="02010609060101010101" pitchFamily="49" charset="-122"/>
+                <a:cs typeface="+mn-cs"/>
+              </a:rPr>
+              <a:t>每抓到一次小偷，计一分。</a:t>
+            </a:r>
+            <a:endParaRPr kumimoji="0" lang="en-US" altLang="zh-CN" sz="1800" b="0" i="0" u="sng" strike="noStrike" kern="1200" cap="none" spc="0" normalizeH="0" baseline="0" noProof="0" dirty="0">
+              <a:ln>
+                <a:noFill/>
+              </a:ln>
+              <a:solidFill>
+                <a:prstClr val="white">
+                  <a:lumMod val="95000"/>
+                </a:prstClr>
+              </a:solidFill>
+              <a:effectLst/>
+              <a:uLnTx/>
+              <a:uFillTx/>
+              <a:latin typeface="黑体" panose="02010609060101010101" pitchFamily="49" charset="-122"/>
+              <a:ea typeface="黑体" panose="02010609060101010101" pitchFamily="49" charset="-122"/>
+              <a:cs typeface="+mn-cs"/>
+            </a:endParaRPr>
+          </a:p>
+          <a:p>
+            <a:pPr marL="285750" marR="0" lvl="0" indent="-285750" algn="l" defTabSz="914400" rtl="0" eaLnBrk="1" fontAlgn="auto" latinLnBrk="0" hangingPunct="1">
+              <a:lnSpc>
+                <a:spcPct val="200000"/>
+              </a:lnSpc>
+              <a:spcBef>
+                <a:spcPts val="200"/>
+              </a:spcBef>
+              <a:spcAft>
+                <a:spcPts val="200"/>
+              </a:spcAft>
+              <a:buClrTx/>
+              <a:buSzTx/>
+              <a:buFont typeface="Arial" panose="020B0604020202020204" pitchFamily="34" charset="0"/>
+              <a:buChar char="•"/>
+              <a:tabLst/>
+              <a:defRPr/>
+            </a:pPr>
+            <a:r>
+              <a:rPr kumimoji="0" lang="zh-CN" altLang="en-US" sz="1800" b="0" i="0" u="none" strike="noStrike" kern="1200" cap="none" spc="0" normalizeH="0" baseline="0" noProof="0" dirty="0">
+                <a:ln>
+                  <a:noFill/>
+                </a:ln>
+                <a:solidFill>
+                  <a:srgbClr val="92D050"/>
+                </a:solidFill>
+                <a:effectLst/>
+                <a:uLnTx/>
+                <a:uFillTx/>
+                <a:latin typeface="黑体" panose="02010609060101010101" pitchFamily="49" charset="-122"/>
+                <a:ea typeface="黑体" panose="02010609060101010101" pitchFamily="49" charset="-122"/>
+                <a:cs typeface="+mn-cs"/>
+              </a:rPr>
+              <a:t>游戏结束后总分越高，最终实验报酬越高。</a:t>
+            </a:r>
+            <a:endParaRPr kumimoji="0" lang="zh-CN" altLang="en-US" sz="1800" b="0" i="0" u="none" strike="noStrike" kern="1200" cap="none" spc="0" normalizeH="0" baseline="0" noProof="0" dirty="0">
+              <a:ln>
+                <a:noFill/>
+              </a:ln>
+              <a:solidFill>
+                <a:prstClr val="white">
+                  <a:lumMod val="95000"/>
+                </a:prstClr>
+              </a:solidFill>
+              <a:effectLst/>
+              <a:uLnTx/>
+              <a:uFillTx/>
+              <a:latin typeface="黑体" panose="02010609060101010101" pitchFamily="49" charset="-122"/>
+              <a:ea typeface="黑体" panose="02010609060101010101" pitchFamily="49" charset="-122"/>
+              <a:cs typeface="+mn-cs"/>
+            </a:endParaRPr>
+          </a:p>
+        </p:txBody>
+      </p:sp>
+      <p:grpSp>
+        <p:nvGrpSpPr>
+          <p:cNvPr id="52" name="组合 51">
+            <a:extLst>
+              <a:ext uri="{FF2B5EF4-FFF2-40B4-BE49-F238E27FC236}">
+                <a16:creationId xmlns:a16="http://schemas.microsoft.com/office/drawing/2014/main" id="{217A059A-3423-4FAC-B3AF-CA9047F40EF2}"/>
+              </a:ext>
+            </a:extLst>
+          </p:cNvPr>
+          <p:cNvGrpSpPr/>
+          <p:nvPr/>
+        </p:nvGrpSpPr>
+        <p:grpSpPr>
+          <a:xfrm>
+            <a:off x="294313" y="1070906"/>
+            <a:ext cx="4712977" cy="4716187"/>
+            <a:chOff x="3576000" y="203170"/>
+            <a:chExt cx="5040000" cy="5043433"/>
+          </a:xfrm>
+        </p:grpSpPr>
+        <p:sp>
+          <p:nvSpPr>
+            <p:cNvPr id="53" name="矩形 52">
+              <a:extLst>
+                <a:ext uri="{FF2B5EF4-FFF2-40B4-BE49-F238E27FC236}">
+                  <a16:creationId xmlns:a16="http://schemas.microsoft.com/office/drawing/2014/main" id="{AC06D308-6271-466C-92E5-F6199629F923}"/>
+                </a:ext>
+              </a:extLst>
+            </p:cNvPr>
+            <p:cNvSpPr/>
+            <p:nvPr/>
+          </p:nvSpPr>
+          <p:spPr>
+            <a:xfrm>
+              <a:off x="3576000" y="206603"/>
+              <a:ext cx="5040000" cy="5040000"/>
+            </a:xfrm>
+            <a:prstGeom prst="rect">
+              <a:avLst/>
+            </a:prstGeom>
+            <a:solidFill>
+              <a:schemeClr val="tx1"/>
+            </a:solidFill>
+            <a:ln>
+              <a:noFill/>
+            </a:ln>
+          </p:spPr>
+          <p:style>
+            <a:lnRef idx="2">
+              <a:schemeClr val="accent3">
+                <a:shade val="50000"/>
+              </a:schemeClr>
+            </a:lnRef>
+            <a:fillRef idx="1">
+              <a:schemeClr val="accent3"/>
+            </a:fillRef>
+            <a:effectRef idx="0">
+              <a:schemeClr val="accent3"/>
+            </a:effectRef>
+            <a:fontRef idx="minor">
+              <a:schemeClr val="lt1"/>
+            </a:fontRef>
+          </p:style>
+          <p:txBody>
+            <a:bodyPr rtlCol="0" anchor="ctr"/>
+            <a:lstStyle/>
+            <a:p>
+              <a:pPr marL="0" marR="0" lvl="0" indent="0" algn="ctr" defTabSz="914400" rtl="0" eaLnBrk="1" fontAlgn="auto" latinLnBrk="0" hangingPunct="1">
+                <a:lnSpc>
+                  <a:spcPct val="100000"/>
+                </a:lnSpc>
+                <a:spcBef>
+                  <a:spcPts val="0"/>
+                </a:spcBef>
+                <a:spcAft>
+                  <a:spcPts val="0"/>
+                </a:spcAft>
+                <a:buClrTx/>
+                <a:buSzTx/>
+                <a:buFontTx/>
+                <a:buNone/>
+                <a:tabLst/>
+                <a:defRPr/>
+              </a:pPr>
+              <a:endParaRPr kumimoji="0" lang="zh-CN" altLang="en-US" sz="1800" b="0" i="0" u="none" strike="noStrike" kern="1200" cap="none" spc="0" normalizeH="0" baseline="0" noProof="0" dirty="0">
+                <a:ln>
+                  <a:noFill/>
+                </a:ln>
+                <a:solidFill>
+                  <a:prstClr val="white"/>
+                </a:solidFill>
+                <a:effectLst/>
+                <a:uLnTx/>
+                <a:uFillTx/>
+                <a:latin typeface="等线" panose="020F0502020204030204"/>
+                <a:ea typeface="等线" panose="02010600030101010101" pitchFamily="2" charset="-122"/>
+                <a:cs typeface="+mn-cs"/>
+              </a:endParaRPr>
+            </a:p>
+          </p:txBody>
+        </p:sp>
+        <p:grpSp>
+          <p:nvGrpSpPr>
+            <p:cNvPr id="54" name="组合 53">
+              <a:extLst>
+                <a:ext uri="{FF2B5EF4-FFF2-40B4-BE49-F238E27FC236}">
+                  <a16:creationId xmlns:a16="http://schemas.microsoft.com/office/drawing/2014/main" id="{939802B7-C297-4A78-8871-C1120CA9E84F}"/>
+                </a:ext>
+              </a:extLst>
+            </p:cNvPr>
+            <p:cNvGrpSpPr/>
+            <p:nvPr/>
+          </p:nvGrpSpPr>
+          <p:grpSpPr>
+            <a:xfrm>
+              <a:off x="3979435" y="610038"/>
+              <a:ext cx="4233130" cy="4233131"/>
+              <a:chOff x="3533447" y="1779270"/>
+              <a:chExt cx="3291401" cy="3318711"/>
+            </a:xfrm>
+          </p:grpSpPr>
+          <p:sp>
+            <p:nvSpPr>
+              <p:cNvPr id="61" name="矩形 60">
+                <a:extLst>
+                  <a:ext uri="{FF2B5EF4-FFF2-40B4-BE49-F238E27FC236}">
+                    <a16:creationId xmlns:a16="http://schemas.microsoft.com/office/drawing/2014/main" id="{9C1DEBEE-EA46-4C40-818E-7BA990E69438}"/>
+                  </a:ext>
+                </a:extLst>
+              </p:cNvPr>
+              <p:cNvSpPr/>
+              <p:nvPr/>
+            </p:nvSpPr>
+            <p:spPr>
+              <a:xfrm>
+                <a:off x="3533447" y="1779270"/>
+                <a:ext cx="3291401" cy="3318711"/>
+              </a:xfrm>
+              <a:prstGeom prst="rect">
+                <a:avLst/>
+              </a:prstGeom>
+              <a:ln>
+                <a:noFill/>
+              </a:ln>
+            </p:spPr>
+            <p:style>
+              <a:lnRef idx="2">
+                <a:schemeClr val="accent3">
+                  <a:shade val="50000"/>
+                </a:schemeClr>
+              </a:lnRef>
+              <a:fillRef idx="1">
+                <a:schemeClr val="accent3"/>
+              </a:fillRef>
+              <a:effectRef idx="0">
+                <a:schemeClr val="accent3"/>
+              </a:effectRef>
+              <a:fontRef idx="minor">
+                <a:schemeClr val="lt1"/>
+              </a:fontRef>
+            </p:style>
+            <p:txBody>
+              <a:bodyPr rtlCol="0" anchor="ctr"/>
+              <a:lstStyle/>
+              <a:p>
+                <a:pPr marL="0" marR="0" lvl="0" indent="0" algn="ctr" defTabSz="914400" rtl="0" eaLnBrk="1" fontAlgn="auto" latinLnBrk="0" hangingPunct="1">
+                  <a:lnSpc>
+                    <a:spcPct val="100000"/>
+                  </a:lnSpc>
+                  <a:spcBef>
+                    <a:spcPts val="0"/>
+                  </a:spcBef>
+                  <a:spcAft>
+                    <a:spcPts val="0"/>
+                  </a:spcAft>
+                  <a:buClrTx/>
+                  <a:buSzTx/>
+                  <a:buFontTx/>
+                  <a:buNone/>
+                  <a:tabLst/>
+                  <a:defRPr/>
+                </a:pPr>
+                <a:endParaRPr kumimoji="0" lang="zh-CN" altLang="en-US" sz="1800" b="0" i="0" u="none" strike="noStrike" kern="1200" cap="none" spc="0" normalizeH="0" baseline="0" noProof="0" dirty="0">
+                  <a:ln>
+                    <a:noFill/>
+                  </a:ln>
+                  <a:solidFill>
+                    <a:prstClr val="white"/>
+                  </a:solidFill>
+                  <a:effectLst/>
+                  <a:uLnTx/>
+                  <a:uFillTx/>
+                  <a:latin typeface="等线" panose="020F0502020204030204"/>
+                  <a:ea typeface="等线" panose="02010600030101010101" pitchFamily="2" charset="-122"/>
+                  <a:cs typeface="+mn-cs"/>
+                </a:endParaRPr>
+              </a:p>
+            </p:txBody>
+          </p:sp>
+          <p:sp>
+            <p:nvSpPr>
+              <p:cNvPr id="62" name="椭圆 61">
+                <a:extLst>
+                  <a:ext uri="{FF2B5EF4-FFF2-40B4-BE49-F238E27FC236}">
+                    <a16:creationId xmlns:a16="http://schemas.microsoft.com/office/drawing/2014/main" id="{87BD0FCE-BE35-402E-8FA3-7E4C4DF4FDFF}"/>
+                  </a:ext>
+                </a:extLst>
+              </p:cNvPr>
+              <p:cNvSpPr/>
+              <p:nvPr/>
+            </p:nvSpPr>
+            <p:spPr>
+              <a:xfrm>
+                <a:off x="3898231" y="2569945"/>
+                <a:ext cx="173256" cy="173256"/>
+              </a:xfrm>
+              <a:prstGeom prst="ellipse">
+                <a:avLst/>
+              </a:prstGeom>
+              <a:solidFill>
+                <a:srgbClr val="FFA500"/>
+              </a:solidFill>
+              <a:ln>
+                <a:solidFill>
+                  <a:srgbClr val="FFA500"/>
+                </a:solidFill>
+              </a:ln>
+            </p:spPr>
+            <p:style>
+              <a:lnRef idx="2">
+                <a:schemeClr val="accent2">
+                  <a:shade val="50000"/>
+                </a:schemeClr>
+              </a:lnRef>
+              <a:fillRef idx="1">
+                <a:schemeClr val="accent2"/>
+              </a:fillRef>
+              <a:effectRef idx="0">
+                <a:schemeClr val="accent2"/>
+              </a:effectRef>
+              <a:fontRef idx="minor">
+                <a:schemeClr val="lt1"/>
+              </a:fontRef>
+            </p:style>
+            <p:txBody>
+              <a:bodyPr rtlCol="0" anchor="ctr"/>
+              <a:lstStyle/>
+              <a:p>
+                <a:pPr marL="0" marR="0" lvl="0" indent="0" algn="ctr" defTabSz="914400" rtl="0" eaLnBrk="1" fontAlgn="auto" latinLnBrk="0" hangingPunct="1">
+                  <a:lnSpc>
+                    <a:spcPct val="100000"/>
+                  </a:lnSpc>
+                  <a:spcBef>
+                    <a:spcPts val="0"/>
+                  </a:spcBef>
+                  <a:spcAft>
+                    <a:spcPts val="0"/>
+                  </a:spcAft>
+                  <a:buClrTx/>
+                  <a:buSzTx/>
+                  <a:buFontTx/>
+                  <a:buNone/>
+                  <a:tabLst/>
+                  <a:defRPr/>
+                </a:pPr>
+                <a:endParaRPr kumimoji="0" lang="zh-CN" altLang="en-US" sz="1800" b="0" i="0" u="none" strike="noStrike" kern="1200" cap="none" spc="0" normalizeH="0" baseline="0" noProof="0">
+                  <a:ln>
+                    <a:noFill/>
+                  </a:ln>
+                  <a:solidFill>
+                    <a:prstClr val="white"/>
+                  </a:solidFill>
+                  <a:effectLst/>
+                  <a:uLnTx/>
+                  <a:uFillTx/>
+                  <a:latin typeface="等线" panose="020F0502020204030204"/>
+                  <a:ea typeface="等线" panose="02010600030101010101" pitchFamily="2" charset="-122"/>
+                  <a:cs typeface="+mn-cs"/>
+                </a:endParaRPr>
+              </a:p>
+            </p:txBody>
+          </p:sp>
+          <p:sp>
+            <p:nvSpPr>
+              <p:cNvPr id="63" name="椭圆 62">
+                <a:extLst>
+                  <a:ext uri="{FF2B5EF4-FFF2-40B4-BE49-F238E27FC236}">
+                    <a16:creationId xmlns:a16="http://schemas.microsoft.com/office/drawing/2014/main" id="{B5A0211D-3881-40B1-9B9A-3175DBDA6542}"/>
+                  </a:ext>
+                </a:extLst>
+              </p:cNvPr>
+              <p:cNvSpPr/>
+              <p:nvPr/>
+            </p:nvSpPr>
+            <p:spPr>
+              <a:xfrm>
+                <a:off x="6081562" y="3049604"/>
+                <a:ext cx="173256" cy="173256"/>
+              </a:xfrm>
+              <a:prstGeom prst="ellipse">
+                <a:avLst/>
+              </a:prstGeom>
+              <a:solidFill>
+                <a:srgbClr val="FFA500"/>
+              </a:solidFill>
+              <a:ln>
+                <a:solidFill>
+                  <a:srgbClr val="FFA500"/>
+                </a:solidFill>
+              </a:ln>
+            </p:spPr>
+            <p:style>
+              <a:lnRef idx="2">
+                <a:schemeClr val="accent2">
+                  <a:shade val="50000"/>
+                </a:schemeClr>
+              </a:lnRef>
+              <a:fillRef idx="1">
+                <a:schemeClr val="accent2"/>
+              </a:fillRef>
+              <a:effectRef idx="0">
+                <a:schemeClr val="accent2"/>
+              </a:effectRef>
+              <a:fontRef idx="minor">
+                <a:schemeClr val="lt1"/>
+              </a:fontRef>
+            </p:style>
+            <p:txBody>
+              <a:bodyPr rtlCol="0" anchor="ctr"/>
+              <a:lstStyle/>
+              <a:p>
+                <a:pPr marL="0" marR="0" lvl="0" indent="0" algn="ctr" defTabSz="914400" rtl="0" eaLnBrk="1" fontAlgn="auto" latinLnBrk="0" hangingPunct="1">
+                  <a:lnSpc>
+                    <a:spcPct val="100000"/>
+                  </a:lnSpc>
+                  <a:spcBef>
+                    <a:spcPts val="0"/>
+                  </a:spcBef>
+                  <a:spcAft>
+                    <a:spcPts val="0"/>
+                  </a:spcAft>
+                  <a:buClrTx/>
+                  <a:buSzTx/>
+                  <a:buFontTx/>
+                  <a:buNone/>
+                  <a:tabLst/>
+                  <a:defRPr/>
+                </a:pPr>
+                <a:endParaRPr kumimoji="0" lang="zh-CN" altLang="en-US" sz="1800" b="0" i="0" u="none" strike="noStrike" kern="1200" cap="none" spc="0" normalizeH="0" baseline="0" noProof="0">
+                  <a:ln>
+                    <a:noFill/>
+                  </a:ln>
+                  <a:solidFill>
+                    <a:prstClr val="white"/>
+                  </a:solidFill>
+                  <a:effectLst/>
+                  <a:uLnTx/>
+                  <a:uFillTx/>
+                  <a:latin typeface="等线" panose="020F0502020204030204"/>
+                  <a:ea typeface="等线" panose="02010600030101010101" pitchFamily="2" charset="-122"/>
+                  <a:cs typeface="+mn-cs"/>
+                </a:endParaRPr>
+              </a:p>
+            </p:txBody>
+          </p:sp>
+          <p:sp>
+            <p:nvSpPr>
+              <p:cNvPr id="64" name="椭圆 63">
+                <a:extLst>
+                  <a:ext uri="{FF2B5EF4-FFF2-40B4-BE49-F238E27FC236}">
+                    <a16:creationId xmlns:a16="http://schemas.microsoft.com/office/drawing/2014/main" id="{5FCC5684-DAEC-4849-A0AB-9009954803D9}"/>
+                  </a:ext>
+                </a:extLst>
+              </p:cNvPr>
+              <p:cNvSpPr/>
+              <p:nvPr/>
+            </p:nvSpPr>
+            <p:spPr>
+              <a:xfrm>
+                <a:off x="4198125" y="3438626"/>
+                <a:ext cx="173256" cy="173256"/>
+              </a:xfrm>
+              <a:prstGeom prst="ellipse">
+                <a:avLst/>
+              </a:prstGeom>
+              <a:solidFill>
+                <a:srgbClr val="FFA500"/>
+              </a:solidFill>
+              <a:ln>
+                <a:solidFill>
+                  <a:srgbClr val="FFA500"/>
+                </a:solidFill>
+              </a:ln>
+            </p:spPr>
+            <p:style>
+              <a:lnRef idx="2">
+                <a:schemeClr val="accent2">
+                  <a:shade val="50000"/>
+                </a:schemeClr>
+              </a:lnRef>
+              <a:fillRef idx="1">
+                <a:schemeClr val="accent2"/>
+              </a:fillRef>
+              <a:effectRef idx="0">
+                <a:schemeClr val="accent2"/>
+              </a:effectRef>
+              <a:fontRef idx="minor">
+                <a:schemeClr val="lt1"/>
+              </a:fontRef>
+            </p:style>
+            <p:txBody>
+              <a:bodyPr rtlCol="0" anchor="ctr"/>
+              <a:lstStyle/>
+              <a:p>
+                <a:pPr marL="0" marR="0" lvl="0" indent="0" algn="ctr" defTabSz="914400" rtl="0" eaLnBrk="1" fontAlgn="auto" latinLnBrk="0" hangingPunct="1">
+                  <a:lnSpc>
+                    <a:spcPct val="100000"/>
+                  </a:lnSpc>
+                  <a:spcBef>
+                    <a:spcPts val="0"/>
+                  </a:spcBef>
+                  <a:spcAft>
+                    <a:spcPts val="0"/>
+                  </a:spcAft>
+                  <a:buClrTx/>
+                  <a:buSzTx/>
+                  <a:buFontTx/>
+                  <a:buNone/>
+                  <a:tabLst/>
+                  <a:defRPr/>
+                </a:pPr>
+                <a:endParaRPr kumimoji="0" lang="zh-CN" altLang="en-US" sz="1800" b="0" i="0" u="none" strike="noStrike" kern="1200" cap="none" spc="0" normalizeH="0" baseline="0" noProof="0">
+                  <a:ln>
+                    <a:noFill/>
+                  </a:ln>
+                  <a:solidFill>
+                    <a:prstClr val="white"/>
+                  </a:solidFill>
+                  <a:effectLst/>
+                  <a:uLnTx/>
+                  <a:uFillTx/>
+                  <a:latin typeface="等线" panose="020F0502020204030204"/>
+                  <a:ea typeface="等线" panose="02010600030101010101" pitchFamily="2" charset="-122"/>
+                  <a:cs typeface="+mn-cs"/>
+                </a:endParaRPr>
+              </a:p>
+            </p:txBody>
+          </p:sp>
+          <p:sp>
+            <p:nvSpPr>
+              <p:cNvPr id="65" name="椭圆 64">
+                <a:extLst>
+                  <a:ext uri="{FF2B5EF4-FFF2-40B4-BE49-F238E27FC236}">
+                    <a16:creationId xmlns:a16="http://schemas.microsoft.com/office/drawing/2014/main" id="{608A833E-CA70-4CBC-8F95-3DE15FD19948}"/>
+                  </a:ext>
+                </a:extLst>
+              </p:cNvPr>
+              <p:cNvSpPr/>
+              <p:nvPr/>
+            </p:nvSpPr>
+            <p:spPr>
+              <a:xfrm>
+                <a:off x="5005891" y="4676273"/>
+                <a:ext cx="173256" cy="173256"/>
+              </a:xfrm>
+              <a:prstGeom prst="ellipse">
+                <a:avLst/>
+              </a:prstGeom>
+              <a:solidFill>
+                <a:srgbClr val="FFA500"/>
+              </a:solidFill>
+              <a:ln>
+                <a:solidFill>
+                  <a:srgbClr val="FFA500"/>
+                </a:solidFill>
+              </a:ln>
+            </p:spPr>
+            <p:style>
+              <a:lnRef idx="2">
+                <a:schemeClr val="accent2">
+                  <a:shade val="50000"/>
+                </a:schemeClr>
+              </a:lnRef>
+              <a:fillRef idx="1">
+                <a:schemeClr val="accent2"/>
+              </a:fillRef>
+              <a:effectRef idx="0">
+                <a:schemeClr val="accent2"/>
+              </a:effectRef>
+              <a:fontRef idx="minor">
+                <a:schemeClr val="lt1"/>
+              </a:fontRef>
+            </p:style>
+            <p:txBody>
+              <a:bodyPr rtlCol="0" anchor="ctr"/>
+              <a:lstStyle/>
+              <a:p>
+                <a:pPr marL="0" marR="0" lvl="0" indent="0" algn="ctr" defTabSz="914400" rtl="0" eaLnBrk="1" fontAlgn="auto" latinLnBrk="0" hangingPunct="1">
+                  <a:lnSpc>
+                    <a:spcPct val="100000"/>
+                  </a:lnSpc>
+                  <a:spcBef>
+                    <a:spcPts val="0"/>
+                  </a:spcBef>
+                  <a:spcAft>
+                    <a:spcPts val="0"/>
+                  </a:spcAft>
+                  <a:buClrTx/>
+                  <a:buSzTx/>
+                  <a:buFontTx/>
+                  <a:buNone/>
+                  <a:tabLst/>
+                  <a:defRPr/>
+                </a:pPr>
+                <a:endParaRPr kumimoji="0" lang="zh-CN" altLang="en-US" sz="1800" b="0" i="0" u="none" strike="noStrike" kern="1200" cap="none" spc="0" normalizeH="0" baseline="0" noProof="0">
+                  <a:ln>
+                    <a:noFill/>
+                  </a:ln>
+                  <a:solidFill>
+                    <a:prstClr val="white"/>
+                  </a:solidFill>
+                  <a:effectLst/>
+                  <a:uLnTx/>
+                  <a:uFillTx/>
+                  <a:latin typeface="等线" panose="020F0502020204030204"/>
+                  <a:ea typeface="等线" panose="02010600030101010101" pitchFamily="2" charset="-122"/>
+                  <a:cs typeface="+mn-cs"/>
+                </a:endParaRPr>
+              </a:p>
+            </p:txBody>
+          </p:sp>
+          <p:sp>
+            <p:nvSpPr>
+              <p:cNvPr id="66" name="椭圆 65">
+                <a:extLst>
+                  <a:ext uri="{FF2B5EF4-FFF2-40B4-BE49-F238E27FC236}">
+                    <a16:creationId xmlns:a16="http://schemas.microsoft.com/office/drawing/2014/main" id="{A8BB97F1-FD42-4599-B72E-19FEDC19ACCF}"/>
+                  </a:ext>
+                </a:extLst>
+              </p:cNvPr>
+              <p:cNvSpPr/>
+              <p:nvPr/>
+            </p:nvSpPr>
+            <p:spPr>
+              <a:xfrm>
+                <a:off x="5134040" y="3525254"/>
+                <a:ext cx="173256" cy="173256"/>
+              </a:xfrm>
+              <a:prstGeom prst="ellipse">
+                <a:avLst/>
+              </a:prstGeom>
+              <a:solidFill>
+                <a:srgbClr val="C00000"/>
+              </a:solidFill>
+              <a:ln>
+                <a:solidFill>
+                  <a:srgbClr val="C00000"/>
+                </a:solidFill>
+              </a:ln>
+            </p:spPr>
+            <p:style>
+              <a:lnRef idx="2">
+                <a:schemeClr val="accent1">
+                  <a:shade val="50000"/>
+                </a:schemeClr>
+              </a:lnRef>
+              <a:fillRef idx="1">
+                <a:schemeClr val="accent1"/>
+              </a:fillRef>
+              <a:effectRef idx="0">
+                <a:schemeClr val="accent1"/>
+              </a:effectRef>
+              <a:fontRef idx="minor">
+                <a:schemeClr val="lt1"/>
+              </a:fontRef>
+            </p:style>
+            <p:txBody>
+              <a:bodyPr rtlCol="0" anchor="ctr"/>
+              <a:lstStyle/>
+              <a:p>
+                <a:pPr marL="0" marR="0" lvl="0" indent="0" algn="ctr" defTabSz="914400" rtl="0" eaLnBrk="1" fontAlgn="auto" latinLnBrk="0" hangingPunct="1">
+                  <a:lnSpc>
+                    <a:spcPct val="100000"/>
+                  </a:lnSpc>
+                  <a:spcBef>
+                    <a:spcPts val="0"/>
+                  </a:spcBef>
+                  <a:spcAft>
+                    <a:spcPts val="0"/>
+                  </a:spcAft>
+                  <a:buClrTx/>
+                  <a:buSzTx/>
+                  <a:buFontTx/>
+                  <a:buNone/>
+                  <a:tabLst/>
+                  <a:defRPr/>
+                </a:pPr>
+                <a:endParaRPr kumimoji="0" lang="zh-CN" altLang="en-US" sz="1800" b="0" i="0" u="none" strike="noStrike" kern="1200" cap="none" spc="0" normalizeH="0" baseline="0" noProof="0">
+                  <a:ln>
+                    <a:noFill/>
+                  </a:ln>
+                  <a:solidFill>
+                    <a:prstClr val="white"/>
+                  </a:solidFill>
+                  <a:effectLst/>
+                  <a:uLnTx/>
+                  <a:uFillTx/>
+                  <a:latin typeface="等线" panose="020F0502020204030204"/>
+                  <a:ea typeface="等线" panose="02010600030101010101" pitchFamily="2" charset="-122"/>
+                  <a:cs typeface="+mn-cs"/>
+                </a:endParaRPr>
+              </a:p>
+            </p:txBody>
+          </p:sp>
+          <p:sp>
+            <p:nvSpPr>
+              <p:cNvPr id="67" name="椭圆 66">
+                <a:extLst>
+                  <a:ext uri="{FF2B5EF4-FFF2-40B4-BE49-F238E27FC236}">
+                    <a16:creationId xmlns:a16="http://schemas.microsoft.com/office/drawing/2014/main" id="{82626319-AA26-4955-A94C-15CA1727E2EE}"/>
+                  </a:ext>
+                </a:extLst>
+              </p:cNvPr>
+              <p:cNvSpPr/>
+              <p:nvPr/>
+            </p:nvSpPr>
+            <p:spPr>
+              <a:xfrm>
+                <a:off x="6187441" y="3202272"/>
+                <a:ext cx="173256" cy="173256"/>
+              </a:xfrm>
+              <a:prstGeom prst="ellipse">
+                <a:avLst/>
+              </a:prstGeom>
+              <a:solidFill>
+                <a:srgbClr val="0000CD"/>
+              </a:solidFill>
+              <a:ln>
+                <a:solidFill>
+                  <a:srgbClr val="0000CD"/>
+                </a:solidFill>
+              </a:ln>
+            </p:spPr>
+            <p:style>
+              <a:lnRef idx="2">
+                <a:schemeClr val="accent4">
+                  <a:shade val="50000"/>
+                </a:schemeClr>
+              </a:lnRef>
+              <a:fillRef idx="1">
+                <a:schemeClr val="accent4"/>
+              </a:fillRef>
+              <a:effectRef idx="0">
+                <a:schemeClr val="accent4"/>
+              </a:effectRef>
+              <a:fontRef idx="minor">
+                <a:schemeClr val="lt1"/>
+              </a:fontRef>
+            </p:style>
+            <p:txBody>
+              <a:bodyPr rtlCol="0" anchor="ctr"/>
+              <a:lstStyle/>
+              <a:p>
+                <a:pPr marL="0" marR="0" lvl="0" indent="0" algn="ctr" defTabSz="914400" rtl="0" eaLnBrk="1" fontAlgn="auto" latinLnBrk="0" hangingPunct="1">
+                  <a:lnSpc>
+                    <a:spcPct val="100000"/>
+                  </a:lnSpc>
+                  <a:spcBef>
+                    <a:spcPts val="0"/>
+                  </a:spcBef>
+                  <a:spcAft>
+                    <a:spcPts val="0"/>
+                  </a:spcAft>
+                  <a:buClrTx/>
+                  <a:buSzTx/>
+                  <a:buFontTx/>
+                  <a:buNone/>
+                  <a:tabLst/>
+                  <a:defRPr/>
+                </a:pPr>
+                <a:endParaRPr kumimoji="0" lang="zh-CN" altLang="en-US" sz="1800" b="0" i="0" u="none" strike="noStrike" kern="1200" cap="none" spc="0" normalizeH="0" baseline="0" noProof="0">
+                  <a:ln>
+                    <a:noFill/>
+                  </a:ln>
+                  <a:solidFill>
+                    <a:prstClr val="white"/>
+                  </a:solidFill>
+                  <a:effectLst/>
+                  <a:uLnTx/>
+                  <a:uFillTx/>
+                  <a:latin typeface="等线" panose="020F0502020204030204"/>
+                  <a:ea typeface="等线" panose="02010600030101010101" pitchFamily="2" charset="-122"/>
+                  <a:cs typeface="+mn-cs"/>
+                </a:endParaRPr>
+              </a:p>
+            </p:txBody>
+          </p:sp>
+          <p:cxnSp>
+            <p:nvCxnSpPr>
+              <p:cNvPr id="68" name="连接符: 曲线 67">
+                <a:extLst>
+                  <a:ext uri="{FF2B5EF4-FFF2-40B4-BE49-F238E27FC236}">
+                    <a16:creationId xmlns:a16="http://schemas.microsoft.com/office/drawing/2014/main" id="{686405EB-6DDD-40E4-BD30-FF14938B0645}"/>
+                  </a:ext>
+                </a:extLst>
+              </p:cNvPr>
+              <p:cNvCxnSpPr>
+                <a:cxnSpLocks/>
+                <a:stCxn id="66" idx="0"/>
+              </p:cNvCxnSpPr>
+              <p:nvPr/>
+            </p:nvCxnSpPr>
+            <p:spPr>
+              <a:xfrm rot="5400000" flipH="1" flipV="1">
+                <a:off x="5446979" y="2909921"/>
+                <a:ext cx="389022" cy="841644"/>
+              </a:xfrm>
+              <a:prstGeom prst="curvedConnector2">
+                <a:avLst/>
+              </a:prstGeom>
+              <a:ln>
+                <a:solidFill>
+                  <a:srgbClr val="FF0000"/>
+                </a:solidFill>
+                <a:tailEnd type="triangle"/>
+              </a:ln>
+            </p:spPr>
+            <p:style>
+              <a:lnRef idx="1">
+                <a:schemeClr val="dk1"/>
+              </a:lnRef>
+              <a:fillRef idx="0">
+                <a:schemeClr val="dk1"/>
+              </a:fillRef>
+              <a:effectRef idx="0">
+                <a:schemeClr val="dk1"/>
+              </a:effectRef>
+              <a:fontRef idx="minor">
+                <a:schemeClr val="tx1"/>
+              </a:fontRef>
+            </p:style>
+          </p:cxnSp>
+        </p:grpSp>
+        <p:cxnSp>
+          <p:nvCxnSpPr>
+            <p:cNvPr id="55" name="连接符: 曲线 54">
+              <a:extLst>
+                <a:ext uri="{FF2B5EF4-FFF2-40B4-BE49-F238E27FC236}">
+                  <a16:creationId xmlns:a16="http://schemas.microsoft.com/office/drawing/2014/main" id="{FE2C92BF-C81F-425D-8743-A435357C0727}"/>
+                </a:ext>
+              </a:extLst>
+            </p:cNvPr>
+            <p:cNvCxnSpPr>
+              <a:cxnSpLocks/>
+              <a:stCxn id="63" idx="7"/>
+            </p:cNvCxnSpPr>
+            <p:nvPr/>
+          </p:nvCxnSpPr>
+          <p:spPr>
+            <a:xfrm rot="5400000" flipH="1" flipV="1">
+              <a:off x="7596699" y="1742188"/>
+              <a:ext cx="370679" cy="670460"/>
+            </a:xfrm>
+            <a:prstGeom prst="curvedConnector2">
+              <a:avLst/>
+            </a:prstGeom>
+            <a:ln>
+              <a:tailEnd type="triangle"/>
+            </a:ln>
+          </p:spPr>
+          <p:style>
+            <a:lnRef idx="1">
+              <a:schemeClr val="accent2"/>
+            </a:lnRef>
+            <a:fillRef idx="0">
+              <a:schemeClr val="accent2"/>
+            </a:fillRef>
+            <a:effectRef idx="0">
+              <a:schemeClr val="accent2"/>
+            </a:effectRef>
+            <a:fontRef idx="minor">
+              <a:schemeClr val="tx1"/>
+            </a:fontRef>
+          </p:style>
+        </p:cxnSp>
+        <p:cxnSp>
+          <p:nvCxnSpPr>
+            <p:cNvPr id="56" name="连接符: 曲线 55">
+              <a:extLst>
+                <a:ext uri="{FF2B5EF4-FFF2-40B4-BE49-F238E27FC236}">
+                  <a16:creationId xmlns:a16="http://schemas.microsoft.com/office/drawing/2014/main" id="{2C6C7483-52FF-41FE-9150-51D52888C97B}"/>
+                </a:ext>
+              </a:extLst>
+            </p:cNvPr>
+            <p:cNvCxnSpPr>
+              <a:cxnSpLocks/>
+              <a:stCxn id="62" idx="1"/>
+            </p:cNvCxnSpPr>
+            <p:nvPr/>
+          </p:nvCxnSpPr>
+          <p:spPr>
+            <a:xfrm rot="16200000" flipV="1">
+              <a:off x="4204064" y="1373777"/>
+              <a:ext cx="238695" cy="315622"/>
+            </a:xfrm>
+            <a:prstGeom prst="curvedConnector2">
+              <a:avLst/>
+            </a:prstGeom>
+            <a:ln>
+              <a:tailEnd type="triangle"/>
+            </a:ln>
+          </p:spPr>
+          <p:style>
+            <a:lnRef idx="1">
+              <a:schemeClr val="accent2"/>
+            </a:lnRef>
+            <a:fillRef idx="0">
+              <a:schemeClr val="accent2"/>
+            </a:fillRef>
+            <a:effectRef idx="0">
+              <a:schemeClr val="accent2"/>
+            </a:effectRef>
+            <a:fontRef idx="minor">
+              <a:schemeClr val="tx1"/>
+            </a:fontRef>
+          </p:style>
+        </p:cxnSp>
+        <p:cxnSp>
+          <p:nvCxnSpPr>
+            <p:cNvPr id="57" name="连接符: 曲线 56">
+              <a:extLst>
+                <a:ext uri="{FF2B5EF4-FFF2-40B4-BE49-F238E27FC236}">
+                  <a16:creationId xmlns:a16="http://schemas.microsoft.com/office/drawing/2014/main" id="{BF3FEA33-E2B9-4811-A645-F33F70CD2CBC}"/>
+                </a:ext>
+              </a:extLst>
+            </p:cNvPr>
+            <p:cNvCxnSpPr>
+              <a:cxnSpLocks/>
+              <a:stCxn id="64" idx="0"/>
+            </p:cNvCxnSpPr>
+            <p:nvPr/>
+          </p:nvCxnSpPr>
+          <p:spPr>
+            <a:xfrm rot="16200000" flipV="1">
+              <a:off x="4603033" y="2383933"/>
+              <a:ext cx="301478" cy="383863"/>
+            </a:xfrm>
+            <a:prstGeom prst="curvedConnector2">
+              <a:avLst/>
+            </a:prstGeom>
+            <a:ln>
+              <a:tailEnd type="triangle"/>
+            </a:ln>
+          </p:spPr>
+          <p:style>
+            <a:lnRef idx="1">
+              <a:schemeClr val="accent2"/>
+            </a:lnRef>
+            <a:fillRef idx="0">
+              <a:schemeClr val="accent2"/>
+            </a:fillRef>
+            <a:effectRef idx="0">
+              <a:schemeClr val="accent2"/>
+            </a:effectRef>
+            <a:fontRef idx="minor">
+              <a:schemeClr val="tx1"/>
+            </a:fontRef>
+          </p:style>
+        </p:cxnSp>
+        <p:cxnSp>
+          <p:nvCxnSpPr>
+            <p:cNvPr id="58" name="连接符: 曲线 57">
+              <a:extLst>
+                <a:ext uri="{FF2B5EF4-FFF2-40B4-BE49-F238E27FC236}">
+                  <a16:creationId xmlns:a16="http://schemas.microsoft.com/office/drawing/2014/main" id="{6213B31A-DF10-49BE-B754-CD01915F5418}"/>
+                </a:ext>
+              </a:extLst>
+            </p:cNvPr>
+            <p:cNvCxnSpPr>
+              <a:cxnSpLocks/>
+              <a:stCxn id="65" idx="1"/>
+            </p:cNvCxnSpPr>
+            <p:nvPr/>
+          </p:nvCxnSpPr>
+          <p:spPr>
+            <a:xfrm rot="16200000" flipV="1">
+              <a:off x="5508487" y="3940313"/>
+              <a:ext cx="354910" cy="439724"/>
+            </a:xfrm>
+            <a:prstGeom prst="curvedConnector2">
+              <a:avLst/>
+            </a:prstGeom>
+            <a:ln>
+              <a:tailEnd type="triangle"/>
+            </a:ln>
+          </p:spPr>
+          <p:style>
+            <a:lnRef idx="1">
+              <a:schemeClr val="accent2"/>
+            </a:lnRef>
+            <a:fillRef idx="0">
+              <a:schemeClr val="accent2"/>
+            </a:fillRef>
+            <a:effectRef idx="0">
+              <a:schemeClr val="accent2"/>
+            </a:effectRef>
+            <a:fontRef idx="minor">
+              <a:schemeClr val="tx1"/>
+            </a:fontRef>
+          </p:style>
+        </p:cxnSp>
+        <p:sp>
+          <p:nvSpPr>
+            <p:cNvPr id="59" name="文本框 58">
+              <a:extLst>
+                <a:ext uri="{FF2B5EF4-FFF2-40B4-BE49-F238E27FC236}">
+                  <a16:creationId xmlns:a16="http://schemas.microsoft.com/office/drawing/2014/main" id="{0469B7F3-B6F7-40EB-B968-11E43D9658FB}"/>
+                </a:ext>
+              </a:extLst>
+            </p:cNvPr>
+            <p:cNvSpPr txBox="1"/>
+            <p:nvPr/>
+          </p:nvSpPr>
+          <p:spPr>
+            <a:xfrm>
+              <a:off x="3900516" y="203170"/>
+              <a:ext cx="1318977" cy="417518"/>
+            </a:xfrm>
+            <a:prstGeom prst="rect">
+              <a:avLst/>
+            </a:prstGeom>
+            <a:noFill/>
+          </p:spPr>
+          <p:txBody>
+            <a:bodyPr wrap="square" rtlCol="0">
+              <a:spAutoFit/>
+            </a:bodyPr>
+            <a:lstStyle/>
+            <a:p>
+              <a:pPr marL="0" marR="0" lvl="0" indent="0" algn="l" defTabSz="914400" rtl="0" eaLnBrk="1" fontAlgn="auto" latinLnBrk="0" hangingPunct="1">
+                <a:lnSpc>
+                  <a:spcPct val="100000"/>
+                </a:lnSpc>
+                <a:spcBef>
+                  <a:spcPts val="0"/>
+                </a:spcBef>
+                <a:spcAft>
+                  <a:spcPts val="0"/>
+                </a:spcAft>
+                <a:buClrTx/>
+                <a:buSzTx/>
+                <a:buFontTx/>
+                <a:buNone/>
+                <a:tabLst/>
+                <a:defRPr/>
+              </a:pPr>
+              <a:r>
+                <a:rPr kumimoji="0" lang="en-US" altLang="zh-CN" sz="1800" b="1" i="0" u="none" strike="noStrike" kern="1200" cap="none" spc="0" normalizeH="0" baseline="0" noProof="0" dirty="0">
+                  <a:ln>
+                    <a:noFill/>
+                  </a:ln>
+                  <a:solidFill>
+                    <a:prstClr val="white"/>
+                  </a:solidFill>
+                  <a:effectLst/>
+                  <a:uLnTx/>
+                  <a:uFillTx/>
+                  <a:latin typeface="等线" panose="020F0502020204030204"/>
+                  <a:ea typeface="等线" panose="02010600030101010101" pitchFamily="2" charset="-122"/>
+                  <a:cs typeface="+mn-cs"/>
+                </a:rPr>
+                <a:t>Time: 7s</a:t>
+              </a:r>
+              <a:endParaRPr kumimoji="0" lang="zh-CN" altLang="en-US" sz="1800" b="1" i="0" u="none" strike="noStrike" kern="1200" cap="none" spc="0" normalizeH="0" baseline="0" noProof="0" dirty="0">
+                <a:ln>
+                  <a:noFill/>
+                </a:ln>
+                <a:solidFill>
+                  <a:prstClr val="white"/>
+                </a:solidFill>
+                <a:effectLst/>
+                <a:uLnTx/>
+                <a:uFillTx/>
+                <a:latin typeface="等线" panose="020F0502020204030204"/>
+                <a:ea typeface="等线" panose="02010600030101010101" pitchFamily="2" charset="-122"/>
+                <a:cs typeface="+mn-cs"/>
+              </a:endParaRPr>
+            </a:p>
+          </p:txBody>
+        </p:sp>
+        <p:sp>
+          <p:nvSpPr>
+            <p:cNvPr id="60" name="文本框 59">
+              <a:extLst>
+                <a:ext uri="{FF2B5EF4-FFF2-40B4-BE49-F238E27FC236}">
+                  <a16:creationId xmlns:a16="http://schemas.microsoft.com/office/drawing/2014/main" id="{26F9E336-869D-47E6-85A4-ADDFEEF016C0}"/>
+                </a:ext>
+              </a:extLst>
+            </p:cNvPr>
+            <p:cNvSpPr txBox="1"/>
+            <p:nvPr/>
+          </p:nvSpPr>
+          <p:spPr>
+            <a:xfrm>
+              <a:off x="6404750" y="208361"/>
+              <a:ext cx="2072528" cy="394959"/>
+            </a:xfrm>
+            <a:prstGeom prst="rect">
+              <a:avLst/>
+            </a:prstGeom>
+            <a:noFill/>
+          </p:spPr>
+          <p:txBody>
+            <a:bodyPr wrap="square" rtlCol="0">
+              <a:spAutoFit/>
+            </a:bodyPr>
+            <a:lstStyle/>
+            <a:p>
+              <a:pPr marL="0" marR="0" lvl="0" indent="0" algn="l" defTabSz="914400" rtl="0" eaLnBrk="1" fontAlgn="auto" latinLnBrk="0" hangingPunct="1">
+                <a:lnSpc>
+                  <a:spcPct val="100000"/>
+                </a:lnSpc>
+                <a:spcBef>
+                  <a:spcPts val="0"/>
+                </a:spcBef>
+                <a:spcAft>
+                  <a:spcPts val="0"/>
+                </a:spcAft>
+                <a:buClrTx/>
+                <a:buSzTx/>
+                <a:buFontTx/>
+                <a:buNone/>
+                <a:tabLst/>
+                <a:defRPr/>
+              </a:pPr>
+              <a:r>
+                <a:rPr kumimoji="0" lang="en-US" altLang="zh-CN" sz="1800" b="1" i="0" u="none" strike="noStrike" kern="1200" cap="none" spc="0" normalizeH="0" baseline="0" noProof="0" dirty="0">
+                  <a:ln>
+                    <a:noFill/>
+                  </a:ln>
+                  <a:solidFill>
+                    <a:srgbClr val="00FF00"/>
+                  </a:solidFill>
+                  <a:effectLst/>
+                  <a:uLnTx/>
+                  <a:uFillTx/>
+                  <a:latin typeface="等线" panose="020F0502020204030204"/>
+                  <a:ea typeface="等线" panose="02010600030101010101" pitchFamily="2" charset="-122"/>
+                  <a:cs typeface="+mn-cs"/>
+                </a:rPr>
+                <a:t>Total Score: 10</a:t>
+              </a:r>
+              <a:endParaRPr kumimoji="0" lang="zh-CN" altLang="en-US" sz="1800" b="1" i="0" u="none" strike="noStrike" kern="1200" cap="none" spc="0" normalizeH="0" baseline="0" noProof="0" dirty="0">
+                <a:ln>
+                  <a:noFill/>
+                </a:ln>
+                <a:solidFill>
+                  <a:srgbClr val="00FF00"/>
+                </a:solidFill>
+                <a:effectLst/>
+                <a:uLnTx/>
+                <a:uFillTx/>
+                <a:latin typeface="等线" panose="020F0502020204030204"/>
+                <a:ea typeface="等线" panose="02010600030101010101" pitchFamily="2" charset="-122"/>
+                <a:cs typeface="+mn-cs"/>
+              </a:endParaRPr>
+            </a:p>
+          </p:txBody>
+        </p:sp>
+      </p:grpSp>
+      <p:sp>
+        <p:nvSpPr>
+          <p:cNvPr id="20" name="椭圆 19">
+            <a:extLst>
+              <a:ext uri="{FF2B5EF4-FFF2-40B4-BE49-F238E27FC236}">
+                <a16:creationId xmlns:a16="http://schemas.microsoft.com/office/drawing/2014/main" id="{BD514CDC-356F-4474-B104-8E06EEAE033A}"/>
+              </a:ext>
+            </a:extLst>
+          </p:cNvPr>
+          <p:cNvSpPr/>
+          <p:nvPr/>
+        </p:nvSpPr>
+        <p:spPr>
+          <a:xfrm>
+            <a:off x="2926985" y="2646147"/>
+            <a:ext cx="210842" cy="209107"/>
+          </a:xfrm>
+          <a:prstGeom prst="ellipse">
+            <a:avLst/>
+          </a:prstGeom>
+          <a:solidFill>
+            <a:schemeClr val="accent6">
+              <a:lumMod val="75000"/>
+            </a:schemeClr>
+          </a:solidFill>
+          <a:ln>
+            <a:solidFill>
+              <a:schemeClr val="accent6">
+                <a:lumMod val="75000"/>
+              </a:schemeClr>
+            </a:solidFill>
+          </a:ln>
+        </p:spPr>
+        <p:style>
+          <a:lnRef idx="2">
+            <a:schemeClr val="accent1">
+              <a:shade val="50000"/>
+            </a:schemeClr>
+          </a:lnRef>
+          <a:fillRef idx="1">
+            <a:schemeClr val="accent1"/>
+          </a:fillRef>
+          <a:effectRef idx="0">
+            <a:schemeClr val="accent1"/>
+          </a:effectRef>
+          <a:fontRef idx="minor">
+            <a:schemeClr val="lt1"/>
+          </a:fontRef>
+        </p:style>
+        <p:txBody>
+          <a:bodyPr rtlCol="0" anchor="ctr"/>
+          <a:lstStyle/>
+          <a:p>
+            <a:pPr marL="0" marR="0" lvl="0" indent="0" algn="ctr" defTabSz="914400" rtl="0" eaLnBrk="1" fontAlgn="auto" latinLnBrk="0" hangingPunct="1">
+              <a:lnSpc>
+                <a:spcPct val="100000"/>
+              </a:lnSpc>
+              <a:spcBef>
+                <a:spcPts val="0"/>
+              </a:spcBef>
+              <a:spcAft>
+                <a:spcPts val="0"/>
+              </a:spcAft>
+              <a:buClrTx/>
+              <a:buSzTx/>
+              <a:buFontTx/>
+              <a:buNone/>
+              <a:tabLst/>
+              <a:defRPr/>
+            </a:pPr>
+            <a:endParaRPr kumimoji="0" lang="zh-CN" altLang="en-US" sz="1800" b="0" i="0" u="none" strike="noStrike" kern="1200" cap="none" spc="0" normalizeH="0" baseline="0" noProof="0" dirty="0">
+              <a:ln>
+                <a:noFill/>
+              </a:ln>
+              <a:solidFill>
+                <a:srgbClr val="C00000"/>
+              </a:solidFill>
+              <a:effectLst/>
+              <a:uLnTx/>
+              <a:uFillTx/>
+              <a:latin typeface="等线" panose="020F0502020204030204"/>
+              <a:ea typeface="等线" panose="02010600030101010101" pitchFamily="2" charset="-122"/>
+              <a:cs typeface="+mn-cs"/>
+            </a:endParaRPr>
+          </a:p>
+        </p:txBody>
+      </p:sp>
+      <p:cxnSp>
+        <p:nvCxnSpPr>
+          <p:cNvPr id="21" name="连接符: 曲线 20">
+            <a:extLst>
+              <a:ext uri="{FF2B5EF4-FFF2-40B4-BE49-F238E27FC236}">
+                <a16:creationId xmlns:a16="http://schemas.microsoft.com/office/drawing/2014/main" id="{86BC0D5F-E9FB-42EC-BFC4-D2BA929B58DA}"/>
+              </a:ext>
+            </a:extLst>
+          </p:cNvPr>
+          <p:cNvCxnSpPr>
+            <a:cxnSpLocks/>
+            <a:stCxn id="20" idx="6"/>
+            <a:endCxn id="63" idx="1"/>
+          </p:cNvCxnSpPr>
+          <p:nvPr/>
+        </p:nvCxnSpPr>
+        <p:spPr>
+          <a:xfrm>
+            <a:off x="3137827" y="2750701"/>
+            <a:ext cx="628794" cy="246154"/>
+          </a:xfrm>
+          <a:prstGeom prst="curvedConnector2">
+            <a:avLst/>
+          </a:prstGeom>
+          <a:ln>
+            <a:solidFill>
+              <a:schemeClr val="accent6">
+                <a:lumMod val="75000"/>
+              </a:schemeClr>
+            </a:solidFill>
+            <a:tailEnd type="triangle"/>
+          </a:ln>
+        </p:spPr>
+        <p:style>
+          <a:lnRef idx="1">
+            <a:schemeClr val="dk1"/>
+          </a:lnRef>
+          <a:fillRef idx="0">
+            <a:schemeClr val="dk1"/>
+          </a:fillRef>
+          <a:effectRef idx="0">
+            <a:schemeClr val="dk1"/>
+          </a:effectRef>
+          <a:fontRef idx="minor">
+            <a:schemeClr val="tx1"/>
+          </a:fontRef>
+        </p:style>
+      </p:cxnSp>
+    </p:spTree>
+    <p:extLst>
+      <p:ext uri="{BB962C8B-B14F-4D97-AF65-F5344CB8AC3E}">
+        <p14:creationId xmlns:p14="http://schemas.microsoft.com/office/powerpoint/2010/main" val="3007792076"/>
+      </p:ext>
+    </p:extLst>
+  </p:cSld>
+  <p:clrMapOvr>
+    <a:masterClrMapping/>
+  </p:clrMapOvr>
+</p:sld>
+</file>
+
+<file path=ppt/slides/slide6.xml><?xml version="1.0" encoding="utf-8"?>
+<p:sld xmlns:a="http://schemas.openxmlformats.org/drawingml/2006/main" xmlns:r="http://schemas.openxmlformats.org/officeDocument/2006/relationships" xmlns:p="http://schemas.openxmlformats.org/presentationml/2006/main">
+  <p:cSld>
+    <p:spTree>
+      <p:nvGrpSpPr>
+        <p:cNvPr id="1" name=""/>
+        <p:cNvGrpSpPr/>
+        <p:nvPr/>
+      </p:nvGrpSpPr>
+      <p:grpSpPr>
+        <a:xfrm>
+          <a:off x="0" y="0"/>
+          <a:ext cx="0" cy="0"/>
+          <a:chOff x="0" y="0"/>
+          <a:chExt cx="0" cy="0"/>
+        </a:xfrm>
+      </p:grpSpPr>
+      <p:sp>
+        <p:nvSpPr>
+          <p:cNvPr id="4" name="矩形 3"/>
+          <p:cNvSpPr/>
+          <p:nvPr/>
+        </p:nvSpPr>
+        <p:spPr>
+          <a:xfrm>
+            <a:off x="0" y="0"/>
+            <a:ext cx="12192000" cy="6858000"/>
+          </a:xfrm>
+          <a:prstGeom prst="rect">
+            <a:avLst/>
+          </a:prstGeom>
+          <a:solidFill>
+            <a:schemeClr val="bg2">
+              <a:lumMod val="25000"/>
+            </a:schemeClr>
+          </a:solidFill>
+          <a:ln>
+            <a:noFill/>
+          </a:ln>
+        </p:spPr>
+        <p:style>
+          <a:lnRef idx="3">
+            <a:schemeClr val="lt1"/>
+          </a:lnRef>
+          <a:fillRef idx="1">
+            <a:schemeClr val="accent3"/>
+          </a:fillRef>
+          <a:effectRef idx="1">
+            <a:schemeClr val="accent3"/>
+          </a:effectRef>
+          <a:fontRef idx="minor">
+            <a:schemeClr val="lt1"/>
+          </a:fontRef>
+        </p:style>
+        <p:txBody>
+          <a:bodyPr rtlCol="0" anchor="ctr"/>
+          <a:lstStyle/>
+          <a:p>
+            <a:pPr lvl="4">
+              <a:lnSpc>
+                <a:spcPct val="150000"/>
+              </a:lnSpc>
+            </a:pPr>
+            <a:r>
+              <a:rPr lang="zh-CN" altLang="en-US" sz="2800" dirty="0">
+                <a:latin typeface="黑体" panose="02010609060101010101" pitchFamily="49" charset="-122"/>
+                <a:ea typeface="黑体" panose="02010609060101010101" pitchFamily="49" charset="-122"/>
+              </a:rPr>
+              <a:t>游戏开始后，前面六轮将作为练习，</a:t>
+            </a:r>
+            <a:endParaRPr lang="en-US" altLang="zh-CN" sz="2800" dirty="0">
+              <a:latin typeface="黑体" panose="02010609060101010101" pitchFamily="49" charset="-122"/>
+              <a:ea typeface="黑体" panose="02010609060101010101" pitchFamily="49" charset="-122"/>
+            </a:endParaRPr>
+          </a:p>
+          <a:p>
+            <a:pPr lvl="4">
+              <a:lnSpc>
+                <a:spcPct val="150000"/>
+              </a:lnSpc>
+            </a:pPr>
+            <a:r>
+              <a:rPr lang="zh-CN" altLang="en-US" sz="2800" dirty="0">
+                <a:latin typeface="黑体" panose="02010609060101010101" pitchFamily="49" charset="-122"/>
+                <a:ea typeface="黑体" panose="02010609060101010101" pitchFamily="49" charset="-122"/>
+              </a:rPr>
+              <a:t>便于进一步理解规则以及熟悉操作，不计入成绩。</a:t>
+            </a:r>
+            <a:endParaRPr lang="en-US" altLang="zh-CN" sz="2800" dirty="0">
+              <a:latin typeface="黑体" panose="02010609060101010101" pitchFamily="49" charset="-122"/>
+              <a:ea typeface="黑体" panose="02010609060101010101" pitchFamily="49" charset="-122"/>
+            </a:endParaRPr>
+          </a:p>
+          <a:p>
+            <a:pPr lvl="4">
+              <a:lnSpc>
+                <a:spcPct val="150000"/>
+              </a:lnSpc>
+            </a:pPr>
+            <a:r>
+              <a:rPr lang="zh-CN" altLang="en-US" sz="2800" dirty="0">
+                <a:latin typeface="黑体" panose="02010609060101010101" pitchFamily="49" charset="-122"/>
+                <a:ea typeface="黑体" panose="02010609060101010101" pitchFamily="49" charset="-122"/>
+              </a:rPr>
+              <a:t>待双方玩家都明确游戏规则后，再进入正式游戏。</a:t>
+            </a:r>
+          </a:p>
+        </p:txBody>
+      </p:sp>
+    </p:spTree>
+    <p:extLst>
+      <p:ext uri="{BB962C8B-B14F-4D97-AF65-F5344CB8AC3E}">
+        <p14:creationId xmlns:p14="http://schemas.microsoft.com/office/powerpoint/2010/main" val="2838034172"/>
+      </p:ext>
+    </p:extLst>
+  </p:cSld>
+  <p:clrMapOvr>
+    <a:masterClrMapping/>
+  </p:clrMapOvr>
+</p:sld>
+</file>
+
+<file path=ppt/slides/slide7.xml><?xml version="1.0" encoding="utf-8"?>
 <p:sld xmlns:a="http://schemas.openxmlformats.org/drawingml/2006/main" xmlns:r="http://schemas.openxmlformats.org/officeDocument/2006/relationships" xmlns:p="http://schemas.openxmlformats.org/presentationml/2006/main">
   <p:cSld>
     <p:spTree>
@@ -6735,7 +10474,7 @@
                 <a:latin typeface="黑体" panose="02010609060101010101" pitchFamily="49" charset="-122"/>
                 <a:ea typeface="黑体" panose="02010609060101010101" pitchFamily="49" charset="-122"/>
               </a:rPr>
-              <a:t>游戏界面刷新，两名玩家的位置也会刷新</a:t>
+              <a:t>游戏界面刷新，玩家的位置也会刷新</a:t>
             </a:r>
             <a:endParaRPr lang="en-US" altLang="zh-CN" b="1" dirty="0">
               <a:solidFill>
@@ -6864,7 +10603,7 @@
                 <a:latin typeface="黑体" panose="02010609060101010101" pitchFamily="49" charset="-122"/>
                 <a:ea typeface="黑体" panose="02010609060101010101" pitchFamily="49" charset="-122"/>
               </a:rPr>
-              <a:t>等待双方确认后游戏开始。</a:t>
+              <a:t>等待各玩家确认后游戏开始。</a:t>
             </a:r>
           </a:p>
         </p:txBody>
@@ -7412,7 +11151,7 @@
 </p:sld>
 </file>
 
-<file path=ppt/slides/slide5.xml><?xml version="1.0" encoding="utf-8"?>
+<file path=ppt/slides/slide8.xml><?xml version="1.0" encoding="utf-8"?>
 <p:sld xmlns:a="http://schemas.openxmlformats.org/drawingml/2006/main" xmlns:r="http://schemas.openxmlformats.org/officeDocument/2006/relationships" xmlns:p="http://schemas.openxmlformats.org/presentationml/2006/main">
   <p:cSld>
     <p:spTree>
@@ -7544,7 +11283,26 @@
                 <a:latin typeface="黑体" panose="02010609060101010101" pitchFamily="49" charset="-122"/>
                 <a:ea typeface="黑体" panose="02010609060101010101" pitchFamily="49" charset="-122"/>
               </a:rPr>
-              <a:t>等待双方确认后游戏继续。</a:t>
+              <a:t>等待</a:t>
+            </a:r>
+            <a:r>
+              <a:rPr lang="zh-CN" altLang="en-US" sz="2800" b="1" dirty="0">
+                <a:solidFill>
+                  <a:schemeClr val="bg1">
+                    <a:lumMod val="95000"/>
+                  </a:schemeClr>
+                </a:solidFill>
+                <a:latin typeface="黑体" panose="02010609060101010101" pitchFamily="49" charset="-122"/>
+                <a:ea typeface="黑体" panose="02010609060101010101" pitchFamily="49" charset="-122"/>
+              </a:rPr>
+              <a:t>各玩家</a:t>
+            </a:r>
+            <a:r>
+              <a:rPr lang="zh-CN" altLang="en-US" sz="2800" b="1" dirty="0">
+                <a:latin typeface="黑体" panose="02010609060101010101" pitchFamily="49" charset="-122"/>
+                <a:ea typeface="黑体" panose="02010609060101010101" pitchFamily="49" charset="-122"/>
+              </a:rPr>
+              <a:t>确认后游戏继续。</a:t>
             </a:r>
             <a:endParaRPr lang="zh-CN" altLang="en-US" sz="3600" b="1" dirty="0">
               <a:latin typeface="黑体" panose="02010609060101010101" pitchFamily="49" charset="-122"/>
@@ -7837,111 +11595,7 @@
 </p:sld>
 </file>
 
-<file path=ppt/slides/slide6.xml><?xml version="1.0" encoding="utf-8"?>
-<p:sld xmlns:a="http://schemas.openxmlformats.org/drawingml/2006/main" xmlns:r="http://schemas.openxmlformats.org/officeDocument/2006/relationships" xmlns:p="http://schemas.openxmlformats.org/presentationml/2006/main">
-  <p:cSld>
-    <p:spTree>
-      <p:nvGrpSpPr>
-        <p:cNvPr id="1" name=""/>
-        <p:cNvGrpSpPr/>
-        <p:nvPr/>
-      </p:nvGrpSpPr>
-      <p:grpSpPr>
-        <a:xfrm>
-          <a:off x="0" y="0"/>
-          <a:ext cx="0" cy="0"/>
-          <a:chOff x="0" y="0"/>
-          <a:chExt cx="0" cy="0"/>
-        </a:xfrm>
-      </p:grpSpPr>
-      <p:sp>
-        <p:nvSpPr>
-          <p:cNvPr id="4" name="矩形 3"/>
-          <p:cNvSpPr/>
-          <p:nvPr/>
-        </p:nvSpPr>
-        <p:spPr>
-          <a:xfrm>
-            <a:off x="887506" y="416859"/>
-            <a:ext cx="10273830" cy="6131859"/>
-          </a:xfrm>
-          <a:prstGeom prst="rect">
-            <a:avLst/>
-          </a:prstGeom>
-          <a:solidFill>
-            <a:schemeClr val="bg2">
-              <a:lumMod val="25000"/>
-            </a:schemeClr>
-          </a:solidFill>
-          <a:ln>
-            <a:noFill/>
-          </a:ln>
-        </p:spPr>
-        <p:style>
-          <a:lnRef idx="3">
-            <a:schemeClr val="lt1"/>
-          </a:lnRef>
-          <a:fillRef idx="1">
-            <a:schemeClr val="accent3"/>
-          </a:fillRef>
-          <a:effectRef idx="1">
-            <a:schemeClr val="accent3"/>
-          </a:effectRef>
-          <a:fontRef idx="minor">
-            <a:schemeClr val="lt1"/>
-          </a:fontRef>
-        </p:style>
-        <p:txBody>
-          <a:bodyPr rtlCol="0" anchor="ctr"/>
-          <a:lstStyle/>
-          <a:p>
-            <a:pPr marL="0" lvl="4" algn="ctr">
-              <a:lnSpc>
-                <a:spcPct val="150000"/>
-              </a:lnSpc>
-            </a:pPr>
-            <a:r>
-              <a:rPr lang="zh-CN" altLang="en-US" sz="5400" b="1" dirty="0">
-                <a:latin typeface="黑体" panose="02010609060101010101" pitchFamily="49" charset="-122"/>
-                <a:ea typeface="黑体" panose="02010609060101010101" pitchFamily="49" charset="-122"/>
-              </a:rPr>
-              <a:t>等待双方休息完毕后</a:t>
-            </a:r>
-            <a:endParaRPr lang="en-US" altLang="zh-CN" sz="5400" b="1" dirty="0">
-              <a:latin typeface="黑体" panose="02010609060101010101" pitchFamily="49" charset="-122"/>
-              <a:ea typeface="黑体" panose="02010609060101010101" pitchFamily="49" charset="-122"/>
-            </a:endParaRPr>
-          </a:p>
-          <a:p>
-            <a:pPr marL="0" lvl="4" algn="ctr">
-              <a:lnSpc>
-                <a:spcPct val="150000"/>
-              </a:lnSpc>
-            </a:pPr>
-            <a:r>
-              <a:rPr lang="zh-CN" altLang="en-US" sz="5400" b="1" dirty="0">
-                <a:latin typeface="黑体" panose="02010609060101010101" pitchFamily="49" charset="-122"/>
-                <a:ea typeface="黑体" panose="02010609060101010101" pitchFamily="49" charset="-122"/>
-              </a:rPr>
-              <a:t>游戏继续。</a:t>
-            </a:r>
-          </a:p>
-        </p:txBody>
-      </p:sp>
-    </p:spTree>
-    <p:extLst>
-      <p:ext uri="{BB962C8B-B14F-4D97-AF65-F5344CB8AC3E}">
-        <p14:creationId xmlns:p14="http://schemas.microsoft.com/office/powerpoint/2010/main" val="679786441"/>
-      </p:ext>
-    </p:extLst>
-  </p:cSld>
-  <p:clrMapOvr>
-    <a:masterClrMapping/>
-  </p:clrMapOvr>
-</p:sld>
-</file>
-
-<file path=ppt/slides/slide7.xml><?xml version="1.0" encoding="utf-8"?>
+<file path=ppt/slides/slide9.xml><?xml version="1.0" encoding="utf-8"?>
 <p:sld xmlns:a="http://schemas.openxmlformats.org/drawingml/2006/main" xmlns:r="http://schemas.openxmlformats.org/officeDocument/2006/relationships" xmlns:p="http://schemas.openxmlformats.org/presentationml/2006/main">
   <p:cSld>
     <p:spTree>
@@ -8036,117 +11690,6 @@
     <p:extLst>
       <p:ext uri="{BB962C8B-B14F-4D97-AF65-F5344CB8AC3E}">
         <p14:creationId xmlns:p14="http://schemas.microsoft.com/office/powerpoint/2010/main" val="856994835"/>
-      </p:ext>
-    </p:extLst>
-  </p:cSld>
-  <p:clrMapOvr>
-    <a:masterClrMapping/>
-  </p:clrMapOvr>
-</p:sld>
-</file>
-
-<file path=ppt/slides/slide8.xml><?xml version="1.0" encoding="utf-8"?>
-<p:sld xmlns:a="http://schemas.openxmlformats.org/drawingml/2006/main" xmlns:r="http://schemas.openxmlformats.org/officeDocument/2006/relationships" xmlns:p="http://schemas.openxmlformats.org/presentationml/2006/main">
-  <p:cSld>
-    <p:spTree>
-      <p:nvGrpSpPr>
-        <p:cNvPr id="1" name=""/>
-        <p:cNvGrpSpPr/>
-        <p:nvPr/>
-      </p:nvGrpSpPr>
-      <p:grpSpPr>
-        <a:xfrm>
-          <a:off x="0" y="0"/>
-          <a:ext cx="0" cy="0"/>
-          <a:chOff x="0" y="0"/>
-          <a:chExt cx="0" cy="0"/>
-        </a:xfrm>
-      </p:grpSpPr>
-      <p:sp>
-        <p:nvSpPr>
-          <p:cNvPr id="4" name="矩形 3"/>
-          <p:cNvSpPr/>
-          <p:nvPr/>
-        </p:nvSpPr>
-        <p:spPr>
-          <a:xfrm>
-            <a:off x="887506" y="416859"/>
-            <a:ext cx="8767482" cy="6131859"/>
-          </a:xfrm>
-          <a:prstGeom prst="rect">
-            <a:avLst/>
-          </a:prstGeom>
-          <a:solidFill>
-            <a:schemeClr val="bg2">
-              <a:lumMod val="25000"/>
-            </a:schemeClr>
-          </a:solidFill>
-          <a:ln>
-            <a:noFill/>
-          </a:ln>
-        </p:spPr>
-        <p:style>
-          <a:lnRef idx="3">
-            <a:schemeClr val="lt1"/>
-          </a:lnRef>
-          <a:fillRef idx="1">
-            <a:schemeClr val="accent3"/>
-          </a:fillRef>
-          <a:effectRef idx="1">
-            <a:schemeClr val="accent3"/>
-          </a:effectRef>
-          <a:fontRef idx="minor">
-            <a:schemeClr val="lt1"/>
-          </a:fontRef>
-        </p:style>
-        <p:txBody>
-          <a:bodyPr rtlCol="0" anchor="ctr"/>
-          <a:lstStyle/>
-          <a:p>
-            <a:pPr lvl="4">
-              <a:lnSpc>
-                <a:spcPct val="150000"/>
-              </a:lnSpc>
-            </a:pPr>
-            <a:r>
-              <a:rPr lang="zh-CN" altLang="en-US" sz="5400" b="1" dirty="0">
-                <a:latin typeface="黑体" panose="02010609060101010101" pitchFamily="49" charset="-122"/>
-                <a:ea typeface="黑体" panose="02010609060101010101" pitchFamily="49" charset="-122"/>
-              </a:rPr>
-              <a:t>请休息片刻，</a:t>
-            </a:r>
-            <a:endParaRPr lang="en-US" altLang="zh-CN" sz="5400" b="1" dirty="0">
-              <a:latin typeface="黑体" panose="02010609060101010101" pitchFamily="49" charset="-122"/>
-              <a:ea typeface="黑体" panose="02010609060101010101" pitchFamily="49" charset="-122"/>
-            </a:endParaRPr>
-          </a:p>
-          <a:p>
-            <a:pPr lvl="4">
-              <a:lnSpc>
-                <a:spcPct val="150000"/>
-              </a:lnSpc>
-            </a:pPr>
-            <a:r>
-              <a:rPr lang="en-US" altLang="zh-CN" sz="5400" b="1" dirty="0">
-                <a:latin typeface="黑体" panose="02010609060101010101" pitchFamily="49" charset="-122"/>
-                <a:ea typeface="黑体" panose="02010609060101010101" pitchFamily="49" charset="-122"/>
-              </a:rPr>
-              <a:t>30s</a:t>
-            </a:r>
-            <a:r>
-              <a:rPr lang="zh-CN" altLang="en-US" sz="5400" b="1" dirty="0">
-                <a:latin typeface="黑体" panose="02010609060101010101" pitchFamily="49" charset="-122"/>
-                <a:ea typeface="黑体" panose="02010609060101010101" pitchFamily="49" charset="-122"/>
-              </a:rPr>
-              <a:t>后游戏继续。</a:t>
-            </a:r>
-          </a:p>
-        </p:txBody>
-      </p:sp>
-    </p:spTree>
-    <p:extLst>
-      <p:ext uri="{BB962C8B-B14F-4D97-AF65-F5344CB8AC3E}">
-        <p14:creationId xmlns:p14="http://schemas.microsoft.com/office/powerpoint/2010/main" val="3226466048"/>
       </p:ext>
     </p:extLst>
   </p:cSld>

</xml_diff>